<commit_message>
slides: minor revisions to final set
</commit_message>
<xml_diff>
--- a/slides/basicSE.pptx
+++ b/slides/basicSE.pptx
@@ -5,7 +5,7 @@
     <p:sldMasterId id="2147484294" r:id="rId1"/>
   </p:sldMasterIdLst>
   <p:notesMasterIdLst>
-    <p:notesMasterId r:id="rId9"/>
+    <p:notesMasterId r:id="rId10"/>
   </p:notesMasterIdLst>
   <p:sldIdLst>
     <p:sldId id="256" r:id="rId2"/>
@@ -15,6 +15,7 @@
     <p:sldId id="260" r:id="rId6"/>
     <p:sldId id="261" r:id="rId7"/>
     <p:sldId id="262" r:id="rId8"/>
+    <p:sldId id="263" r:id="rId9"/>
   </p:sldIdLst>
   <p:sldSz cx="12192000" cy="6858000"/>
   <p:notesSz cx="6858000" cy="9144000"/>
@@ -203,7 +204,7 @@
           <a:p>
             <a:fld id="{A58EF676-DA74-5E46-A6CE-5ED3069388CC}" type="datetimeFigureOut">
               <a:rPr lang="en-US" smtClean="0"/>
-              <a:t>5/15/20</a:t>
+              <a:t>5/18/20</a:t>
             </a:fld>
             <a:endParaRPr lang="en-US"/>
           </a:p>
@@ -945,7 +946,7 @@
           <a:p>
             <a:fld id="{51673806-0BCD-1F42-BAA8-2011034B3C6A}" type="datetimeFigureOut">
               <a:rPr lang="en-US" smtClean="0"/>
-              <a:t>5/15/20</a:t>
+              <a:t>5/18/20</a:t>
             </a:fld>
             <a:endParaRPr lang="en-US"/>
           </a:p>
@@ -1359,7 +1360,7 @@
           <a:p>
             <a:fld id="{51673806-0BCD-1F42-BAA8-2011034B3C6A}" type="datetimeFigureOut">
               <a:rPr lang="en-US" smtClean="0"/>
-              <a:t>5/15/20</a:t>
+              <a:t>5/18/20</a:t>
             </a:fld>
             <a:endParaRPr lang="en-US"/>
           </a:p>
@@ -1690,7 +1691,7 @@
           <a:p>
             <a:fld id="{51673806-0BCD-1F42-BAA8-2011034B3C6A}" type="datetimeFigureOut">
               <a:rPr lang="en-US" smtClean="0"/>
-              <a:t>5/15/20</a:t>
+              <a:t>5/18/20</a:t>
             </a:fld>
             <a:endParaRPr lang="en-US"/>
           </a:p>
@@ -2090,7 +2091,7 @@
           <a:p>
             <a:fld id="{51673806-0BCD-1F42-BAA8-2011034B3C6A}" type="datetimeFigureOut">
               <a:rPr lang="en-US" smtClean="0"/>
-              <a:t>5/15/20</a:t>
+              <a:t>5/18/20</a:t>
             </a:fld>
             <a:endParaRPr lang="en-US"/>
           </a:p>
@@ -2653,7 +2654,7 @@
           <a:p>
             <a:fld id="{51673806-0BCD-1F42-BAA8-2011034B3C6A}" type="datetimeFigureOut">
               <a:rPr lang="en-US" smtClean="0"/>
-              <a:t>5/15/20</a:t>
+              <a:t>5/18/20</a:t>
             </a:fld>
             <a:endParaRPr lang="en-US"/>
           </a:p>
@@ -3329,7 +3330,7 @@
           <a:p>
             <a:fld id="{51673806-0BCD-1F42-BAA8-2011034B3C6A}" type="datetimeFigureOut">
               <a:rPr lang="en-US" smtClean="0"/>
-              <a:t>5/15/20</a:t>
+              <a:t>5/18/20</a:t>
             </a:fld>
             <a:endParaRPr lang="en-US"/>
           </a:p>
@@ -4237,7 +4238,7 @@
           <a:p>
             <a:fld id="{51673806-0BCD-1F42-BAA8-2011034B3C6A}" type="datetimeFigureOut">
               <a:rPr lang="en-US" smtClean="0"/>
-              <a:t>5/15/20</a:t>
+              <a:t>5/18/20</a:t>
             </a:fld>
             <a:endParaRPr lang="en-US"/>
           </a:p>
@@ -4545,7 +4546,7 @@
           <a:p>
             <a:fld id="{51673806-0BCD-1F42-BAA8-2011034B3C6A}" type="datetimeFigureOut">
               <a:rPr lang="en-US" smtClean="0"/>
-              <a:t>5/15/20</a:t>
+              <a:t>5/18/20</a:t>
             </a:fld>
             <a:endParaRPr lang="en-US"/>
           </a:p>
@@ -4804,7 +4805,7 @@
           <a:p>
             <a:fld id="{51673806-0BCD-1F42-BAA8-2011034B3C6A}" type="datetimeFigureOut">
               <a:rPr lang="en-US" smtClean="0"/>
-              <a:t>5/15/20</a:t>
+              <a:t>5/18/20</a:t>
             </a:fld>
             <a:endParaRPr lang="en-US"/>
           </a:p>
@@ -5127,7 +5128,7 @@
           <a:p>
             <a:fld id="{51673806-0BCD-1F42-BAA8-2011034B3C6A}" type="datetimeFigureOut">
               <a:rPr lang="en-US" smtClean="0"/>
-              <a:t>5/15/20</a:t>
+              <a:t>5/18/20</a:t>
             </a:fld>
             <a:endParaRPr lang="en-US"/>
           </a:p>
@@ -5511,7 +5512,7 @@
           <a:p>
             <a:fld id="{51673806-0BCD-1F42-BAA8-2011034B3C6A}" type="datetimeFigureOut">
               <a:rPr lang="en-US" smtClean="0"/>
-              <a:t>5/15/20</a:t>
+              <a:t>5/18/20</a:t>
             </a:fld>
             <a:endParaRPr lang="en-US"/>
           </a:p>
@@ -5887,7 +5888,7 @@
           <a:p>
             <a:fld id="{51673806-0BCD-1F42-BAA8-2011034B3C6A}" type="datetimeFigureOut">
               <a:rPr lang="en-US" smtClean="0"/>
-              <a:t>5/15/20</a:t>
+              <a:t>5/18/20</a:t>
             </a:fld>
             <a:endParaRPr lang="en-US"/>
           </a:p>
@@ -6393,7 +6394,7 @@
           <a:p>
             <a:fld id="{51673806-0BCD-1F42-BAA8-2011034B3C6A}" type="datetimeFigureOut">
               <a:rPr lang="en-US" smtClean="0"/>
-              <a:t>5/15/20</a:t>
+              <a:t>5/18/20</a:t>
             </a:fld>
             <a:endParaRPr lang="en-US"/>
           </a:p>
@@ -6650,7 +6651,7 @@
           <a:p>
             <a:fld id="{51673806-0BCD-1F42-BAA8-2011034B3C6A}" type="datetimeFigureOut">
               <a:rPr lang="en-US" smtClean="0"/>
-              <a:t>5/15/20</a:t>
+              <a:t>5/18/20</a:t>
             </a:fld>
             <a:endParaRPr lang="en-US"/>
           </a:p>
@@ -6808,7 +6809,7 @@
           <a:p>
             <a:fld id="{51673806-0BCD-1F42-BAA8-2011034B3C6A}" type="datetimeFigureOut">
               <a:rPr lang="en-US" smtClean="0"/>
-              <a:t>5/15/20</a:t>
+              <a:t>5/18/20</a:t>
             </a:fld>
             <a:endParaRPr lang="en-US"/>
           </a:p>
@@ -7198,7 +7199,7 @@
           <a:p>
             <a:fld id="{51673806-0BCD-1F42-BAA8-2011034B3C6A}" type="datetimeFigureOut">
               <a:rPr lang="en-US" smtClean="0"/>
-              <a:t>5/15/20</a:t>
+              <a:t>5/18/20</a:t>
             </a:fld>
             <a:endParaRPr lang="en-US"/>
           </a:p>
@@ -7607,7 +7608,7 @@
           <a:p>
             <a:fld id="{51673806-0BCD-1F42-BAA8-2011034B3C6A}" type="datetimeFigureOut">
               <a:rPr lang="en-US" smtClean="0"/>
-              <a:t>5/15/20</a:t>
+              <a:t>5/18/20</a:t>
             </a:fld>
             <a:endParaRPr lang="en-US"/>
           </a:p>
@@ -7855,7 +7856,7 @@
             <a:fld id="{51673806-0BCD-1F42-BAA8-2011034B3C6A}" type="datetimeFigureOut">
               <a:rPr lang="en-US" smtClean="0"/>
               <a:pPr/>
-              <a:t>5/15/20</a:t>
+              <a:t>5/18/20</a:t>
             </a:fld>
             <a:endParaRPr lang="en-US" dirty="0"/>
           </a:p>
@@ -8295,15 +8296,15 @@
           <a:p>
             <a:r>
               <a:rPr lang="en-US" dirty="0" smtClean="0"/>
-              <a:t>Basic Software </a:t>
-            </a:r>
-            <a:r>
-              <a:rPr lang="en-US" dirty="0" err="1" smtClean="0"/>
-              <a:t>Enginnering</a:t>
-            </a:r>
-            <a:r>
-              <a:rPr lang="en-US" dirty="0" smtClean="0"/>
-              <a:t> </a:t>
+              <a:t>Basic </a:t>
+            </a:r>
+            <a:r>
+              <a:rPr lang="en-US" smtClean="0"/>
+              <a:t>Software </a:t>
+            </a:r>
+            <a:r>
+              <a:rPr lang="en-US" smtClean="0"/>
+              <a:t>Engineering </a:t>
             </a:r>
             <a:endParaRPr lang="en-US" dirty="0"/>
           </a:p>
@@ -8420,7 +8421,9 @@
           </a:xfrm>
         </p:spPr>
         <p:txBody>
-          <a:bodyPr/>
+          <a:bodyPr>
+            <a:normAutofit/>
+          </a:bodyPr>
           <a:lstStyle/>
           <a:p>
             <a:pPr marL="0" marR="0" lvl="0" indent="0" defTabSz="914400" eaLnBrk="1" fontAlgn="auto" latinLnBrk="0" hangingPunct="1">
@@ -8519,8 +8522,13 @@
             </a:pPr>
             <a:r>
               <a:rPr lang="en-US" dirty="0" smtClean="0"/>
-              <a:t>Make efficient use of resources </a:t>
-            </a:r>
+              <a:t>Making </a:t>
+            </a:r>
+            <a:r>
+              <a:rPr lang="en-US" dirty="0" smtClean="0"/>
+              <a:t>efficient use of resources </a:t>
+            </a:r>
+            <a:endParaRPr lang="en-US" dirty="0" smtClean="0"/>
           </a:p>
           <a:p>
             <a:pPr lvl="1">
@@ -8533,8 +8541,9 @@
             </a:pPr>
             <a:r>
               <a:rPr lang="en-US" dirty="0" smtClean="0"/>
-              <a:t>Testing of individual components </a:t>
-            </a:r>
+              <a:t>Extensions of existing features </a:t>
+            </a:r>
+            <a:endParaRPr lang="en-US" dirty="0" smtClean="0"/>
           </a:p>
           <a:p>
             <a:pPr lvl="1">
@@ -8547,20 +8556,22 @@
             </a:pPr>
             <a:r>
               <a:rPr lang="en-US" dirty="0" smtClean="0"/>
-              <a:t>Maintenance </a:t>
-            </a:r>
-          </a:p>
-          <a:p>
-            <a:pPr marL="0" indent="0">
+              <a:t>Testing of individual components </a:t>
+            </a:r>
+          </a:p>
+          <a:p>
+            <a:pPr lvl="1">
               <a:lnSpc>
                 <a:spcPct val="100000"/>
               </a:lnSpc>
               <a:spcBef>
                 <a:spcPts val="0"/>
               </a:spcBef>
-              <a:buNone/>
             </a:pPr>
-            <a:endParaRPr lang="en-US" dirty="0" smtClean="0"/>
+            <a:r>
+              <a:rPr lang="en-US" dirty="0" smtClean="0"/>
+              <a:t>Maintenance </a:t>
+            </a:r>
           </a:p>
           <a:p>
             <a:pPr marL="0" indent="0">
@@ -9678,6 +9689,253 @@
     <p:extLst>
       <p:ext uri="{BB962C8B-B14F-4D97-AF65-F5344CB8AC3E}">
         <p14:creationId xmlns:p14="http://schemas.microsoft.com/office/powerpoint/2010/main" val="932260817"/>
+      </p:ext>
+    </p:extLst>
+  </p:cSld>
+  <p:clrMapOvr>
+    <a:masterClrMapping/>
+  </p:clrMapOvr>
+</p:sld>
+</file>
+
+<file path=ppt/slides/slide8.xml><?xml version="1.0" encoding="utf-8"?>
+<p:sld xmlns:a="http://schemas.openxmlformats.org/drawingml/2006/main" xmlns:r="http://schemas.openxmlformats.org/officeDocument/2006/relationships" xmlns:p="http://schemas.openxmlformats.org/presentationml/2006/main">
+  <p:cSld>
+    <p:spTree>
+      <p:nvGrpSpPr>
+        <p:cNvPr id="1" name=""/>
+        <p:cNvGrpSpPr/>
+        <p:nvPr/>
+      </p:nvGrpSpPr>
+      <p:grpSpPr>
+        <a:xfrm>
+          <a:off x="0" y="0"/>
+          <a:ext cx="0" cy="0"/>
+          <a:chOff x="0" y="0"/>
+          <a:chExt cx="0" cy="0"/>
+        </a:xfrm>
+      </p:grpSpPr>
+      <p:sp>
+        <p:nvSpPr>
+          <p:cNvPr id="2" name="Title 1"/>
+          <p:cNvSpPr>
+            <a:spLocks noGrp="1"/>
+          </p:cNvSpPr>
+          <p:nvPr>
+            <p:ph type="title"/>
+          </p:nvPr>
+        </p:nvSpPr>
+        <p:spPr/>
+        <p:txBody>
+          <a:bodyPr/>
+          <a:lstStyle/>
+          <a:p>
+            <a:r>
+              <a:rPr lang="en-US" dirty="0" smtClean="0"/>
+              <a:t>Rule Number One</a:t>
+            </a:r>
+            <a:endParaRPr lang="en-US" dirty="0"/>
+          </a:p>
+        </p:txBody>
+      </p:sp>
+      <p:sp>
+        <p:nvSpPr>
+          <p:cNvPr id="3" name="Content Placeholder 2"/>
+          <p:cNvSpPr>
+            <a:spLocks noGrp="1"/>
+          </p:cNvSpPr>
+          <p:nvPr>
+            <p:ph idx="1"/>
+          </p:nvPr>
+        </p:nvSpPr>
+        <p:spPr>
+          <a:xfrm>
+            <a:off x="680321" y="2336872"/>
+            <a:ext cx="9814807" cy="4077575"/>
+          </a:xfrm>
+        </p:spPr>
+        <p:txBody>
+          <a:bodyPr>
+            <a:normAutofit/>
+          </a:bodyPr>
+          <a:lstStyle/>
+          <a:p>
+            <a:pPr marL="0" marR="0" lvl="0" indent="0" defTabSz="914400" eaLnBrk="1" fontAlgn="auto" latinLnBrk="0" hangingPunct="1">
+              <a:lnSpc>
+                <a:spcPct val="100000"/>
+              </a:lnSpc>
+              <a:spcBef>
+                <a:spcPts val="0"/>
+              </a:spcBef>
+              <a:spcAft>
+                <a:spcPts val="0"/>
+              </a:spcAft>
+              <a:buClrTx/>
+              <a:buSzTx/>
+              <a:buFontTx/>
+              <a:buNone/>
+              <a:tabLst/>
+              <a:defRPr/>
+            </a:pPr>
+            <a:r>
+              <a:rPr lang="en-US" i="1" dirty="0" smtClean="0"/>
+              <a:t>Code is read much more often than it is written. </a:t>
+            </a:r>
+            <a:endParaRPr lang="en-US" dirty="0" smtClean="0"/>
+          </a:p>
+          <a:p>
+            <a:pPr lvl="1">
+              <a:lnSpc>
+                <a:spcPct val="100000"/>
+              </a:lnSpc>
+              <a:spcBef>
+                <a:spcPts val="0"/>
+              </a:spcBef>
+            </a:pPr>
+            <a:r>
+              <a:rPr lang="en-US" dirty="0" smtClean="0"/>
+              <a:t>Assume this applies to all of the code you will ever write </a:t>
+            </a:r>
+            <a:endParaRPr lang="en-US" dirty="0"/>
+          </a:p>
+          <a:p>
+            <a:pPr marL="0" marR="0" lvl="0" indent="0" defTabSz="914400" eaLnBrk="1" fontAlgn="auto" latinLnBrk="0" hangingPunct="1">
+              <a:lnSpc>
+                <a:spcPct val="100000"/>
+              </a:lnSpc>
+              <a:spcBef>
+                <a:spcPts val="0"/>
+              </a:spcBef>
+              <a:spcAft>
+                <a:spcPts val="0"/>
+              </a:spcAft>
+              <a:buClrTx/>
+              <a:buSzTx/>
+              <a:buFontTx/>
+              <a:buNone/>
+              <a:tabLst/>
+              <a:defRPr/>
+            </a:pPr>
+            <a:endParaRPr lang="en-US" dirty="0"/>
+          </a:p>
+          <a:p>
+            <a:pPr marL="0" marR="0" lvl="0" indent="0" defTabSz="914400" eaLnBrk="1" fontAlgn="auto" latinLnBrk="0" hangingPunct="1">
+              <a:lnSpc>
+                <a:spcPct val="100000"/>
+              </a:lnSpc>
+              <a:spcBef>
+                <a:spcPts val="0"/>
+              </a:spcBef>
+              <a:spcAft>
+                <a:spcPts val="0"/>
+              </a:spcAft>
+              <a:buClrTx/>
+              <a:buSzTx/>
+              <a:buFontTx/>
+              <a:buNone/>
+              <a:tabLst/>
+              <a:defRPr/>
+            </a:pPr>
+            <a:r>
+              <a:rPr lang="en-US" dirty="0" smtClean="0"/>
+              <a:t>Emphasize </a:t>
+            </a:r>
+            <a:r>
+              <a:rPr lang="en-US" i="1" dirty="0" smtClean="0"/>
+              <a:t>readability</a:t>
+            </a:r>
+            <a:r>
+              <a:rPr lang="en-US" dirty="0" smtClean="0"/>
+              <a:t> above all else. </a:t>
+            </a:r>
+          </a:p>
+          <a:p>
+            <a:pPr marL="0" marR="0" lvl="0" indent="0" defTabSz="914400" eaLnBrk="1" fontAlgn="auto" latinLnBrk="0" hangingPunct="1">
+              <a:lnSpc>
+                <a:spcPct val="100000"/>
+              </a:lnSpc>
+              <a:spcBef>
+                <a:spcPts val="0"/>
+              </a:spcBef>
+              <a:spcAft>
+                <a:spcPts val="0"/>
+              </a:spcAft>
+              <a:buClrTx/>
+              <a:buSzTx/>
+              <a:buFontTx/>
+              <a:buNone/>
+              <a:tabLst/>
+              <a:defRPr/>
+            </a:pPr>
+            <a:endParaRPr lang="en-US" dirty="0" smtClean="0"/>
+          </a:p>
+          <a:p>
+            <a:pPr marL="0" marR="0" lvl="0" indent="0" defTabSz="914400" eaLnBrk="1" fontAlgn="auto" latinLnBrk="0" hangingPunct="1">
+              <a:lnSpc>
+                <a:spcPct val="100000"/>
+              </a:lnSpc>
+              <a:spcBef>
+                <a:spcPts val="0"/>
+              </a:spcBef>
+              <a:spcAft>
+                <a:spcPts val="0"/>
+              </a:spcAft>
+              <a:buClrTx/>
+              <a:buSzTx/>
+              <a:buFontTx/>
+              <a:buNone/>
+              <a:tabLst/>
+              <a:defRPr/>
+            </a:pPr>
+            <a:endParaRPr lang="en-US" dirty="0" smtClean="0"/>
+          </a:p>
+          <a:p>
+            <a:pPr marL="0" marR="0" lvl="0" indent="0" defTabSz="914400" eaLnBrk="1" fontAlgn="auto" latinLnBrk="0" hangingPunct="1">
+              <a:lnSpc>
+                <a:spcPct val="100000"/>
+              </a:lnSpc>
+              <a:spcBef>
+                <a:spcPts val="0"/>
+              </a:spcBef>
+              <a:spcAft>
+                <a:spcPts val="0"/>
+              </a:spcAft>
+              <a:buClrTx/>
+              <a:buSzTx/>
+              <a:buFontTx/>
+              <a:buNone/>
+              <a:tabLst/>
+              <a:defRPr/>
+            </a:pPr>
+            <a:r>
+              <a:rPr lang="en-US" dirty="0" smtClean="0"/>
+              <a:t>Bottom line: </a:t>
+            </a:r>
+            <a:r>
+              <a:rPr lang="en-US" i="1" dirty="0" smtClean="0"/>
+              <a:t>Well-written software is clear and does not cut corners. </a:t>
+            </a:r>
+          </a:p>
+          <a:p>
+            <a:pPr lvl="1">
+              <a:lnSpc>
+                <a:spcPct val="100000"/>
+              </a:lnSpc>
+              <a:spcBef>
+                <a:spcPts val="0"/>
+              </a:spcBef>
+            </a:pPr>
+            <a:r>
+              <a:rPr lang="en-US" dirty="0" smtClean="0"/>
+              <a:t>The view commonly held by research scientists that code is simply a means to an end can only cause problems if you decide to build anything of substantial size; this line is usually crossed much before a public software release. The solution to this is knowing how to engineer your code. </a:t>
+            </a:r>
+          </a:p>
+        </p:txBody>
+      </p:sp>
+    </p:spTree>
+    <p:extLst>
+      <p:ext uri="{BB962C8B-B14F-4D97-AF65-F5344CB8AC3E}">
+        <p14:creationId xmlns:p14="http://schemas.microsoft.com/office/powerpoint/2010/main" val="2027507245"/>
       </p:ext>
     </p:extLst>
   </p:cSld>

</xml_diff>

<commit_message>
slides: minor updates to basic SE final set of slides
</commit_message>
<xml_diff>
--- a/slides/basicSE.pptx
+++ b/slides/basicSE.pptx
@@ -5,17 +5,18 @@
     <p:sldMasterId id="2147484294" r:id="rId1"/>
   </p:sldMasterIdLst>
   <p:notesMasterIdLst>
-    <p:notesMasterId r:id="rId10"/>
+    <p:notesMasterId r:id="rId11"/>
   </p:notesMasterIdLst>
   <p:sldIdLst>
     <p:sldId id="256" r:id="rId2"/>
     <p:sldId id="257" r:id="rId3"/>
     <p:sldId id="258" r:id="rId4"/>
     <p:sldId id="259" r:id="rId5"/>
-    <p:sldId id="260" r:id="rId6"/>
-    <p:sldId id="261" r:id="rId7"/>
-    <p:sldId id="262" r:id="rId8"/>
-    <p:sldId id="263" r:id="rId9"/>
+    <p:sldId id="264" r:id="rId6"/>
+    <p:sldId id="260" r:id="rId7"/>
+    <p:sldId id="261" r:id="rId8"/>
+    <p:sldId id="262" r:id="rId9"/>
+    <p:sldId id="263" r:id="rId10"/>
   </p:sldIdLst>
   <p:sldSz cx="12192000" cy="6858000"/>
   <p:notesSz cx="6858000" cy="9144000"/>
@@ -204,7 +205,7 @@
           <a:p>
             <a:fld id="{A58EF676-DA74-5E46-A6CE-5ED3069388CC}" type="datetimeFigureOut">
               <a:rPr lang="en-US" smtClean="0"/>
-              <a:t>5/18/20</a:t>
+              <a:t>5/21/20</a:t>
             </a:fld>
             <a:endParaRPr lang="en-US"/>
           </a:p>
@@ -518,11 +519,11 @@
           <a:p>
             <a:r>
               <a:rPr lang="en-US" dirty="0" smtClean="0"/>
-              <a:t>Specifically address the “oh just copy and paste</a:t>
+              <a:t>Note here that engineering code</a:t>
             </a:r>
             <a:r>
               <a:rPr lang="en-US" baseline="0" dirty="0" smtClean="0"/>
-              <a:t> it!” that seemingly every astronomer says about writing code </a:t>
+              <a:t> and organizing code are more or less the same thing. Substantially large will generally apply to research project code bases as well, not just production-level code. </a:t>
             </a:r>
             <a:endParaRPr lang="en-US" dirty="0"/>
           </a:p>
@@ -545,7 +546,7 @@
           <a:p>
             <a:fld id="{4FBF28C1-3B45-464E-B5E4-80D7800AB463}" type="slidenum">
               <a:rPr lang="en-US" smtClean="0"/>
-              <a:t>3</a:t>
+              <a:t>2</a:t>
             </a:fld>
             <a:endParaRPr lang="en-US"/>
           </a:p>
@@ -554,7 +555,7 @@
     </p:spTree>
     <p:extLst>
       <p:ext uri="{BB962C8B-B14F-4D97-AF65-F5344CB8AC3E}">
-        <p14:creationId xmlns:p14="http://schemas.microsoft.com/office/powerpoint/2010/main" val="1608300188"/>
+        <p14:creationId xmlns:p14="http://schemas.microsoft.com/office/powerpoint/2010/main" val="1583462478"/>
       </p:ext>
     </p:extLst>
   </p:cSld>
@@ -610,6 +611,98 @@
           <a:p>
             <a:r>
               <a:rPr lang="en-US" dirty="0" smtClean="0"/>
+              <a:t>Specifically address the “oh just copy and paste</a:t>
+            </a:r>
+            <a:r>
+              <a:rPr lang="en-US" baseline="0" dirty="0" smtClean="0"/>
+              <a:t> it!” that seemingly every astronomer says about writing code </a:t>
+            </a:r>
+            <a:endParaRPr lang="en-US" dirty="0"/>
+          </a:p>
+        </p:txBody>
+      </p:sp>
+      <p:sp>
+        <p:nvSpPr>
+          <p:cNvPr id="4" name="Slide Number Placeholder 3"/>
+          <p:cNvSpPr>
+            <a:spLocks noGrp="1"/>
+          </p:cNvSpPr>
+          <p:nvPr>
+            <p:ph type="sldNum" sz="quarter" idx="10"/>
+          </p:nvPr>
+        </p:nvSpPr>
+        <p:spPr/>
+        <p:txBody>
+          <a:bodyPr/>
+          <a:lstStyle/>
+          <a:p>
+            <a:fld id="{4FBF28C1-3B45-464E-B5E4-80D7800AB463}" type="slidenum">
+              <a:rPr lang="en-US" smtClean="0"/>
+              <a:t>3</a:t>
+            </a:fld>
+            <a:endParaRPr lang="en-US"/>
+          </a:p>
+        </p:txBody>
+      </p:sp>
+    </p:spTree>
+    <p:extLst>
+      <p:ext uri="{BB962C8B-B14F-4D97-AF65-F5344CB8AC3E}">
+        <p14:creationId xmlns:p14="http://schemas.microsoft.com/office/powerpoint/2010/main" val="1608300188"/>
+      </p:ext>
+    </p:extLst>
+  </p:cSld>
+  <p:clrMapOvr>
+    <a:masterClrMapping/>
+  </p:clrMapOvr>
+</p:notes>
+</file>
+
+<file path=ppt/notesSlides/notesSlide3.xml><?xml version="1.0" encoding="utf-8"?>
+<p:notes xmlns:a="http://schemas.openxmlformats.org/drawingml/2006/main" xmlns:r="http://schemas.openxmlformats.org/officeDocument/2006/relationships" xmlns:p="http://schemas.openxmlformats.org/presentationml/2006/main">
+  <p:cSld>
+    <p:spTree>
+      <p:nvGrpSpPr>
+        <p:cNvPr id="1" name=""/>
+        <p:cNvGrpSpPr/>
+        <p:nvPr/>
+      </p:nvGrpSpPr>
+      <p:grpSpPr>
+        <a:xfrm>
+          <a:off x="0" y="0"/>
+          <a:ext cx="0" cy="0"/>
+          <a:chOff x="0" y="0"/>
+          <a:chExt cx="0" cy="0"/>
+        </a:xfrm>
+      </p:grpSpPr>
+      <p:sp>
+        <p:nvSpPr>
+          <p:cNvPr id="2" name="Slide Image Placeholder 1"/>
+          <p:cNvSpPr>
+            <a:spLocks noGrp="1" noRot="1" noChangeAspect="1"/>
+          </p:cNvSpPr>
+          <p:nvPr>
+            <p:ph type="sldImg"/>
+          </p:nvPr>
+        </p:nvSpPr>
+        <p:spPr/>
+      </p:sp>
+      <p:sp>
+        <p:nvSpPr>
+          <p:cNvPr id="3" name="Notes Placeholder 2"/>
+          <p:cNvSpPr>
+            <a:spLocks noGrp="1"/>
+          </p:cNvSpPr>
+          <p:nvPr>
+            <p:ph type="body" idx="1"/>
+          </p:nvPr>
+        </p:nvSpPr>
+        <p:spPr/>
+        <p:txBody>
+          <a:bodyPr/>
+          <a:lstStyle/>
+          <a:p>
+            <a:r>
+              <a:rPr lang="en-US" dirty="0" smtClean="0"/>
               <a:t>Professional</a:t>
             </a:r>
             <a:r>
@@ -649,7 +742,7 @@
           <a:p>
             <a:fld id="{4FBF28C1-3B45-464E-B5E4-80D7800AB463}" type="slidenum">
               <a:rPr lang="en-US" smtClean="0"/>
-              <a:t>7</a:t>
+              <a:t>8</a:t>
             </a:fld>
             <a:endParaRPr lang="en-US"/>
           </a:p>
@@ -946,7 +1039,7 @@
           <a:p>
             <a:fld id="{51673806-0BCD-1F42-BAA8-2011034B3C6A}" type="datetimeFigureOut">
               <a:rPr lang="en-US" smtClean="0"/>
-              <a:t>5/18/20</a:t>
+              <a:t>5/21/20</a:t>
             </a:fld>
             <a:endParaRPr lang="en-US"/>
           </a:p>
@@ -1360,7 +1453,7 @@
           <a:p>
             <a:fld id="{51673806-0BCD-1F42-BAA8-2011034B3C6A}" type="datetimeFigureOut">
               <a:rPr lang="en-US" smtClean="0"/>
-              <a:t>5/18/20</a:t>
+              <a:t>5/21/20</a:t>
             </a:fld>
             <a:endParaRPr lang="en-US"/>
           </a:p>
@@ -1691,7 +1784,7 @@
           <a:p>
             <a:fld id="{51673806-0BCD-1F42-BAA8-2011034B3C6A}" type="datetimeFigureOut">
               <a:rPr lang="en-US" smtClean="0"/>
-              <a:t>5/18/20</a:t>
+              <a:t>5/21/20</a:t>
             </a:fld>
             <a:endParaRPr lang="en-US"/>
           </a:p>
@@ -2091,7 +2184,7 @@
           <a:p>
             <a:fld id="{51673806-0BCD-1F42-BAA8-2011034B3C6A}" type="datetimeFigureOut">
               <a:rPr lang="en-US" smtClean="0"/>
-              <a:t>5/18/20</a:t>
+              <a:t>5/21/20</a:t>
             </a:fld>
             <a:endParaRPr lang="en-US"/>
           </a:p>
@@ -2654,7 +2747,7 @@
           <a:p>
             <a:fld id="{51673806-0BCD-1F42-BAA8-2011034B3C6A}" type="datetimeFigureOut">
               <a:rPr lang="en-US" smtClean="0"/>
-              <a:t>5/18/20</a:t>
+              <a:t>5/21/20</a:t>
             </a:fld>
             <a:endParaRPr lang="en-US"/>
           </a:p>
@@ -3330,7 +3423,7 @@
           <a:p>
             <a:fld id="{51673806-0BCD-1F42-BAA8-2011034B3C6A}" type="datetimeFigureOut">
               <a:rPr lang="en-US" smtClean="0"/>
-              <a:t>5/18/20</a:t>
+              <a:t>5/21/20</a:t>
             </a:fld>
             <a:endParaRPr lang="en-US"/>
           </a:p>
@@ -4238,7 +4331,7 @@
           <a:p>
             <a:fld id="{51673806-0BCD-1F42-BAA8-2011034B3C6A}" type="datetimeFigureOut">
               <a:rPr lang="en-US" smtClean="0"/>
-              <a:t>5/18/20</a:t>
+              <a:t>5/21/20</a:t>
             </a:fld>
             <a:endParaRPr lang="en-US"/>
           </a:p>
@@ -4546,7 +4639,7 @@
           <a:p>
             <a:fld id="{51673806-0BCD-1F42-BAA8-2011034B3C6A}" type="datetimeFigureOut">
               <a:rPr lang="en-US" smtClean="0"/>
-              <a:t>5/18/20</a:t>
+              <a:t>5/21/20</a:t>
             </a:fld>
             <a:endParaRPr lang="en-US"/>
           </a:p>
@@ -4805,7 +4898,7 @@
           <a:p>
             <a:fld id="{51673806-0BCD-1F42-BAA8-2011034B3C6A}" type="datetimeFigureOut">
               <a:rPr lang="en-US" smtClean="0"/>
-              <a:t>5/18/20</a:t>
+              <a:t>5/21/20</a:t>
             </a:fld>
             <a:endParaRPr lang="en-US"/>
           </a:p>
@@ -5128,7 +5221,7 @@
           <a:p>
             <a:fld id="{51673806-0BCD-1F42-BAA8-2011034B3C6A}" type="datetimeFigureOut">
               <a:rPr lang="en-US" smtClean="0"/>
-              <a:t>5/18/20</a:t>
+              <a:t>5/21/20</a:t>
             </a:fld>
             <a:endParaRPr lang="en-US"/>
           </a:p>
@@ -5512,7 +5605,7 @@
           <a:p>
             <a:fld id="{51673806-0BCD-1F42-BAA8-2011034B3C6A}" type="datetimeFigureOut">
               <a:rPr lang="en-US" smtClean="0"/>
-              <a:t>5/18/20</a:t>
+              <a:t>5/21/20</a:t>
             </a:fld>
             <a:endParaRPr lang="en-US"/>
           </a:p>
@@ -5888,7 +5981,7 @@
           <a:p>
             <a:fld id="{51673806-0BCD-1F42-BAA8-2011034B3C6A}" type="datetimeFigureOut">
               <a:rPr lang="en-US" smtClean="0"/>
-              <a:t>5/18/20</a:t>
+              <a:t>5/21/20</a:t>
             </a:fld>
             <a:endParaRPr lang="en-US"/>
           </a:p>
@@ -6394,7 +6487,7 @@
           <a:p>
             <a:fld id="{51673806-0BCD-1F42-BAA8-2011034B3C6A}" type="datetimeFigureOut">
               <a:rPr lang="en-US" smtClean="0"/>
-              <a:t>5/18/20</a:t>
+              <a:t>5/21/20</a:t>
             </a:fld>
             <a:endParaRPr lang="en-US"/>
           </a:p>
@@ -6651,7 +6744,7 @@
           <a:p>
             <a:fld id="{51673806-0BCD-1F42-BAA8-2011034B3C6A}" type="datetimeFigureOut">
               <a:rPr lang="en-US" smtClean="0"/>
-              <a:t>5/18/20</a:t>
+              <a:t>5/21/20</a:t>
             </a:fld>
             <a:endParaRPr lang="en-US"/>
           </a:p>
@@ -6809,7 +6902,7 @@
           <a:p>
             <a:fld id="{51673806-0BCD-1F42-BAA8-2011034B3C6A}" type="datetimeFigureOut">
               <a:rPr lang="en-US" smtClean="0"/>
-              <a:t>5/18/20</a:t>
+              <a:t>5/21/20</a:t>
             </a:fld>
             <a:endParaRPr lang="en-US"/>
           </a:p>
@@ -7199,7 +7292,7 @@
           <a:p>
             <a:fld id="{51673806-0BCD-1F42-BAA8-2011034B3C6A}" type="datetimeFigureOut">
               <a:rPr lang="en-US" smtClean="0"/>
-              <a:t>5/18/20</a:t>
+              <a:t>5/21/20</a:t>
             </a:fld>
             <a:endParaRPr lang="en-US"/>
           </a:p>
@@ -7608,7 +7701,7 @@
           <a:p>
             <a:fld id="{51673806-0BCD-1F42-BAA8-2011034B3C6A}" type="datetimeFigureOut">
               <a:rPr lang="en-US" smtClean="0"/>
-              <a:t>5/18/20</a:t>
+              <a:t>5/21/20</a:t>
             </a:fld>
             <a:endParaRPr lang="en-US"/>
           </a:p>
@@ -7856,7 +7949,7 @@
             <a:fld id="{51673806-0BCD-1F42-BAA8-2011034B3C6A}" type="datetimeFigureOut">
               <a:rPr lang="en-US" smtClean="0"/>
               <a:pPr/>
-              <a:t>5/18/20</a:t>
+              <a:t>5/21/20</a:t>
             </a:fld>
             <a:endParaRPr lang="en-US" dirty="0"/>
           </a:p>
@@ -8296,15 +8389,7 @@
           <a:p>
             <a:r>
               <a:rPr lang="en-US" dirty="0" smtClean="0"/>
-              <a:t>Basic </a:t>
-            </a:r>
-            <a:r>
-              <a:rPr lang="en-US" smtClean="0"/>
-              <a:t>Software </a:t>
-            </a:r>
-            <a:r>
-              <a:rPr lang="en-US" smtClean="0"/>
-              <a:t>Engineering </a:t>
+              <a:t>Basic Software Engineering </a:t>
             </a:r>
             <a:endParaRPr lang="en-US" dirty="0"/>
           </a:p>
@@ -8522,13 +8607,8 @@
             </a:pPr>
             <a:r>
               <a:rPr lang="en-US" dirty="0" smtClean="0"/>
-              <a:t>Making </a:t>
-            </a:r>
-            <a:r>
-              <a:rPr lang="en-US" dirty="0" smtClean="0"/>
-              <a:t>efficient use of resources </a:t>
-            </a:r>
-            <a:endParaRPr lang="en-US" dirty="0" smtClean="0"/>
+              <a:t>Making efficient use of resources </a:t>
+            </a:r>
           </a:p>
           <a:p>
             <a:pPr lvl="1">
@@ -8543,7 +8623,6 @@
               <a:rPr lang="en-US" dirty="0" smtClean="0"/>
               <a:t>Extensions of existing features </a:t>
             </a:r>
-            <a:endParaRPr lang="en-US" dirty="0" smtClean="0"/>
           </a:p>
           <a:p>
             <a:pPr lvl="1">
@@ -8599,17 +8678,6 @@
               <a:rPr lang="en-US" dirty="0" smtClean="0"/>
               <a:t>Why care if you’re an astronomer? If you build anything substantially large, these principles can save you not just headaches but migraines. </a:t>
             </a:r>
-          </a:p>
-          <a:p>
-            <a:pPr lvl="1">
-              <a:lnSpc>
-                <a:spcPct val="100000"/>
-              </a:lnSpc>
-              <a:spcBef>
-                <a:spcPts val="0"/>
-              </a:spcBef>
-            </a:pPr>
-            <a:endParaRPr lang="en-US" dirty="0" smtClean="0"/>
           </a:p>
         </p:txBody>
       </p:sp>
@@ -9062,7 +9130,7 @@
           <a:p>
             <a:r>
               <a:rPr lang="en-US" dirty="0" smtClean="0"/>
-              <a:t>Testing</a:t>
+              <a:t>Version Control</a:t>
             </a:r>
             <a:endParaRPr lang="en-US" dirty="0"/>
           </a:p>
@@ -9078,12 +9146,7 @@
             <p:ph idx="1"/>
           </p:nvPr>
         </p:nvSpPr>
-        <p:spPr>
-          <a:xfrm>
-            <a:off x="680321" y="2336872"/>
-            <a:ext cx="9613861" cy="4159461"/>
-          </a:xfrm>
-        </p:spPr>
+        <p:spPr/>
         <p:txBody>
           <a:bodyPr/>
           <a:lstStyle/>
@@ -9107,17 +9170,8 @@
             </a:pPr>
             <a:r>
               <a:rPr lang="en-US" dirty="0" smtClean="0"/>
-              <a:t>Well-written software implements </a:t>
-            </a:r>
-            <a:r>
-              <a:rPr lang="en-US" i="1" dirty="0" smtClean="0"/>
-              <a:t>unit tests</a:t>
-            </a:r>
-            <a:r>
-              <a:rPr lang="en-US" dirty="0" smtClean="0"/>
-              <a:t> </a:t>
-            </a:r>
-            <a:endParaRPr lang="en-US" dirty="0"/>
+              <a:t>Cataloging of previous copies of a software’s source code </a:t>
+            </a:r>
           </a:p>
           <a:p>
             <a:pPr lvl="1">
@@ -9130,15 +9184,37 @@
             </a:pPr>
             <a:r>
               <a:rPr lang="en-US" dirty="0" smtClean="0"/>
-              <a:t>A means of assigning </a:t>
-            </a:r>
-            <a:r>
-              <a:rPr lang="en-US" i="1" dirty="0" smtClean="0"/>
-              <a:t>Success/Failure/Skipped</a:t>
+              <a:t>Popular tools: GitHub, </a:t>
+            </a:r>
+            <a:r>
+              <a:rPr lang="en-US" dirty="0" err="1" smtClean="0"/>
+              <a:t>Bitbucket</a:t>
             </a:r>
             <a:r>
               <a:rPr lang="en-US" dirty="0" smtClean="0"/>
-              <a:t> messages to the smallest possible components of a code base </a:t>
+              <a:t> </a:t>
+            </a:r>
+          </a:p>
+          <a:p>
+            <a:pPr lvl="1">
+              <a:lnSpc>
+                <a:spcPct val="100000"/>
+              </a:lnSpc>
+              <a:spcBef>
+                <a:spcPts val="0"/>
+              </a:spcBef>
+            </a:pPr>
+            <a:r>
+              <a:rPr lang="en-US" dirty="0" smtClean="0"/>
+              <a:t>Command line: </a:t>
+            </a:r>
+            <a:r>
+              <a:rPr lang="en-US" i="1" dirty="0" err="1" smtClean="0"/>
+              <a:t>git</a:t>
+            </a:r>
+            <a:r>
+              <a:rPr lang="en-US" dirty="0" smtClean="0"/>
+              <a:t> </a:t>
             </a:r>
           </a:p>
           <a:p>
@@ -9163,10 +9239,7 @@
               </a:spcBef>
               <a:buNone/>
             </a:pPr>
-            <a:r>
-              <a:rPr lang="en-US" dirty="0" smtClean="0"/>
-              <a:t>When you make a future change to your code base, this gives you an automated means of finding out if your change broke anything you weren’t expecting to break. </a:t>
-            </a:r>
+            <a:endParaRPr lang="en-US" dirty="0" smtClean="0"/>
           </a:p>
           <a:p>
             <a:pPr marL="0" indent="0">
@@ -9192,15 +9265,15 @@
             </a:pPr>
             <a:r>
               <a:rPr lang="en-US" dirty="0" smtClean="0"/>
-              <a:t>This is as simple as </a:t>
-            </a:r>
-            <a:r>
-              <a:rPr lang="en-US" i="1" dirty="0" smtClean="0"/>
-              <a:t>actually saving</a:t>
+              <a:t>You don’t need to use GitHub for version control </a:t>
+            </a:r>
+            <a:r>
+              <a:rPr lang="mr-IN" dirty="0" smtClean="0"/>
+              <a:t>–</a:t>
             </a:r>
             <a:r>
               <a:rPr lang="en-US" dirty="0" smtClean="0"/>
-              <a:t> the code you write to test a new component of your software, and the same for when you resolve an issue. </a:t>
+              <a:t> you can also store your code, plots, etc. there to manage copies between multiple systems. </a:t>
             </a:r>
           </a:p>
         </p:txBody>
@@ -9208,7 +9281,7 @@
     </p:spTree>
     <p:extLst>
       <p:ext uri="{BB962C8B-B14F-4D97-AF65-F5344CB8AC3E}">
-        <p14:creationId xmlns:p14="http://schemas.microsoft.com/office/powerpoint/2010/main" val="1484475418"/>
+        <p14:creationId xmlns:p14="http://schemas.microsoft.com/office/powerpoint/2010/main" val="1336916395"/>
       </p:ext>
     </p:extLst>
   </p:cSld>
@@ -9252,7 +9325,7 @@
           <a:p>
             <a:r>
               <a:rPr lang="en-US" dirty="0" smtClean="0"/>
-              <a:t>Minimization of Dependencies </a:t>
+              <a:t>Testing</a:t>
             </a:r>
             <a:endParaRPr lang="en-US" dirty="0"/>
           </a:p>
@@ -9271,13 +9344,11 @@
         <p:spPr>
           <a:xfrm>
             <a:off x="680321" y="2336872"/>
-            <a:ext cx="10265183" cy="4295939"/>
-          </a:xfrm>
-        </p:spPr>
-        <p:txBody>
-          <a:bodyPr>
-            <a:normAutofit/>
-          </a:bodyPr>
+            <a:ext cx="9613861" cy="4159461"/>
+          </a:xfrm>
+        </p:spPr>
+        <p:txBody>
+          <a:bodyPr/>
           <a:lstStyle/>
           <a:p>
             <a:pPr marL="0" marR="0" lvl="0" indent="0" defTabSz="914400" eaLnBrk="1" fontAlgn="auto" latinLnBrk="0" hangingPunct="1">
@@ -9299,189 +9370,108 @@
             </a:pPr>
             <a:r>
               <a:rPr lang="en-US" dirty="0" smtClean="0"/>
-              <a:t>If the code base for your software uses another, external software (e.g. </a:t>
-            </a:r>
-            <a:r>
-              <a:rPr lang="en-US" dirty="0" err="1" smtClean="0"/>
-              <a:t>NumPy</a:t>
+              <a:t>Well-written software implements </a:t>
+            </a:r>
+            <a:r>
+              <a:rPr lang="en-US" i="1" dirty="0" smtClean="0"/>
+              <a:t>unit tests</a:t>
             </a:r>
             <a:r>
               <a:rPr lang="en-US" dirty="0" smtClean="0"/>
-              <a:t>), that is called a </a:t>
-            </a:r>
-            <a:r>
-              <a:rPr lang="en-US" i="1" dirty="0" smtClean="0"/>
-              <a:t>dependency</a:t>
-            </a:r>
-            <a:r>
-              <a:rPr lang="en-US" dirty="0" smtClean="0"/>
-              <a:t> (your code </a:t>
-            </a:r>
-            <a:r>
-              <a:rPr lang="en-US" i="1" dirty="0" smtClean="0"/>
-              <a:t>depends on </a:t>
-            </a:r>
-            <a:r>
-              <a:rPr lang="en-US" dirty="0" err="1" smtClean="0"/>
-              <a:t>NumPy</a:t>
-            </a:r>
-            <a:r>
-              <a:rPr lang="en-US" dirty="0" smtClean="0"/>
-              <a:t>). </a:t>
-            </a:r>
-          </a:p>
-          <a:p>
-            <a:pPr marL="0" marR="0" lvl="0" indent="0" defTabSz="914400" eaLnBrk="1" fontAlgn="auto" latinLnBrk="0" hangingPunct="1">
+              <a:t> </a:t>
+            </a:r>
+            <a:endParaRPr lang="en-US" dirty="0"/>
+          </a:p>
+          <a:p>
+            <a:pPr lvl="1">
               <a:lnSpc>
                 <a:spcPct val="100000"/>
               </a:lnSpc>
               <a:spcBef>
                 <a:spcPts val="0"/>
               </a:spcBef>
-              <a:spcAft>
-                <a:spcPts val="0"/>
-              </a:spcAft>
-              <a:buClrTx/>
-              <a:buSzTx/>
-              <a:buFontTx/>
-              <a:buNone/>
-              <a:tabLst/>
-              <a:defRPr/>
             </a:pPr>
-            <a:endParaRPr lang="en-US" dirty="0"/>
-          </a:p>
-          <a:p>
-            <a:pPr marL="0" marR="0" lvl="0" indent="0" defTabSz="914400" eaLnBrk="1" fontAlgn="auto" latinLnBrk="0" hangingPunct="1">
+            <a:r>
+              <a:rPr lang="en-US" dirty="0" smtClean="0"/>
+              <a:t>A means of assigning </a:t>
+            </a:r>
+            <a:r>
+              <a:rPr lang="en-US" i="1" dirty="0" smtClean="0"/>
+              <a:t>Success/Failure/Skipped</a:t>
+            </a:r>
+            <a:r>
+              <a:rPr lang="en-US" dirty="0" smtClean="0"/>
+              <a:t> messages to the smallest possible components of a code base </a:t>
+            </a:r>
+          </a:p>
+          <a:p>
+            <a:pPr marL="0" indent="0">
               <a:lnSpc>
                 <a:spcPct val="100000"/>
               </a:lnSpc>
               <a:spcBef>
                 <a:spcPts val="0"/>
               </a:spcBef>
-              <a:spcAft>
-                <a:spcPts val="0"/>
-              </a:spcAft>
-              <a:buClrTx/>
-              <a:buSzTx/>
-              <a:buFontTx/>
-              <a:buNone/>
-              <a:tabLst/>
-              <a:defRPr/>
+              <a:buNone/>
             </a:pPr>
-            <a:r>
-              <a:rPr lang="en-US" dirty="0" smtClean="0"/>
-              <a:t>It’s quite common to have ~few dependencies, but too many is </a:t>
-            </a:r>
-            <a:r>
-              <a:rPr lang="en-US" i="1" dirty="0" smtClean="0"/>
-              <a:t>problematic</a:t>
-            </a:r>
-            <a:r>
-              <a:rPr lang="en-US" dirty="0" smtClean="0"/>
-              <a:t>. </a:t>
-            </a:r>
-          </a:p>
-          <a:p>
-            <a:pPr marL="0" marR="0" lvl="0" indent="0" defTabSz="914400" eaLnBrk="1" fontAlgn="auto" latinLnBrk="0" hangingPunct="1">
+            <a:endParaRPr lang="en-US" dirty="0"/>
+          </a:p>
+          <a:p>
+            <a:pPr marL="0" indent="0">
               <a:lnSpc>
                 <a:spcPct val="100000"/>
               </a:lnSpc>
               <a:spcBef>
                 <a:spcPts val="0"/>
               </a:spcBef>
-              <a:spcAft>
-                <a:spcPts val="0"/>
-              </a:spcAft>
-              <a:buClrTx/>
-              <a:buSzTx/>
-              <a:buFontTx/>
-              <a:buNone/>
-              <a:tabLst/>
-              <a:defRPr/>
+              <a:buNone/>
             </a:pPr>
-            <a:endParaRPr lang="en-US" dirty="0" smtClean="0"/>
-          </a:p>
-          <a:p>
-            <a:pPr marL="0" marR="0" lvl="0" indent="0" defTabSz="914400" eaLnBrk="1" fontAlgn="auto" latinLnBrk="0" hangingPunct="1">
+            <a:r>
+              <a:rPr lang="en-US" dirty="0" smtClean="0"/>
+              <a:t>When you make a future change to your code base, this gives you an automated means of finding out if your change broke anything you weren’t expecting to break. </a:t>
+            </a:r>
+          </a:p>
+          <a:p>
+            <a:pPr marL="0" indent="0">
               <a:lnSpc>
                 <a:spcPct val="100000"/>
               </a:lnSpc>
               <a:spcBef>
                 <a:spcPts val="0"/>
               </a:spcBef>
-              <a:spcAft>
-                <a:spcPts val="0"/>
-              </a:spcAft>
-              <a:buClrTx/>
-              <a:buSzTx/>
-              <a:buFontTx/>
-              <a:buNone/>
-              <a:tabLst/>
-              <a:defRPr/>
+              <a:buNone/>
             </a:pPr>
-            <a:r>
-              <a:rPr lang="en-US" dirty="0" smtClean="0"/>
-              <a:t>As of now one of my own python packages is ~60k lines of code. If </a:t>
-            </a:r>
-            <a:r>
-              <a:rPr lang="en-US" dirty="0" err="1" smtClean="0"/>
-              <a:t>NumPy</a:t>
-            </a:r>
-            <a:r>
-              <a:rPr lang="en-US" dirty="0" smtClean="0"/>
-              <a:t> releases a new version that isn’t back-compatible with previous versions, I’d have to go through the </a:t>
-            </a:r>
-            <a:r>
-              <a:rPr lang="en-US" i="1" dirty="0" smtClean="0"/>
-              <a:t>whole thing </a:t>
-            </a:r>
-            <a:r>
-              <a:rPr lang="en-US" dirty="0" smtClean="0"/>
-              <a:t>to ensure that it works with all versions of </a:t>
-            </a:r>
-            <a:r>
-              <a:rPr lang="en-US" dirty="0" err="1" smtClean="0"/>
-              <a:t>NumPy</a:t>
-            </a:r>
-            <a:r>
-              <a:rPr lang="en-US" dirty="0" smtClean="0"/>
-              <a:t> that I support. </a:t>
-            </a:r>
-            <a:br>
-              <a:rPr lang="en-US" dirty="0" smtClean="0"/>
-            </a:br>
-            <a:endParaRPr lang="en-US" dirty="0" smtClean="0"/>
-          </a:p>
-          <a:p>
-            <a:pPr marL="0" marR="0" lvl="0" indent="0" defTabSz="914400" eaLnBrk="1" fontAlgn="auto" latinLnBrk="0" hangingPunct="1">
+            <a:endParaRPr lang="en-US" dirty="0"/>
+          </a:p>
+          <a:p>
+            <a:pPr marL="0" indent="0">
               <a:lnSpc>
                 <a:spcPct val="100000"/>
               </a:lnSpc>
               <a:spcBef>
                 <a:spcPts val="0"/>
               </a:spcBef>
-              <a:spcAft>
-                <a:spcPts val="0"/>
-              </a:spcAft>
-              <a:buClrTx/>
-              <a:buSzTx/>
-              <a:buFontTx/>
-              <a:buNone/>
-              <a:tabLst/>
-              <a:defRPr/>
+              <a:buNone/>
             </a:pPr>
             <a:r>
               <a:rPr lang="en-US" dirty="0" smtClean="0"/>
-              <a:t>Advice: Don’t be afraid to write the small but challenging stuff yourself. </a:t>
-            </a:r>
-            <a:endParaRPr lang="en-US" dirty="0"/>
+              <a:t>This is as simple as </a:t>
+            </a:r>
+            <a:r>
+              <a:rPr lang="en-US" i="1" dirty="0" smtClean="0"/>
+              <a:t>actually saving</a:t>
+            </a:r>
+            <a:r>
+              <a:rPr lang="en-US" dirty="0" smtClean="0"/>
+              <a:t> the code you write to test a new component of your software, and the same for when you resolve an issue. </a:t>
+            </a:r>
           </a:p>
         </p:txBody>
       </p:sp>
     </p:spTree>
     <p:extLst>
       <p:ext uri="{BB962C8B-B14F-4D97-AF65-F5344CB8AC3E}">
-        <p14:creationId xmlns:p14="http://schemas.microsoft.com/office/powerpoint/2010/main" val="831163437"/>
+        <p14:creationId xmlns:p14="http://schemas.microsoft.com/office/powerpoint/2010/main" val="1484475418"/>
       </p:ext>
     </p:extLst>
   </p:cSld>
@@ -9524,22 +9514,10 @@
           <a:lstStyle/>
           <a:p>
             <a:r>
-              <a:rPr lang="en-US" i="1" dirty="0" smtClean="0"/>
-              <a:t>Think</a:t>
-            </a:r>
-            <a:r>
               <a:rPr lang="en-US" dirty="0" smtClean="0"/>
-              <a:t> Before You </a:t>
-            </a:r>
-            <a:r>
-              <a:rPr lang="en-US" i="1" dirty="0" smtClean="0"/>
-              <a:t>Write</a:t>
-            </a:r>
-            <a:r>
-              <a:rPr lang="en-US" dirty="0" smtClean="0"/>
-              <a:t> </a:t>
-            </a:r>
-            <a:endParaRPr lang="en-US" i="1" dirty="0"/>
+              <a:t>Minimization of Dependencies </a:t>
+            </a:r>
+            <a:endParaRPr lang="en-US" dirty="0"/>
           </a:p>
         </p:txBody>
       </p:sp>
@@ -9555,12 +9533,14 @@
         </p:nvSpPr>
         <p:spPr>
           <a:xfrm>
-            <a:off x="680321" y="2336873"/>
-            <a:ext cx="9613861" cy="4104870"/>
-          </a:xfrm>
-        </p:spPr>
-        <p:txBody>
-          <a:bodyPr/>
+            <a:off x="680321" y="2336872"/>
+            <a:ext cx="10265183" cy="4295939"/>
+          </a:xfrm>
+        </p:spPr>
+        <p:txBody>
+          <a:bodyPr>
+            <a:normAutofit/>
+          </a:bodyPr>
           <a:lstStyle/>
           <a:p>
             <a:pPr marL="0" marR="0" lvl="0" indent="0" defTabSz="914400" eaLnBrk="1" fontAlgn="auto" latinLnBrk="0" hangingPunct="1">
@@ -9582,113 +9562,198 @@
             </a:pPr>
             <a:r>
               <a:rPr lang="en-US" dirty="0" smtClean="0"/>
-              <a:t>Many scientists just start writing functions when posed with a problem </a:t>
-            </a:r>
-          </a:p>
-          <a:p>
-            <a:pPr lvl="1">
+              <a:t>If the code base for your software uses another, external software (e.g. </a:t>
+            </a:r>
+            <a:r>
+              <a:rPr lang="en-US" dirty="0" err="1" smtClean="0"/>
+              <a:t>NumPy</a:t>
+            </a:r>
+            <a:r>
+              <a:rPr lang="en-US" dirty="0" smtClean="0"/>
+              <a:t>), that is called a </a:t>
+            </a:r>
+            <a:r>
+              <a:rPr lang="en-US" i="1" dirty="0" smtClean="0"/>
+              <a:t>dependency</a:t>
+            </a:r>
+            <a:r>
+              <a:rPr lang="en-US" dirty="0" smtClean="0"/>
+              <a:t> (your code </a:t>
+            </a:r>
+            <a:r>
+              <a:rPr lang="en-US" i="1" dirty="0" smtClean="0"/>
+              <a:t>depends on </a:t>
+            </a:r>
+            <a:r>
+              <a:rPr lang="en-US" dirty="0" err="1" smtClean="0"/>
+              <a:t>NumPy</a:t>
+            </a:r>
+            <a:r>
+              <a:rPr lang="en-US" dirty="0" smtClean="0"/>
+              <a:t>). </a:t>
+            </a:r>
+          </a:p>
+          <a:p>
+            <a:pPr marL="0" marR="0" lvl="0" indent="0" defTabSz="914400" eaLnBrk="1" fontAlgn="auto" latinLnBrk="0" hangingPunct="1">
               <a:lnSpc>
                 <a:spcPct val="100000"/>
               </a:lnSpc>
               <a:spcBef>
                 <a:spcPts val="0"/>
               </a:spcBef>
+              <a:spcAft>
+                <a:spcPts val="0"/>
+              </a:spcAft>
+              <a:buClrTx/>
+              <a:buSzTx/>
+              <a:buFontTx/>
+              <a:buNone/>
+              <a:tabLst/>
+              <a:defRPr/>
             </a:pPr>
-            <a:r>
-              <a:rPr lang="en-US" dirty="0" smtClean="0"/>
-              <a:t>This has its place and its usefulness within research </a:t>
-            </a:r>
-          </a:p>
-          <a:p>
-            <a:pPr marL="0" indent="0">
+            <a:endParaRPr lang="en-US" dirty="0"/>
+          </a:p>
+          <a:p>
+            <a:pPr marL="0" marR="0" lvl="0" indent="0" defTabSz="914400" eaLnBrk="1" fontAlgn="auto" latinLnBrk="0" hangingPunct="1">
               <a:lnSpc>
                 <a:spcPct val="100000"/>
               </a:lnSpc>
               <a:spcBef>
                 <a:spcPts val="0"/>
               </a:spcBef>
-              <a:buNone/>
+              <a:spcAft>
+                <a:spcPts val="0"/>
+              </a:spcAft>
+              <a:buClrTx/>
+              <a:buSzTx/>
+              <a:buFontTx/>
+              <a:buNone/>
+              <a:tabLst/>
+              <a:defRPr/>
             </a:pPr>
-            <a:endParaRPr lang="en-US" dirty="0"/>
-          </a:p>
-          <a:p>
-            <a:pPr marL="0" indent="0">
+            <a:r>
+              <a:rPr lang="en-US" dirty="0" smtClean="0"/>
+              <a:t>It’s quite common to have ~few dependencies, but too many is </a:t>
+            </a:r>
+            <a:r>
+              <a:rPr lang="en-US" i="1" dirty="0" smtClean="0"/>
+              <a:t>problematic</a:t>
+            </a:r>
+            <a:r>
+              <a:rPr lang="en-US" dirty="0" smtClean="0"/>
+              <a:t>. </a:t>
+            </a:r>
+          </a:p>
+          <a:p>
+            <a:pPr marL="0" marR="0" lvl="0" indent="0" defTabSz="914400" eaLnBrk="1" fontAlgn="auto" latinLnBrk="0" hangingPunct="1">
               <a:lnSpc>
                 <a:spcPct val="100000"/>
               </a:lnSpc>
               <a:spcBef>
                 <a:spcPts val="0"/>
               </a:spcBef>
-              <a:buNone/>
+              <a:spcAft>
+                <a:spcPts val="0"/>
+              </a:spcAft>
+              <a:buClrTx/>
+              <a:buSzTx/>
+              <a:buFontTx/>
+              <a:buNone/>
+              <a:tabLst/>
+              <a:defRPr/>
             </a:pPr>
             <a:endParaRPr lang="en-US" dirty="0" smtClean="0"/>
           </a:p>
           <a:p>
-            <a:pPr marL="0" indent="0">
+            <a:pPr marL="0" marR="0" lvl="0" indent="0" defTabSz="914400" eaLnBrk="1" fontAlgn="auto" latinLnBrk="0" hangingPunct="1">
               <a:lnSpc>
                 <a:spcPct val="100000"/>
               </a:lnSpc>
               <a:spcBef>
                 <a:spcPts val="0"/>
               </a:spcBef>
-              <a:buNone/>
+              <a:spcAft>
+                <a:spcPts val="0"/>
+              </a:spcAft>
+              <a:buClrTx/>
+              <a:buSzTx/>
+              <a:buFontTx/>
+              <a:buNone/>
+              <a:tabLst/>
+              <a:defRPr/>
             </a:pPr>
             <a:r>
               <a:rPr lang="en-US" dirty="0" smtClean="0"/>
-              <a:t>If you’re going to be spending even as much as five minutes writing a given file, stop and ask yourself: </a:t>
-            </a:r>
-            <a:r>
-              <a:rPr lang="en-US" i="1" dirty="0"/>
-              <a:t>W</a:t>
-            </a:r>
-            <a:r>
-              <a:rPr lang="en-US" i="1" dirty="0" smtClean="0"/>
-              <a:t>hat objects might be useful? What functions might be useful? </a:t>
+              <a:t>As of now </a:t>
+            </a:r>
+            <a:r>
+              <a:rPr lang="en-US" dirty="0" smtClean="0"/>
+              <a:t>my </a:t>
+            </a:r>
+            <a:r>
+              <a:rPr lang="en-US" dirty="0" smtClean="0"/>
+              <a:t>own python packages is ~60k lines of </a:t>
+            </a:r>
+            <a:r>
+              <a:rPr lang="en-US" dirty="0" smtClean="0"/>
+              <a:t>code</a:t>
+            </a:r>
+            <a:r>
+              <a:rPr lang="en-US" dirty="0" smtClean="0"/>
+              <a:t>. If one of its dependencies releases a new version with changes that affect my code, I have to go look at every file to ensure this doesn’t break anything. </a:t>
             </a:r>
             <a:endParaRPr lang="en-US" dirty="0" smtClean="0"/>
           </a:p>
           <a:p>
-            <a:pPr marL="0" indent="0">
+            <a:pPr marL="0" marR="0" lvl="0" indent="0" defTabSz="914400" eaLnBrk="1" fontAlgn="auto" latinLnBrk="0" hangingPunct="1">
               <a:lnSpc>
                 <a:spcPct val="100000"/>
               </a:lnSpc>
               <a:spcBef>
                 <a:spcPts val="0"/>
               </a:spcBef>
-              <a:buNone/>
+              <a:spcAft>
+                <a:spcPts val="0"/>
+              </a:spcAft>
+              <a:buClrTx/>
+              <a:buSzTx/>
+              <a:buFontTx/>
+              <a:buNone/>
+              <a:tabLst/>
+              <a:defRPr/>
             </a:pPr>
-            <a:endParaRPr lang="en-US" dirty="0"/>
-          </a:p>
-          <a:p>
-            <a:pPr marL="0" indent="0">
+            <a:endParaRPr lang="en-US" dirty="0" smtClean="0"/>
+          </a:p>
+          <a:p>
+            <a:pPr marL="0" marR="0" lvl="0" indent="0" defTabSz="914400" eaLnBrk="1" fontAlgn="auto" latinLnBrk="0" hangingPunct="1">
               <a:lnSpc>
                 <a:spcPct val="100000"/>
               </a:lnSpc>
               <a:spcBef>
                 <a:spcPts val="0"/>
               </a:spcBef>
-              <a:buNone/>
+              <a:spcAft>
+                <a:spcPts val="0"/>
+              </a:spcAft>
+              <a:buClrTx/>
+              <a:buSzTx/>
+              <a:buFontTx/>
+              <a:buNone/>
+              <a:tabLst/>
+              <a:defRPr/>
             </a:pPr>
             <a:r>
               <a:rPr lang="en-US" dirty="0" smtClean="0"/>
-              <a:t>There are many ways to write the same program, so don’t always settle for the first idea that comes into your head. </a:t>
-            </a:r>
-            <a:r>
-              <a:rPr lang="en-US" i="1" dirty="0" smtClean="0"/>
-              <a:t>You can usually improve upon the first thing that comes to mind</a:t>
-            </a:r>
-            <a:r>
-              <a:rPr lang="en-US" dirty="0" smtClean="0"/>
-              <a:t>. </a:t>
-            </a:r>
-            <a:endParaRPr lang="en-US" i="1" dirty="0" smtClean="0"/>
+              <a:t>Advice: Don’t be afraid to write the small but challenging stuff yourself. </a:t>
+            </a:r>
+            <a:endParaRPr lang="en-US" dirty="0"/>
           </a:p>
         </p:txBody>
       </p:sp>
     </p:spTree>
     <p:extLst>
       <p:ext uri="{BB962C8B-B14F-4D97-AF65-F5344CB8AC3E}">
-        <p14:creationId xmlns:p14="http://schemas.microsoft.com/office/powerpoint/2010/main" val="932260817"/>
+        <p14:creationId xmlns:p14="http://schemas.microsoft.com/office/powerpoint/2010/main" val="831163437"/>
       </p:ext>
     </p:extLst>
   </p:cSld>
@@ -9731,10 +9796,22 @@
           <a:lstStyle/>
           <a:p>
             <a:r>
+              <a:rPr lang="en-US" i="1" dirty="0" smtClean="0"/>
+              <a:t>Think</a:t>
+            </a:r>
+            <a:r>
               <a:rPr lang="en-US" dirty="0" smtClean="0"/>
-              <a:t>Rule Number One</a:t>
-            </a:r>
-            <a:endParaRPr lang="en-US" dirty="0"/>
+              <a:t> Before You </a:t>
+            </a:r>
+            <a:r>
+              <a:rPr lang="en-US" i="1" dirty="0" smtClean="0"/>
+              <a:t>Write</a:t>
+            </a:r>
+            <a:r>
+              <a:rPr lang="en-US" dirty="0" smtClean="0"/>
+              <a:t> </a:t>
+            </a:r>
+            <a:endParaRPr lang="en-US" i="1" dirty="0"/>
           </a:p>
         </p:txBody>
       </p:sp>
@@ -9750,14 +9827,12 @@
         </p:nvSpPr>
         <p:spPr>
           <a:xfrm>
-            <a:off x="680321" y="2336872"/>
-            <a:ext cx="9814807" cy="4077575"/>
-          </a:xfrm>
-        </p:spPr>
-        <p:txBody>
-          <a:bodyPr>
-            <a:normAutofit/>
-          </a:bodyPr>
+            <a:off x="680321" y="2336873"/>
+            <a:ext cx="9613861" cy="4104870"/>
+          </a:xfrm>
+        </p:spPr>
+        <p:txBody>
+          <a:bodyPr/>
           <a:lstStyle/>
           <a:p>
             <a:pPr marL="0" marR="0" lvl="0" indent="0" defTabSz="914400" eaLnBrk="1" fontAlgn="auto" latinLnBrk="0" hangingPunct="1">
@@ -9778,10 +9853,9 @@
               <a:defRPr/>
             </a:pPr>
             <a:r>
-              <a:rPr lang="en-US" i="1" dirty="0" smtClean="0"/>
-              <a:t>Code is read much more often than it is written. </a:t>
-            </a:r>
-            <a:endParaRPr lang="en-US" dirty="0" smtClean="0"/>
+              <a:rPr lang="en-US" dirty="0" smtClean="0"/>
+              <a:t>Many scientists just start writing functions when posed with a problem </a:t>
+            </a:r>
           </a:p>
           <a:p>
             <a:pPr lvl="1">
@@ -9794,10 +9868,169 @@
             </a:pPr>
             <a:r>
               <a:rPr lang="en-US" dirty="0" smtClean="0"/>
-              <a:t>Assume this applies to all of the code you will ever write </a:t>
-            </a:r>
+              <a:t>This has its place and its usefulness within research </a:t>
+            </a:r>
+          </a:p>
+          <a:p>
+            <a:pPr marL="0" indent="0">
+              <a:lnSpc>
+                <a:spcPct val="100000"/>
+              </a:lnSpc>
+              <a:spcBef>
+                <a:spcPts val="0"/>
+              </a:spcBef>
+              <a:buNone/>
+            </a:pPr>
             <a:endParaRPr lang="en-US" dirty="0"/>
           </a:p>
+          <a:p>
+            <a:pPr marL="0" indent="0">
+              <a:lnSpc>
+                <a:spcPct val="100000"/>
+              </a:lnSpc>
+              <a:spcBef>
+                <a:spcPts val="0"/>
+              </a:spcBef>
+              <a:buNone/>
+            </a:pPr>
+            <a:endParaRPr lang="en-US" dirty="0" smtClean="0"/>
+          </a:p>
+          <a:p>
+            <a:pPr marL="0" indent="0">
+              <a:lnSpc>
+                <a:spcPct val="100000"/>
+              </a:lnSpc>
+              <a:spcBef>
+                <a:spcPts val="0"/>
+              </a:spcBef>
+              <a:buNone/>
+            </a:pPr>
+            <a:r>
+              <a:rPr lang="en-US" dirty="0" smtClean="0"/>
+              <a:t>If you’re going to be spending even as much as five minutes writing a given file, stop and ask yourself: </a:t>
+            </a:r>
+            <a:r>
+              <a:rPr lang="en-US" i="1" dirty="0"/>
+              <a:t>W</a:t>
+            </a:r>
+            <a:r>
+              <a:rPr lang="en-US" i="1" dirty="0" smtClean="0"/>
+              <a:t>hat objects might be useful? What functions might be useful? </a:t>
+            </a:r>
+            <a:endParaRPr lang="en-US" dirty="0" smtClean="0"/>
+          </a:p>
+          <a:p>
+            <a:pPr marL="0" indent="0">
+              <a:lnSpc>
+                <a:spcPct val="100000"/>
+              </a:lnSpc>
+              <a:spcBef>
+                <a:spcPts val="0"/>
+              </a:spcBef>
+              <a:buNone/>
+            </a:pPr>
+            <a:endParaRPr lang="en-US" dirty="0"/>
+          </a:p>
+          <a:p>
+            <a:pPr marL="0" indent="0">
+              <a:lnSpc>
+                <a:spcPct val="100000"/>
+              </a:lnSpc>
+              <a:spcBef>
+                <a:spcPts val="0"/>
+              </a:spcBef>
+              <a:buNone/>
+            </a:pPr>
+            <a:r>
+              <a:rPr lang="en-US" dirty="0" smtClean="0"/>
+              <a:t>There are many ways to write the same program, so don’t always settle for the first idea that comes into your head. </a:t>
+            </a:r>
+            <a:r>
+              <a:rPr lang="en-US" i="1" dirty="0" smtClean="0"/>
+              <a:t>You can usually improve upon the first thing that comes to mind</a:t>
+            </a:r>
+            <a:r>
+              <a:rPr lang="en-US" dirty="0" smtClean="0"/>
+              <a:t>. </a:t>
+            </a:r>
+            <a:endParaRPr lang="en-US" i="1" dirty="0" smtClean="0"/>
+          </a:p>
+        </p:txBody>
+      </p:sp>
+    </p:spTree>
+    <p:extLst>
+      <p:ext uri="{BB962C8B-B14F-4D97-AF65-F5344CB8AC3E}">
+        <p14:creationId xmlns:p14="http://schemas.microsoft.com/office/powerpoint/2010/main" val="932260817"/>
+      </p:ext>
+    </p:extLst>
+  </p:cSld>
+  <p:clrMapOvr>
+    <a:masterClrMapping/>
+  </p:clrMapOvr>
+</p:sld>
+</file>
+
+<file path=ppt/slides/slide9.xml><?xml version="1.0" encoding="utf-8"?>
+<p:sld xmlns:a="http://schemas.openxmlformats.org/drawingml/2006/main" xmlns:r="http://schemas.openxmlformats.org/officeDocument/2006/relationships" xmlns:p="http://schemas.openxmlformats.org/presentationml/2006/main">
+  <p:cSld>
+    <p:spTree>
+      <p:nvGrpSpPr>
+        <p:cNvPr id="1" name=""/>
+        <p:cNvGrpSpPr/>
+        <p:nvPr/>
+      </p:nvGrpSpPr>
+      <p:grpSpPr>
+        <a:xfrm>
+          <a:off x="0" y="0"/>
+          <a:ext cx="0" cy="0"/>
+          <a:chOff x="0" y="0"/>
+          <a:chExt cx="0" cy="0"/>
+        </a:xfrm>
+      </p:grpSpPr>
+      <p:sp>
+        <p:nvSpPr>
+          <p:cNvPr id="2" name="Title 1"/>
+          <p:cNvSpPr>
+            <a:spLocks noGrp="1"/>
+          </p:cNvSpPr>
+          <p:nvPr>
+            <p:ph type="title"/>
+          </p:nvPr>
+        </p:nvSpPr>
+        <p:spPr/>
+        <p:txBody>
+          <a:bodyPr/>
+          <a:lstStyle/>
+          <a:p>
+            <a:r>
+              <a:rPr lang="en-US" dirty="0" smtClean="0"/>
+              <a:t>Rule Number One</a:t>
+            </a:r>
+            <a:endParaRPr lang="en-US" dirty="0"/>
+          </a:p>
+        </p:txBody>
+      </p:sp>
+      <p:sp>
+        <p:nvSpPr>
+          <p:cNvPr id="3" name="Content Placeholder 2"/>
+          <p:cNvSpPr>
+            <a:spLocks noGrp="1"/>
+          </p:cNvSpPr>
+          <p:nvPr>
+            <p:ph idx="1"/>
+          </p:nvPr>
+        </p:nvSpPr>
+        <p:spPr>
+          <a:xfrm>
+            <a:off x="680321" y="2336872"/>
+            <a:ext cx="9814807" cy="4077575"/>
+          </a:xfrm>
+        </p:spPr>
+        <p:txBody>
+          <a:bodyPr>
+            <a:normAutofit/>
+          </a:bodyPr>
+          <a:lstStyle/>
           <a:p>
             <a:pPr marL="0" marR="0" lvl="0" indent="0" defTabSz="914400" eaLnBrk="1" fontAlgn="auto" latinLnBrk="0" hangingPunct="1">
               <a:lnSpc>
@@ -9816,6 +10049,29 @@
               <a:tabLst/>
               <a:defRPr/>
             </a:pPr>
+            <a:r>
+              <a:rPr lang="en-US" i="1" dirty="0" smtClean="0"/>
+              <a:t>Code is read much more often than it is written. </a:t>
+            </a:r>
+            <a:endParaRPr lang="en-US" dirty="0" smtClean="0"/>
+          </a:p>
+          <a:p>
+            <a:pPr lvl="1">
+              <a:lnSpc>
+                <a:spcPct val="100000"/>
+              </a:lnSpc>
+              <a:spcBef>
+                <a:spcPts val="0"/>
+              </a:spcBef>
+            </a:pPr>
+            <a:r>
+              <a:rPr lang="en-US" dirty="0" smtClean="0"/>
+              <a:t>Advice: Assume </a:t>
+            </a:r>
+            <a:r>
+              <a:rPr lang="en-US" dirty="0" smtClean="0"/>
+              <a:t>this applies to all of the code you will ever write </a:t>
+            </a:r>
             <a:endParaRPr lang="en-US" dirty="0"/>
           </a:p>
           <a:p>
@@ -9836,18 +10092,7 @@
               <a:tabLst/>
               <a:defRPr/>
             </a:pPr>
-            <a:r>
-              <a:rPr lang="en-US" dirty="0" smtClean="0"/>
-              <a:t>Emphasize </a:t>
-            </a:r>
-            <a:r>
-              <a:rPr lang="en-US" i="1" dirty="0" smtClean="0"/>
-              <a:t>readability</a:t>
-            </a:r>
-            <a:r>
-              <a:rPr lang="en-US" dirty="0" smtClean="0"/>
-              <a:t> above all else. </a:t>
-            </a:r>
+            <a:endParaRPr lang="en-US" dirty="0"/>
           </a:p>
           <a:p>
             <a:pPr marL="0" marR="0" lvl="0" indent="0" defTabSz="914400" eaLnBrk="1" fontAlgn="auto" latinLnBrk="0" hangingPunct="1">
@@ -9867,7 +10112,18 @@
               <a:tabLst/>
               <a:defRPr/>
             </a:pPr>
-            <a:endParaRPr lang="en-US" dirty="0" smtClean="0"/>
+            <a:r>
+              <a:rPr lang="en-US" dirty="0" smtClean="0"/>
+              <a:t>Emphasize </a:t>
+            </a:r>
+            <a:r>
+              <a:rPr lang="en-US" i="1" dirty="0" smtClean="0"/>
+              <a:t>readability</a:t>
+            </a:r>
+            <a:r>
+              <a:rPr lang="en-US" dirty="0" smtClean="0"/>
+              <a:t> above all else. </a:t>
+            </a:r>
           </a:p>
           <a:p>
             <a:pPr marL="0" marR="0" lvl="0" indent="0" defTabSz="914400" eaLnBrk="1" fontAlgn="auto" latinLnBrk="0" hangingPunct="1">
@@ -9907,6 +10163,26 @@
               <a:tabLst/>
               <a:defRPr/>
             </a:pPr>
+            <a:endParaRPr lang="en-US" dirty="0" smtClean="0"/>
+          </a:p>
+          <a:p>
+            <a:pPr marL="0" marR="0" lvl="0" indent="0" defTabSz="914400" eaLnBrk="1" fontAlgn="auto" latinLnBrk="0" hangingPunct="1">
+              <a:lnSpc>
+                <a:spcPct val="100000"/>
+              </a:lnSpc>
+              <a:spcBef>
+                <a:spcPts val="0"/>
+              </a:spcBef>
+              <a:spcAft>
+                <a:spcPts val="0"/>
+              </a:spcAft>
+              <a:buClrTx/>
+              <a:buSzTx/>
+              <a:buFontTx/>
+              <a:buNone/>
+              <a:tabLst/>
+              <a:defRPr/>
+            </a:pPr>
             <a:r>
               <a:rPr lang="en-US" dirty="0" smtClean="0"/>
               <a:t>Bottom line: </a:t>
@@ -9927,7 +10203,7 @@
             </a:pPr>
             <a:r>
               <a:rPr lang="en-US" dirty="0" smtClean="0"/>
-              <a:t>The view commonly held by research scientists that code is simply a means to an end can only cause problems if you decide to build anything of substantial size; this line is usually crossed much before a public software release. The solution to this is knowing how to engineer your code. </a:t>
+              <a:t>The view commonly held by research scientists that code is simply a means to an end can only cause problems if you decide to build anything of substantial size; this line is usually crossed long before a public software release. The solution to this is knowing how to engineer your code. </a:t>
             </a:r>
           </a:p>
         </p:txBody>

</xml_diff>

<commit_message>
slides: minor edits to final slides
</commit_message>
<xml_diff>
--- a/slides/basicSE.pptx
+++ b/slides/basicSE.pptx
@@ -5,7 +5,7 @@
     <p:sldMasterId id="2147484294" r:id="rId1"/>
   </p:sldMasterIdLst>
   <p:notesMasterIdLst>
-    <p:notesMasterId r:id="rId11"/>
+    <p:notesMasterId r:id="rId12"/>
   </p:notesMasterIdLst>
   <p:sldIdLst>
     <p:sldId id="256" r:id="rId2"/>
@@ -13,10 +13,11 @@
     <p:sldId id="258" r:id="rId4"/>
     <p:sldId id="259" r:id="rId5"/>
     <p:sldId id="264" r:id="rId6"/>
-    <p:sldId id="260" r:id="rId7"/>
-    <p:sldId id="261" r:id="rId8"/>
+    <p:sldId id="261" r:id="rId7"/>
+    <p:sldId id="260" r:id="rId8"/>
     <p:sldId id="262" r:id="rId9"/>
     <p:sldId id="263" r:id="rId10"/>
+    <p:sldId id="265" r:id="rId11"/>
   </p:sldIdLst>
   <p:sldSz cx="12192000" cy="6858000"/>
   <p:notesSz cx="6858000" cy="9144000"/>
@@ -205,7 +206,7 @@
           <a:p>
             <a:fld id="{A58EF676-DA74-5E46-A6CE-5ED3069388CC}" type="datetimeFigureOut">
               <a:rPr lang="en-US" smtClean="0"/>
-              <a:t>5/21/20</a:t>
+              <a:t>5/22/20</a:t>
             </a:fld>
             <a:endParaRPr lang="en-US"/>
           </a:p>
@@ -703,6 +704,98 @@
           <a:p>
             <a:r>
               <a:rPr lang="en-US" dirty="0" smtClean="0"/>
+              <a:t>This applies</a:t>
+            </a:r>
+            <a:r>
+              <a:rPr lang="en-US" baseline="0" dirty="0" smtClean="0"/>
+              <a:t> much more to people releasing code publicly </a:t>
+            </a:r>
+            <a:endParaRPr lang="en-US" dirty="0"/>
+          </a:p>
+        </p:txBody>
+      </p:sp>
+      <p:sp>
+        <p:nvSpPr>
+          <p:cNvPr id="4" name="Slide Number Placeholder 3"/>
+          <p:cNvSpPr>
+            <a:spLocks noGrp="1"/>
+          </p:cNvSpPr>
+          <p:nvPr>
+            <p:ph type="sldNum" sz="quarter" idx="10"/>
+          </p:nvPr>
+        </p:nvSpPr>
+        <p:spPr/>
+        <p:txBody>
+          <a:bodyPr/>
+          <a:lstStyle/>
+          <a:p>
+            <a:fld id="{4FBF28C1-3B45-464E-B5E4-80D7800AB463}" type="slidenum">
+              <a:rPr lang="en-US" smtClean="0"/>
+              <a:t>6</a:t>
+            </a:fld>
+            <a:endParaRPr lang="en-US"/>
+          </a:p>
+        </p:txBody>
+      </p:sp>
+    </p:spTree>
+    <p:extLst>
+      <p:ext uri="{BB962C8B-B14F-4D97-AF65-F5344CB8AC3E}">
+        <p14:creationId xmlns:p14="http://schemas.microsoft.com/office/powerpoint/2010/main" val="903635624"/>
+      </p:ext>
+    </p:extLst>
+  </p:cSld>
+  <p:clrMapOvr>
+    <a:masterClrMapping/>
+  </p:clrMapOvr>
+</p:notes>
+</file>
+
+<file path=ppt/notesSlides/notesSlide4.xml><?xml version="1.0" encoding="utf-8"?>
+<p:notes xmlns:a="http://schemas.openxmlformats.org/drawingml/2006/main" xmlns:r="http://schemas.openxmlformats.org/officeDocument/2006/relationships" xmlns:p="http://schemas.openxmlformats.org/presentationml/2006/main">
+  <p:cSld>
+    <p:spTree>
+      <p:nvGrpSpPr>
+        <p:cNvPr id="1" name=""/>
+        <p:cNvGrpSpPr/>
+        <p:nvPr/>
+      </p:nvGrpSpPr>
+      <p:grpSpPr>
+        <a:xfrm>
+          <a:off x="0" y="0"/>
+          <a:ext cx="0" cy="0"/>
+          <a:chOff x="0" y="0"/>
+          <a:chExt cx="0" cy="0"/>
+        </a:xfrm>
+      </p:grpSpPr>
+      <p:sp>
+        <p:nvSpPr>
+          <p:cNvPr id="2" name="Slide Image Placeholder 1"/>
+          <p:cNvSpPr>
+            <a:spLocks noGrp="1" noRot="1" noChangeAspect="1"/>
+          </p:cNvSpPr>
+          <p:nvPr>
+            <p:ph type="sldImg"/>
+          </p:nvPr>
+        </p:nvSpPr>
+        <p:spPr/>
+      </p:sp>
+      <p:sp>
+        <p:nvSpPr>
+          <p:cNvPr id="3" name="Notes Placeholder 2"/>
+          <p:cNvSpPr>
+            <a:spLocks noGrp="1"/>
+          </p:cNvSpPr>
+          <p:nvPr>
+            <p:ph type="body" idx="1"/>
+          </p:nvPr>
+        </p:nvSpPr>
+        <p:spPr/>
+        <p:txBody>
+          <a:bodyPr/>
+          <a:lstStyle/>
+          <a:p>
+            <a:r>
+              <a:rPr lang="en-US" dirty="0" smtClean="0"/>
               <a:t>Professional</a:t>
             </a:r>
             <a:r>
@@ -752,6 +845,102 @@
     <p:extLst>
       <p:ext uri="{BB962C8B-B14F-4D97-AF65-F5344CB8AC3E}">
         <p14:creationId xmlns:p14="http://schemas.microsoft.com/office/powerpoint/2010/main" val="348344692"/>
+      </p:ext>
+    </p:extLst>
+  </p:cSld>
+  <p:clrMapOvr>
+    <a:masterClrMapping/>
+  </p:clrMapOvr>
+</p:notes>
+</file>
+
+<file path=ppt/notesSlides/notesSlide5.xml><?xml version="1.0" encoding="utf-8"?>
+<p:notes xmlns:a="http://schemas.openxmlformats.org/drawingml/2006/main" xmlns:r="http://schemas.openxmlformats.org/officeDocument/2006/relationships" xmlns:p="http://schemas.openxmlformats.org/presentationml/2006/main">
+  <p:cSld>
+    <p:spTree>
+      <p:nvGrpSpPr>
+        <p:cNvPr id="1" name=""/>
+        <p:cNvGrpSpPr/>
+        <p:nvPr/>
+      </p:nvGrpSpPr>
+      <p:grpSpPr>
+        <a:xfrm>
+          <a:off x="0" y="0"/>
+          <a:ext cx="0" cy="0"/>
+          <a:chOff x="0" y="0"/>
+          <a:chExt cx="0" cy="0"/>
+        </a:xfrm>
+      </p:grpSpPr>
+      <p:sp>
+        <p:nvSpPr>
+          <p:cNvPr id="2" name="Slide Image Placeholder 1"/>
+          <p:cNvSpPr>
+            <a:spLocks noGrp="1" noRot="1" noChangeAspect="1"/>
+          </p:cNvSpPr>
+          <p:nvPr>
+            <p:ph type="sldImg"/>
+          </p:nvPr>
+        </p:nvSpPr>
+        <p:spPr/>
+      </p:sp>
+      <p:sp>
+        <p:nvSpPr>
+          <p:cNvPr id="3" name="Notes Placeholder 2"/>
+          <p:cNvSpPr>
+            <a:spLocks noGrp="1"/>
+          </p:cNvSpPr>
+          <p:nvPr>
+            <p:ph type="body" idx="1"/>
+          </p:nvPr>
+        </p:nvSpPr>
+        <p:spPr/>
+        <p:txBody>
+          <a:bodyPr/>
+          <a:lstStyle/>
+          <a:p>
+            <a:r>
+              <a:rPr lang="en-US" dirty="0" smtClean="0"/>
+              <a:t>If you don’t know about their</a:t>
+            </a:r>
+            <a:r>
+              <a:rPr lang="en-US" baseline="0" dirty="0" smtClean="0"/>
+              <a:t> software engineering experience, you should always take code advice from </a:t>
+            </a:r>
+            <a:r>
+              <a:rPr lang="en-US" baseline="0" smtClean="0"/>
+              <a:t>a research scientist with a grain of salt. </a:t>
+            </a:r>
+            <a:endParaRPr lang="en-US" dirty="0"/>
+          </a:p>
+        </p:txBody>
+      </p:sp>
+      <p:sp>
+        <p:nvSpPr>
+          <p:cNvPr id="4" name="Slide Number Placeholder 3"/>
+          <p:cNvSpPr>
+            <a:spLocks noGrp="1"/>
+          </p:cNvSpPr>
+          <p:nvPr>
+            <p:ph type="sldNum" sz="quarter" idx="10"/>
+          </p:nvPr>
+        </p:nvSpPr>
+        <p:spPr/>
+        <p:txBody>
+          <a:bodyPr/>
+          <a:lstStyle/>
+          <a:p>
+            <a:fld id="{4FBF28C1-3B45-464E-B5E4-80D7800AB463}" type="slidenum">
+              <a:rPr lang="en-US" smtClean="0"/>
+              <a:t>9</a:t>
+            </a:fld>
+            <a:endParaRPr lang="en-US"/>
+          </a:p>
+        </p:txBody>
+      </p:sp>
+    </p:spTree>
+    <p:extLst>
+      <p:ext uri="{BB962C8B-B14F-4D97-AF65-F5344CB8AC3E}">
+        <p14:creationId xmlns:p14="http://schemas.microsoft.com/office/powerpoint/2010/main" val="6894971"/>
       </p:ext>
     </p:extLst>
   </p:cSld>
@@ -1039,7 +1228,7 @@
           <a:p>
             <a:fld id="{51673806-0BCD-1F42-BAA8-2011034B3C6A}" type="datetimeFigureOut">
               <a:rPr lang="en-US" smtClean="0"/>
-              <a:t>5/21/20</a:t>
+              <a:t>5/22/20</a:t>
             </a:fld>
             <a:endParaRPr lang="en-US"/>
           </a:p>
@@ -1453,7 +1642,7 @@
           <a:p>
             <a:fld id="{51673806-0BCD-1F42-BAA8-2011034B3C6A}" type="datetimeFigureOut">
               <a:rPr lang="en-US" smtClean="0"/>
-              <a:t>5/21/20</a:t>
+              <a:t>5/22/20</a:t>
             </a:fld>
             <a:endParaRPr lang="en-US"/>
           </a:p>
@@ -1784,7 +1973,7 @@
           <a:p>
             <a:fld id="{51673806-0BCD-1F42-BAA8-2011034B3C6A}" type="datetimeFigureOut">
               <a:rPr lang="en-US" smtClean="0"/>
-              <a:t>5/21/20</a:t>
+              <a:t>5/22/20</a:t>
             </a:fld>
             <a:endParaRPr lang="en-US"/>
           </a:p>
@@ -2184,7 +2373,7 @@
           <a:p>
             <a:fld id="{51673806-0BCD-1F42-BAA8-2011034B3C6A}" type="datetimeFigureOut">
               <a:rPr lang="en-US" smtClean="0"/>
-              <a:t>5/21/20</a:t>
+              <a:t>5/22/20</a:t>
             </a:fld>
             <a:endParaRPr lang="en-US"/>
           </a:p>
@@ -2747,7 +2936,7 @@
           <a:p>
             <a:fld id="{51673806-0BCD-1F42-BAA8-2011034B3C6A}" type="datetimeFigureOut">
               <a:rPr lang="en-US" smtClean="0"/>
-              <a:t>5/21/20</a:t>
+              <a:t>5/22/20</a:t>
             </a:fld>
             <a:endParaRPr lang="en-US"/>
           </a:p>
@@ -3423,7 +3612,7 @@
           <a:p>
             <a:fld id="{51673806-0BCD-1F42-BAA8-2011034B3C6A}" type="datetimeFigureOut">
               <a:rPr lang="en-US" smtClean="0"/>
-              <a:t>5/21/20</a:t>
+              <a:t>5/22/20</a:t>
             </a:fld>
             <a:endParaRPr lang="en-US"/>
           </a:p>
@@ -4331,7 +4520,7 @@
           <a:p>
             <a:fld id="{51673806-0BCD-1F42-BAA8-2011034B3C6A}" type="datetimeFigureOut">
               <a:rPr lang="en-US" smtClean="0"/>
-              <a:t>5/21/20</a:t>
+              <a:t>5/22/20</a:t>
             </a:fld>
             <a:endParaRPr lang="en-US"/>
           </a:p>
@@ -4639,7 +4828,7 @@
           <a:p>
             <a:fld id="{51673806-0BCD-1F42-BAA8-2011034B3C6A}" type="datetimeFigureOut">
               <a:rPr lang="en-US" smtClean="0"/>
-              <a:t>5/21/20</a:t>
+              <a:t>5/22/20</a:t>
             </a:fld>
             <a:endParaRPr lang="en-US"/>
           </a:p>
@@ -4898,7 +5087,7 @@
           <a:p>
             <a:fld id="{51673806-0BCD-1F42-BAA8-2011034B3C6A}" type="datetimeFigureOut">
               <a:rPr lang="en-US" smtClean="0"/>
-              <a:t>5/21/20</a:t>
+              <a:t>5/22/20</a:t>
             </a:fld>
             <a:endParaRPr lang="en-US"/>
           </a:p>
@@ -5221,7 +5410,7 @@
           <a:p>
             <a:fld id="{51673806-0BCD-1F42-BAA8-2011034B3C6A}" type="datetimeFigureOut">
               <a:rPr lang="en-US" smtClean="0"/>
-              <a:t>5/21/20</a:t>
+              <a:t>5/22/20</a:t>
             </a:fld>
             <a:endParaRPr lang="en-US"/>
           </a:p>
@@ -5605,7 +5794,7 @@
           <a:p>
             <a:fld id="{51673806-0BCD-1F42-BAA8-2011034B3C6A}" type="datetimeFigureOut">
               <a:rPr lang="en-US" smtClean="0"/>
-              <a:t>5/21/20</a:t>
+              <a:t>5/22/20</a:t>
             </a:fld>
             <a:endParaRPr lang="en-US"/>
           </a:p>
@@ -5981,7 +6170,7 @@
           <a:p>
             <a:fld id="{51673806-0BCD-1F42-BAA8-2011034B3C6A}" type="datetimeFigureOut">
               <a:rPr lang="en-US" smtClean="0"/>
-              <a:t>5/21/20</a:t>
+              <a:t>5/22/20</a:t>
             </a:fld>
             <a:endParaRPr lang="en-US"/>
           </a:p>
@@ -6487,7 +6676,7 @@
           <a:p>
             <a:fld id="{51673806-0BCD-1F42-BAA8-2011034B3C6A}" type="datetimeFigureOut">
               <a:rPr lang="en-US" smtClean="0"/>
-              <a:t>5/21/20</a:t>
+              <a:t>5/22/20</a:t>
             </a:fld>
             <a:endParaRPr lang="en-US"/>
           </a:p>
@@ -6744,7 +6933,7 @@
           <a:p>
             <a:fld id="{51673806-0BCD-1F42-BAA8-2011034B3C6A}" type="datetimeFigureOut">
               <a:rPr lang="en-US" smtClean="0"/>
-              <a:t>5/21/20</a:t>
+              <a:t>5/22/20</a:t>
             </a:fld>
             <a:endParaRPr lang="en-US"/>
           </a:p>
@@ -6902,7 +7091,7 @@
           <a:p>
             <a:fld id="{51673806-0BCD-1F42-BAA8-2011034B3C6A}" type="datetimeFigureOut">
               <a:rPr lang="en-US" smtClean="0"/>
-              <a:t>5/21/20</a:t>
+              <a:t>5/22/20</a:t>
             </a:fld>
             <a:endParaRPr lang="en-US"/>
           </a:p>
@@ -7292,7 +7481,7 @@
           <a:p>
             <a:fld id="{51673806-0BCD-1F42-BAA8-2011034B3C6A}" type="datetimeFigureOut">
               <a:rPr lang="en-US" smtClean="0"/>
-              <a:t>5/21/20</a:t>
+              <a:t>5/22/20</a:t>
             </a:fld>
             <a:endParaRPr lang="en-US"/>
           </a:p>
@@ -7701,7 +7890,7 @@
           <a:p>
             <a:fld id="{51673806-0BCD-1F42-BAA8-2011034B3C6A}" type="datetimeFigureOut">
               <a:rPr lang="en-US" smtClean="0"/>
-              <a:t>5/21/20</a:t>
+              <a:t>5/22/20</a:t>
             </a:fld>
             <a:endParaRPr lang="en-US"/>
           </a:p>
@@ -7949,7 +8138,7 @@
             <a:fld id="{51673806-0BCD-1F42-BAA8-2011034B3C6A}" type="datetimeFigureOut">
               <a:rPr lang="en-US" smtClean="0"/>
               <a:pPr/>
-              <a:t>5/21/20</a:t>
+              <a:t>5/22/20</a:t>
             </a:fld>
             <a:endParaRPr lang="en-US" dirty="0"/>
           </a:p>
@@ -8449,6 +8638,155 @@
 </p:sld>
 </file>
 
+<file path=ppt/slides/slide10.xml><?xml version="1.0" encoding="utf-8"?>
+<p:sld xmlns:a="http://schemas.openxmlformats.org/drawingml/2006/main" xmlns:r="http://schemas.openxmlformats.org/officeDocument/2006/relationships" xmlns:p="http://schemas.openxmlformats.org/presentationml/2006/main">
+  <p:cSld>
+    <p:spTree>
+      <p:nvGrpSpPr>
+        <p:cNvPr id="1" name=""/>
+        <p:cNvGrpSpPr/>
+        <p:nvPr/>
+      </p:nvGrpSpPr>
+      <p:grpSpPr>
+        <a:xfrm>
+          <a:off x="0" y="0"/>
+          <a:ext cx="0" cy="0"/>
+          <a:chOff x="0" y="0"/>
+          <a:chExt cx="0" cy="0"/>
+        </a:xfrm>
+      </p:grpSpPr>
+      <p:sp>
+        <p:nvSpPr>
+          <p:cNvPr id="2" name="Title 1"/>
+          <p:cNvSpPr>
+            <a:spLocks noGrp="1"/>
+          </p:cNvSpPr>
+          <p:nvPr>
+            <p:ph type="title"/>
+          </p:nvPr>
+        </p:nvSpPr>
+        <p:spPr/>
+        <p:txBody>
+          <a:bodyPr/>
+          <a:lstStyle/>
+          <a:p>
+            <a:endParaRPr lang="en-US"/>
+          </a:p>
+        </p:txBody>
+      </p:sp>
+      <p:sp>
+        <p:nvSpPr>
+          <p:cNvPr id="3" name="Content Placeholder 2"/>
+          <p:cNvSpPr>
+            <a:spLocks noGrp="1"/>
+          </p:cNvSpPr>
+          <p:nvPr>
+            <p:ph idx="1"/>
+          </p:nvPr>
+        </p:nvSpPr>
+        <p:spPr/>
+        <p:txBody>
+          <a:bodyPr/>
+          <a:lstStyle/>
+          <a:p>
+            <a:pPr marL="0" marR="0" lvl="0" indent="0" algn="ctr" defTabSz="914400" eaLnBrk="1" fontAlgn="auto" latinLnBrk="0" hangingPunct="1">
+              <a:lnSpc>
+                <a:spcPct val="100000"/>
+              </a:lnSpc>
+              <a:spcBef>
+                <a:spcPts val="0"/>
+              </a:spcBef>
+              <a:spcAft>
+                <a:spcPts val="0"/>
+              </a:spcAft>
+              <a:buClrTx/>
+              <a:buSzTx/>
+              <a:buFontTx/>
+              <a:buNone/>
+              <a:tabLst/>
+              <a:defRPr/>
+            </a:pPr>
+            <a:endParaRPr lang="en-US" dirty="0" smtClean="0"/>
+          </a:p>
+          <a:p>
+            <a:pPr marL="0" marR="0" lvl="0" indent="0" algn="ctr" defTabSz="914400" eaLnBrk="1" fontAlgn="auto" latinLnBrk="0" hangingPunct="1">
+              <a:lnSpc>
+                <a:spcPct val="100000"/>
+              </a:lnSpc>
+              <a:spcBef>
+                <a:spcPts val="0"/>
+              </a:spcBef>
+              <a:spcAft>
+                <a:spcPts val="0"/>
+              </a:spcAft>
+              <a:buClrTx/>
+              <a:buSzTx/>
+              <a:buFontTx/>
+              <a:buNone/>
+              <a:tabLst/>
+              <a:defRPr/>
+            </a:pPr>
+            <a:endParaRPr lang="en-US" dirty="0"/>
+          </a:p>
+          <a:p>
+            <a:pPr marL="0" marR="0" lvl="0" indent="0" algn="ctr" defTabSz="914400" eaLnBrk="1" fontAlgn="auto" latinLnBrk="0" hangingPunct="1">
+              <a:lnSpc>
+                <a:spcPct val="100000"/>
+              </a:lnSpc>
+              <a:spcBef>
+                <a:spcPts val="0"/>
+              </a:spcBef>
+              <a:spcAft>
+                <a:spcPts val="0"/>
+              </a:spcAft>
+              <a:buClrTx/>
+              <a:buSzTx/>
+              <a:buFontTx/>
+              <a:buNone/>
+              <a:tabLst/>
+              <a:defRPr/>
+            </a:pPr>
+            <a:endParaRPr lang="en-US" dirty="0" smtClean="0"/>
+          </a:p>
+          <a:p>
+            <a:pPr marL="0" marR="0" lvl="0" indent="0" algn="ctr" defTabSz="914400" eaLnBrk="1" fontAlgn="auto" latinLnBrk="0" hangingPunct="1">
+              <a:lnSpc>
+                <a:spcPct val="100000"/>
+              </a:lnSpc>
+              <a:spcBef>
+                <a:spcPts val="0"/>
+              </a:spcBef>
+              <a:spcAft>
+                <a:spcPts val="0"/>
+              </a:spcAft>
+              <a:buClrTx/>
+              <a:buSzTx/>
+              <a:buFontTx/>
+              <a:buNone/>
+              <a:tabLst/>
+              <a:defRPr/>
+            </a:pPr>
+            <a:r>
+              <a:rPr lang="en-US" sz="6000" dirty="0" smtClean="0"/>
+              <a:t>Thank you!</a:t>
+            </a:r>
+            <a:endParaRPr lang="en-US" sz="6000" dirty="0"/>
+          </a:p>
+        </p:txBody>
+      </p:sp>
+    </p:spTree>
+    <p:extLst>
+      <p:ext uri="{BB962C8B-B14F-4D97-AF65-F5344CB8AC3E}">
+        <p14:creationId xmlns:p14="http://schemas.microsoft.com/office/powerpoint/2010/main" val="2037745443"/>
+      </p:ext>
+    </p:extLst>
+  </p:cSld>
+  <p:clrMapOvr>
+    <a:masterClrMapping/>
+  </p:clrMapOvr>
+</p:sld>
+</file>
+
 <file path=ppt/slides/slide2.xml><?xml version="1.0" encoding="utf-8"?>
 <p:sld xmlns:a="http://schemas.openxmlformats.org/drawingml/2006/main" xmlns:r="http://schemas.openxmlformats.org/officeDocument/2006/relationships" xmlns:p="http://schemas.openxmlformats.org/presentationml/2006/main">
   <p:cSld>
@@ -9265,7 +9603,23 @@
             </a:pPr>
             <a:r>
               <a:rPr lang="en-US" dirty="0" smtClean="0"/>
-              <a:t>You don’t need to use GitHub for version control </a:t>
+              <a:t>You don’t need to use </a:t>
+            </a:r>
+            <a:r>
+              <a:rPr lang="en-US" dirty="0" smtClean="0"/>
+              <a:t>GitHub/</a:t>
+            </a:r>
+            <a:r>
+              <a:rPr lang="en-US" dirty="0" err="1" smtClean="0"/>
+              <a:t>Bitbucket</a:t>
+            </a:r>
+            <a:r>
+              <a:rPr lang="en-US" dirty="0" smtClean="0"/>
+              <a:t> </a:t>
+            </a:r>
+            <a:r>
+              <a:rPr lang="en-US" dirty="0" smtClean="0"/>
+              <a:t>for version control </a:t>
             </a:r>
             <a:r>
               <a:rPr lang="mr-IN" dirty="0" smtClean="0"/>
@@ -9325,7 +9679,7 @@
           <a:p>
             <a:r>
               <a:rPr lang="en-US" dirty="0" smtClean="0"/>
-              <a:t>Testing</a:t>
+              <a:t>Minimization of Dependencies </a:t>
             </a:r>
             <a:endParaRPr lang="en-US" dirty="0"/>
           </a:p>
@@ -9344,11 +9698,13 @@
         <p:spPr>
           <a:xfrm>
             <a:off x="680321" y="2336872"/>
-            <a:ext cx="9613861" cy="4159461"/>
-          </a:xfrm>
-        </p:spPr>
-        <p:txBody>
-          <a:bodyPr/>
+            <a:ext cx="10265183" cy="4295939"/>
+          </a:xfrm>
+        </p:spPr>
+        <p:txBody>
+          <a:bodyPr>
+            <a:normAutofit/>
+          </a:bodyPr>
           <a:lstStyle/>
           <a:p>
             <a:pPr marL="0" marR="0" lvl="0" indent="0" defTabSz="914400" eaLnBrk="1" fontAlgn="auto" latinLnBrk="0" hangingPunct="1">
@@ -9370,108 +9726,189 @@
             </a:pPr>
             <a:r>
               <a:rPr lang="en-US" dirty="0" smtClean="0"/>
-              <a:t>Well-written software implements </a:t>
+              <a:t>If the code base for your software uses another, external software (e.g. </a:t>
+            </a:r>
+            <a:r>
+              <a:rPr lang="en-US" dirty="0" err="1" smtClean="0"/>
+              <a:t>NumPy</a:t>
+            </a:r>
+            <a:r>
+              <a:rPr lang="en-US" dirty="0" smtClean="0"/>
+              <a:t>), that is called a </a:t>
             </a:r>
             <a:r>
               <a:rPr lang="en-US" i="1" dirty="0" smtClean="0"/>
-              <a:t>unit tests</a:t>
+              <a:t>dependency</a:t>
             </a:r>
             <a:r>
               <a:rPr lang="en-US" dirty="0" smtClean="0"/>
-              <a:t> </a:t>
-            </a:r>
-            <a:endParaRPr lang="en-US" dirty="0"/>
-          </a:p>
-          <a:p>
-            <a:pPr lvl="1">
+              <a:t> (your code </a:t>
+            </a:r>
+            <a:r>
+              <a:rPr lang="en-US" i="1" dirty="0" smtClean="0"/>
+              <a:t>depends on </a:t>
+            </a:r>
+            <a:r>
+              <a:rPr lang="en-US" dirty="0" err="1" smtClean="0"/>
+              <a:t>NumPy</a:t>
+            </a:r>
+            <a:r>
+              <a:rPr lang="en-US" dirty="0" smtClean="0"/>
+              <a:t>). </a:t>
+            </a:r>
+          </a:p>
+          <a:p>
+            <a:pPr marL="0" marR="0" lvl="0" indent="0" defTabSz="914400" eaLnBrk="1" fontAlgn="auto" latinLnBrk="0" hangingPunct="1">
               <a:lnSpc>
                 <a:spcPct val="100000"/>
               </a:lnSpc>
               <a:spcBef>
                 <a:spcPts val="0"/>
               </a:spcBef>
+              <a:spcAft>
+                <a:spcPts val="0"/>
+              </a:spcAft>
+              <a:buClrTx/>
+              <a:buSzTx/>
+              <a:buFontTx/>
+              <a:buNone/>
+              <a:tabLst/>
+              <a:defRPr/>
             </a:pPr>
-            <a:r>
-              <a:rPr lang="en-US" dirty="0" smtClean="0"/>
-              <a:t>A means of assigning </a:t>
-            </a:r>
-            <a:r>
-              <a:rPr lang="en-US" i="1" dirty="0" smtClean="0"/>
-              <a:t>Success/Failure/Skipped</a:t>
-            </a:r>
-            <a:r>
-              <a:rPr lang="en-US" dirty="0" smtClean="0"/>
-              <a:t> messages to the smallest possible components of a code base </a:t>
-            </a:r>
-          </a:p>
-          <a:p>
-            <a:pPr marL="0" indent="0">
+            <a:endParaRPr lang="en-US" dirty="0"/>
+          </a:p>
+          <a:p>
+            <a:pPr marL="0" marR="0" lvl="0" indent="0" defTabSz="914400" eaLnBrk="1" fontAlgn="auto" latinLnBrk="0" hangingPunct="1">
               <a:lnSpc>
                 <a:spcPct val="100000"/>
               </a:lnSpc>
               <a:spcBef>
                 <a:spcPts val="0"/>
               </a:spcBef>
-              <a:buNone/>
+              <a:spcAft>
+                <a:spcPts val="0"/>
+              </a:spcAft>
+              <a:buClrTx/>
+              <a:buSzTx/>
+              <a:buFontTx/>
+              <a:buNone/>
+              <a:tabLst/>
+              <a:defRPr/>
             </a:pPr>
-            <a:endParaRPr lang="en-US" dirty="0"/>
-          </a:p>
-          <a:p>
-            <a:pPr marL="0" indent="0">
+            <a:r>
+              <a:rPr lang="en-US" dirty="0" smtClean="0"/>
+              <a:t>It’s quite common to have ~few dependencies, but too many is </a:t>
+            </a:r>
+            <a:r>
+              <a:rPr lang="en-US" i="1" dirty="0" smtClean="0"/>
+              <a:t>problematic</a:t>
+            </a:r>
+            <a:r>
+              <a:rPr lang="en-US" dirty="0" smtClean="0"/>
+              <a:t>. </a:t>
+            </a:r>
+          </a:p>
+          <a:p>
+            <a:pPr marL="0" marR="0" lvl="0" indent="0" defTabSz="914400" eaLnBrk="1" fontAlgn="auto" latinLnBrk="0" hangingPunct="1">
               <a:lnSpc>
                 <a:spcPct val="100000"/>
               </a:lnSpc>
               <a:spcBef>
                 <a:spcPts val="0"/>
               </a:spcBef>
-              <a:buNone/>
+              <a:spcAft>
+                <a:spcPts val="0"/>
+              </a:spcAft>
+              <a:buClrTx/>
+              <a:buSzTx/>
+              <a:buFontTx/>
+              <a:buNone/>
+              <a:tabLst/>
+              <a:defRPr/>
             </a:pPr>
-            <a:r>
-              <a:rPr lang="en-US" dirty="0" smtClean="0"/>
-              <a:t>When you make a future change to your code base, this gives you an automated means of finding out if your change broke anything you weren’t expecting to break. </a:t>
-            </a:r>
-          </a:p>
-          <a:p>
-            <a:pPr marL="0" indent="0">
+            <a:endParaRPr lang="en-US" dirty="0" smtClean="0"/>
+          </a:p>
+          <a:p>
+            <a:pPr marL="0" marR="0" lvl="0" indent="0" defTabSz="914400" eaLnBrk="1" fontAlgn="auto" latinLnBrk="0" hangingPunct="1">
               <a:lnSpc>
                 <a:spcPct val="100000"/>
               </a:lnSpc>
               <a:spcBef>
                 <a:spcPts val="0"/>
               </a:spcBef>
-              <a:buNone/>
+              <a:spcAft>
+                <a:spcPts val="0"/>
+              </a:spcAft>
+              <a:buClrTx/>
+              <a:buSzTx/>
+              <a:buFontTx/>
+              <a:buNone/>
+              <a:tabLst/>
+              <a:defRPr/>
             </a:pPr>
-            <a:endParaRPr lang="en-US" dirty="0"/>
-          </a:p>
-          <a:p>
-            <a:pPr marL="0" indent="0">
+            <a:r>
+              <a:rPr lang="en-US" dirty="0" smtClean="0"/>
+              <a:t>As of now my own python </a:t>
+            </a:r>
+            <a:r>
+              <a:rPr lang="en-US" dirty="0" smtClean="0"/>
+              <a:t>package </a:t>
+            </a:r>
+            <a:r>
+              <a:rPr lang="en-US" dirty="0" smtClean="0"/>
+              <a:t>is ~60k lines of code. If one of its dependencies releases a new version with changes that affect my code, I have to go look at every file to ensure this doesn’t break anything. </a:t>
+            </a:r>
+          </a:p>
+          <a:p>
+            <a:pPr marL="0" marR="0" lvl="0" indent="0" defTabSz="914400" eaLnBrk="1" fontAlgn="auto" latinLnBrk="0" hangingPunct="1">
               <a:lnSpc>
                 <a:spcPct val="100000"/>
               </a:lnSpc>
               <a:spcBef>
                 <a:spcPts val="0"/>
               </a:spcBef>
-              <a:buNone/>
+              <a:spcAft>
+                <a:spcPts val="0"/>
+              </a:spcAft>
+              <a:buClrTx/>
+              <a:buSzTx/>
+              <a:buFontTx/>
+              <a:buNone/>
+              <a:tabLst/>
+              <a:defRPr/>
             </a:pPr>
+            <a:endParaRPr lang="en-US" dirty="0" smtClean="0"/>
+          </a:p>
+          <a:p>
+            <a:pPr marL="0" marR="0" lvl="0" indent="0" defTabSz="914400" eaLnBrk="1" fontAlgn="auto" latinLnBrk="0" hangingPunct="1">
+              <a:lnSpc>
+                <a:spcPct val="100000"/>
+              </a:lnSpc>
+              <a:spcBef>
+                <a:spcPts val="0"/>
+              </a:spcBef>
+              <a:spcAft>
+                <a:spcPts val="0"/>
+              </a:spcAft>
+              <a:buClrTx/>
+              <a:buSzTx/>
+              <a:buFontTx/>
+              <a:buNone/>
+              <a:tabLst/>
+              <a:defRPr/>
+            </a:pPr>
             <a:r>
               <a:rPr lang="en-US" dirty="0" smtClean="0"/>
-              <a:t>This is as simple as </a:t>
-            </a:r>
-            <a:r>
-              <a:rPr lang="en-US" i="1" dirty="0" smtClean="0"/>
-              <a:t>actually saving</a:t>
-            </a:r>
-            <a:r>
-              <a:rPr lang="en-US" dirty="0" smtClean="0"/>
-              <a:t> the code you write to test a new component of your software, and the same for when you resolve an issue. </a:t>
-            </a:r>
+              <a:t>Advice: Don’t be afraid to write the small but challenging stuff yourself. </a:t>
+            </a:r>
+            <a:endParaRPr lang="en-US" dirty="0"/>
           </a:p>
         </p:txBody>
       </p:sp>
     </p:spTree>
     <p:extLst>
       <p:ext uri="{BB962C8B-B14F-4D97-AF65-F5344CB8AC3E}">
-        <p14:creationId xmlns:p14="http://schemas.microsoft.com/office/powerpoint/2010/main" val="1484475418"/>
+        <p14:creationId xmlns:p14="http://schemas.microsoft.com/office/powerpoint/2010/main" val="831163437"/>
       </p:ext>
     </p:extLst>
   </p:cSld>
@@ -9515,7 +9952,7 @@
           <a:p>
             <a:r>
               <a:rPr lang="en-US" dirty="0" smtClean="0"/>
-              <a:t>Minimization of Dependencies </a:t>
+              <a:t>Testing</a:t>
             </a:r>
             <a:endParaRPr lang="en-US" dirty="0"/>
           </a:p>
@@ -9534,13 +9971,11 @@
         <p:spPr>
           <a:xfrm>
             <a:off x="680321" y="2336872"/>
-            <a:ext cx="10265183" cy="4295939"/>
-          </a:xfrm>
-        </p:spPr>
-        <p:txBody>
-          <a:bodyPr>
-            <a:normAutofit/>
-          </a:bodyPr>
+            <a:ext cx="9613861" cy="4159461"/>
+          </a:xfrm>
+        </p:spPr>
+        <p:txBody>
+          <a:bodyPr/>
           <a:lstStyle/>
           <a:p>
             <a:pPr marL="0" marR="0" lvl="0" indent="0" defTabSz="914400" eaLnBrk="1" fontAlgn="auto" latinLnBrk="0" hangingPunct="1">
@@ -9562,198 +9997,108 @@
             </a:pPr>
             <a:r>
               <a:rPr lang="en-US" dirty="0" smtClean="0"/>
-              <a:t>If the code base for your software uses another, external software (e.g. </a:t>
-            </a:r>
-            <a:r>
-              <a:rPr lang="en-US" dirty="0" err="1" smtClean="0"/>
-              <a:t>NumPy</a:t>
+              <a:t>Well-written software implements </a:t>
+            </a:r>
+            <a:r>
+              <a:rPr lang="en-US" i="1" dirty="0" smtClean="0"/>
+              <a:t>unit tests</a:t>
             </a:r>
             <a:r>
               <a:rPr lang="en-US" dirty="0" smtClean="0"/>
-              <a:t>), that is called a </a:t>
-            </a:r>
-            <a:r>
-              <a:rPr lang="en-US" i="1" dirty="0" smtClean="0"/>
-              <a:t>dependency</a:t>
-            </a:r>
-            <a:r>
-              <a:rPr lang="en-US" dirty="0" smtClean="0"/>
-              <a:t> (your code </a:t>
-            </a:r>
-            <a:r>
-              <a:rPr lang="en-US" i="1" dirty="0" smtClean="0"/>
-              <a:t>depends on </a:t>
-            </a:r>
-            <a:r>
-              <a:rPr lang="en-US" dirty="0" err="1" smtClean="0"/>
-              <a:t>NumPy</a:t>
-            </a:r>
-            <a:r>
-              <a:rPr lang="en-US" dirty="0" smtClean="0"/>
-              <a:t>). </a:t>
-            </a:r>
-          </a:p>
-          <a:p>
-            <a:pPr marL="0" marR="0" lvl="0" indent="0" defTabSz="914400" eaLnBrk="1" fontAlgn="auto" latinLnBrk="0" hangingPunct="1">
+              <a:t> </a:t>
+            </a:r>
+            <a:endParaRPr lang="en-US" dirty="0"/>
+          </a:p>
+          <a:p>
+            <a:pPr lvl="1">
               <a:lnSpc>
                 <a:spcPct val="100000"/>
               </a:lnSpc>
               <a:spcBef>
                 <a:spcPts val="0"/>
               </a:spcBef>
-              <a:spcAft>
-                <a:spcPts val="0"/>
-              </a:spcAft>
-              <a:buClrTx/>
-              <a:buSzTx/>
-              <a:buFontTx/>
-              <a:buNone/>
-              <a:tabLst/>
-              <a:defRPr/>
             </a:pPr>
-            <a:endParaRPr lang="en-US" dirty="0"/>
-          </a:p>
-          <a:p>
-            <a:pPr marL="0" marR="0" lvl="0" indent="0" defTabSz="914400" eaLnBrk="1" fontAlgn="auto" latinLnBrk="0" hangingPunct="1">
+            <a:r>
+              <a:rPr lang="en-US" dirty="0" smtClean="0"/>
+              <a:t>A means of assigning </a:t>
+            </a:r>
+            <a:r>
+              <a:rPr lang="en-US" i="1" dirty="0" smtClean="0"/>
+              <a:t>Success/Failure/Skipped</a:t>
+            </a:r>
+            <a:r>
+              <a:rPr lang="en-US" dirty="0" smtClean="0"/>
+              <a:t> messages to the smallest possible components of a code base </a:t>
+            </a:r>
+          </a:p>
+          <a:p>
+            <a:pPr marL="0" indent="0">
               <a:lnSpc>
                 <a:spcPct val="100000"/>
               </a:lnSpc>
               <a:spcBef>
                 <a:spcPts val="0"/>
               </a:spcBef>
-              <a:spcAft>
-                <a:spcPts val="0"/>
-              </a:spcAft>
-              <a:buClrTx/>
-              <a:buSzTx/>
-              <a:buFontTx/>
-              <a:buNone/>
-              <a:tabLst/>
-              <a:defRPr/>
+              <a:buNone/>
             </a:pPr>
-            <a:r>
-              <a:rPr lang="en-US" dirty="0" smtClean="0"/>
-              <a:t>It’s quite common to have ~few dependencies, but too many is </a:t>
-            </a:r>
-            <a:r>
-              <a:rPr lang="en-US" i="1" dirty="0" smtClean="0"/>
-              <a:t>problematic</a:t>
-            </a:r>
-            <a:r>
-              <a:rPr lang="en-US" dirty="0" smtClean="0"/>
-              <a:t>. </a:t>
-            </a:r>
-          </a:p>
-          <a:p>
-            <a:pPr marL="0" marR="0" lvl="0" indent="0" defTabSz="914400" eaLnBrk="1" fontAlgn="auto" latinLnBrk="0" hangingPunct="1">
+            <a:endParaRPr lang="en-US" dirty="0"/>
+          </a:p>
+          <a:p>
+            <a:pPr marL="0" indent="0">
               <a:lnSpc>
                 <a:spcPct val="100000"/>
               </a:lnSpc>
               <a:spcBef>
                 <a:spcPts val="0"/>
               </a:spcBef>
-              <a:spcAft>
-                <a:spcPts val="0"/>
-              </a:spcAft>
-              <a:buClrTx/>
-              <a:buSzTx/>
-              <a:buFontTx/>
-              <a:buNone/>
-              <a:tabLst/>
-              <a:defRPr/>
+              <a:buNone/>
             </a:pPr>
-            <a:endParaRPr lang="en-US" dirty="0" smtClean="0"/>
-          </a:p>
-          <a:p>
-            <a:pPr marL="0" marR="0" lvl="0" indent="0" defTabSz="914400" eaLnBrk="1" fontAlgn="auto" latinLnBrk="0" hangingPunct="1">
+            <a:r>
+              <a:rPr lang="en-US" dirty="0" smtClean="0"/>
+              <a:t>When you make a future change to your code base, this gives you an automated means of finding out if your change broke anything you weren’t expecting to break. </a:t>
+            </a:r>
+          </a:p>
+          <a:p>
+            <a:pPr marL="0" indent="0">
               <a:lnSpc>
                 <a:spcPct val="100000"/>
               </a:lnSpc>
               <a:spcBef>
                 <a:spcPts val="0"/>
               </a:spcBef>
-              <a:spcAft>
-                <a:spcPts val="0"/>
-              </a:spcAft>
-              <a:buClrTx/>
-              <a:buSzTx/>
-              <a:buFontTx/>
-              <a:buNone/>
-              <a:tabLst/>
-              <a:defRPr/>
+              <a:buNone/>
             </a:pPr>
-            <a:r>
-              <a:rPr lang="en-US" dirty="0" smtClean="0"/>
-              <a:t>As of now </a:t>
-            </a:r>
-            <a:r>
-              <a:rPr lang="en-US" dirty="0" smtClean="0"/>
-              <a:t>my </a:t>
-            </a:r>
-            <a:r>
-              <a:rPr lang="en-US" dirty="0" smtClean="0"/>
-              <a:t>own python packages is ~60k lines of </a:t>
-            </a:r>
-            <a:r>
-              <a:rPr lang="en-US" dirty="0" smtClean="0"/>
-              <a:t>code</a:t>
-            </a:r>
-            <a:r>
-              <a:rPr lang="en-US" dirty="0" smtClean="0"/>
-              <a:t>. If one of its dependencies releases a new version with changes that affect my code, I have to go look at every file to ensure this doesn’t break anything. </a:t>
-            </a:r>
-            <a:endParaRPr lang="en-US" dirty="0" smtClean="0"/>
-          </a:p>
-          <a:p>
-            <a:pPr marL="0" marR="0" lvl="0" indent="0" defTabSz="914400" eaLnBrk="1" fontAlgn="auto" latinLnBrk="0" hangingPunct="1">
+            <a:endParaRPr lang="en-US" dirty="0"/>
+          </a:p>
+          <a:p>
+            <a:pPr marL="0" indent="0">
               <a:lnSpc>
                 <a:spcPct val="100000"/>
               </a:lnSpc>
               <a:spcBef>
                 <a:spcPts val="0"/>
               </a:spcBef>
-              <a:spcAft>
-                <a:spcPts val="0"/>
-              </a:spcAft>
-              <a:buClrTx/>
-              <a:buSzTx/>
-              <a:buFontTx/>
-              <a:buNone/>
-              <a:tabLst/>
-              <a:defRPr/>
+              <a:buNone/>
             </a:pPr>
-            <a:endParaRPr lang="en-US" dirty="0" smtClean="0"/>
-          </a:p>
-          <a:p>
-            <a:pPr marL="0" marR="0" lvl="0" indent="0" defTabSz="914400" eaLnBrk="1" fontAlgn="auto" latinLnBrk="0" hangingPunct="1">
-              <a:lnSpc>
-                <a:spcPct val="100000"/>
-              </a:lnSpc>
-              <a:spcBef>
-                <a:spcPts val="0"/>
-              </a:spcBef>
-              <a:spcAft>
-                <a:spcPts val="0"/>
-              </a:spcAft>
-              <a:buClrTx/>
-              <a:buSzTx/>
-              <a:buFontTx/>
-              <a:buNone/>
-              <a:tabLst/>
-              <a:defRPr/>
-            </a:pPr>
             <a:r>
               <a:rPr lang="en-US" dirty="0" smtClean="0"/>
-              <a:t>Advice: Don’t be afraid to write the small but challenging stuff yourself. </a:t>
-            </a:r>
-            <a:endParaRPr lang="en-US" dirty="0"/>
+              <a:t>This is as simple as </a:t>
+            </a:r>
+            <a:r>
+              <a:rPr lang="en-US" i="1" dirty="0" smtClean="0"/>
+              <a:t>actually saving</a:t>
+            </a:r>
+            <a:r>
+              <a:rPr lang="en-US" dirty="0" smtClean="0"/>
+              <a:t> the code you write to test a new component of your software, and the same for when you resolve an issue. </a:t>
+            </a:r>
           </a:p>
         </p:txBody>
       </p:sp>
     </p:spTree>
     <p:extLst>
       <p:ext uri="{BB962C8B-B14F-4D97-AF65-F5344CB8AC3E}">
-        <p14:creationId xmlns:p14="http://schemas.microsoft.com/office/powerpoint/2010/main" val="831163437"/>
+        <p14:creationId xmlns:p14="http://schemas.microsoft.com/office/powerpoint/2010/main" val="1484475418"/>
       </p:ext>
     </p:extLst>
   </p:cSld>
@@ -10066,11 +10411,7 @@
             </a:pPr>
             <a:r>
               <a:rPr lang="en-US" dirty="0" smtClean="0"/>
-              <a:t>Advice: Assume </a:t>
-            </a:r>
-            <a:r>
-              <a:rPr lang="en-US" dirty="0" smtClean="0"/>
-              <a:t>this applies to all of the code you will ever write </a:t>
+              <a:t>Advice: Assume this applies to all of the code you will ever write </a:t>
             </a:r>
             <a:endParaRPr lang="en-US" dirty="0"/>
           </a:p>

</xml_diff>

<commit_message>
first commit: copied from OSUAstroSURP2020 repository
</commit_message>
<xml_diff>
--- a/slides/basicSE.pptx
+++ b/slides/basicSE.pptx
@@ -904,11 +904,7 @@
             </a:r>
             <a:r>
               <a:rPr lang="en-US" baseline="0" dirty="0" smtClean="0"/>
-              <a:t> software engineering experience, you should always take code advice from </a:t>
-            </a:r>
-            <a:r>
-              <a:rPr lang="en-US" baseline="0" smtClean="0"/>
-              <a:t>a research scientist with a grain of salt. </a:t>
+              <a:t> software engineering experience, you should always take code advice from a research scientist with a grain of salt. </a:t>
             </a:r>
             <a:endParaRPr lang="en-US" dirty="0"/>
           </a:p>
@@ -8635,6 +8631,13 @@
   <p:clrMapOvr>
     <a:masterClrMapping/>
   </p:clrMapOvr>
+  <p:timing>
+    <p:tnLst>
+      <p:par>
+        <p:cTn id="1" dur="indefinite" restart="never" nodeType="tmRoot"/>
+      </p:par>
+    </p:tnLst>
+  </p:timing>
 </p:sld>
 </file>
 
@@ -8784,6 +8787,13 @@
   <p:clrMapOvr>
     <a:masterClrMapping/>
   </p:clrMapOvr>
+  <p:timing>
+    <p:tnLst>
+      <p:par>
+        <p:cTn id="1" dur="indefinite" restart="never" nodeType="tmRoot"/>
+      </p:par>
+    </p:tnLst>
+  </p:timing>
 </p:sld>
 </file>
 
@@ -9029,6 +9039,13 @@
   <p:clrMapOvr>
     <a:masterClrMapping/>
   </p:clrMapOvr>
+  <p:timing>
+    <p:tnLst>
+      <p:par>
+        <p:cTn id="1" dur="indefinite" restart="never" nodeType="tmRoot"/>
+      </p:par>
+    </p:tnLst>
+  </p:timing>
 </p:sld>
 </file>
 
@@ -9253,6 +9270,13 @@
   <p:clrMapOvr>
     <a:masterClrMapping/>
   </p:clrMapOvr>
+  <p:timing>
+    <p:tnLst>
+      <p:par>
+        <p:cTn id="1" dur="indefinite" restart="never" nodeType="tmRoot"/>
+      </p:par>
+    </p:tnLst>
+  </p:timing>
 </p:sld>
 </file>
 
@@ -9431,6 +9455,13 @@
   <p:clrMapOvr>
     <a:masterClrMapping/>
   </p:clrMapOvr>
+  <p:timing>
+    <p:tnLst>
+      <p:par>
+        <p:cTn id="1" dur="indefinite" restart="never" nodeType="tmRoot"/>
+      </p:par>
+    </p:tnLst>
+  </p:timing>
 </p:sld>
 </file>
 
@@ -9642,6 +9673,13 @@
   <p:clrMapOvr>
     <a:masterClrMapping/>
   </p:clrMapOvr>
+  <p:timing>
+    <p:tnLst>
+      <p:par>
+        <p:cTn id="1" dur="indefinite" restart="never" nodeType="tmRoot"/>
+      </p:par>
+    </p:tnLst>
+  </p:timing>
 </p:sld>
 </file>
 
@@ -9915,6 +9953,13 @@
   <p:clrMapOvr>
     <a:masterClrMapping/>
   </p:clrMapOvr>
+  <p:timing>
+    <p:tnLst>
+      <p:par>
+        <p:cTn id="1" dur="indefinite" restart="never" nodeType="tmRoot"/>
+      </p:par>
+    </p:tnLst>
+  </p:timing>
 </p:sld>
 </file>
 
@@ -10105,6 +10150,13 @@
   <p:clrMapOvr>
     <a:masterClrMapping/>
   </p:clrMapOvr>
+  <p:timing>
+    <p:tnLst>
+      <p:par>
+        <p:cTn id="1" dur="indefinite" restart="never" nodeType="tmRoot"/>
+      </p:par>
+    </p:tnLst>
+  </p:timing>
 </p:sld>
 </file>
 
@@ -10312,6 +10364,13 @@
   <p:clrMapOvr>
     <a:masterClrMapping/>
   </p:clrMapOvr>
+  <p:timing>
+    <p:tnLst>
+      <p:par>
+        <p:cTn id="1" dur="indefinite" restart="never" nodeType="tmRoot"/>
+      </p:par>
+    </p:tnLst>
+  </p:timing>
 </p:sld>
 </file>
 
@@ -10559,6 +10618,13 @@
   <p:clrMapOvr>
     <a:masterClrMapping/>
   </p:clrMapOvr>
+  <p:timing>
+    <p:tnLst>
+      <p:par>
+        <p:cTn id="1" dur="indefinite" restart="never" nodeType="tmRoot"/>
+      </p:par>
+    </p:tnLst>
+  </p:timing>
 </p:sld>
 </file>
 

</xml_diff>

<commit_message>
slides: minor revisions to existing set ; multiple inheritance started
</commit_message>
<xml_diff>
--- a/slides/basicSE.pptx
+++ b/slides/basicSE.pptx
@@ -5,7 +5,7 @@
     <p:sldMasterId id="2147484294" r:id="rId1"/>
   </p:sldMasterIdLst>
   <p:notesMasterIdLst>
-    <p:notesMasterId r:id="rId12"/>
+    <p:notesMasterId r:id="rId13"/>
   </p:notesMasterIdLst>
   <p:sldIdLst>
     <p:sldId id="256" r:id="rId2"/>
@@ -16,8 +16,9 @@
     <p:sldId id="261" r:id="rId7"/>
     <p:sldId id="260" r:id="rId8"/>
     <p:sldId id="262" r:id="rId9"/>
-    <p:sldId id="263" r:id="rId10"/>
-    <p:sldId id="265" r:id="rId11"/>
+    <p:sldId id="266" r:id="rId10"/>
+    <p:sldId id="263" r:id="rId11"/>
+    <p:sldId id="265" r:id="rId12"/>
   </p:sldIdLst>
   <p:sldSz cx="12192000" cy="6858000"/>
   <p:notesSz cx="6858000" cy="9144000"/>
@@ -206,7 +207,7 @@
           <a:p>
             <a:fld id="{A58EF676-DA74-5E46-A6CE-5ED3069388CC}" type="datetimeFigureOut">
               <a:rPr lang="en-US" smtClean="0"/>
-              <a:t>5/22/20</a:t>
+              <a:t>4/30/21</a:t>
             </a:fld>
             <a:endParaRPr lang="en-US"/>
           </a:p>
@@ -616,7 +617,7 @@
             </a:r>
             <a:r>
               <a:rPr lang="en-US" baseline="0" dirty="0" smtClean="0"/>
-              <a:t> it!” that seemingly every astronomer says about writing code </a:t>
+              <a:t> it!” that seemingly every astronomer says about writing code. Give them the example that in the entire ~76,000 line code base of VICE, the 1-dimensional linear interpolation function is written *once*. </a:t>
             </a:r>
             <a:endParaRPr lang="en-US" dirty="0"/>
           </a:p>
@@ -704,11 +705,11 @@
           <a:p>
             <a:r>
               <a:rPr lang="en-US" dirty="0" smtClean="0"/>
-              <a:t>This applies</a:t>
+              <a:t>This is a rule of thumb, and can</a:t>
             </a:r>
             <a:r>
               <a:rPr lang="en-US" baseline="0" dirty="0" smtClean="0"/>
-              <a:t> much more to people releasing code publicly </a:t>
+              <a:t> be broken if the phrase can be re-stated without an if, and, or but. For example “fitting a line” and “determining the slope and intercept” are really the same thing and ideally wouldn’t be separated even though the second version has an “and.” </a:t>
             </a:r>
             <a:endParaRPr lang="en-US" dirty="0"/>
           </a:p>
@@ -731,7 +732,7 @@
           <a:p>
             <a:fld id="{4FBF28C1-3B45-464E-B5E4-80D7800AB463}" type="slidenum">
               <a:rPr lang="en-US" smtClean="0"/>
-              <a:t>6</a:t>
+              <a:t>4</a:t>
             </a:fld>
             <a:endParaRPr lang="en-US"/>
           </a:p>
@@ -740,7 +741,7 @@
     </p:spTree>
     <p:extLst>
       <p:ext uri="{BB962C8B-B14F-4D97-AF65-F5344CB8AC3E}">
-        <p14:creationId xmlns:p14="http://schemas.microsoft.com/office/powerpoint/2010/main" val="903635624"/>
+        <p14:creationId xmlns:p14="http://schemas.microsoft.com/office/powerpoint/2010/main" val="2140900781"/>
       </p:ext>
     </p:extLst>
   </p:cSld>
@@ -796,25 +797,13 @@
           <a:p>
             <a:r>
               <a:rPr lang="en-US" dirty="0" smtClean="0"/>
-              <a:t>Professional</a:t>
+              <a:t>This applies</a:t>
             </a:r>
             <a:r>
               <a:rPr lang="en-US" baseline="0" dirty="0" smtClean="0"/>
-              <a:t> software engineers don’t start in the text editor/IDE </a:t>
-            </a:r>
-            <a:r>
-              <a:rPr lang="mr-IN" baseline="0" dirty="0" smtClean="0"/>
-              <a:t>–</a:t>
-            </a:r>
-            <a:r>
-              <a:rPr lang="en-US" baseline="0" dirty="0" smtClean="0"/>
-              <a:t> they start with paper or a </a:t>
-            </a:r>
-            <a:r>
-              <a:rPr lang="en-US" baseline="0" smtClean="0"/>
-              <a:t>white board and diagram a solution to a problem, then implement it. </a:t>
-            </a:r>
-            <a:endParaRPr lang="en-US"/>
+              <a:t> much more to people releasing code publicly </a:t>
+            </a:r>
+            <a:endParaRPr lang="en-US" dirty="0"/>
           </a:p>
         </p:txBody>
       </p:sp>
@@ -835,7 +824,7 @@
           <a:p>
             <a:fld id="{4FBF28C1-3B45-464E-B5E4-80D7800AB463}" type="slidenum">
               <a:rPr lang="en-US" smtClean="0"/>
-              <a:t>8</a:t>
+              <a:t>6</a:t>
             </a:fld>
             <a:endParaRPr lang="en-US"/>
           </a:p>
@@ -844,7 +833,7 @@
     </p:spTree>
     <p:extLst>
       <p:ext uri="{BB962C8B-B14F-4D97-AF65-F5344CB8AC3E}">
-        <p14:creationId xmlns:p14="http://schemas.microsoft.com/office/powerpoint/2010/main" val="348344692"/>
+        <p14:creationId xmlns:p14="http://schemas.microsoft.com/office/powerpoint/2010/main" val="903635624"/>
       </p:ext>
     </p:extLst>
   </p:cSld>
@@ -900,6 +889,206 @@
           <a:p>
             <a:r>
               <a:rPr lang="en-US" dirty="0" smtClean="0"/>
+              <a:t>Professional</a:t>
+            </a:r>
+            <a:r>
+              <a:rPr lang="en-US" baseline="0" dirty="0" smtClean="0"/>
+              <a:t> software engineers don’t start in the text editor/IDE </a:t>
+            </a:r>
+            <a:r>
+              <a:rPr lang="mr-IN" baseline="0" dirty="0" smtClean="0"/>
+              <a:t>–</a:t>
+            </a:r>
+            <a:r>
+              <a:rPr lang="en-US" baseline="0" dirty="0" smtClean="0"/>
+              <a:t> they know how they’re going to solve the problem and test their implementation before they even write a single line. </a:t>
+            </a:r>
+            <a:endParaRPr lang="en-US" dirty="0"/>
+          </a:p>
+        </p:txBody>
+      </p:sp>
+      <p:sp>
+        <p:nvSpPr>
+          <p:cNvPr id="4" name="Slide Number Placeholder 3"/>
+          <p:cNvSpPr>
+            <a:spLocks noGrp="1"/>
+          </p:cNvSpPr>
+          <p:nvPr>
+            <p:ph type="sldNum" sz="quarter" idx="10"/>
+          </p:nvPr>
+        </p:nvSpPr>
+        <p:spPr/>
+        <p:txBody>
+          <a:bodyPr/>
+          <a:lstStyle/>
+          <a:p>
+            <a:fld id="{4FBF28C1-3B45-464E-B5E4-80D7800AB463}" type="slidenum">
+              <a:rPr lang="en-US" smtClean="0"/>
+              <a:t>8</a:t>
+            </a:fld>
+            <a:endParaRPr lang="en-US"/>
+          </a:p>
+        </p:txBody>
+      </p:sp>
+    </p:spTree>
+    <p:extLst>
+      <p:ext uri="{BB962C8B-B14F-4D97-AF65-F5344CB8AC3E}">
+        <p14:creationId xmlns:p14="http://schemas.microsoft.com/office/powerpoint/2010/main" val="348344692"/>
+      </p:ext>
+    </p:extLst>
+  </p:cSld>
+  <p:clrMapOvr>
+    <a:masterClrMapping/>
+  </p:clrMapOvr>
+</p:notes>
+</file>
+
+<file path=ppt/notesSlides/notesSlide6.xml><?xml version="1.0" encoding="utf-8"?>
+<p:notes xmlns:a="http://schemas.openxmlformats.org/drawingml/2006/main" xmlns:r="http://schemas.openxmlformats.org/officeDocument/2006/relationships" xmlns:p="http://schemas.openxmlformats.org/presentationml/2006/main">
+  <p:cSld>
+    <p:spTree>
+      <p:nvGrpSpPr>
+        <p:cNvPr id="1" name=""/>
+        <p:cNvGrpSpPr/>
+        <p:nvPr/>
+      </p:nvGrpSpPr>
+      <p:grpSpPr>
+        <a:xfrm>
+          <a:off x="0" y="0"/>
+          <a:ext cx="0" cy="0"/>
+          <a:chOff x="0" y="0"/>
+          <a:chExt cx="0" cy="0"/>
+        </a:xfrm>
+      </p:grpSpPr>
+      <p:sp>
+        <p:nvSpPr>
+          <p:cNvPr id="2" name="Slide Image Placeholder 1"/>
+          <p:cNvSpPr>
+            <a:spLocks noGrp="1" noRot="1" noChangeAspect="1"/>
+          </p:cNvSpPr>
+          <p:nvPr>
+            <p:ph type="sldImg"/>
+          </p:nvPr>
+        </p:nvSpPr>
+        <p:spPr/>
+      </p:sp>
+      <p:sp>
+        <p:nvSpPr>
+          <p:cNvPr id="3" name="Notes Placeholder 2"/>
+          <p:cNvSpPr>
+            <a:spLocks noGrp="1"/>
+          </p:cNvSpPr>
+          <p:nvPr>
+            <p:ph type="body" idx="1"/>
+          </p:nvPr>
+        </p:nvSpPr>
+        <p:spPr/>
+        <p:txBody>
+          <a:bodyPr/>
+          <a:lstStyle/>
+          <a:p>
+            <a:r>
+              <a:rPr lang="en-US" dirty="0" smtClean="0"/>
+              <a:t>Professional</a:t>
+            </a:r>
+            <a:r>
+              <a:rPr lang="en-US" baseline="0" dirty="0" smtClean="0"/>
+              <a:t> software engineers don’t start in the text editor/IDE </a:t>
+            </a:r>
+            <a:r>
+              <a:rPr lang="mr-IN" baseline="0" dirty="0" smtClean="0"/>
+              <a:t>–</a:t>
+            </a:r>
+            <a:r>
+              <a:rPr lang="en-US" baseline="0" dirty="0" smtClean="0"/>
+              <a:t> they start with paper or a white board and diagram a solution to a problem, then</a:t>
+            </a:r>
+            <a:endParaRPr lang="en-US" dirty="0"/>
+          </a:p>
+        </p:txBody>
+      </p:sp>
+      <p:sp>
+        <p:nvSpPr>
+          <p:cNvPr id="4" name="Slide Number Placeholder 3"/>
+          <p:cNvSpPr>
+            <a:spLocks noGrp="1"/>
+          </p:cNvSpPr>
+          <p:nvPr>
+            <p:ph type="sldNum" sz="quarter" idx="10"/>
+          </p:nvPr>
+        </p:nvSpPr>
+        <p:spPr/>
+        <p:txBody>
+          <a:bodyPr/>
+          <a:lstStyle/>
+          <a:p>
+            <a:fld id="{4FBF28C1-3B45-464E-B5E4-80D7800AB463}" type="slidenum">
+              <a:rPr lang="en-US" smtClean="0"/>
+              <a:t>9</a:t>
+            </a:fld>
+            <a:endParaRPr lang="en-US"/>
+          </a:p>
+        </p:txBody>
+      </p:sp>
+    </p:spTree>
+    <p:extLst>
+      <p:ext uri="{BB962C8B-B14F-4D97-AF65-F5344CB8AC3E}">
+        <p14:creationId xmlns:p14="http://schemas.microsoft.com/office/powerpoint/2010/main" val="2118647226"/>
+      </p:ext>
+    </p:extLst>
+  </p:cSld>
+  <p:clrMapOvr>
+    <a:masterClrMapping/>
+  </p:clrMapOvr>
+</p:notes>
+</file>
+
+<file path=ppt/notesSlides/notesSlide7.xml><?xml version="1.0" encoding="utf-8"?>
+<p:notes xmlns:a="http://schemas.openxmlformats.org/drawingml/2006/main" xmlns:r="http://schemas.openxmlformats.org/officeDocument/2006/relationships" xmlns:p="http://schemas.openxmlformats.org/presentationml/2006/main">
+  <p:cSld>
+    <p:spTree>
+      <p:nvGrpSpPr>
+        <p:cNvPr id="1" name=""/>
+        <p:cNvGrpSpPr/>
+        <p:nvPr/>
+      </p:nvGrpSpPr>
+      <p:grpSpPr>
+        <a:xfrm>
+          <a:off x="0" y="0"/>
+          <a:ext cx="0" cy="0"/>
+          <a:chOff x="0" y="0"/>
+          <a:chExt cx="0" cy="0"/>
+        </a:xfrm>
+      </p:grpSpPr>
+      <p:sp>
+        <p:nvSpPr>
+          <p:cNvPr id="2" name="Slide Image Placeholder 1"/>
+          <p:cNvSpPr>
+            <a:spLocks noGrp="1" noRot="1" noChangeAspect="1"/>
+          </p:cNvSpPr>
+          <p:nvPr>
+            <p:ph type="sldImg"/>
+          </p:nvPr>
+        </p:nvSpPr>
+        <p:spPr/>
+      </p:sp>
+      <p:sp>
+        <p:nvSpPr>
+          <p:cNvPr id="3" name="Notes Placeholder 2"/>
+          <p:cNvSpPr>
+            <a:spLocks noGrp="1"/>
+          </p:cNvSpPr>
+          <p:nvPr>
+            <p:ph type="body" idx="1"/>
+          </p:nvPr>
+        </p:nvSpPr>
+        <p:spPr/>
+        <p:txBody>
+          <a:bodyPr/>
+          <a:lstStyle/>
+          <a:p>
+            <a:r>
+              <a:rPr lang="en-US" dirty="0" smtClean="0"/>
               <a:t>If you don’t know about their</a:t>
             </a:r>
             <a:r>
@@ -927,7 +1116,7 @@
           <a:p>
             <a:fld id="{4FBF28C1-3B45-464E-B5E4-80D7800AB463}" type="slidenum">
               <a:rPr lang="en-US" smtClean="0"/>
-              <a:t>9</a:t>
+              <a:t>10</a:t>
             </a:fld>
             <a:endParaRPr lang="en-US"/>
           </a:p>
@@ -1224,7 +1413,7 @@
           <a:p>
             <a:fld id="{51673806-0BCD-1F42-BAA8-2011034B3C6A}" type="datetimeFigureOut">
               <a:rPr lang="en-US" smtClean="0"/>
-              <a:t>5/22/20</a:t>
+              <a:t>4/30/21</a:t>
             </a:fld>
             <a:endParaRPr lang="en-US"/>
           </a:p>
@@ -1638,7 +1827,7 @@
           <a:p>
             <a:fld id="{51673806-0BCD-1F42-BAA8-2011034B3C6A}" type="datetimeFigureOut">
               <a:rPr lang="en-US" smtClean="0"/>
-              <a:t>5/22/20</a:t>
+              <a:t>4/30/21</a:t>
             </a:fld>
             <a:endParaRPr lang="en-US"/>
           </a:p>
@@ -1969,7 +2158,7 @@
           <a:p>
             <a:fld id="{51673806-0BCD-1F42-BAA8-2011034B3C6A}" type="datetimeFigureOut">
               <a:rPr lang="en-US" smtClean="0"/>
-              <a:t>5/22/20</a:t>
+              <a:t>4/30/21</a:t>
             </a:fld>
             <a:endParaRPr lang="en-US"/>
           </a:p>
@@ -2369,7 +2558,7 @@
           <a:p>
             <a:fld id="{51673806-0BCD-1F42-BAA8-2011034B3C6A}" type="datetimeFigureOut">
               <a:rPr lang="en-US" smtClean="0"/>
-              <a:t>5/22/20</a:t>
+              <a:t>4/30/21</a:t>
             </a:fld>
             <a:endParaRPr lang="en-US"/>
           </a:p>
@@ -2932,7 +3121,7 @@
           <a:p>
             <a:fld id="{51673806-0BCD-1F42-BAA8-2011034B3C6A}" type="datetimeFigureOut">
               <a:rPr lang="en-US" smtClean="0"/>
-              <a:t>5/22/20</a:t>
+              <a:t>4/30/21</a:t>
             </a:fld>
             <a:endParaRPr lang="en-US"/>
           </a:p>
@@ -3608,7 +3797,7 @@
           <a:p>
             <a:fld id="{51673806-0BCD-1F42-BAA8-2011034B3C6A}" type="datetimeFigureOut">
               <a:rPr lang="en-US" smtClean="0"/>
-              <a:t>5/22/20</a:t>
+              <a:t>4/30/21</a:t>
             </a:fld>
             <a:endParaRPr lang="en-US"/>
           </a:p>
@@ -4516,7 +4705,7 @@
           <a:p>
             <a:fld id="{51673806-0BCD-1F42-BAA8-2011034B3C6A}" type="datetimeFigureOut">
               <a:rPr lang="en-US" smtClean="0"/>
-              <a:t>5/22/20</a:t>
+              <a:t>4/30/21</a:t>
             </a:fld>
             <a:endParaRPr lang="en-US"/>
           </a:p>
@@ -4824,7 +5013,7 @@
           <a:p>
             <a:fld id="{51673806-0BCD-1F42-BAA8-2011034B3C6A}" type="datetimeFigureOut">
               <a:rPr lang="en-US" smtClean="0"/>
-              <a:t>5/22/20</a:t>
+              <a:t>4/30/21</a:t>
             </a:fld>
             <a:endParaRPr lang="en-US"/>
           </a:p>
@@ -5083,7 +5272,7 @@
           <a:p>
             <a:fld id="{51673806-0BCD-1F42-BAA8-2011034B3C6A}" type="datetimeFigureOut">
               <a:rPr lang="en-US" smtClean="0"/>
-              <a:t>5/22/20</a:t>
+              <a:t>4/30/21</a:t>
             </a:fld>
             <a:endParaRPr lang="en-US"/>
           </a:p>
@@ -5406,7 +5595,7 @@
           <a:p>
             <a:fld id="{51673806-0BCD-1F42-BAA8-2011034B3C6A}" type="datetimeFigureOut">
               <a:rPr lang="en-US" smtClean="0"/>
-              <a:t>5/22/20</a:t>
+              <a:t>4/30/21</a:t>
             </a:fld>
             <a:endParaRPr lang="en-US"/>
           </a:p>
@@ -5790,7 +5979,7 @@
           <a:p>
             <a:fld id="{51673806-0BCD-1F42-BAA8-2011034B3C6A}" type="datetimeFigureOut">
               <a:rPr lang="en-US" smtClean="0"/>
-              <a:t>5/22/20</a:t>
+              <a:t>4/30/21</a:t>
             </a:fld>
             <a:endParaRPr lang="en-US"/>
           </a:p>
@@ -6166,7 +6355,7 @@
           <a:p>
             <a:fld id="{51673806-0BCD-1F42-BAA8-2011034B3C6A}" type="datetimeFigureOut">
               <a:rPr lang="en-US" smtClean="0"/>
-              <a:t>5/22/20</a:t>
+              <a:t>4/30/21</a:t>
             </a:fld>
             <a:endParaRPr lang="en-US"/>
           </a:p>
@@ -6672,7 +6861,7 @@
           <a:p>
             <a:fld id="{51673806-0BCD-1F42-BAA8-2011034B3C6A}" type="datetimeFigureOut">
               <a:rPr lang="en-US" smtClean="0"/>
-              <a:t>5/22/20</a:t>
+              <a:t>4/30/21</a:t>
             </a:fld>
             <a:endParaRPr lang="en-US"/>
           </a:p>
@@ -6929,7 +7118,7 @@
           <a:p>
             <a:fld id="{51673806-0BCD-1F42-BAA8-2011034B3C6A}" type="datetimeFigureOut">
               <a:rPr lang="en-US" smtClean="0"/>
-              <a:t>5/22/20</a:t>
+              <a:t>4/30/21</a:t>
             </a:fld>
             <a:endParaRPr lang="en-US"/>
           </a:p>
@@ -7087,7 +7276,7 @@
           <a:p>
             <a:fld id="{51673806-0BCD-1F42-BAA8-2011034B3C6A}" type="datetimeFigureOut">
               <a:rPr lang="en-US" smtClean="0"/>
-              <a:t>5/22/20</a:t>
+              <a:t>4/30/21</a:t>
             </a:fld>
             <a:endParaRPr lang="en-US"/>
           </a:p>
@@ -7477,7 +7666,7 @@
           <a:p>
             <a:fld id="{51673806-0BCD-1F42-BAA8-2011034B3C6A}" type="datetimeFigureOut">
               <a:rPr lang="en-US" smtClean="0"/>
-              <a:t>5/22/20</a:t>
+              <a:t>4/30/21</a:t>
             </a:fld>
             <a:endParaRPr lang="en-US"/>
           </a:p>
@@ -7886,7 +8075,7 @@
           <a:p>
             <a:fld id="{51673806-0BCD-1F42-BAA8-2011034B3C6A}" type="datetimeFigureOut">
               <a:rPr lang="en-US" smtClean="0"/>
-              <a:t>5/22/20</a:t>
+              <a:t>4/30/21</a:t>
             </a:fld>
             <a:endParaRPr lang="en-US"/>
           </a:p>
@@ -8134,7 +8323,7 @@
             <a:fld id="{51673806-0BCD-1F42-BAA8-2011034B3C6A}" type="datetimeFigureOut">
               <a:rPr lang="en-US" smtClean="0"/>
               <a:pPr/>
-              <a:t>5/22/20</a:t>
+              <a:t>4/30/21</a:t>
             </a:fld>
             <a:endParaRPr lang="en-US" dirty="0"/>
           </a:p>
@@ -8598,8 +8787,16 @@
           <a:lstStyle/>
           <a:p>
             <a:r>
+              <a:rPr lang="en-US"/>
+              <a:t>SURP </a:t>
+            </a:r>
+            <a:r>
+              <a:rPr lang="en-US" smtClean="0"/>
+              <a:t>2021 </a:t>
+            </a:r>
+            <a:r>
               <a:rPr lang="en-US" dirty="0"/>
-              <a:t>SURP 2020 Python Bootcamp</a:t>
+              <a:t>Python Bootcamp</a:t>
             </a:r>
           </a:p>
           <a:p>
@@ -8673,6 +8870,240 @@
           <a:bodyPr/>
           <a:lstStyle/>
           <a:p>
+            <a:r>
+              <a:rPr lang="en-US" dirty="0" smtClean="0"/>
+              <a:t>Rule Number One</a:t>
+            </a:r>
+            <a:endParaRPr lang="en-US" dirty="0"/>
+          </a:p>
+        </p:txBody>
+      </p:sp>
+      <p:sp>
+        <p:nvSpPr>
+          <p:cNvPr id="3" name="Content Placeholder 2"/>
+          <p:cNvSpPr>
+            <a:spLocks noGrp="1"/>
+          </p:cNvSpPr>
+          <p:nvPr>
+            <p:ph idx="1"/>
+          </p:nvPr>
+        </p:nvSpPr>
+        <p:spPr>
+          <a:xfrm>
+            <a:off x="680321" y="2336872"/>
+            <a:ext cx="9814807" cy="4077575"/>
+          </a:xfrm>
+        </p:spPr>
+        <p:txBody>
+          <a:bodyPr>
+            <a:normAutofit/>
+          </a:bodyPr>
+          <a:lstStyle/>
+          <a:p>
+            <a:pPr marL="0" marR="0" lvl="0" indent="0" defTabSz="914400" eaLnBrk="1" fontAlgn="auto" latinLnBrk="0" hangingPunct="1">
+              <a:lnSpc>
+                <a:spcPct val="100000"/>
+              </a:lnSpc>
+              <a:spcBef>
+                <a:spcPts val="0"/>
+              </a:spcBef>
+              <a:spcAft>
+                <a:spcPts val="0"/>
+              </a:spcAft>
+              <a:buClrTx/>
+              <a:buSzTx/>
+              <a:buFontTx/>
+              <a:buNone/>
+              <a:tabLst/>
+              <a:defRPr/>
+            </a:pPr>
+            <a:r>
+              <a:rPr lang="en-US" i="1" dirty="0" smtClean="0"/>
+              <a:t>Code is read much more often than it is written. </a:t>
+            </a:r>
+            <a:endParaRPr lang="en-US" dirty="0" smtClean="0"/>
+          </a:p>
+          <a:p>
+            <a:pPr lvl="1">
+              <a:lnSpc>
+                <a:spcPct val="100000"/>
+              </a:lnSpc>
+              <a:spcBef>
+                <a:spcPts val="0"/>
+              </a:spcBef>
+            </a:pPr>
+            <a:r>
+              <a:rPr lang="en-US" dirty="0" smtClean="0"/>
+              <a:t>Advice: Assume this applies to all of the code you will ever write </a:t>
+            </a:r>
+            <a:endParaRPr lang="en-US" dirty="0"/>
+          </a:p>
+          <a:p>
+            <a:pPr marL="0" marR="0" lvl="0" indent="0" defTabSz="914400" eaLnBrk="1" fontAlgn="auto" latinLnBrk="0" hangingPunct="1">
+              <a:lnSpc>
+                <a:spcPct val="100000"/>
+              </a:lnSpc>
+              <a:spcBef>
+                <a:spcPts val="0"/>
+              </a:spcBef>
+              <a:spcAft>
+                <a:spcPts val="0"/>
+              </a:spcAft>
+              <a:buClrTx/>
+              <a:buSzTx/>
+              <a:buFontTx/>
+              <a:buNone/>
+              <a:tabLst/>
+              <a:defRPr/>
+            </a:pPr>
+            <a:endParaRPr lang="en-US" dirty="0"/>
+          </a:p>
+          <a:p>
+            <a:pPr marL="0" marR="0" lvl="0" indent="0" defTabSz="914400" eaLnBrk="1" fontAlgn="auto" latinLnBrk="0" hangingPunct="1">
+              <a:lnSpc>
+                <a:spcPct val="100000"/>
+              </a:lnSpc>
+              <a:spcBef>
+                <a:spcPts val="0"/>
+              </a:spcBef>
+              <a:spcAft>
+                <a:spcPts val="0"/>
+              </a:spcAft>
+              <a:buClrTx/>
+              <a:buSzTx/>
+              <a:buFontTx/>
+              <a:buNone/>
+              <a:tabLst/>
+              <a:defRPr/>
+            </a:pPr>
+            <a:r>
+              <a:rPr lang="en-US" dirty="0" smtClean="0"/>
+              <a:t>Emphasize </a:t>
+            </a:r>
+            <a:r>
+              <a:rPr lang="en-US" i="1" dirty="0" smtClean="0"/>
+              <a:t>readability</a:t>
+            </a:r>
+            <a:r>
+              <a:rPr lang="en-US" dirty="0" smtClean="0"/>
+              <a:t> above all else. It’s okay to break any of these rules if the result is a much more readable solution. </a:t>
+            </a:r>
+          </a:p>
+          <a:p>
+            <a:pPr marL="0" marR="0" lvl="0" indent="0" defTabSz="914400" eaLnBrk="1" fontAlgn="auto" latinLnBrk="0" hangingPunct="1">
+              <a:lnSpc>
+                <a:spcPct val="100000"/>
+              </a:lnSpc>
+              <a:spcBef>
+                <a:spcPts val="0"/>
+              </a:spcBef>
+              <a:spcAft>
+                <a:spcPts val="0"/>
+              </a:spcAft>
+              <a:buClrTx/>
+              <a:buSzTx/>
+              <a:buFontTx/>
+              <a:buNone/>
+              <a:tabLst/>
+              <a:defRPr/>
+            </a:pPr>
+            <a:endParaRPr lang="en-US" dirty="0" smtClean="0"/>
+          </a:p>
+          <a:p>
+            <a:pPr marL="0" marR="0" lvl="0" indent="0" defTabSz="914400" eaLnBrk="1" fontAlgn="auto" latinLnBrk="0" hangingPunct="1">
+              <a:lnSpc>
+                <a:spcPct val="100000"/>
+              </a:lnSpc>
+              <a:spcBef>
+                <a:spcPts val="0"/>
+              </a:spcBef>
+              <a:spcAft>
+                <a:spcPts val="0"/>
+              </a:spcAft>
+              <a:buClrTx/>
+              <a:buSzTx/>
+              <a:buFontTx/>
+              <a:buNone/>
+              <a:tabLst/>
+              <a:defRPr/>
+            </a:pPr>
+            <a:r>
+              <a:rPr lang="en-US" dirty="0" smtClean="0"/>
+              <a:t>Bottom line: </a:t>
+            </a:r>
+            <a:r>
+              <a:rPr lang="en-US" i="1" dirty="0" smtClean="0"/>
+              <a:t>Well-written software is clear and does not cut corners. </a:t>
+            </a:r>
+          </a:p>
+          <a:p>
+            <a:pPr lvl="1">
+              <a:lnSpc>
+                <a:spcPct val="100000"/>
+              </a:lnSpc>
+              <a:spcBef>
+                <a:spcPts val="0"/>
+              </a:spcBef>
+            </a:pPr>
+            <a:r>
+              <a:rPr lang="en-US" dirty="0" smtClean="0"/>
+              <a:t>The view commonly held by research scientists that code is simply a means to an end can only cause problems if you decide to build anything of substantial size; this line is usually crossed long before a public software release. The solution to this is knowing how to engineer your code. </a:t>
+            </a:r>
+          </a:p>
+        </p:txBody>
+      </p:sp>
+    </p:spTree>
+    <p:extLst>
+      <p:ext uri="{BB962C8B-B14F-4D97-AF65-F5344CB8AC3E}">
+        <p14:creationId xmlns:p14="http://schemas.microsoft.com/office/powerpoint/2010/main" val="2027507245"/>
+      </p:ext>
+    </p:extLst>
+  </p:cSld>
+  <p:clrMapOvr>
+    <a:masterClrMapping/>
+  </p:clrMapOvr>
+  <p:timing>
+    <p:tnLst>
+      <p:par>
+        <p:cTn id="1" dur="indefinite" restart="never" nodeType="tmRoot"/>
+      </p:par>
+    </p:tnLst>
+  </p:timing>
+</p:sld>
+</file>
+
+<file path=ppt/slides/slide11.xml><?xml version="1.0" encoding="utf-8"?>
+<p:sld xmlns:a="http://schemas.openxmlformats.org/drawingml/2006/main" xmlns:r="http://schemas.openxmlformats.org/officeDocument/2006/relationships" xmlns:p="http://schemas.openxmlformats.org/presentationml/2006/main">
+  <p:cSld>
+    <p:spTree>
+      <p:nvGrpSpPr>
+        <p:cNvPr id="1" name=""/>
+        <p:cNvGrpSpPr/>
+        <p:nvPr/>
+      </p:nvGrpSpPr>
+      <p:grpSpPr>
+        <a:xfrm>
+          <a:off x="0" y="0"/>
+          <a:ext cx="0" cy="0"/>
+          <a:chOff x="0" y="0"/>
+          <a:chExt cx="0" cy="0"/>
+        </a:xfrm>
+      </p:grpSpPr>
+      <p:sp>
+        <p:nvSpPr>
+          <p:cNvPr id="2" name="Title 1"/>
+          <p:cNvSpPr>
+            <a:spLocks noGrp="1"/>
+          </p:cNvSpPr>
+          <p:nvPr>
+            <p:ph type="title"/>
+          </p:nvPr>
+        </p:nvSpPr>
+        <p:spPr/>
+        <p:txBody>
+          <a:bodyPr/>
+          <a:lstStyle/>
+          <a:p>
             <a:endParaRPr lang="en-US"/>
           </a:p>
         </p:txBody>
@@ -9254,7 +9685,30 @@
             </a:r>
             <a:r>
               <a:rPr lang="en-US" dirty="0" smtClean="0"/>
-              <a:t> that is, if each component of your software is implemented independently of the other components. </a:t>
+              <a:t> that is, if each component of your software is implemented independently of the other components. In this case DRY applies within the </a:t>
+            </a:r>
+          </a:p>
+          <a:p>
+            <a:pPr marL="0" indent="0">
+              <a:lnSpc>
+                <a:spcPct val="100000"/>
+              </a:lnSpc>
+              <a:spcBef>
+                <a:spcPts val="0"/>
+              </a:spcBef>
+              <a:buNone/>
+            </a:pPr>
+            <a:r>
+              <a:rPr lang="en-US" dirty="0" smtClean="0"/>
+              <a:t>Individual </a:t>
+            </a:r>
+            <a:r>
+              <a:rPr lang="en-US" i="1" dirty="0" smtClean="0"/>
+              <a:t>modules</a:t>
+            </a:r>
+            <a:r>
+              <a:rPr lang="en-US" dirty="0" smtClean="0"/>
+              <a:t>. </a:t>
             </a:r>
             <a:endParaRPr lang="en-US" dirty="0"/>
           </a:p>
@@ -9634,11 +10088,7 @@
             </a:pPr>
             <a:r>
               <a:rPr lang="en-US" dirty="0" smtClean="0"/>
-              <a:t>You don’t need to use </a:t>
-            </a:r>
-            <a:r>
-              <a:rPr lang="en-US" dirty="0" smtClean="0"/>
-              <a:t>GitHub/</a:t>
+              <a:t>You don’t need to use GitHub/</a:t>
             </a:r>
             <a:r>
               <a:rPr lang="en-US" dirty="0" err="1" smtClean="0"/>
@@ -9646,11 +10096,7 @@
             </a:r>
             <a:r>
               <a:rPr lang="en-US" dirty="0" smtClean="0"/>
-              <a:t> </a:t>
-            </a:r>
-            <a:r>
-              <a:rPr lang="en-US" dirty="0" smtClean="0"/>
-              <a:t>for version control </a:t>
+              <a:t> for version control </a:t>
             </a:r>
             <a:r>
               <a:rPr lang="mr-IN" dirty="0" smtClean="0"/>
@@ -9659,6 +10105,21 @@
             <a:r>
               <a:rPr lang="en-US" dirty="0" smtClean="0"/>
               <a:t> you can also store your code, plots, etc. there to manage copies between multiple systems. </a:t>
+            </a:r>
+          </a:p>
+          <a:p>
+            <a:pPr marL="0" indent="0">
+              <a:lnSpc>
+                <a:spcPct val="100000"/>
+              </a:lnSpc>
+              <a:spcBef>
+                <a:spcPts val="0"/>
+              </a:spcBef>
+              <a:buNone/>
+            </a:pPr>
+            <a:r>
+              <a:rPr lang="en-US" dirty="0" smtClean="0"/>
+              <a:t>I also use it to share my research notes and plots with collaborators. </a:t>
             </a:r>
           </a:p>
         </p:txBody>
@@ -9835,7 +10296,7 @@
             </a:pPr>
             <a:r>
               <a:rPr lang="en-US" dirty="0" smtClean="0"/>
-              <a:t>It’s quite common to have ~few dependencies, but too many is </a:t>
+              <a:t>It’s quite common to have a ~few dependencies, but too many is </a:t>
             </a:r>
             <a:r>
               <a:rPr lang="en-US" i="1" dirty="0" smtClean="0"/>
@@ -9886,15 +10347,7 @@
             </a:pPr>
             <a:r>
               <a:rPr lang="en-US" dirty="0" smtClean="0"/>
-              <a:t>As of now my own python </a:t>
-            </a:r>
-            <a:r>
-              <a:rPr lang="en-US" dirty="0" smtClean="0"/>
-              <a:t>package </a:t>
-            </a:r>
-            <a:r>
-              <a:rPr lang="en-US" dirty="0" smtClean="0"/>
-              <a:t>is ~60k lines of code. If one of its dependencies releases a new version with changes that affect my code, I have to go look at every file to ensure this doesn’t break anything. </a:t>
+              <a:t>As of now my own python package (VICE) is ~76k lines of code. If one of its dependencies releases a new version with changes that affect my code, I have to go look at every file to ensure this doesn’t break anything. </a:t>
             </a:r>
           </a:p>
           <a:p>
@@ -10229,7 +10682,9 @@
           </a:xfrm>
         </p:spPr>
         <p:txBody>
-          <a:bodyPr/>
+          <a:bodyPr>
+            <a:normAutofit/>
+          </a:bodyPr>
           <a:lstStyle/>
           <a:p>
             <a:pPr marL="0" marR="0" lvl="0" indent="0" defTabSz="914400" eaLnBrk="1" fontAlgn="auto" latinLnBrk="0" hangingPunct="1">
@@ -10267,17 +10722,21 @@
               <a:rPr lang="en-US" dirty="0" smtClean="0"/>
               <a:t>This has its place and its usefulness within research </a:t>
             </a:r>
-          </a:p>
-          <a:p>
-            <a:pPr marL="0" indent="0">
+            <a:endParaRPr lang="en-US" dirty="0"/>
+          </a:p>
+          <a:p>
+            <a:pPr lvl="1">
               <a:lnSpc>
                 <a:spcPct val="100000"/>
               </a:lnSpc>
               <a:spcBef>
                 <a:spcPts val="0"/>
               </a:spcBef>
-              <a:buNone/>
             </a:pPr>
+            <a:r>
+              <a:rPr lang="en-US" dirty="0" smtClean="0"/>
+              <a:t>If you’re going to use some function &gt;few times, I advise more thought </a:t>
+            </a:r>
             <a:endParaRPr lang="en-US" dirty="0"/>
           </a:p>
           <a:p>
@@ -10407,10 +10866,22 @@
           <a:lstStyle/>
           <a:p>
             <a:r>
+              <a:rPr lang="en-US" i="1" dirty="0" smtClean="0"/>
+              <a:t>Think</a:t>
+            </a:r>
+            <a:r>
               <a:rPr lang="en-US" dirty="0" smtClean="0"/>
-              <a:t>Rule Number One</a:t>
-            </a:r>
-            <a:endParaRPr lang="en-US" dirty="0"/>
+              <a:t> Before You </a:t>
+            </a:r>
+            <a:r>
+              <a:rPr lang="en-US" i="1" dirty="0" smtClean="0"/>
+              <a:t>Write</a:t>
+            </a:r>
+            <a:r>
+              <a:rPr lang="en-US" dirty="0" smtClean="0"/>
+              <a:t> </a:t>
+            </a:r>
+            <a:endParaRPr lang="en-US" i="1" dirty="0"/>
           </a:p>
         </p:txBody>
       </p:sp>
@@ -10426,14 +10897,12 @@
         </p:nvSpPr>
         <p:spPr>
           <a:xfrm>
-            <a:off x="680321" y="2336872"/>
-            <a:ext cx="9814807" cy="4077575"/>
-          </a:xfrm>
-        </p:spPr>
-        <p:txBody>
-          <a:bodyPr>
-            <a:normAutofit/>
-          </a:bodyPr>
+            <a:off x="680321" y="2336873"/>
+            <a:ext cx="6116264" cy="4104870"/>
+          </a:xfrm>
+        </p:spPr>
+        <p:txBody>
+          <a:bodyPr/>
           <a:lstStyle/>
           <a:p>
             <a:pPr marL="0" marR="0" lvl="0" indent="0" defTabSz="914400" eaLnBrk="1" fontAlgn="auto" latinLnBrk="0" hangingPunct="1">
@@ -10453,26 +10922,7 @@
               <a:tabLst/>
               <a:defRPr/>
             </a:pPr>
-            <a:r>
-              <a:rPr lang="en-US" i="1" dirty="0" smtClean="0"/>
-              <a:t>Code is read much more often than it is written. </a:t>
-            </a:r>
             <a:endParaRPr lang="en-US" dirty="0" smtClean="0"/>
-          </a:p>
-          <a:p>
-            <a:pPr lvl="1">
-              <a:lnSpc>
-                <a:spcPct val="100000"/>
-              </a:lnSpc>
-              <a:spcBef>
-                <a:spcPts val="0"/>
-              </a:spcBef>
-            </a:pPr>
-            <a:r>
-              <a:rPr lang="en-US" dirty="0" smtClean="0"/>
-              <a:t>Advice: Assume this applies to all of the code you will ever write </a:t>
-            </a:r>
-            <a:endParaRPr lang="en-US" dirty="0"/>
           </a:p>
           <a:p>
             <a:pPr marL="0" marR="0" lvl="0" indent="0" defTabSz="914400" eaLnBrk="1" fontAlgn="auto" latinLnBrk="0" hangingPunct="1">
@@ -10512,18 +10962,7 @@
               <a:tabLst/>
               <a:defRPr/>
             </a:pPr>
-            <a:r>
-              <a:rPr lang="en-US" dirty="0" smtClean="0"/>
-              <a:t>Emphasize </a:t>
-            </a:r>
-            <a:r>
-              <a:rPr lang="en-US" i="1" dirty="0" smtClean="0"/>
-              <a:t>readability</a:t>
-            </a:r>
-            <a:r>
-              <a:rPr lang="en-US" dirty="0" smtClean="0"/>
-              <a:t> above all else. </a:t>
-            </a:r>
+            <a:endParaRPr lang="en-US" dirty="0" smtClean="0"/>
           </a:p>
           <a:p>
             <a:pPr marL="0" marR="0" lvl="0" indent="0" defTabSz="914400" eaLnBrk="1" fontAlgn="auto" latinLnBrk="0" hangingPunct="1">
@@ -10563,55 +11002,47 @@
               <a:tabLst/>
               <a:defRPr/>
             </a:pPr>
-            <a:endParaRPr lang="en-US" dirty="0" smtClean="0"/>
-          </a:p>
-          <a:p>
-            <a:pPr marL="0" marR="0" lvl="0" indent="0" defTabSz="914400" eaLnBrk="1" fontAlgn="auto" latinLnBrk="0" hangingPunct="1">
-              <a:lnSpc>
-                <a:spcPct val="100000"/>
-              </a:lnSpc>
-              <a:spcBef>
-                <a:spcPts val="0"/>
-              </a:spcBef>
-              <a:spcAft>
-                <a:spcPts val="0"/>
-              </a:spcAft>
-              <a:buClrTx/>
-              <a:buSzTx/>
-              <a:buFontTx/>
-              <a:buNone/>
-              <a:tabLst/>
-              <a:defRPr/>
-            </a:pPr>
             <a:r>
               <a:rPr lang="en-US" dirty="0" smtClean="0"/>
-              <a:t>Bottom line: </a:t>
-            </a:r>
-            <a:r>
-              <a:rPr lang="en-US" i="1" dirty="0" smtClean="0"/>
-              <a:t>Well-written software is clear and does not cut corners. </a:t>
-            </a:r>
-          </a:p>
-          <a:p>
-            <a:pPr lvl="1">
-              <a:lnSpc>
-                <a:spcPct val="100000"/>
-              </a:lnSpc>
-              <a:spcBef>
-                <a:spcPts val="0"/>
-              </a:spcBef>
-            </a:pPr>
-            <a:r>
-              <a:rPr lang="en-US" dirty="0" smtClean="0"/>
-              <a:t>The view commonly held by research scientists that code is simply a means to an end can only cause problems if you decide to build anything of substantial size; this line is usually crossed long before a public software release. The solution to this is knowing how to engineer your code. </a:t>
-            </a:r>
-          </a:p>
-        </p:txBody>
-      </p:sp>
+              <a:t>This is truly how professional developers and software engineers view scientist-written code </a:t>
+            </a:r>
+          </a:p>
+        </p:txBody>
+      </p:sp>
+      <p:pic>
+        <p:nvPicPr>
+          <p:cNvPr id="4" name="Picture 3"/>
+          <p:cNvPicPr>
+            <a:picLocks noChangeAspect="1"/>
+          </p:cNvPicPr>
+          <p:nvPr/>
+        </p:nvPicPr>
+        <p:blipFill>
+          <a:blip r:embed="rId3">
+            <a:extLst>
+              <a:ext uri="{28A0092B-C50C-407E-A947-70E740481C1C}">
+                <a14:useLocalDpi xmlns:a14="http://schemas.microsoft.com/office/drawing/2010/main" val="0"/>
+              </a:ext>
+            </a:extLst>
+          </a:blip>
+          <a:stretch>
+            <a:fillRect/>
+          </a:stretch>
+        </p:blipFill>
+        <p:spPr>
+          <a:xfrm>
+            <a:off x="7011349" y="2040359"/>
+            <a:ext cx="3770384" cy="4697898"/>
+          </a:xfrm>
+          <a:prstGeom prst="rect">
+            <a:avLst/>
+          </a:prstGeom>
+        </p:spPr>
+      </p:pic>
     </p:spTree>
     <p:extLst>
       <p:ext uri="{BB962C8B-B14F-4D97-AF65-F5344CB8AC3E}">
-        <p14:creationId xmlns:p14="http://schemas.microsoft.com/office/powerpoint/2010/main" val="2027507245"/>
+        <p14:creationId xmlns:p14="http://schemas.microsoft.com/office/powerpoint/2010/main" val="651769218"/>
       </p:ext>
     </p:extLst>
   </p:cSld>

</xml_diff>

<commit_message>
readme, schedule, and tools edits ; slides: basicSE slides minor revisions
</commit_message>
<xml_diff>
--- a/slides/basicSE.pptx
+++ b/slides/basicSE.pptx
@@ -207,7 +207,7 @@
           <a:p>
             <a:fld id="{A58EF676-DA74-5E46-A6CE-5ED3069388CC}" type="datetimeFigureOut">
               <a:rPr lang="en-US" smtClean="0"/>
-              <a:t>4/30/21</a:t>
+              <a:t>5/7/21</a:t>
             </a:fld>
             <a:endParaRPr lang="en-US"/>
           </a:p>
@@ -1001,7 +1001,11 @@
             </a:r>
             <a:r>
               <a:rPr lang="en-US" baseline="0" dirty="0" smtClean="0"/>
-              <a:t> they start with paper or a white board and diagram a solution to a problem, then</a:t>
+              <a:t> </a:t>
+            </a:r>
+            <a:r>
+              <a:rPr lang="en-US" baseline="0" dirty="0" smtClean="0"/>
+              <a:t>they know how they’re going to solve the problem and test their implementation before they even write a single line. </a:t>
             </a:r>
             <a:endParaRPr lang="en-US" dirty="0"/>
           </a:p>
@@ -1413,7 +1417,7 @@
           <a:p>
             <a:fld id="{51673806-0BCD-1F42-BAA8-2011034B3C6A}" type="datetimeFigureOut">
               <a:rPr lang="en-US" smtClean="0"/>
-              <a:t>4/30/21</a:t>
+              <a:t>5/7/21</a:t>
             </a:fld>
             <a:endParaRPr lang="en-US"/>
           </a:p>
@@ -1827,7 +1831,7 @@
           <a:p>
             <a:fld id="{51673806-0BCD-1F42-BAA8-2011034B3C6A}" type="datetimeFigureOut">
               <a:rPr lang="en-US" smtClean="0"/>
-              <a:t>4/30/21</a:t>
+              <a:t>5/7/21</a:t>
             </a:fld>
             <a:endParaRPr lang="en-US"/>
           </a:p>
@@ -2158,7 +2162,7 @@
           <a:p>
             <a:fld id="{51673806-0BCD-1F42-BAA8-2011034B3C6A}" type="datetimeFigureOut">
               <a:rPr lang="en-US" smtClean="0"/>
-              <a:t>4/30/21</a:t>
+              <a:t>5/7/21</a:t>
             </a:fld>
             <a:endParaRPr lang="en-US"/>
           </a:p>
@@ -2558,7 +2562,7 @@
           <a:p>
             <a:fld id="{51673806-0BCD-1F42-BAA8-2011034B3C6A}" type="datetimeFigureOut">
               <a:rPr lang="en-US" smtClean="0"/>
-              <a:t>4/30/21</a:t>
+              <a:t>5/7/21</a:t>
             </a:fld>
             <a:endParaRPr lang="en-US"/>
           </a:p>
@@ -3121,7 +3125,7 @@
           <a:p>
             <a:fld id="{51673806-0BCD-1F42-BAA8-2011034B3C6A}" type="datetimeFigureOut">
               <a:rPr lang="en-US" smtClean="0"/>
-              <a:t>4/30/21</a:t>
+              <a:t>5/7/21</a:t>
             </a:fld>
             <a:endParaRPr lang="en-US"/>
           </a:p>
@@ -3797,7 +3801,7 @@
           <a:p>
             <a:fld id="{51673806-0BCD-1F42-BAA8-2011034B3C6A}" type="datetimeFigureOut">
               <a:rPr lang="en-US" smtClean="0"/>
-              <a:t>4/30/21</a:t>
+              <a:t>5/7/21</a:t>
             </a:fld>
             <a:endParaRPr lang="en-US"/>
           </a:p>
@@ -4705,7 +4709,7 @@
           <a:p>
             <a:fld id="{51673806-0BCD-1F42-BAA8-2011034B3C6A}" type="datetimeFigureOut">
               <a:rPr lang="en-US" smtClean="0"/>
-              <a:t>4/30/21</a:t>
+              <a:t>5/7/21</a:t>
             </a:fld>
             <a:endParaRPr lang="en-US"/>
           </a:p>
@@ -5013,7 +5017,7 @@
           <a:p>
             <a:fld id="{51673806-0BCD-1F42-BAA8-2011034B3C6A}" type="datetimeFigureOut">
               <a:rPr lang="en-US" smtClean="0"/>
-              <a:t>4/30/21</a:t>
+              <a:t>5/7/21</a:t>
             </a:fld>
             <a:endParaRPr lang="en-US"/>
           </a:p>
@@ -5272,7 +5276,7 @@
           <a:p>
             <a:fld id="{51673806-0BCD-1F42-BAA8-2011034B3C6A}" type="datetimeFigureOut">
               <a:rPr lang="en-US" smtClean="0"/>
-              <a:t>4/30/21</a:t>
+              <a:t>5/7/21</a:t>
             </a:fld>
             <a:endParaRPr lang="en-US"/>
           </a:p>
@@ -5595,7 +5599,7 @@
           <a:p>
             <a:fld id="{51673806-0BCD-1F42-BAA8-2011034B3C6A}" type="datetimeFigureOut">
               <a:rPr lang="en-US" smtClean="0"/>
-              <a:t>4/30/21</a:t>
+              <a:t>5/7/21</a:t>
             </a:fld>
             <a:endParaRPr lang="en-US"/>
           </a:p>
@@ -5979,7 +5983,7 @@
           <a:p>
             <a:fld id="{51673806-0BCD-1F42-BAA8-2011034B3C6A}" type="datetimeFigureOut">
               <a:rPr lang="en-US" smtClean="0"/>
-              <a:t>4/30/21</a:t>
+              <a:t>5/7/21</a:t>
             </a:fld>
             <a:endParaRPr lang="en-US"/>
           </a:p>
@@ -6355,7 +6359,7 @@
           <a:p>
             <a:fld id="{51673806-0BCD-1F42-BAA8-2011034B3C6A}" type="datetimeFigureOut">
               <a:rPr lang="en-US" smtClean="0"/>
-              <a:t>4/30/21</a:t>
+              <a:t>5/7/21</a:t>
             </a:fld>
             <a:endParaRPr lang="en-US"/>
           </a:p>
@@ -6861,7 +6865,7 @@
           <a:p>
             <a:fld id="{51673806-0BCD-1F42-BAA8-2011034B3C6A}" type="datetimeFigureOut">
               <a:rPr lang="en-US" smtClean="0"/>
-              <a:t>4/30/21</a:t>
+              <a:t>5/7/21</a:t>
             </a:fld>
             <a:endParaRPr lang="en-US"/>
           </a:p>
@@ -7118,7 +7122,7 @@
           <a:p>
             <a:fld id="{51673806-0BCD-1F42-BAA8-2011034B3C6A}" type="datetimeFigureOut">
               <a:rPr lang="en-US" smtClean="0"/>
-              <a:t>4/30/21</a:t>
+              <a:t>5/7/21</a:t>
             </a:fld>
             <a:endParaRPr lang="en-US"/>
           </a:p>
@@ -7276,7 +7280,7 @@
           <a:p>
             <a:fld id="{51673806-0BCD-1F42-BAA8-2011034B3C6A}" type="datetimeFigureOut">
               <a:rPr lang="en-US" smtClean="0"/>
-              <a:t>4/30/21</a:t>
+              <a:t>5/7/21</a:t>
             </a:fld>
             <a:endParaRPr lang="en-US"/>
           </a:p>
@@ -7666,7 +7670,7 @@
           <a:p>
             <a:fld id="{51673806-0BCD-1F42-BAA8-2011034B3C6A}" type="datetimeFigureOut">
               <a:rPr lang="en-US" smtClean="0"/>
-              <a:t>4/30/21</a:t>
+              <a:t>5/7/21</a:t>
             </a:fld>
             <a:endParaRPr lang="en-US"/>
           </a:p>
@@ -8075,7 +8079,7 @@
           <a:p>
             <a:fld id="{51673806-0BCD-1F42-BAA8-2011034B3C6A}" type="datetimeFigureOut">
               <a:rPr lang="en-US" smtClean="0"/>
-              <a:t>4/30/21</a:t>
+              <a:t>5/7/21</a:t>
             </a:fld>
             <a:endParaRPr lang="en-US"/>
           </a:p>
@@ -8323,7 +8327,7 @@
             <a:fld id="{51673806-0BCD-1F42-BAA8-2011034B3C6A}" type="datetimeFigureOut">
               <a:rPr lang="en-US" smtClean="0"/>
               <a:pPr/>
-              <a:t>4/30/21</a:t>
+              <a:t>5/7/21</a:t>
             </a:fld>
             <a:endParaRPr lang="en-US" dirty="0"/>
           </a:p>
@@ -9047,7 +9051,15 @@
             </a:pPr>
             <a:r>
               <a:rPr lang="en-US" dirty="0" smtClean="0"/>
-              <a:t>The view commonly held by research scientists that code is simply a means to an end can only cause problems if you decide to build anything of substantial size; this line is usually crossed long before a public software release. The solution to this is knowing how to engineer your code. </a:t>
+              <a:t>The view commonly held by research scientists that code is simply a means to an end can only cause problems </a:t>
+            </a:r>
+            <a:r>
+              <a:rPr lang="en-US" dirty="0" smtClean="0"/>
+              <a:t>if the code base gets sufficiently large; </a:t>
+            </a:r>
+            <a:r>
+              <a:rPr lang="en-US" dirty="0" smtClean="0"/>
+              <a:t>this line is usually crossed long before a public software release. The solution to this is knowing how to engineer your code. </a:t>
             </a:r>
           </a:p>
         </p:txBody>
@@ -11004,7 +11016,15 @@
             </a:pPr>
             <a:r>
               <a:rPr lang="en-US" dirty="0" smtClean="0"/>
-              <a:t>This is truly how professional developers and software engineers view scientist-written code </a:t>
+              <a:t>This is </a:t>
+            </a:r>
+            <a:r>
+              <a:rPr lang="en-US" dirty="0" smtClean="0"/>
+              <a:t>how </a:t>
+            </a:r>
+            <a:r>
+              <a:rPr lang="en-US" dirty="0" smtClean="0"/>
+              <a:t>professional developers and software engineers view scientist-written code </a:t>
             </a:r>
           </a:p>
         </p:txBody>

</xml_diff>

<commit_message>
slides: minor slide updates
</commit_message>
<xml_diff>
--- a/slides/basicSE.pptx
+++ b/slides/basicSE.pptx
@@ -271,38 +271,37 @@
           <a:p>
             <a:pPr lvl="0"/>
             <a:r>
-              <a:rPr lang="en-US" smtClean="0"/>
+              <a:rPr lang="en-US"/>
               <a:t>Click to edit Master text styles</a:t>
             </a:r>
           </a:p>
           <a:p>
             <a:pPr lvl="1"/>
             <a:r>
-              <a:rPr lang="en-US" smtClean="0"/>
+              <a:rPr lang="en-US"/>
               <a:t>Second level</a:t>
             </a:r>
           </a:p>
           <a:p>
             <a:pPr lvl="2"/>
             <a:r>
-              <a:rPr lang="en-US" smtClean="0"/>
+              <a:rPr lang="en-US"/>
               <a:t>Third level</a:t>
             </a:r>
           </a:p>
           <a:p>
             <a:pPr lvl="3"/>
             <a:r>
-              <a:rPr lang="en-US" smtClean="0"/>
+              <a:rPr lang="en-US"/>
               <a:t>Fourth level</a:t>
             </a:r>
           </a:p>
           <a:p>
             <a:pPr lvl="4"/>
             <a:r>
-              <a:rPr lang="en-US" smtClean="0"/>
+              <a:rPr lang="en-US"/>
               <a:t>Fifth level</a:t>
             </a:r>
-            <a:endParaRPr lang="en-US"/>
           </a:p>
         </p:txBody>
       </p:sp>
@@ -520,11 +519,11 @@
           <a:lstStyle/>
           <a:p>
             <a:r>
-              <a:rPr lang="en-US" dirty="0" smtClean="0"/>
+              <a:rPr lang="en-US" dirty="0"/>
               <a:t>Note here that engineering code</a:t>
             </a:r>
             <a:r>
-              <a:rPr lang="en-US" baseline="0" dirty="0" smtClean="0"/>
+              <a:rPr lang="en-US" baseline="0" dirty="0"/>
               <a:t> and organizing code are more or less the same thing. Substantially large will generally apply to research project code bases as well, not just production-level code. </a:t>
             </a:r>
             <a:endParaRPr lang="en-US" dirty="0"/>
@@ -612,11 +611,11 @@
           <a:lstStyle/>
           <a:p>
             <a:r>
-              <a:rPr lang="en-US" dirty="0" smtClean="0"/>
+              <a:rPr lang="en-US" dirty="0"/>
               <a:t>Specifically address the “oh just copy and paste</a:t>
             </a:r>
             <a:r>
-              <a:rPr lang="en-US" baseline="0" dirty="0" smtClean="0"/>
+              <a:rPr lang="en-US" baseline="0" dirty="0"/>
               <a:t> it!” that seemingly every astronomer says about writing code. Give them the example that in the entire ~76,000 line code base of VICE, the 1-dimensional linear interpolation function is written *once*. </a:t>
             </a:r>
             <a:endParaRPr lang="en-US" dirty="0"/>
@@ -704,11 +703,11 @@
           <a:lstStyle/>
           <a:p>
             <a:r>
-              <a:rPr lang="en-US" dirty="0" smtClean="0"/>
+              <a:rPr lang="en-US" dirty="0"/>
               <a:t>This is a rule of thumb, and can</a:t>
             </a:r>
             <a:r>
-              <a:rPr lang="en-US" baseline="0" dirty="0" smtClean="0"/>
+              <a:rPr lang="en-US" baseline="0" dirty="0"/>
               <a:t> be broken if the phrase can be re-stated without an if, and, or but. For example “fitting a line” and “determining the slope and intercept” are really the same thing and ideally wouldn’t be separated even though the second version has an “and.” </a:t>
             </a:r>
             <a:endParaRPr lang="en-US" dirty="0"/>
@@ -796,12 +795,12 @@
           <a:lstStyle/>
           <a:p>
             <a:r>
-              <a:rPr lang="en-US" dirty="0" smtClean="0"/>
+              <a:rPr lang="en-US" dirty="0"/>
               <a:t>This applies</a:t>
             </a:r>
             <a:r>
-              <a:rPr lang="en-US" baseline="0" dirty="0" smtClean="0"/>
-              <a:t> much more to people releasing code publicly </a:t>
+              <a:rPr lang="en-US" baseline="0" dirty="0"/>
+              <a:t> much more to people releasing code publicly, but can be a source of errors if you share code with close colleagues too. </a:t>
             </a:r>
             <a:endParaRPr lang="en-US" dirty="0"/>
           </a:p>
@@ -888,19 +887,19 @@
           <a:lstStyle/>
           <a:p>
             <a:r>
-              <a:rPr lang="en-US" dirty="0" smtClean="0"/>
+              <a:rPr lang="en-US" dirty="0"/>
               <a:t>Professional</a:t>
             </a:r>
             <a:r>
-              <a:rPr lang="en-US" baseline="0" dirty="0" smtClean="0"/>
+              <a:rPr lang="en-US" baseline="0" dirty="0"/>
               <a:t> software engineers don’t start in the text editor/IDE </a:t>
             </a:r>
             <a:r>
-              <a:rPr lang="mr-IN" baseline="0" dirty="0" smtClean="0"/>
+              <a:rPr lang="mr-IN" baseline="0" dirty="0"/>
               <a:t>–</a:t>
             </a:r>
             <a:r>
-              <a:rPr lang="en-US" baseline="0" dirty="0" smtClean="0"/>
+              <a:rPr lang="en-US" baseline="0" dirty="0"/>
               <a:t> they know how they’re going to solve the problem and test their implementation before they even write a single line. </a:t>
             </a:r>
             <a:endParaRPr lang="en-US" dirty="0"/>
@@ -988,24 +987,20 @@
           <a:lstStyle/>
           <a:p>
             <a:r>
-              <a:rPr lang="en-US" dirty="0" smtClean="0"/>
+              <a:rPr lang="en-US" dirty="0"/>
               <a:t>Professional</a:t>
             </a:r>
             <a:r>
-              <a:rPr lang="en-US" baseline="0" dirty="0" smtClean="0"/>
+              <a:rPr lang="en-US" baseline="0" dirty="0"/>
               <a:t> software engineers don’t start in the text editor/IDE </a:t>
             </a:r>
             <a:r>
-              <a:rPr lang="mr-IN" baseline="0" dirty="0" smtClean="0"/>
+              <a:rPr lang="mr-IN" baseline="0" dirty="0"/>
               <a:t>–</a:t>
             </a:r>
             <a:r>
-              <a:rPr lang="en-US" baseline="0" dirty="0" smtClean="0"/>
-              <a:t> </a:t>
-            </a:r>
-            <a:r>
-              <a:rPr lang="en-US" baseline="0" dirty="0" smtClean="0"/>
-              <a:t>they know how they’re going to solve the problem and test their implementation before they even write a single line. </a:t>
+              <a:rPr lang="en-US" baseline="0" dirty="0"/>
+              <a:t> they know how they’re going to solve the problem and test their implementation before they even write a single line. </a:t>
             </a:r>
             <a:endParaRPr lang="en-US" dirty="0"/>
           </a:p>
@@ -1092,12 +1087,20 @@
           <a:lstStyle/>
           <a:p>
             <a:r>
-              <a:rPr lang="en-US" dirty="0" smtClean="0"/>
-              <a:t>If you don’t know about their</a:t>
-            </a:r>
-            <a:r>
-              <a:rPr lang="en-US" baseline="0" dirty="0" smtClean="0"/>
-              <a:t> software engineering experience, you should always take code advice from a research scientist with a grain of salt. </a:t>
+              <a:rPr lang="en-US" dirty="0"/>
+              <a:t>If you don’t know about </a:t>
+            </a:r>
+            <a:r>
+              <a:rPr lang="en-US"/>
+              <a:t>their</a:t>
+            </a:r>
+            <a:r>
+              <a:rPr lang="en-US" baseline="0"/>
+              <a:t> coding </a:t>
+            </a:r>
+            <a:r>
+              <a:rPr lang="en-US" baseline="0" dirty="0"/>
+              <a:t>background, you should always take code advice from a research scientist with a grain of salt. </a:t>
             </a:r>
             <a:endParaRPr lang="en-US" dirty="0"/>
           </a:p>
@@ -1326,10 +1329,9 @@
           </a:lstStyle>
           <a:p>
             <a:r>
-              <a:rPr lang="en-US" dirty="0" smtClean="0"/>
+              <a:rPr lang="en-US" dirty="0"/>
               <a:t>Click to edit Master title style</a:t>
             </a:r>
-            <a:endParaRPr lang="en-US" dirty="0"/>
           </a:p>
         </p:txBody>
       </p:sp>
@@ -1393,10 +1395,9 @@
           </a:lstStyle>
           <a:p>
             <a:r>
-              <a:rPr lang="en-US" dirty="0" smtClean="0"/>
+              <a:rPr lang="en-US" dirty="0"/>
               <a:t>Click to edit Master subtitle style</a:t>
             </a:r>
-            <a:endParaRPr lang="en-US" dirty="0"/>
           </a:p>
         </p:txBody>
       </p:sp>
@@ -1666,7 +1667,7 @@
           </a:lstStyle>
           <a:p>
             <a:r>
-              <a:rPr lang="en-US" smtClean="0"/>
+              <a:rPr lang="en-US"/>
               <a:t>Click to edit Master title style</a:t>
             </a:r>
             <a:endParaRPr lang="en-US" dirty="0"/>
@@ -1742,7 +1743,7 @@
           </a:lstStyle>
           <a:p>
             <a:r>
-              <a:rPr lang="en-US" smtClean="0"/>
+              <a:rPr lang="en-US"/>
               <a:t>Drag picture to placeholder or click icon to add</a:t>
             </a:r>
             <a:endParaRPr lang="en-US" dirty="0"/>
@@ -1808,7 +1809,7 @@
           <a:p>
             <a:pPr lvl="0"/>
             <a:r>
-              <a:rPr lang="en-US" smtClean="0"/>
+              <a:rPr lang="en-US"/>
               <a:t>Click to edit Master text styles</a:t>
             </a:r>
           </a:p>
@@ -2073,7 +2074,7 @@
           </a:lstStyle>
           <a:p>
             <a:r>
-              <a:rPr lang="en-US" smtClean="0"/>
+              <a:rPr lang="en-US"/>
               <a:t>Click to edit Master title style</a:t>
             </a:r>
             <a:endParaRPr lang="en-US" dirty="0"/>
@@ -2139,7 +2140,7 @@
           <a:p>
             <a:pPr lvl="0"/>
             <a:r>
-              <a:rPr lang="en-US" smtClean="0"/>
+              <a:rPr lang="en-US"/>
               <a:t>Click to edit Master text styles</a:t>
             </a:r>
           </a:p>
@@ -2404,7 +2405,7 @@
           </a:lstStyle>
           <a:p>
             <a:r>
-              <a:rPr lang="en-US" smtClean="0"/>
+              <a:rPr lang="en-US"/>
               <a:t>Click to edit Master title style</a:t>
             </a:r>
             <a:endParaRPr lang="en-US" dirty="0"/>
@@ -2472,7 +2473,7 @@
           <a:p>
             <a:pPr lvl="0"/>
             <a:r>
-              <a:rPr lang="en-US" smtClean="0"/>
+              <a:rPr lang="en-US"/>
               <a:t>Click to edit Master text styles</a:t>
             </a:r>
           </a:p>
@@ -2539,7 +2540,7 @@
           <a:p>
             <a:pPr lvl="0"/>
             <a:r>
-              <a:rPr lang="en-US" smtClean="0"/>
+              <a:rPr lang="en-US"/>
               <a:t>Click to edit Master text styles</a:t>
             </a:r>
           </a:p>
@@ -3036,7 +3037,7 @@
           </a:lstStyle>
           <a:p>
             <a:r>
-              <a:rPr lang="en-US" smtClean="0"/>
+              <a:rPr lang="en-US"/>
               <a:t>Click to edit Master title style</a:t>
             </a:r>
             <a:endParaRPr lang="en-US" dirty="0"/>
@@ -3102,7 +3103,7 @@
           <a:p>
             <a:pPr lvl="0"/>
             <a:r>
-              <a:rPr lang="en-US" smtClean="0"/>
+              <a:rPr lang="en-US"/>
               <a:t>Click to edit Master text styles</a:t>
             </a:r>
           </a:p>
@@ -3363,7 +3364,7 @@
           <a:lstStyle/>
           <a:p>
             <a:r>
-              <a:rPr lang="en-US" smtClean="0"/>
+              <a:rPr lang="en-US"/>
               <a:t>Click to edit Master title style</a:t>
             </a:r>
             <a:endParaRPr lang="en-US" dirty="0"/>
@@ -3435,7 +3436,7 @@
           <a:p>
             <a:pPr lvl="0"/>
             <a:r>
-              <a:rPr lang="en-US" smtClean="0"/>
+              <a:rPr lang="en-US"/>
               <a:t>Click to edit Master text styles</a:t>
             </a:r>
           </a:p>
@@ -3502,7 +3503,7 @@
           <a:p>
             <a:pPr lvl="0"/>
             <a:r>
-              <a:rPr lang="en-US" smtClean="0"/>
+              <a:rPr lang="en-US"/>
               <a:t>Click to edit Master text styles</a:t>
             </a:r>
           </a:p>
@@ -3573,7 +3574,7 @@
           <a:p>
             <a:pPr lvl="0"/>
             <a:r>
-              <a:rPr lang="en-US" smtClean="0"/>
+              <a:rPr lang="en-US"/>
               <a:t>Click to edit Master text styles</a:t>
             </a:r>
           </a:p>
@@ -3640,7 +3641,7 @@
           <a:p>
             <a:pPr lvl="0"/>
             <a:r>
-              <a:rPr lang="en-US" smtClean="0"/>
+              <a:rPr lang="en-US"/>
               <a:t>Click to edit Master text styles</a:t>
             </a:r>
           </a:p>
@@ -3711,7 +3712,7 @@
           <a:p>
             <a:pPr lvl="0"/>
             <a:r>
-              <a:rPr lang="en-US" smtClean="0"/>
+              <a:rPr lang="en-US"/>
               <a:t>Click to edit Master text styles</a:t>
             </a:r>
           </a:p>
@@ -3778,7 +3779,7 @@
           <a:p>
             <a:pPr lvl="0"/>
             <a:r>
-              <a:rPr lang="en-US" smtClean="0"/>
+              <a:rPr lang="en-US"/>
               <a:t>Click to edit Master text styles</a:t>
             </a:r>
           </a:p>
@@ -4034,7 +4035,7 @@
           <a:lstStyle/>
           <a:p>
             <a:r>
-              <a:rPr lang="en-US" smtClean="0"/>
+              <a:rPr lang="en-US"/>
               <a:t>Click to edit Master title style</a:t>
             </a:r>
             <a:endParaRPr lang="en-US" dirty="0"/>
@@ -4106,7 +4107,7 @@
           <a:p>
             <a:pPr lvl="0"/>
             <a:r>
-              <a:rPr lang="en-US" smtClean="0"/>
+              <a:rPr lang="en-US"/>
               <a:t>Click to edit Master text styles</a:t>
             </a:r>
           </a:p>
@@ -4184,7 +4185,7 @@
           </a:lstStyle>
           <a:p>
             <a:r>
-              <a:rPr lang="en-US" smtClean="0"/>
+              <a:rPr lang="en-US"/>
               <a:t>Drag picture to placeholder or click icon to add</a:t>
             </a:r>
             <a:endParaRPr lang="en-US" dirty="0"/>
@@ -4252,7 +4253,7 @@
           <a:p>
             <a:pPr lvl="0"/>
             <a:r>
-              <a:rPr lang="en-US" smtClean="0"/>
+              <a:rPr lang="en-US"/>
               <a:t>Click to edit Master text styles</a:t>
             </a:r>
           </a:p>
@@ -4323,7 +4324,7 @@
           <a:p>
             <a:pPr lvl="0"/>
             <a:r>
-              <a:rPr lang="en-US" smtClean="0"/>
+              <a:rPr lang="en-US"/>
               <a:t>Click to edit Master text styles</a:t>
             </a:r>
           </a:p>
@@ -4401,7 +4402,7 @@
           </a:lstStyle>
           <a:p>
             <a:r>
-              <a:rPr lang="en-US" smtClean="0"/>
+              <a:rPr lang="en-US"/>
               <a:t>Drag picture to placeholder or click icon to add</a:t>
             </a:r>
             <a:endParaRPr lang="en-US" dirty="0"/>
@@ -4469,7 +4470,7 @@
           <a:p>
             <a:pPr lvl="0"/>
             <a:r>
-              <a:rPr lang="en-US" smtClean="0"/>
+              <a:rPr lang="en-US"/>
               <a:t>Click to edit Master text styles</a:t>
             </a:r>
           </a:p>
@@ -4540,7 +4541,7 @@
           <a:p>
             <a:pPr lvl="0"/>
             <a:r>
-              <a:rPr lang="en-US" smtClean="0"/>
+              <a:rPr lang="en-US"/>
               <a:t>Click to edit Master text styles</a:t>
             </a:r>
           </a:p>
@@ -4618,7 +4619,7 @@
           </a:lstStyle>
           <a:p>
             <a:r>
-              <a:rPr lang="en-US" smtClean="0"/>
+              <a:rPr lang="en-US"/>
               <a:t>Drag picture to placeholder or click icon to add</a:t>
             </a:r>
             <a:endParaRPr lang="en-US" dirty="0"/>
@@ -4686,7 +4687,7 @@
           <a:p>
             <a:pPr lvl="0"/>
             <a:r>
-              <a:rPr lang="en-US" smtClean="0"/>
+              <a:rPr lang="en-US"/>
               <a:t>Click to edit Master text styles</a:t>
             </a:r>
           </a:p>
@@ -4941,7 +4942,7 @@
           </a:lstStyle>
           <a:p>
             <a:r>
-              <a:rPr lang="en-US" smtClean="0"/>
+              <a:rPr lang="en-US"/>
               <a:t>Click to edit Master title style</a:t>
             </a:r>
             <a:endParaRPr lang="en-US" dirty="0"/>
@@ -4965,35 +4966,35 @@
           <a:p>
             <a:pPr lvl="0"/>
             <a:r>
-              <a:rPr lang="en-US" smtClean="0"/>
+              <a:rPr lang="en-US"/>
               <a:t>Click to edit Master text styles</a:t>
             </a:r>
           </a:p>
           <a:p>
             <a:pPr lvl="1"/>
             <a:r>
-              <a:rPr lang="en-US" smtClean="0"/>
+              <a:rPr lang="en-US"/>
               <a:t>Second level</a:t>
             </a:r>
           </a:p>
           <a:p>
             <a:pPr lvl="2"/>
             <a:r>
-              <a:rPr lang="en-US" smtClean="0"/>
+              <a:rPr lang="en-US"/>
               <a:t>Third level</a:t>
             </a:r>
           </a:p>
           <a:p>
             <a:pPr lvl="3"/>
             <a:r>
-              <a:rPr lang="en-US" smtClean="0"/>
+              <a:rPr lang="en-US"/>
               <a:t>Fourth level</a:t>
             </a:r>
           </a:p>
           <a:p>
             <a:pPr lvl="4"/>
             <a:r>
-              <a:rPr lang="en-US" smtClean="0"/>
+              <a:rPr lang="en-US"/>
               <a:t>Fifth level</a:t>
             </a:r>
             <a:endParaRPr lang="en-US" dirty="0"/>
@@ -5190,7 +5191,7 @@
           <a:lstStyle/>
           <a:p>
             <a:r>
-              <a:rPr lang="en-US" smtClean="0"/>
+              <a:rPr lang="en-US"/>
               <a:t>Click to edit Master title style</a:t>
             </a:r>
             <a:endParaRPr lang="en-US" dirty="0"/>
@@ -5219,35 +5220,35 @@
           <a:p>
             <a:pPr lvl="0"/>
             <a:r>
-              <a:rPr lang="en-US" smtClean="0"/>
+              <a:rPr lang="en-US"/>
               <a:t>Click to edit Master text styles</a:t>
             </a:r>
           </a:p>
           <a:p>
             <a:pPr lvl="1"/>
             <a:r>
-              <a:rPr lang="en-US" smtClean="0"/>
+              <a:rPr lang="en-US"/>
               <a:t>Second level</a:t>
             </a:r>
           </a:p>
           <a:p>
             <a:pPr lvl="2"/>
             <a:r>
-              <a:rPr lang="en-US" smtClean="0"/>
+              <a:rPr lang="en-US"/>
               <a:t>Third level</a:t>
             </a:r>
           </a:p>
           <a:p>
             <a:pPr lvl="3"/>
             <a:r>
-              <a:rPr lang="en-US" smtClean="0"/>
+              <a:rPr lang="en-US"/>
               <a:t>Fourth level</a:t>
             </a:r>
           </a:p>
           <a:p>
             <a:pPr lvl="4"/>
             <a:r>
-              <a:rPr lang="en-US" smtClean="0"/>
+              <a:rPr lang="en-US"/>
               <a:t>Fifth level</a:t>
             </a:r>
             <a:endParaRPr lang="en-US" dirty="0"/>
@@ -5523,7 +5524,7 @@
           <a:lstStyle/>
           <a:p>
             <a:r>
-              <a:rPr lang="en-US" smtClean="0"/>
+              <a:rPr lang="en-US"/>
               <a:t>Click to edit Master title style</a:t>
             </a:r>
             <a:endParaRPr lang="en-US" dirty="0"/>
@@ -5547,35 +5548,35 @@
           <a:p>
             <a:pPr lvl="0"/>
             <a:r>
-              <a:rPr lang="en-US" smtClean="0"/>
+              <a:rPr lang="en-US"/>
               <a:t>Click to edit Master text styles</a:t>
             </a:r>
           </a:p>
           <a:p>
             <a:pPr lvl="1"/>
             <a:r>
-              <a:rPr lang="en-US" smtClean="0"/>
+              <a:rPr lang="en-US"/>
               <a:t>Second level</a:t>
             </a:r>
           </a:p>
           <a:p>
             <a:pPr lvl="2"/>
             <a:r>
-              <a:rPr lang="en-US" smtClean="0"/>
+              <a:rPr lang="en-US"/>
               <a:t>Third level</a:t>
             </a:r>
           </a:p>
           <a:p>
             <a:pPr lvl="3"/>
             <a:r>
-              <a:rPr lang="en-US" smtClean="0"/>
+              <a:rPr lang="en-US"/>
               <a:t>Fourth level</a:t>
             </a:r>
           </a:p>
           <a:p>
             <a:pPr lvl="4"/>
             <a:r>
-              <a:rPr lang="en-US" smtClean="0"/>
+              <a:rPr lang="en-US"/>
               <a:t>Fifth level</a:t>
             </a:r>
             <a:endParaRPr lang="en-US" dirty="0"/>
@@ -5838,7 +5839,7 @@
           </a:lstStyle>
           <a:p>
             <a:r>
-              <a:rPr lang="en-US" smtClean="0"/>
+              <a:rPr lang="en-US"/>
               <a:t>Click to edit Master title style</a:t>
             </a:r>
             <a:endParaRPr lang="en-US" dirty="0"/>
@@ -5960,7 +5961,7 @@
           <a:p>
             <a:pPr lvl="0"/>
             <a:r>
-              <a:rPr lang="en-US" smtClean="0"/>
+              <a:rPr lang="en-US"/>
               <a:t>Click to edit Master text styles</a:t>
             </a:r>
           </a:p>
@@ -6221,7 +6222,7 @@
           <a:lstStyle/>
           <a:p>
             <a:r>
-              <a:rPr lang="en-US" smtClean="0"/>
+              <a:rPr lang="en-US"/>
               <a:t>Click to edit Master title style</a:t>
             </a:r>
             <a:endParaRPr lang="en-US" dirty="0"/>
@@ -6250,35 +6251,35 @@
           <a:p>
             <a:pPr lvl="0"/>
             <a:r>
-              <a:rPr lang="en-US" smtClean="0"/>
+              <a:rPr lang="en-US"/>
               <a:t>Click to edit Master text styles</a:t>
             </a:r>
           </a:p>
           <a:p>
             <a:pPr lvl="1"/>
             <a:r>
-              <a:rPr lang="en-US" smtClean="0"/>
+              <a:rPr lang="en-US"/>
               <a:t>Second level</a:t>
             </a:r>
           </a:p>
           <a:p>
             <a:pPr lvl="2"/>
             <a:r>
-              <a:rPr lang="en-US" smtClean="0"/>
+              <a:rPr lang="en-US"/>
               <a:t>Third level</a:t>
             </a:r>
           </a:p>
           <a:p>
             <a:pPr lvl="3"/>
             <a:r>
-              <a:rPr lang="en-US" smtClean="0"/>
+              <a:rPr lang="en-US"/>
               <a:t>Fourth level</a:t>
             </a:r>
           </a:p>
           <a:p>
             <a:pPr lvl="4"/>
             <a:r>
-              <a:rPr lang="en-US" smtClean="0"/>
+              <a:rPr lang="en-US"/>
               <a:t>Fifth level</a:t>
             </a:r>
             <a:endParaRPr lang="en-US" dirty="0"/>
@@ -6307,35 +6308,35 @@
           <a:p>
             <a:pPr lvl="0"/>
             <a:r>
-              <a:rPr lang="en-US" smtClean="0"/>
+              <a:rPr lang="en-US"/>
               <a:t>Click to edit Master text styles</a:t>
             </a:r>
           </a:p>
           <a:p>
             <a:pPr lvl="1"/>
             <a:r>
-              <a:rPr lang="en-US" smtClean="0"/>
+              <a:rPr lang="en-US"/>
               <a:t>Second level</a:t>
             </a:r>
           </a:p>
           <a:p>
             <a:pPr lvl="2"/>
             <a:r>
-              <a:rPr lang="en-US" smtClean="0"/>
+              <a:rPr lang="en-US"/>
               <a:t>Third level</a:t>
             </a:r>
           </a:p>
           <a:p>
             <a:pPr lvl="3"/>
             <a:r>
-              <a:rPr lang="en-US" smtClean="0"/>
+              <a:rPr lang="en-US"/>
               <a:t>Fourth level</a:t>
             </a:r>
           </a:p>
           <a:p>
             <a:pPr lvl="4"/>
             <a:r>
-              <a:rPr lang="en-US" smtClean="0"/>
+              <a:rPr lang="en-US"/>
               <a:t>Fifth level</a:t>
             </a:r>
             <a:endParaRPr lang="en-US" dirty="0"/>
@@ -6597,7 +6598,7 @@
           <a:lstStyle/>
           <a:p>
             <a:r>
-              <a:rPr lang="en-US" smtClean="0"/>
+              <a:rPr lang="en-US"/>
               <a:t>Click to edit Master title style</a:t>
             </a:r>
             <a:endParaRPr lang="en-US" dirty="0"/>
@@ -6663,7 +6664,7 @@
           <a:p>
             <a:pPr lvl="0"/>
             <a:r>
-              <a:rPr lang="en-US" smtClean="0"/>
+              <a:rPr lang="en-US"/>
               <a:t>Click to edit Master text styles</a:t>
             </a:r>
           </a:p>
@@ -6691,35 +6692,35 @@
           <a:p>
             <a:pPr lvl="0"/>
             <a:r>
-              <a:rPr lang="en-US" smtClean="0"/>
+              <a:rPr lang="en-US"/>
               <a:t>Click to edit Master text styles</a:t>
             </a:r>
           </a:p>
           <a:p>
             <a:pPr lvl="1"/>
             <a:r>
-              <a:rPr lang="en-US" smtClean="0"/>
+              <a:rPr lang="en-US"/>
               <a:t>Second level</a:t>
             </a:r>
           </a:p>
           <a:p>
             <a:pPr lvl="2"/>
             <a:r>
-              <a:rPr lang="en-US" smtClean="0"/>
+              <a:rPr lang="en-US"/>
               <a:t>Third level</a:t>
             </a:r>
           </a:p>
           <a:p>
             <a:pPr lvl="3"/>
             <a:r>
-              <a:rPr lang="en-US" smtClean="0"/>
+              <a:rPr lang="en-US"/>
               <a:t>Fourth level</a:t>
             </a:r>
           </a:p>
           <a:p>
             <a:pPr lvl="4"/>
             <a:r>
-              <a:rPr lang="en-US" smtClean="0"/>
+              <a:rPr lang="en-US"/>
               <a:t>Fifth level</a:t>
             </a:r>
             <a:endParaRPr lang="en-US" dirty="0"/>
@@ -6785,7 +6786,7 @@
           <a:p>
             <a:pPr lvl="0"/>
             <a:r>
-              <a:rPr lang="en-US" smtClean="0"/>
+              <a:rPr lang="en-US"/>
               <a:t>Click to edit Master text styles</a:t>
             </a:r>
           </a:p>
@@ -6813,35 +6814,35 @@
           <a:p>
             <a:pPr lvl="0"/>
             <a:r>
-              <a:rPr lang="en-US" smtClean="0"/>
+              <a:rPr lang="en-US"/>
               <a:t>Click to edit Master text styles</a:t>
             </a:r>
           </a:p>
           <a:p>
             <a:pPr lvl="1"/>
             <a:r>
-              <a:rPr lang="en-US" smtClean="0"/>
+              <a:rPr lang="en-US"/>
               <a:t>Second level</a:t>
             </a:r>
           </a:p>
           <a:p>
             <a:pPr lvl="2"/>
             <a:r>
-              <a:rPr lang="en-US" smtClean="0"/>
+              <a:rPr lang="en-US"/>
               <a:t>Third level</a:t>
             </a:r>
           </a:p>
           <a:p>
             <a:pPr lvl="3"/>
             <a:r>
-              <a:rPr lang="en-US" smtClean="0"/>
+              <a:rPr lang="en-US"/>
               <a:t>Fourth level</a:t>
             </a:r>
           </a:p>
           <a:p>
             <a:pPr lvl="4"/>
             <a:r>
-              <a:rPr lang="en-US" smtClean="0"/>
+              <a:rPr lang="en-US"/>
               <a:t>Fifth level</a:t>
             </a:r>
             <a:endParaRPr lang="en-US" dirty="0"/>
@@ -7098,7 +7099,7 @@
           <a:lstStyle/>
           <a:p>
             <a:r>
-              <a:rPr lang="en-US" smtClean="0"/>
+              <a:rPr lang="en-US"/>
               <a:t>Click to edit Master title style</a:t>
             </a:r>
             <a:endParaRPr lang="en-US" dirty="0"/>
@@ -7524,7 +7525,7 @@
           </a:lstStyle>
           <a:p>
             <a:r>
-              <a:rPr lang="en-US" smtClean="0"/>
+              <a:rPr lang="en-US"/>
               <a:t>Click to edit Master title style</a:t>
             </a:r>
             <a:endParaRPr lang="en-US" dirty="0"/>
@@ -7553,35 +7554,35 @@
           <a:p>
             <a:pPr lvl="0"/>
             <a:r>
-              <a:rPr lang="en-US" smtClean="0"/>
+              <a:rPr lang="en-US"/>
               <a:t>Click to edit Master text styles</a:t>
             </a:r>
           </a:p>
           <a:p>
             <a:pPr lvl="1"/>
             <a:r>
-              <a:rPr lang="en-US" smtClean="0"/>
+              <a:rPr lang="en-US"/>
               <a:t>Second level</a:t>
             </a:r>
           </a:p>
           <a:p>
             <a:pPr lvl="2"/>
             <a:r>
-              <a:rPr lang="en-US" smtClean="0"/>
+              <a:rPr lang="en-US"/>
               <a:t>Third level</a:t>
             </a:r>
           </a:p>
           <a:p>
             <a:pPr lvl="3"/>
             <a:r>
-              <a:rPr lang="en-US" smtClean="0"/>
+              <a:rPr lang="en-US"/>
               <a:t>Fourth level</a:t>
             </a:r>
           </a:p>
           <a:p>
             <a:pPr lvl="4"/>
             <a:r>
-              <a:rPr lang="en-US" smtClean="0"/>
+              <a:rPr lang="en-US"/>
               <a:t>Fifth level</a:t>
             </a:r>
             <a:endParaRPr lang="en-US" dirty="0"/>
@@ -7647,7 +7648,7 @@
           <a:p>
             <a:pPr lvl="0"/>
             <a:r>
-              <a:rPr lang="en-US" smtClean="0"/>
+              <a:rPr lang="en-US"/>
               <a:t>Click to edit Master text styles</a:t>
             </a:r>
           </a:p>
@@ -7914,7 +7915,7 @@
           </a:lstStyle>
           <a:p>
             <a:r>
-              <a:rPr lang="en-US" smtClean="0"/>
+              <a:rPr lang="en-US"/>
               <a:t>Click to edit Master title style</a:t>
             </a:r>
             <a:endParaRPr lang="en-US" dirty="0"/>
@@ -7990,7 +7991,7 @@
           </a:lstStyle>
           <a:p>
             <a:r>
-              <a:rPr lang="en-US" smtClean="0"/>
+              <a:rPr lang="en-US"/>
               <a:t>Drag picture to placeholder or click icon to add</a:t>
             </a:r>
             <a:endParaRPr lang="en-US" dirty="0"/>
@@ -8056,7 +8057,7 @@
           <a:p>
             <a:pPr lvl="0"/>
             <a:r>
-              <a:rPr lang="en-US" smtClean="0"/>
+              <a:rPr lang="en-US"/>
               <a:t>Click to edit Master text styles</a:t>
             </a:r>
           </a:p>
@@ -8101,7 +8102,7 @@
           <a:lstStyle/>
           <a:p>
             <a:r>
-              <a:rPr lang="en-US" smtClean="0"/>
+              <a:rPr lang="en-US"/>
               <a:t>
               </a:t>
             </a:r>
@@ -8219,10 +8220,9 @@
           <a:lstStyle/>
           <a:p>
             <a:r>
-              <a:rPr lang="en-US" dirty="0" smtClean="0"/>
+              <a:rPr lang="en-US" dirty="0"/>
               <a:t>Click to edit Master title style</a:t>
             </a:r>
-            <a:endParaRPr lang="en-US" dirty="0"/>
           </a:p>
         </p:txBody>
       </p:sp>
@@ -8253,38 +8253,37 @@
           <a:p>
             <a:pPr lvl="0"/>
             <a:r>
-              <a:rPr lang="en-US" dirty="0" smtClean="0"/>
+              <a:rPr lang="en-US" dirty="0"/>
               <a:t>Click to edit Master text styles</a:t>
             </a:r>
           </a:p>
           <a:p>
             <a:pPr lvl="1"/>
             <a:r>
-              <a:rPr lang="en-US" dirty="0" smtClean="0"/>
+              <a:rPr lang="en-US" dirty="0"/>
               <a:t>Second level</a:t>
             </a:r>
           </a:p>
           <a:p>
             <a:pPr lvl="2"/>
             <a:r>
-              <a:rPr lang="en-US" dirty="0" smtClean="0"/>
+              <a:rPr lang="en-US" dirty="0"/>
               <a:t>Third level</a:t>
             </a:r>
           </a:p>
           <a:p>
             <a:pPr lvl="3"/>
             <a:r>
-              <a:rPr lang="en-US" dirty="0" smtClean="0"/>
+              <a:rPr lang="en-US" dirty="0"/>
               <a:t>Fourth level</a:t>
             </a:r>
           </a:p>
           <a:p>
             <a:pPr lvl="4"/>
             <a:r>
-              <a:rPr lang="en-US" dirty="0" smtClean="0"/>
+              <a:rPr lang="en-US" dirty="0"/>
               <a:t>Fifth level</a:t>
             </a:r>
-            <a:endParaRPr lang="en-US" dirty="0"/>
           </a:p>
         </p:txBody>
       </p:sp>
@@ -8766,10 +8765,9 @@
           <a:lstStyle/>
           <a:p>
             <a:r>
-              <a:rPr lang="en-US" dirty="0" smtClean="0"/>
+              <a:rPr lang="en-US" dirty="0"/>
               <a:t>Basic Software Engineering </a:t>
             </a:r>
-            <a:endParaRPr lang="en-US" dirty="0"/>
           </a:p>
         </p:txBody>
       </p:sp>
@@ -8792,11 +8790,7 @@
           <a:p>
             <a:r>
               <a:rPr lang="en-US"/>
-              <a:t>SURP </a:t>
-            </a:r>
-            <a:r>
-              <a:rPr lang="en-US" smtClean="0"/>
-              <a:t>2021 </a:t>
+              <a:t>SURP 2021 </a:t>
             </a:r>
             <a:r>
               <a:rPr lang="en-US" dirty="0"/>
@@ -8812,13 +8806,8 @@
           <a:p>
             <a:r>
               <a:rPr lang="en-US" dirty="0"/>
-              <a:t>Slides by: James W. </a:t>
-            </a:r>
-            <a:r>
-              <a:rPr lang="en-US" dirty="0" smtClean="0"/>
-              <a:t>Johnson</a:t>
-            </a:r>
-            <a:endParaRPr lang="en-US" dirty="0"/>
+              <a:t>Slides by: James W. Johnson</a:t>
+            </a:r>
           </a:p>
         </p:txBody>
       </p:sp>
@@ -8832,13 +8821,6 @@
   <p:clrMapOvr>
     <a:masterClrMapping/>
   </p:clrMapOvr>
-  <p:timing>
-    <p:tnLst>
-      <p:par>
-        <p:cTn id="1" dur="indefinite" restart="never" nodeType="tmRoot"/>
-      </p:par>
-    </p:tnLst>
-  </p:timing>
 </p:sld>
 </file>
 
@@ -8875,10 +8857,9 @@
           <a:lstStyle/>
           <a:p>
             <a:r>
-              <a:rPr lang="en-US" dirty="0" smtClean="0"/>
+              <a:rPr lang="en-US" dirty="0"/>
               <a:t>Rule Number One</a:t>
             </a:r>
-            <a:endParaRPr lang="en-US" dirty="0"/>
           </a:p>
         </p:txBody>
       </p:sp>
@@ -8922,10 +8903,10 @@
               <a:defRPr/>
             </a:pPr>
             <a:r>
-              <a:rPr lang="en-US" i="1" dirty="0" smtClean="0"/>
+              <a:rPr lang="en-US" i="1" dirty="0"/>
               <a:t>Code is read much more often than it is written. </a:t>
             </a:r>
-            <a:endParaRPr lang="en-US" dirty="0" smtClean="0"/>
+            <a:endParaRPr lang="en-US" dirty="0"/>
           </a:p>
           <a:p>
             <a:pPr lvl="1">
@@ -8937,10 +8918,9 @@
               </a:spcBef>
             </a:pPr>
             <a:r>
-              <a:rPr lang="en-US" dirty="0" smtClean="0"/>
+              <a:rPr lang="en-US" dirty="0"/>
               <a:t>Advice: Assume this applies to all of the code you will ever write </a:t>
             </a:r>
-            <a:endParaRPr lang="en-US" dirty="0"/>
           </a:p>
           <a:p>
             <a:pPr marL="0" marR="0" lvl="0" indent="0" defTabSz="914400" eaLnBrk="1" fontAlgn="auto" latinLnBrk="0" hangingPunct="1">
@@ -8981,15 +8961,15 @@
               <a:defRPr/>
             </a:pPr>
             <a:r>
-              <a:rPr lang="en-US" dirty="0" smtClean="0"/>
+              <a:rPr lang="en-US" dirty="0"/>
               <a:t>Emphasize </a:t>
             </a:r>
             <a:r>
-              <a:rPr lang="en-US" i="1" dirty="0" smtClean="0"/>
+              <a:rPr lang="en-US" i="1" dirty="0"/>
               <a:t>readability</a:t>
             </a:r>
             <a:r>
-              <a:rPr lang="en-US" dirty="0" smtClean="0"/>
+              <a:rPr lang="en-US" dirty="0"/>
               <a:t> above all else. It’s okay to break any of these rules if the result is a much more readable solution. </a:t>
             </a:r>
           </a:p>
@@ -9011,7 +8991,7 @@
               <a:tabLst/>
               <a:defRPr/>
             </a:pPr>
-            <a:endParaRPr lang="en-US" dirty="0" smtClean="0"/>
+            <a:endParaRPr lang="en-US" dirty="0"/>
           </a:p>
           <a:p>
             <a:pPr marL="0" marR="0" lvl="0" indent="0" defTabSz="914400" eaLnBrk="1" fontAlgn="auto" latinLnBrk="0" hangingPunct="1">
@@ -9032,11 +9012,11 @@
               <a:defRPr/>
             </a:pPr>
             <a:r>
-              <a:rPr lang="en-US" dirty="0" smtClean="0"/>
+              <a:rPr lang="en-US" dirty="0"/>
               <a:t>Bottom line: </a:t>
             </a:r>
             <a:r>
-              <a:rPr lang="en-US" i="1" dirty="0" smtClean="0"/>
+              <a:rPr lang="en-US" i="1" dirty="0"/>
               <a:t>Well-written software is clear and does not cut corners. </a:t>
             </a:r>
           </a:p>
@@ -9050,16 +9030,8 @@
               </a:spcBef>
             </a:pPr>
             <a:r>
-              <a:rPr lang="en-US" dirty="0" smtClean="0"/>
-              <a:t>The view commonly held by research scientists that code is simply a means to an end can only cause problems </a:t>
-            </a:r>
-            <a:r>
-              <a:rPr lang="en-US" dirty="0" smtClean="0"/>
-              <a:t>if the code base gets sufficiently large; </a:t>
-            </a:r>
-            <a:r>
-              <a:rPr lang="en-US" dirty="0" smtClean="0"/>
-              <a:t>this line is usually crossed long before a public software release. The solution to this is knowing how to engineer your code. </a:t>
+              <a:rPr lang="en-US" dirty="0"/>
+              <a:t>The view commonly held by research scientists that code is simply a means to an end can only cause problems if the code base gets sufficiently large; this line is usually crossed long before a public software release. The solution to this is knowing how to engineer your code. </a:t>
             </a:r>
           </a:p>
         </p:txBody>
@@ -9074,13 +9046,6 @@
   <p:clrMapOvr>
     <a:masterClrMapping/>
   </p:clrMapOvr>
-  <p:timing>
-    <p:tnLst>
-      <p:par>
-        <p:cTn id="1" dur="indefinite" restart="never" nodeType="tmRoot"/>
-      </p:par>
-    </p:tnLst>
-  </p:timing>
 </p:sld>
 </file>
 
@@ -9152,7 +9117,7 @@
               <a:tabLst/>
               <a:defRPr/>
             </a:pPr>
-            <a:endParaRPr lang="en-US" dirty="0" smtClean="0"/>
+            <a:endParaRPr lang="en-US" dirty="0"/>
           </a:p>
           <a:p>
             <a:pPr marL="0" marR="0" lvl="0" indent="0" algn="ctr" defTabSz="914400" eaLnBrk="1" fontAlgn="auto" latinLnBrk="0" hangingPunct="1">
@@ -9192,7 +9157,7 @@
               <a:tabLst/>
               <a:defRPr/>
             </a:pPr>
-            <a:endParaRPr lang="en-US" dirty="0" smtClean="0"/>
+            <a:endParaRPr lang="en-US" dirty="0"/>
           </a:p>
           <a:p>
             <a:pPr marL="0" marR="0" lvl="0" indent="0" algn="ctr" defTabSz="914400" eaLnBrk="1" fontAlgn="auto" latinLnBrk="0" hangingPunct="1">
@@ -9213,10 +9178,9 @@
               <a:defRPr/>
             </a:pPr>
             <a:r>
-              <a:rPr lang="en-US" sz="6000" dirty="0" smtClean="0"/>
+              <a:rPr lang="en-US" sz="6000" dirty="0"/>
               <a:t>Thank you!</a:t>
             </a:r>
-            <a:endParaRPr lang="en-US" sz="6000" dirty="0"/>
           </a:p>
         </p:txBody>
       </p:sp>
@@ -9230,13 +9194,6 @@
   <p:clrMapOvr>
     <a:masterClrMapping/>
   </p:clrMapOvr>
-  <p:timing>
-    <p:tnLst>
-      <p:par>
-        <p:cTn id="1" dur="indefinite" restart="never" nodeType="tmRoot"/>
-      </p:par>
-    </p:tnLst>
-  </p:timing>
 </p:sld>
 </file>
 
@@ -9273,10 +9230,9 @@
           <a:lstStyle/>
           <a:p>
             <a:r>
-              <a:rPr lang="en-US" dirty="0" smtClean="0"/>
+              <a:rPr lang="en-US" dirty="0"/>
               <a:t>Software Engineering </a:t>
             </a:r>
-            <a:endParaRPr lang="en-US" dirty="0"/>
           </a:p>
         </p:txBody>
       </p:sp>
@@ -9320,7 +9276,7 @@
               <a:defRPr/>
             </a:pPr>
             <a:r>
-              <a:rPr lang="en-US" dirty="0" smtClean="0"/>
+              <a:rPr lang="en-US" dirty="0"/>
               <a:t>The application of the principles of engineering to software development. </a:t>
             </a:r>
           </a:p>
@@ -9362,7 +9318,7 @@
               <a:tabLst/>
               <a:defRPr/>
             </a:pPr>
-            <a:endParaRPr lang="en-US" dirty="0" smtClean="0"/>
+            <a:endParaRPr lang="en-US" dirty="0"/>
           </a:p>
           <a:p>
             <a:pPr marL="0" marR="0" lvl="0" indent="0" defTabSz="914400" eaLnBrk="1" fontAlgn="auto" latinLnBrk="0" hangingPunct="1">
@@ -9383,7 +9339,7 @@
               <a:defRPr/>
             </a:pPr>
             <a:r>
-              <a:rPr lang="en-US" dirty="0" smtClean="0"/>
+              <a:rPr lang="en-US" dirty="0"/>
               <a:t>All of the usual principles apply</a:t>
             </a:r>
           </a:p>
@@ -9397,7 +9353,7 @@
               </a:spcBef>
             </a:pPr>
             <a:r>
-              <a:rPr lang="en-US" dirty="0" smtClean="0"/>
+              <a:rPr lang="en-US" dirty="0"/>
               <a:t>Making efficient use of resources </a:t>
             </a:r>
           </a:p>
@@ -9411,7 +9367,7 @@
               </a:spcBef>
             </a:pPr>
             <a:r>
-              <a:rPr lang="en-US" dirty="0" smtClean="0"/>
+              <a:rPr lang="en-US" dirty="0"/>
               <a:t>Extensions of existing features </a:t>
             </a:r>
           </a:p>
@@ -9425,7 +9381,7 @@
               </a:spcBef>
             </a:pPr>
             <a:r>
-              <a:rPr lang="en-US" dirty="0" smtClean="0"/>
+              <a:rPr lang="en-US" dirty="0"/>
               <a:t>Testing of individual components </a:t>
             </a:r>
           </a:p>
@@ -9439,7 +9395,7 @@
               </a:spcBef>
             </a:pPr>
             <a:r>
-              <a:rPr lang="en-US" dirty="0" smtClean="0"/>
+              <a:rPr lang="en-US" dirty="0"/>
               <a:t>Maintenance </a:t>
             </a:r>
           </a:p>
@@ -9466,7 +9422,7 @@
               <a:buNone/>
             </a:pPr>
             <a:r>
-              <a:rPr lang="en-US" dirty="0" smtClean="0"/>
+              <a:rPr lang="en-US" dirty="0"/>
               <a:t>Why care if you’re an astronomer? If you build anything substantially large, these principles can save you not just headaches but migraines. </a:t>
             </a:r>
           </a:p>
@@ -9482,13 +9438,6 @@
   <p:clrMapOvr>
     <a:masterClrMapping/>
   </p:clrMapOvr>
-  <p:timing>
-    <p:tnLst>
-      <p:par>
-        <p:cTn id="1" dur="indefinite" restart="never" nodeType="tmRoot"/>
-      </p:par>
-    </p:tnLst>
-  </p:timing>
 </p:sld>
 </file>
 
@@ -9525,10 +9474,9 @@
           <a:lstStyle/>
           <a:p>
             <a:r>
-              <a:rPr lang="en-US" dirty="0" smtClean="0"/>
+              <a:rPr lang="en-US" dirty="0"/>
               <a:t>DRY: Don’t Repeat Yourself </a:t>
             </a:r>
-            <a:endParaRPr lang="en-US" dirty="0"/>
           </a:p>
         </p:txBody>
       </p:sp>
@@ -9572,15 +9520,15 @@
               <a:defRPr/>
             </a:pPr>
             <a:r>
-              <a:rPr lang="en-US" dirty="0" smtClean="0"/>
+              <a:rPr lang="en-US" dirty="0"/>
               <a:t>You should </a:t>
             </a:r>
             <a:r>
-              <a:rPr lang="en-US" i="1" dirty="0" smtClean="0"/>
+              <a:rPr lang="en-US" i="1" dirty="0"/>
               <a:t>never</a:t>
             </a:r>
             <a:r>
-              <a:rPr lang="en-US" dirty="0" smtClean="0"/>
+              <a:rPr lang="en-US" dirty="0"/>
               <a:t> write the same code twice within the same application. </a:t>
             </a:r>
           </a:p>
@@ -9602,7 +9550,7 @@
               <a:tabLst/>
               <a:defRPr/>
             </a:pPr>
-            <a:endParaRPr lang="en-US" dirty="0" smtClean="0"/>
+            <a:endParaRPr lang="en-US" dirty="0"/>
           </a:p>
           <a:p>
             <a:pPr marL="0" marR="0" lvl="0" indent="0" defTabSz="914400" eaLnBrk="1" fontAlgn="auto" latinLnBrk="0" hangingPunct="1">
@@ -9623,11 +9571,11 @@
               <a:defRPr/>
             </a:pPr>
             <a:r>
-              <a:rPr lang="en-US" i="1" dirty="0" smtClean="0"/>
+              <a:rPr lang="en-US" i="1" dirty="0"/>
               <a:t>Always</a:t>
             </a:r>
             <a:r>
-              <a:rPr lang="en-US" dirty="0" smtClean="0"/>
+              <a:rPr lang="en-US" dirty="0"/>
               <a:t> assume that every software component you write (no matter how well it performs) is wrong or bugged in some subtle, nuanced way </a:t>
             </a:r>
           </a:p>
@@ -9641,19 +9589,19 @@
               </a:spcBef>
             </a:pPr>
             <a:r>
-              <a:rPr lang="en-US" dirty="0" smtClean="0"/>
+              <a:rPr lang="en-US" dirty="0"/>
               <a:t>When you find a bug, you want to be able to fix it </a:t>
             </a:r>
             <a:r>
-              <a:rPr lang="en-US" i="1" dirty="0" smtClean="0"/>
+              <a:rPr lang="en-US" i="1" dirty="0"/>
               <a:t>once</a:t>
             </a:r>
             <a:r>
-              <a:rPr lang="en-US" dirty="0" smtClean="0"/>
+              <a:rPr lang="en-US" dirty="0"/>
               <a:t> and have that change propagate through the </a:t>
             </a:r>
             <a:r>
-              <a:rPr lang="en-US" i="1" dirty="0" smtClean="0"/>
+              <a:rPr lang="en-US" i="1" dirty="0"/>
               <a:t>entire code base</a:t>
             </a:r>
           </a:p>
@@ -9667,7 +9615,7 @@
               </a:spcBef>
               <a:buNone/>
             </a:pPr>
-            <a:endParaRPr lang="en-US" dirty="0" smtClean="0"/>
+            <a:endParaRPr lang="en-US" dirty="0"/>
           </a:p>
           <a:p>
             <a:pPr marL="0" indent="0">
@@ -9680,23 +9628,23 @@
               <a:buNone/>
             </a:pPr>
             <a:r>
-              <a:rPr lang="en-US" dirty="0" smtClean="0"/>
+              <a:rPr lang="en-US" dirty="0"/>
               <a:t>Caveat: Some choose to break this rule for software written in a </a:t>
             </a:r>
             <a:r>
-              <a:rPr lang="en-US" i="1" dirty="0" smtClean="0"/>
+              <a:rPr lang="en-US" i="1" dirty="0"/>
               <a:t>modular</a:t>
             </a:r>
             <a:r>
-              <a:rPr lang="en-US" dirty="0" smtClean="0"/>
+              <a:rPr lang="en-US" dirty="0"/>
               <a:t> manner </a:t>
             </a:r>
             <a:r>
-              <a:rPr lang="mr-IN" dirty="0" smtClean="0"/>
+              <a:rPr lang="mr-IN" dirty="0"/>
               <a:t>–</a:t>
             </a:r>
             <a:r>
-              <a:rPr lang="en-US" dirty="0" smtClean="0"/>
+              <a:rPr lang="en-US" dirty="0"/>
               <a:t> that is, if each component of your software is implemented independently of the other components. In this case DRY applies within the </a:t>
             </a:r>
           </a:p>
@@ -9711,18 +9659,17 @@
               <a:buNone/>
             </a:pPr>
             <a:r>
-              <a:rPr lang="en-US" dirty="0" smtClean="0"/>
+              <a:rPr lang="en-US" dirty="0"/>
               <a:t>Individual </a:t>
             </a:r>
             <a:r>
-              <a:rPr lang="en-US" i="1" dirty="0" smtClean="0"/>
+              <a:rPr lang="en-US" i="1" dirty="0"/>
               <a:t>modules</a:t>
             </a:r>
             <a:r>
-              <a:rPr lang="en-US" dirty="0" smtClean="0"/>
+              <a:rPr lang="en-US" dirty="0"/>
               <a:t>. </a:t>
             </a:r>
-            <a:endParaRPr lang="en-US" dirty="0"/>
           </a:p>
         </p:txBody>
       </p:sp>
@@ -9736,13 +9683,6 @@
   <p:clrMapOvr>
     <a:masterClrMapping/>
   </p:clrMapOvr>
-  <p:timing>
-    <p:tnLst>
-      <p:par>
-        <p:cTn id="1" dur="indefinite" restart="never" nodeType="tmRoot"/>
-      </p:par>
-    </p:tnLst>
-  </p:timing>
 </p:sld>
 </file>
 
@@ -9779,10 +9719,9 @@
           <a:lstStyle/>
           <a:p>
             <a:r>
-              <a:rPr lang="en-US" dirty="0" smtClean="0"/>
+              <a:rPr lang="en-US" dirty="0"/>
               <a:t>No Ifs, Ands, or Buts </a:t>
             </a:r>
-            <a:endParaRPr lang="en-US" dirty="0"/>
           </a:p>
         </p:txBody>
       </p:sp>
@@ -9819,7 +9758,7 @@
               <a:defRPr/>
             </a:pPr>
             <a:r>
-              <a:rPr lang="en-US" dirty="0" smtClean="0"/>
+              <a:rPr lang="en-US" dirty="0"/>
               <a:t>When describing the function fulfilled by a method, object, file, etc. you should be able to state it in a simple, declarative manner with no ifs, ands, or buts. </a:t>
             </a:r>
           </a:p>
@@ -9862,7 +9801,7 @@
               <a:defRPr/>
             </a:pPr>
             <a:r>
-              <a:rPr lang="en-US" dirty="0" smtClean="0"/>
+              <a:rPr lang="en-US" dirty="0"/>
               <a:t>If you can’t state it without an if, and, or but, then you need to split up that function/object/file/whatever it is into more than one component. </a:t>
             </a:r>
           </a:p>
@@ -9905,7 +9844,7 @@
               <a:defRPr/>
             </a:pPr>
             <a:r>
-              <a:rPr lang="en-US" dirty="0" smtClean="0"/>
+              <a:rPr lang="en-US" dirty="0"/>
               <a:t>This is a mnemonic for “everything component should do exactly one thing.” </a:t>
             </a:r>
           </a:p>
@@ -9921,13 +9860,6 @@
   <p:clrMapOvr>
     <a:masterClrMapping/>
   </p:clrMapOvr>
-  <p:timing>
-    <p:tnLst>
-      <p:par>
-        <p:cTn id="1" dur="indefinite" restart="never" nodeType="tmRoot"/>
-      </p:par>
-    </p:tnLst>
-  </p:timing>
 </p:sld>
 </file>
 
@@ -9964,10 +9896,9 @@
           <a:lstStyle/>
           <a:p>
             <a:r>
-              <a:rPr lang="en-US" dirty="0" smtClean="0"/>
+              <a:rPr lang="en-US" dirty="0"/>
               <a:t>Version Control</a:t>
             </a:r>
-            <a:endParaRPr lang="en-US" dirty="0"/>
           </a:p>
         </p:txBody>
       </p:sp>
@@ -10004,7 +9935,7 @@
               <a:defRPr/>
             </a:pPr>
             <a:r>
-              <a:rPr lang="en-US" dirty="0" smtClean="0"/>
+              <a:rPr lang="en-US" dirty="0"/>
               <a:t>Cataloging of previous copies of a software’s source code </a:t>
             </a:r>
           </a:p>
@@ -10018,15 +9949,15 @@
               </a:spcBef>
             </a:pPr>
             <a:r>
-              <a:rPr lang="en-US" dirty="0" smtClean="0"/>
+              <a:rPr lang="en-US" dirty="0"/>
               <a:t>Popular tools: GitHub, </a:t>
             </a:r>
             <a:r>
-              <a:rPr lang="en-US" dirty="0" err="1" smtClean="0"/>
+              <a:rPr lang="en-US" dirty="0" err="1"/>
               <a:t>Bitbucket</a:t>
             </a:r>
             <a:r>
-              <a:rPr lang="en-US" dirty="0" smtClean="0"/>
+              <a:rPr lang="en-US" dirty="0"/>
               <a:t> </a:t>
             </a:r>
           </a:p>
@@ -10040,15 +9971,15 @@
               </a:spcBef>
             </a:pPr>
             <a:r>
-              <a:rPr lang="en-US" dirty="0" smtClean="0"/>
+              <a:rPr lang="en-US" dirty="0"/>
               <a:t>Command line: </a:t>
             </a:r>
             <a:r>
-              <a:rPr lang="en-US" i="1" dirty="0" err="1" smtClean="0"/>
+              <a:rPr lang="en-US" i="1" dirty="0" err="1"/>
               <a:t>git</a:t>
             </a:r>
             <a:r>
-              <a:rPr lang="en-US" dirty="0" smtClean="0"/>
+              <a:rPr lang="en-US" dirty="0"/>
               <a:t> </a:t>
             </a:r>
           </a:p>
@@ -10074,7 +10005,7 @@
               </a:spcBef>
               <a:buNone/>
             </a:pPr>
-            <a:endParaRPr lang="en-US" dirty="0" smtClean="0"/>
+            <a:endParaRPr lang="en-US" dirty="0"/>
           </a:p>
           <a:p>
             <a:pPr marL="0" indent="0">
@@ -10099,23 +10030,23 @@
               <a:buNone/>
             </a:pPr>
             <a:r>
-              <a:rPr lang="en-US" dirty="0" smtClean="0"/>
+              <a:rPr lang="en-US" dirty="0"/>
               <a:t>You don’t need to use GitHub/</a:t>
             </a:r>
             <a:r>
-              <a:rPr lang="en-US" dirty="0" err="1" smtClean="0"/>
+              <a:rPr lang="en-US" dirty="0" err="1"/>
               <a:t>Bitbucket</a:t>
             </a:r>
             <a:r>
-              <a:rPr lang="en-US" dirty="0" smtClean="0"/>
+              <a:rPr lang="en-US" dirty="0"/>
               <a:t> for version control </a:t>
             </a:r>
             <a:r>
-              <a:rPr lang="mr-IN" dirty="0" smtClean="0"/>
+              <a:rPr lang="mr-IN" dirty="0"/>
               <a:t>–</a:t>
             </a:r>
             <a:r>
-              <a:rPr lang="en-US" dirty="0" smtClean="0"/>
+              <a:rPr lang="en-US" dirty="0"/>
               <a:t> you can also store your code, plots, etc. there to manage copies between multiple systems. </a:t>
             </a:r>
           </a:p>
@@ -10130,7 +10061,7 @@
               <a:buNone/>
             </a:pPr>
             <a:r>
-              <a:rPr lang="en-US" dirty="0" smtClean="0"/>
+              <a:rPr lang="en-US" dirty="0"/>
               <a:t>I also use it to share my research notes and plots with collaborators. </a:t>
             </a:r>
           </a:p>
@@ -10146,13 +10077,6 @@
   <p:clrMapOvr>
     <a:masterClrMapping/>
   </p:clrMapOvr>
-  <p:timing>
-    <p:tnLst>
-      <p:par>
-        <p:cTn id="1" dur="indefinite" restart="never" nodeType="tmRoot"/>
-      </p:par>
-    </p:tnLst>
-  </p:timing>
 </p:sld>
 </file>
 
@@ -10189,10 +10113,9 @@
           <a:lstStyle/>
           <a:p>
             <a:r>
-              <a:rPr lang="en-US" dirty="0" smtClean="0"/>
+              <a:rPr lang="en-US" dirty="0"/>
               <a:t>Minimization of Dependencies </a:t>
             </a:r>
-            <a:endParaRPr lang="en-US" dirty="0"/>
           </a:p>
         </p:txBody>
       </p:sp>
@@ -10236,35 +10159,35 @@
               <a:defRPr/>
             </a:pPr>
             <a:r>
-              <a:rPr lang="en-US" dirty="0" smtClean="0"/>
+              <a:rPr lang="en-US" dirty="0"/>
               <a:t>If the code base for your software uses another, external software (e.g. </a:t>
             </a:r>
             <a:r>
-              <a:rPr lang="en-US" dirty="0" err="1" smtClean="0"/>
+              <a:rPr lang="en-US" dirty="0" err="1"/>
               <a:t>NumPy</a:t>
             </a:r>
             <a:r>
-              <a:rPr lang="en-US" dirty="0" smtClean="0"/>
+              <a:rPr lang="en-US" dirty="0"/>
               <a:t>), that is called a </a:t>
             </a:r>
             <a:r>
-              <a:rPr lang="en-US" i="1" dirty="0" smtClean="0"/>
+              <a:rPr lang="en-US" i="1" dirty="0"/>
               <a:t>dependency</a:t>
             </a:r>
             <a:r>
-              <a:rPr lang="en-US" dirty="0" smtClean="0"/>
+              <a:rPr lang="en-US" dirty="0"/>
               <a:t> (your code </a:t>
             </a:r>
             <a:r>
-              <a:rPr lang="en-US" i="1" dirty="0" smtClean="0"/>
+              <a:rPr lang="en-US" i="1" dirty="0"/>
               <a:t>depends on </a:t>
             </a:r>
             <a:r>
-              <a:rPr lang="en-US" dirty="0" err="1" smtClean="0"/>
+              <a:rPr lang="en-US" dirty="0" err="1"/>
               <a:t>NumPy</a:t>
             </a:r>
             <a:r>
-              <a:rPr lang="en-US" dirty="0" smtClean="0"/>
+              <a:rPr lang="en-US" dirty="0"/>
               <a:t>). </a:t>
             </a:r>
           </a:p>
@@ -10307,15 +10230,15 @@
               <a:defRPr/>
             </a:pPr>
             <a:r>
-              <a:rPr lang="en-US" dirty="0" smtClean="0"/>
+              <a:rPr lang="en-US" dirty="0"/>
               <a:t>It’s quite common to have a ~few dependencies, but too many is </a:t>
             </a:r>
             <a:r>
-              <a:rPr lang="en-US" i="1" dirty="0" smtClean="0"/>
+              <a:rPr lang="en-US" i="1" dirty="0"/>
               <a:t>problematic</a:t>
             </a:r>
             <a:r>
-              <a:rPr lang="en-US" dirty="0" smtClean="0"/>
+              <a:rPr lang="en-US" dirty="0"/>
               <a:t>. </a:t>
             </a:r>
           </a:p>
@@ -10337,7 +10260,7 @@
               <a:tabLst/>
               <a:defRPr/>
             </a:pPr>
-            <a:endParaRPr lang="en-US" dirty="0" smtClean="0"/>
+            <a:endParaRPr lang="en-US" dirty="0"/>
           </a:p>
           <a:p>
             <a:pPr marL="0" marR="0" lvl="0" indent="0" defTabSz="914400" eaLnBrk="1" fontAlgn="auto" latinLnBrk="0" hangingPunct="1">
@@ -10358,7 +10281,7 @@
               <a:defRPr/>
             </a:pPr>
             <a:r>
-              <a:rPr lang="en-US" dirty="0" smtClean="0"/>
+              <a:rPr lang="en-US" dirty="0"/>
               <a:t>As of now my own python package (VICE) is ~76k lines of code. If one of its dependencies releases a new version with changes that affect my code, I have to go look at every file to ensure this doesn’t break anything. </a:t>
             </a:r>
           </a:p>
@@ -10380,7 +10303,7 @@
               <a:tabLst/>
               <a:defRPr/>
             </a:pPr>
-            <a:endParaRPr lang="en-US" dirty="0" smtClean="0"/>
+            <a:endParaRPr lang="en-US" dirty="0"/>
           </a:p>
           <a:p>
             <a:pPr marL="0" marR="0" lvl="0" indent="0" defTabSz="914400" eaLnBrk="1" fontAlgn="auto" latinLnBrk="0" hangingPunct="1">
@@ -10401,10 +10324,9 @@
               <a:defRPr/>
             </a:pPr>
             <a:r>
-              <a:rPr lang="en-US" dirty="0" smtClean="0"/>
+              <a:rPr lang="en-US" dirty="0"/>
               <a:t>Advice: Don’t be afraid to write the small but challenging stuff yourself. </a:t>
             </a:r>
-            <a:endParaRPr lang="en-US" dirty="0"/>
           </a:p>
         </p:txBody>
       </p:sp>
@@ -10418,13 +10340,6 @@
   <p:clrMapOvr>
     <a:masterClrMapping/>
   </p:clrMapOvr>
-  <p:timing>
-    <p:tnLst>
-      <p:par>
-        <p:cTn id="1" dur="indefinite" restart="never" nodeType="tmRoot"/>
-      </p:par>
-    </p:tnLst>
-  </p:timing>
 </p:sld>
 </file>
 
@@ -10461,10 +10376,9 @@
           <a:lstStyle/>
           <a:p>
             <a:r>
-              <a:rPr lang="en-US" dirty="0" smtClean="0"/>
+              <a:rPr lang="en-US" dirty="0"/>
               <a:t>Testing</a:t>
             </a:r>
-            <a:endParaRPr lang="en-US" dirty="0"/>
           </a:p>
         </p:txBody>
       </p:sp>
@@ -10506,18 +10420,17 @@
               <a:defRPr/>
             </a:pPr>
             <a:r>
-              <a:rPr lang="en-US" dirty="0" smtClean="0"/>
+              <a:rPr lang="en-US" dirty="0"/>
               <a:t>Well-written software implements </a:t>
             </a:r>
             <a:r>
-              <a:rPr lang="en-US" i="1" dirty="0" smtClean="0"/>
+              <a:rPr lang="en-US" i="1" dirty="0"/>
               <a:t>unit tests</a:t>
             </a:r>
             <a:r>
-              <a:rPr lang="en-US" dirty="0" smtClean="0"/>
+              <a:rPr lang="en-US" dirty="0"/>
               <a:t> </a:t>
             </a:r>
-            <a:endParaRPr lang="en-US" dirty="0"/>
           </a:p>
           <a:p>
             <a:pPr lvl="1">
@@ -10529,15 +10442,15 @@
               </a:spcBef>
             </a:pPr>
             <a:r>
-              <a:rPr lang="en-US" dirty="0" smtClean="0"/>
+              <a:rPr lang="en-US" dirty="0"/>
               <a:t>A means of assigning </a:t>
             </a:r>
             <a:r>
-              <a:rPr lang="en-US" i="1" dirty="0" smtClean="0"/>
+              <a:rPr lang="en-US" i="1" dirty="0"/>
               <a:t>Success/Failure/Skipped</a:t>
             </a:r>
             <a:r>
-              <a:rPr lang="en-US" dirty="0" smtClean="0"/>
+              <a:rPr lang="en-US" dirty="0"/>
               <a:t> messages to the smallest possible components of a code base </a:t>
             </a:r>
           </a:p>
@@ -10564,7 +10477,7 @@
               <a:buNone/>
             </a:pPr>
             <a:r>
-              <a:rPr lang="en-US" dirty="0" smtClean="0"/>
+              <a:rPr lang="en-US" dirty="0"/>
               <a:t>When you make a future change to your code base, this gives you an automated means of finding out if your change broke anything you weren’t expecting to break. </a:t>
             </a:r>
           </a:p>
@@ -10591,15 +10504,15 @@
               <a:buNone/>
             </a:pPr>
             <a:r>
-              <a:rPr lang="en-US" dirty="0" smtClean="0"/>
+              <a:rPr lang="en-US" dirty="0"/>
               <a:t>This is as simple as </a:t>
             </a:r>
             <a:r>
-              <a:rPr lang="en-US" i="1" dirty="0" smtClean="0"/>
+              <a:rPr lang="en-US" i="1" dirty="0"/>
               <a:t>actually saving</a:t>
             </a:r>
             <a:r>
-              <a:rPr lang="en-US" dirty="0" smtClean="0"/>
+              <a:rPr lang="en-US" dirty="0"/>
               <a:t> the code you write to test a new component of your software, and the same for when you resolve an issue. </a:t>
             </a:r>
           </a:p>
@@ -10615,13 +10528,6 @@
   <p:clrMapOvr>
     <a:masterClrMapping/>
   </p:clrMapOvr>
-  <p:timing>
-    <p:tnLst>
-      <p:par>
-        <p:cTn id="1" dur="indefinite" restart="never" nodeType="tmRoot"/>
-      </p:par>
-    </p:tnLst>
-  </p:timing>
 </p:sld>
 </file>
 
@@ -10658,19 +10564,19 @@
           <a:lstStyle/>
           <a:p>
             <a:r>
-              <a:rPr lang="en-US" i="1" dirty="0" smtClean="0"/>
+              <a:rPr lang="en-US" i="1" dirty="0"/>
               <a:t>Think</a:t>
             </a:r>
             <a:r>
-              <a:rPr lang="en-US" dirty="0" smtClean="0"/>
+              <a:rPr lang="en-US" dirty="0"/>
               <a:t> Before You </a:t>
             </a:r>
             <a:r>
-              <a:rPr lang="en-US" i="1" dirty="0" smtClean="0"/>
+              <a:rPr lang="en-US" i="1" dirty="0"/>
               <a:t>Write</a:t>
             </a:r>
             <a:r>
-              <a:rPr lang="en-US" dirty="0" smtClean="0"/>
+              <a:rPr lang="en-US" dirty="0"/>
               <a:t> </a:t>
             </a:r>
             <a:endParaRPr lang="en-US" i="1" dirty="0"/>
@@ -10717,7 +10623,7 @@
               <a:defRPr/>
             </a:pPr>
             <a:r>
-              <a:rPr lang="en-US" dirty="0" smtClean="0"/>
+              <a:rPr lang="en-US" dirty="0"/>
               <a:t>Many scientists just start writing functions when posed with a problem </a:t>
             </a:r>
           </a:p>
@@ -10731,10 +10637,9 @@
               </a:spcBef>
             </a:pPr>
             <a:r>
-              <a:rPr lang="en-US" dirty="0" smtClean="0"/>
+              <a:rPr lang="en-US" dirty="0"/>
               <a:t>This has its place and its usefulness within research </a:t>
             </a:r>
-            <a:endParaRPr lang="en-US" dirty="0"/>
           </a:p>
           <a:p>
             <a:pPr lvl="1">
@@ -10746,10 +10651,9 @@
               </a:spcBef>
             </a:pPr>
             <a:r>
-              <a:rPr lang="en-US" dirty="0" smtClean="0"/>
+              <a:rPr lang="en-US" dirty="0"/>
               <a:t>If you’re going to use some function &gt;few times, I advise more thought </a:t>
             </a:r>
-            <a:endParaRPr lang="en-US" dirty="0"/>
           </a:p>
           <a:p>
             <a:pPr marL="0" indent="0">
@@ -10761,7 +10665,7 @@
               </a:spcBef>
               <a:buNone/>
             </a:pPr>
-            <a:endParaRPr lang="en-US" dirty="0" smtClean="0"/>
+            <a:endParaRPr lang="en-US" dirty="0"/>
           </a:p>
           <a:p>
             <a:pPr marL="0" indent="0">
@@ -10774,18 +10678,14 @@
               <a:buNone/>
             </a:pPr>
             <a:r>
-              <a:rPr lang="en-US" dirty="0" smtClean="0"/>
+              <a:rPr lang="en-US" dirty="0"/>
               <a:t>If you’re going to be spending even as much as five minutes writing a given file, stop and ask yourself: </a:t>
             </a:r>
             <a:r>
               <a:rPr lang="en-US" i="1" dirty="0"/>
-              <a:t>W</a:t>
-            </a:r>
-            <a:r>
-              <a:rPr lang="en-US" i="1" dirty="0" smtClean="0"/>
-              <a:t>hat objects might be useful? What functions might be useful? </a:t>
-            </a:r>
-            <a:endParaRPr lang="en-US" dirty="0" smtClean="0"/>
+              <a:t>What objects might be useful? What functions might be useful? </a:t>
+            </a:r>
+            <a:endParaRPr lang="en-US" dirty="0"/>
           </a:p>
           <a:p>
             <a:pPr marL="0" indent="0">
@@ -10810,18 +10710,18 @@
               <a:buNone/>
             </a:pPr>
             <a:r>
-              <a:rPr lang="en-US" dirty="0" smtClean="0"/>
+              <a:rPr lang="en-US" dirty="0"/>
               <a:t>There are many ways to write the same program, so don’t always settle for the first idea that comes into your head. </a:t>
             </a:r>
             <a:r>
-              <a:rPr lang="en-US" i="1" dirty="0" smtClean="0"/>
+              <a:rPr lang="en-US" i="1" dirty="0"/>
               <a:t>You can usually improve upon the first thing that comes to mind</a:t>
             </a:r>
             <a:r>
-              <a:rPr lang="en-US" dirty="0" smtClean="0"/>
+              <a:rPr lang="en-US" dirty="0"/>
               <a:t>. </a:t>
             </a:r>
-            <a:endParaRPr lang="en-US" i="1" dirty="0" smtClean="0"/>
+            <a:endParaRPr lang="en-US" i="1" dirty="0"/>
           </a:p>
         </p:txBody>
       </p:sp>
@@ -10835,13 +10735,6 @@
   <p:clrMapOvr>
     <a:masterClrMapping/>
   </p:clrMapOvr>
-  <p:timing>
-    <p:tnLst>
-      <p:par>
-        <p:cTn id="1" dur="indefinite" restart="never" nodeType="tmRoot"/>
-      </p:par>
-    </p:tnLst>
-  </p:timing>
 </p:sld>
 </file>
 
@@ -10878,19 +10771,19 @@
           <a:lstStyle/>
           <a:p>
             <a:r>
-              <a:rPr lang="en-US" i="1" dirty="0" smtClean="0"/>
+              <a:rPr lang="en-US" i="1" dirty="0"/>
               <a:t>Think</a:t>
             </a:r>
             <a:r>
-              <a:rPr lang="en-US" dirty="0" smtClean="0"/>
+              <a:rPr lang="en-US" dirty="0"/>
               <a:t> Before You </a:t>
             </a:r>
             <a:r>
-              <a:rPr lang="en-US" i="1" dirty="0" smtClean="0"/>
+              <a:rPr lang="en-US" i="1" dirty="0"/>
               <a:t>Write</a:t>
             </a:r>
             <a:r>
-              <a:rPr lang="en-US" dirty="0" smtClean="0"/>
+              <a:rPr lang="en-US" dirty="0"/>
               <a:t> </a:t>
             </a:r>
             <a:endParaRPr lang="en-US" i="1" dirty="0"/>
@@ -10934,7 +10827,7 @@
               <a:tabLst/>
               <a:defRPr/>
             </a:pPr>
-            <a:endParaRPr lang="en-US" dirty="0" smtClean="0"/>
+            <a:endParaRPr lang="en-US" dirty="0"/>
           </a:p>
           <a:p>
             <a:pPr marL="0" marR="0" lvl="0" indent="0" defTabSz="914400" eaLnBrk="1" fontAlgn="auto" latinLnBrk="0" hangingPunct="1">
@@ -10974,7 +10867,7 @@
               <a:tabLst/>
               <a:defRPr/>
             </a:pPr>
-            <a:endParaRPr lang="en-US" dirty="0" smtClean="0"/>
+            <a:endParaRPr lang="en-US" dirty="0"/>
           </a:p>
           <a:p>
             <a:pPr marL="0" marR="0" lvl="0" indent="0" defTabSz="914400" eaLnBrk="1" fontAlgn="auto" latinLnBrk="0" hangingPunct="1">
@@ -10994,7 +10887,7 @@
               <a:tabLst/>
               <a:defRPr/>
             </a:pPr>
-            <a:endParaRPr lang="en-US" dirty="0" smtClean="0"/>
+            <a:endParaRPr lang="en-US" dirty="0"/>
           </a:p>
           <a:p>
             <a:pPr marL="0" marR="0" lvl="0" indent="0" defTabSz="914400" eaLnBrk="1" fontAlgn="auto" latinLnBrk="0" hangingPunct="1">
@@ -11015,16 +10908,8 @@
               <a:defRPr/>
             </a:pPr>
             <a:r>
-              <a:rPr lang="en-US" dirty="0" smtClean="0"/>
-              <a:t>This is </a:t>
-            </a:r>
-            <a:r>
-              <a:rPr lang="en-US" dirty="0" smtClean="0"/>
-              <a:t>how </a:t>
-            </a:r>
-            <a:r>
-              <a:rPr lang="en-US" dirty="0" smtClean="0"/>
-              <a:t>professional developers and software engineers view scientist-written code </a:t>
+              <a:rPr lang="en-US" dirty="0"/>
+              <a:t>This is how professional developers and software engineers view scientist-written code </a:t>
             </a:r>
           </a:p>
         </p:txBody>
@@ -11069,13 +10954,6 @@
   <p:clrMapOvr>
     <a:masterClrMapping/>
   </p:clrMapOvr>
-  <p:timing>
-    <p:tnLst>
-      <p:par>
-        <p:cTn id="1" dur="indefinite" restart="never" nodeType="tmRoot"/>
-      </p:par>
-    </p:tnLst>
-  </p:timing>
 </p:sld>
 </file>
 

</xml_diff>

<commit_message>
slides: minor slide updates for session 4
</commit_message>
<xml_diff>
--- a/slides/basicSE.pptx
+++ b/slides/basicSE.pptx
@@ -207,7 +207,7 @@
           <a:p>
             <a:fld id="{A58EF676-DA74-5E46-A6CE-5ED3069388CC}" type="datetimeFigureOut">
               <a:rPr lang="en-US" smtClean="0"/>
-              <a:t>5/7/21</a:t>
+              <a:t>5/14/21</a:t>
             </a:fld>
             <a:endParaRPr lang="en-US"/>
           </a:p>
@@ -1418,7 +1418,7 @@
           <a:p>
             <a:fld id="{51673806-0BCD-1F42-BAA8-2011034B3C6A}" type="datetimeFigureOut">
               <a:rPr lang="en-US" smtClean="0"/>
-              <a:t>5/7/21</a:t>
+              <a:t>5/14/21</a:t>
             </a:fld>
             <a:endParaRPr lang="en-US"/>
           </a:p>
@@ -1832,7 +1832,7 @@
           <a:p>
             <a:fld id="{51673806-0BCD-1F42-BAA8-2011034B3C6A}" type="datetimeFigureOut">
               <a:rPr lang="en-US" smtClean="0"/>
-              <a:t>5/7/21</a:t>
+              <a:t>5/14/21</a:t>
             </a:fld>
             <a:endParaRPr lang="en-US"/>
           </a:p>
@@ -2163,7 +2163,7 @@
           <a:p>
             <a:fld id="{51673806-0BCD-1F42-BAA8-2011034B3C6A}" type="datetimeFigureOut">
               <a:rPr lang="en-US" smtClean="0"/>
-              <a:t>5/7/21</a:t>
+              <a:t>5/14/21</a:t>
             </a:fld>
             <a:endParaRPr lang="en-US"/>
           </a:p>
@@ -2563,7 +2563,7 @@
           <a:p>
             <a:fld id="{51673806-0BCD-1F42-BAA8-2011034B3C6A}" type="datetimeFigureOut">
               <a:rPr lang="en-US" smtClean="0"/>
-              <a:t>5/7/21</a:t>
+              <a:t>5/14/21</a:t>
             </a:fld>
             <a:endParaRPr lang="en-US"/>
           </a:p>
@@ -3126,7 +3126,7 @@
           <a:p>
             <a:fld id="{51673806-0BCD-1F42-BAA8-2011034B3C6A}" type="datetimeFigureOut">
               <a:rPr lang="en-US" smtClean="0"/>
-              <a:t>5/7/21</a:t>
+              <a:t>5/14/21</a:t>
             </a:fld>
             <a:endParaRPr lang="en-US"/>
           </a:p>
@@ -3802,7 +3802,7 @@
           <a:p>
             <a:fld id="{51673806-0BCD-1F42-BAA8-2011034B3C6A}" type="datetimeFigureOut">
               <a:rPr lang="en-US" smtClean="0"/>
-              <a:t>5/7/21</a:t>
+              <a:t>5/14/21</a:t>
             </a:fld>
             <a:endParaRPr lang="en-US"/>
           </a:p>
@@ -4710,7 +4710,7 @@
           <a:p>
             <a:fld id="{51673806-0BCD-1F42-BAA8-2011034B3C6A}" type="datetimeFigureOut">
               <a:rPr lang="en-US" smtClean="0"/>
-              <a:t>5/7/21</a:t>
+              <a:t>5/14/21</a:t>
             </a:fld>
             <a:endParaRPr lang="en-US"/>
           </a:p>
@@ -5018,7 +5018,7 @@
           <a:p>
             <a:fld id="{51673806-0BCD-1F42-BAA8-2011034B3C6A}" type="datetimeFigureOut">
               <a:rPr lang="en-US" smtClean="0"/>
-              <a:t>5/7/21</a:t>
+              <a:t>5/14/21</a:t>
             </a:fld>
             <a:endParaRPr lang="en-US"/>
           </a:p>
@@ -5277,7 +5277,7 @@
           <a:p>
             <a:fld id="{51673806-0BCD-1F42-BAA8-2011034B3C6A}" type="datetimeFigureOut">
               <a:rPr lang="en-US" smtClean="0"/>
-              <a:t>5/7/21</a:t>
+              <a:t>5/14/21</a:t>
             </a:fld>
             <a:endParaRPr lang="en-US"/>
           </a:p>
@@ -5600,7 +5600,7 @@
           <a:p>
             <a:fld id="{51673806-0BCD-1F42-BAA8-2011034B3C6A}" type="datetimeFigureOut">
               <a:rPr lang="en-US" smtClean="0"/>
-              <a:t>5/7/21</a:t>
+              <a:t>5/14/21</a:t>
             </a:fld>
             <a:endParaRPr lang="en-US"/>
           </a:p>
@@ -5984,7 +5984,7 @@
           <a:p>
             <a:fld id="{51673806-0BCD-1F42-BAA8-2011034B3C6A}" type="datetimeFigureOut">
               <a:rPr lang="en-US" smtClean="0"/>
-              <a:t>5/7/21</a:t>
+              <a:t>5/14/21</a:t>
             </a:fld>
             <a:endParaRPr lang="en-US"/>
           </a:p>
@@ -6360,7 +6360,7 @@
           <a:p>
             <a:fld id="{51673806-0BCD-1F42-BAA8-2011034B3C6A}" type="datetimeFigureOut">
               <a:rPr lang="en-US" smtClean="0"/>
-              <a:t>5/7/21</a:t>
+              <a:t>5/14/21</a:t>
             </a:fld>
             <a:endParaRPr lang="en-US"/>
           </a:p>
@@ -6866,7 +6866,7 @@
           <a:p>
             <a:fld id="{51673806-0BCD-1F42-BAA8-2011034B3C6A}" type="datetimeFigureOut">
               <a:rPr lang="en-US" smtClean="0"/>
-              <a:t>5/7/21</a:t>
+              <a:t>5/14/21</a:t>
             </a:fld>
             <a:endParaRPr lang="en-US"/>
           </a:p>
@@ -7123,7 +7123,7 @@
           <a:p>
             <a:fld id="{51673806-0BCD-1F42-BAA8-2011034B3C6A}" type="datetimeFigureOut">
               <a:rPr lang="en-US" smtClean="0"/>
-              <a:t>5/7/21</a:t>
+              <a:t>5/14/21</a:t>
             </a:fld>
             <a:endParaRPr lang="en-US"/>
           </a:p>
@@ -7281,7 +7281,7 @@
           <a:p>
             <a:fld id="{51673806-0BCD-1F42-BAA8-2011034B3C6A}" type="datetimeFigureOut">
               <a:rPr lang="en-US" smtClean="0"/>
-              <a:t>5/7/21</a:t>
+              <a:t>5/14/21</a:t>
             </a:fld>
             <a:endParaRPr lang="en-US"/>
           </a:p>
@@ -7671,7 +7671,7 @@
           <a:p>
             <a:fld id="{51673806-0BCD-1F42-BAA8-2011034B3C6A}" type="datetimeFigureOut">
               <a:rPr lang="en-US" smtClean="0"/>
-              <a:t>5/7/21</a:t>
+              <a:t>5/14/21</a:t>
             </a:fld>
             <a:endParaRPr lang="en-US"/>
           </a:p>
@@ -8080,7 +8080,7 @@
           <a:p>
             <a:fld id="{51673806-0BCD-1F42-BAA8-2011034B3C6A}" type="datetimeFigureOut">
               <a:rPr lang="en-US" smtClean="0"/>
-              <a:t>5/7/21</a:t>
+              <a:t>5/14/21</a:t>
             </a:fld>
             <a:endParaRPr lang="en-US"/>
           </a:p>
@@ -8326,7 +8326,7 @@
             <a:fld id="{51673806-0BCD-1F42-BAA8-2011034B3C6A}" type="datetimeFigureOut">
               <a:rPr lang="en-US" smtClean="0"/>
               <a:pPr/>
-              <a:t>5/7/21</a:t>
+              <a:t>5/14/21</a:t>
             </a:fld>
             <a:endParaRPr lang="en-US" dirty="0"/>
           </a:p>
@@ -9645,22 +9645,7 @@
             </a:r>
             <a:r>
               <a:rPr lang="en-US" dirty="0"/>
-              <a:t> that is, if each component of your software is implemented independently of the other components. In this case DRY applies within the </a:t>
-            </a:r>
-          </a:p>
-          <a:p>
-            <a:pPr marL="0" indent="0">
-              <a:lnSpc>
-                <a:spcPct val="100000"/>
-              </a:lnSpc>
-              <a:spcBef>
-                <a:spcPts val="0"/>
-              </a:spcBef>
-              <a:buNone/>
-            </a:pPr>
-            <a:r>
-              <a:rPr lang="en-US" dirty="0"/>
-              <a:t>Individual </a:t>
+              <a:t> that is, if each component of your software is implemented independently of the other components. In this case DRY applies within the individual </a:t>
             </a:r>
             <a:r>
               <a:rPr lang="en-US" i="1" dirty="0"/>

</xml_diff>

<commit_message>
slides: minor edits to final session slides
</commit_message>
<xml_diff>
--- a/slides/basicSE.pptx
+++ b/slides/basicSE.pptx
@@ -207,7 +207,7 @@
           <a:p>
             <a:fld id="{A58EF676-DA74-5E46-A6CE-5ED3069388CC}" type="datetimeFigureOut">
               <a:rPr lang="en-US" smtClean="0"/>
-              <a:t>5/14/21</a:t>
+              <a:t>5/21/21</a:t>
             </a:fld>
             <a:endParaRPr lang="en-US"/>
           </a:p>
@@ -796,13 +796,16 @@
           <a:p>
             <a:r>
               <a:rPr lang="en-US" dirty="0"/>
-              <a:t>This applies</a:t>
-            </a:r>
-            <a:r>
-              <a:rPr lang="en-US" baseline="0" dirty="0"/>
-              <a:t> much more to people releasing code publicly, but can be a source of errors if you share code with close colleagues too. </a:t>
-            </a:r>
-            <a:endParaRPr lang="en-US" dirty="0"/>
+              <a:t>Address files and codes with the names “v2”/”v3”/”v4” </a:t>
+            </a:r>
+            <a:r>
+              <a:rPr lang="en-US" dirty="0" err="1"/>
+              <a:t>etc</a:t>
+            </a:r>
+            <a:r>
+              <a:rPr lang="en-US" dirty="0"/>
+              <a:t> appended on the end of their names. When you see codes with names like that, it’s like a giant banner broadcasting that whoever wrote it has no knowledge of version control. </a:t>
+            </a:r>
           </a:p>
         </p:txBody>
       </p:sp>
@@ -813,7 +816,7 @@
             <a:spLocks noGrp="1"/>
           </p:cNvSpPr>
           <p:nvPr>
-            <p:ph type="sldNum" sz="quarter" idx="10"/>
+            <p:ph type="sldNum" sz="quarter" idx="5"/>
           </p:nvPr>
         </p:nvSpPr>
         <p:spPr/>
@@ -823,7 +826,7 @@
           <a:p>
             <a:fld id="{4FBF28C1-3B45-464E-B5E4-80D7800AB463}" type="slidenum">
               <a:rPr lang="en-US" smtClean="0"/>
-              <a:t>6</a:t>
+              <a:t>5</a:t>
             </a:fld>
             <a:endParaRPr lang="en-US"/>
           </a:p>
@@ -832,7 +835,7 @@
     </p:spTree>
     <p:extLst>
       <p:ext uri="{BB962C8B-B14F-4D97-AF65-F5344CB8AC3E}">
-        <p14:creationId xmlns:p14="http://schemas.microsoft.com/office/powerpoint/2010/main" val="903635624"/>
+        <p14:creationId xmlns:p14="http://schemas.microsoft.com/office/powerpoint/2010/main" val="2197687947"/>
       </p:ext>
     </p:extLst>
   </p:cSld>
@@ -888,19 +891,11 @@
           <a:p>
             <a:r>
               <a:rPr lang="en-US" dirty="0"/>
-              <a:t>Professional</a:t>
+              <a:t>This applies</a:t>
             </a:r>
             <a:r>
               <a:rPr lang="en-US" baseline="0" dirty="0"/>
-              <a:t> software engineers don’t start in the text editor/IDE </a:t>
-            </a:r>
-            <a:r>
-              <a:rPr lang="mr-IN" baseline="0" dirty="0"/>
-              <a:t>–</a:t>
-            </a:r>
-            <a:r>
-              <a:rPr lang="en-US" baseline="0" dirty="0"/>
-              <a:t> they know how they’re going to solve the problem and test their implementation before they even write a single line. </a:t>
+              <a:t> much more to people releasing code publicly, but can be a source of errors if you share code with close colleagues too. </a:t>
             </a:r>
             <a:endParaRPr lang="en-US" dirty="0"/>
           </a:p>
@@ -923,7 +918,7 @@
           <a:p>
             <a:fld id="{4FBF28C1-3B45-464E-B5E4-80D7800AB463}" type="slidenum">
               <a:rPr lang="en-US" smtClean="0"/>
-              <a:t>8</a:t>
+              <a:t>6</a:t>
             </a:fld>
             <a:endParaRPr lang="en-US"/>
           </a:p>
@@ -932,7 +927,7 @@
     </p:spTree>
     <p:extLst>
       <p:ext uri="{BB962C8B-B14F-4D97-AF65-F5344CB8AC3E}">
-        <p14:creationId xmlns:p14="http://schemas.microsoft.com/office/powerpoint/2010/main" val="348344692"/>
+        <p14:creationId xmlns:p14="http://schemas.microsoft.com/office/powerpoint/2010/main" val="903635624"/>
       </p:ext>
     </p:extLst>
   </p:cSld>
@@ -988,19 +983,15 @@
           <a:p>
             <a:r>
               <a:rPr lang="en-US" dirty="0"/>
-              <a:t>Professional</a:t>
-            </a:r>
-            <a:r>
-              <a:rPr lang="en-US" baseline="0" dirty="0"/>
-              <a:t> software engineers don’t start in the text editor/IDE </a:t>
-            </a:r>
-            <a:r>
-              <a:rPr lang="mr-IN" baseline="0" dirty="0"/>
-              <a:t>–</a:t>
-            </a:r>
-            <a:r>
-              <a:rPr lang="en-US" baseline="0" dirty="0"/>
-              <a:t> they know how they’re going to solve the problem and test their implementation before they even write a single line. </a:t>
+              <a:t>If you’re going to release code publicly, unit tests should be viewed as a </a:t>
+            </a:r>
+            <a:r>
+              <a:rPr lang="en-US" i="1" dirty="0"/>
+              <a:t>requirement</a:t>
+            </a:r>
+            <a:r>
+              <a:rPr lang="en-US" i="0" dirty="0"/>
+              <a:t>, although no one enforces this. </a:t>
             </a:r>
             <a:endParaRPr lang="en-US" dirty="0"/>
           </a:p>
@@ -1013,7 +1004,7 @@
             <a:spLocks noGrp="1"/>
           </p:cNvSpPr>
           <p:nvPr>
-            <p:ph type="sldNum" sz="quarter" idx="10"/>
+            <p:ph type="sldNum" sz="quarter" idx="5"/>
           </p:nvPr>
         </p:nvSpPr>
         <p:spPr/>
@@ -1023,7 +1014,7 @@
           <a:p>
             <a:fld id="{4FBF28C1-3B45-464E-B5E4-80D7800AB463}" type="slidenum">
               <a:rPr lang="en-US" smtClean="0"/>
-              <a:t>9</a:t>
+              <a:t>7</a:t>
             </a:fld>
             <a:endParaRPr lang="en-US"/>
           </a:p>
@@ -1032,7 +1023,7 @@
     </p:spTree>
     <p:extLst>
       <p:ext uri="{BB962C8B-B14F-4D97-AF65-F5344CB8AC3E}">
-        <p14:creationId xmlns:p14="http://schemas.microsoft.com/office/powerpoint/2010/main" val="2118647226"/>
+        <p14:creationId xmlns:p14="http://schemas.microsoft.com/office/powerpoint/2010/main" val="197205030"/>
       </p:ext>
     </p:extLst>
   </p:cSld>
@@ -1088,19 +1079,235 @@
           <a:p>
             <a:r>
               <a:rPr lang="en-US" dirty="0"/>
-              <a:t>If you don’t know about </a:t>
-            </a:r>
-            <a:r>
-              <a:rPr lang="en-US"/>
-              <a:t>their</a:t>
-            </a:r>
-            <a:r>
-              <a:rPr lang="en-US" baseline="0"/>
-              <a:t> coding </a:t>
+              <a:t>Professional</a:t>
             </a:r>
             <a:r>
               <a:rPr lang="en-US" baseline="0" dirty="0"/>
-              <a:t>background, you should always take code advice from a research scientist with a grain of salt. </a:t>
+              <a:t> software engineers don’t start in the text editor/IDE </a:t>
+            </a:r>
+            <a:r>
+              <a:rPr lang="mr-IN" baseline="0" dirty="0"/>
+              <a:t>–</a:t>
+            </a:r>
+            <a:r>
+              <a:rPr lang="en-US" baseline="0" dirty="0"/>
+              <a:t> they know how they’re going to solve the problem and test their implementation before they even write a single line. </a:t>
+            </a:r>
+            <a:endParaRPr lang="en-US" dirty="0"/>
+          </a:p>
+        </p:txBody>
+      </p:sp>
+      <p:sp>
+        <p:nvSpPr>
+          <p:cNvPr id="4" name="Slide Number Placeholder 3"/>
+          <p:cNvSpPr>
+            <a:spLocks noGrp="1"/>
+          </p:cNvSpPr>
+          <p:nvPr>
+            <p:ph type="sldNum" sz="quarter" idx="10"/>
+          </p:nvPr>
+        </p:nvSpPr>
+        <p:spPr/>
+        <p:txBody>
+          <a:bodyPr/>
+          <a:lstStyle/>
+          <a:p>
+            <a:fld id="{4FBF28C1-3B45-464E-B5E4-80D7800AB463}" type="slidenum">
+              <a:rPr lang="en-US" smtClean="0"/>
+              <a:t>8</a:t>
+            </a:fld>
+            <a:endParaRPr lang="en-US"/>
+          </a:p>
+        </p:txBody>
+      </p:sp>
+    </p:spTree>
+    <p:extLst>
+      <p:ext uri="{BB962C8B-B14F-4D97-AF65-F5344CB8AC3E}">
+        <p14:creationId xmlns:p14="http://schemas.microsoft.com/office/powerpoint/2010/main" val="348344692"/>
+      </p:ext>
+    </p:extLst>
+  </p:cSld>
+  <p:clrMapOvr>
+    <a:masterClrMapping/>
+  </p:clrMapOvr>
+</p:notes>
+</file>
+
+<file path=ppt/notesSlides/notesSlide8.xml><?xml version="1.0" encoding="utf-8"?>
+<p:notes xmlns:a="http://schemas.openxmlformats.org/drawingml/2006/main" xmlns:r="http://schemas.openxmlformats.org/officeDocument/2006/relationships" xmlns:p="http://schemas.openxmlformats.org/presentationml/2006/main">
+  <p:cSld>
+    <p:spTree>
+      <p:nvGrpSpPr>
+        <p:cNvPr id="1" name=""/>
+        <p:cNvGrpSpPr/>
+        <p:nvPr/>
+      </p:nvGrpSpPr>
+      <p:grpSpPr>
+        <a:xfrm>
+          <a:off x="0" y="0"/>
+          <a:ext cx="0" cy="0"/>
+          <a:chOff x="0" y="0"/>
+          <a:chExt cx="0" cy="0"/>
+        </a:xfrm>
+      </p:grpSpPr>
+      <p:sp>
+        <p:nvSpPr>
+          <p:cNvPr id="2" name="Slide Image Placeholder 1"/>
+          <p:cNvSpPr>
+            <a:spLocks noGrp="1" noRot="1" noChangeAspect="1"/>
+          </p:cNvSpPr>
+          <p:nvPr>
+            <p:ph type="sldImg"/>
+          </p:nvPr>
+        </p:nvSpPr>
+        <p:spPr/>
+      </p:sp>
+      <p:sp>
+        <p:nvSpPr>
+          <p:cNvPr id="3" name="Notes Placeholder 2"/>
+          <p:cNvSpPr>
+            <a:spLocks noGrp="1"/>
+          </p:cNvSpPr>
+          <p:nvPr>
+            <p:ph type="body" idx="1"/>
+          </p:nvPr>
+        </p:nvSpPr>
+        <p:spPr/>
+        <p:txBody>
+          <a:bodyPr/>
+          <a:lstStyle/>
+          <a:p>
+            <a:r>
+              <a:rPr lang="en-US" dirty="0"/>
+              <a:t>Professional</a:t>
+            </a:r>
+            <a:r>
+              <a:rPr lang="en-US" baseline="0" dirty="0"/>
+              <a:t> software engineers don’t start in the text editor/IDE </a:t>
+            </a:r>
+            <a:r>
+              <a:rPr lang="mr-IN" baseline="0" dirty="0"/>
+              <a:t>–</a:t>
+            </a:r>
+            <a:r>
+              <a:rPr lang="en-US" baseline="0" dirty="0"/>
+              <a:t> they know how they’re going to solve the problem and test their implementation before they even write a single line. </a:t>
+            </a:r>
+            <a:endParaRPr lang="en-US" dirty="0"/>
+          </a:p>
+        </p:txBody>
+      </p:sp>
+      <p:sp>
+        <p:nvSpPr>
+          <p:cNvPr id="4" name="Slide Number Placeholder 3"/>
+          <p:cNvSpPr>
+            <a:spLocks noGrp="1"/>
+          </p:cNvSpPr>
+          <p:nvPr>
+            <p:ph type="sldNum" sz="quarter" idx="10"/>
+          </p:nvPr>
+        </p:nvSpPr>
+        <p:spPr/>
+        <p:txBody>
+          <a:bodyPr/>
+          <a:lstStyle/>
+          <a:p>
+            <a:fld id="{4FBF28C1-3B45-464E-B5E4-80D7800AB463}" type="slidenum">
+              <a:rPr lang="en-US" smtClean="0"/>
+              <a:t>9</a:t>
+            </a:fld>
+            <a:endParaRPr lang="en-US"/>
+          </a:p>
+        </p:txBody>
+      </p:sp>
+    </p:spTree>
+    <p:extLst>
+      <p:ext uri="{BB962C8B-B14F-4D97-AF65-F5344CB8AC3E}">
+        <p14:creationId xmlns:p14="http://schemas.microsoft.com/office/powerpoint/2010/main" val="2118647226"/>
+      </p:ext>
+    </p:extLst>
+  </p:cSld>
+  <p:clrMapOvr>
+    <a:masterClrMapping/>
+  </p:clrMapOvr>
+</p:notes>
+</file>
+
+<file path=ppt/notesSlides/notesSlide9.xml><?xml version="1.0" encoding="utf-8"?>
+<p:notes xmlns:a="http://schemas.openxmlformats.org/drawingml/2006/main" xmlns:r="http://schemas.openxmlformats.org/officeDocument/2006/relationships" xmlns:p="http://schemas.openxmlformats.org/presentationml/2006/main">
+  <p:cSld>
+    <p:spTree>
+      <p:nvGrpSpPr>
+        <p:cNvPr id="1" name=""/>
+        <p:cNvGrpSpPr/>
+        <p:nvPr/>
+      </p:nvGrpSpPr>
+      <p:grpSpPr>
+        <a:xfrm>
+          <a:off x="0" y="0"/>
+          <a:ext cx="0" cy="0"/>
+          <a:chOff x="0" y="0"/>
+          <a:chExt cx="0" cy="0"/>
+        </a:xfrm>
+      </p:grpSpPr>
+      <p:sp>
+        <p:nvSpPr>
+          <p:cNvPr id="2" name="Slide Image Placeholder 1"/>
+          <p:cNvSpPr>
+            <a:spLocks noGrp="1" noRot="1" noChangeAspect="1"/>
+          </p:cNvSpPr>
+          <p:nvPr>
+            <p:ph type="sldImg"/>
+          </p:nvPr>
+        </p:nvSpPr>
+        <p:spPr/>
+      </p:sp>
+      <p:sp>
+        <p:nvSpPr>
+          <p:cNvPr id="3" name="Notes Placeholder 2"/>
+          <p:cNvSpPr>
+            <a:spLocks noGrp="1"/>
+          </p:cNvSpPr>
+          <p:nvPr>
+            <p:ph type="body" idx="1"/>
+          </p:nvPr>
+        </p:nvSpPr>
+        <p:spPr/>
+        <p:txBody>
+          <a:bodyPr/>
+          <a:lstStyle/>
+          <a:p>
+            <a:r>
+              <a:rPr lang="en-US" dirty="0"/>
+              <a:t>If you don’t know about their</a:t>
+            </a:r>
+            <a:r>
+              <a:rPr lang="en-US" baseline="0" dirty="0"/>
+              <a:t> coding background, you should always take code advice from a research scientist with a grain of salt. Being early career researchers, most of the participants of this </a:t>
+            </a:r>
+            <a:r>
+              <a:rPr lang="en-US" baseline="0" dirty="0" err="1"/>
+              <a:t>bootcamp</a:t>
+            </a:r>
+            <a:r>
+              <a:rPr lang="en-US" baseline="0" dirty="0"/>
+              <a:t> are in the perfect position to make the decision about what kind of code they’re going to write </a:t>
+            </a:r>
+            <a:r>
+              <a:rPr lang="en-US" i="1" baseline="0" dirty="0"/>
+              <a:t>now</a:t>
+            </a:r>
+            <a:r>
+              <a:rPr lang="en-US" i="0" baseline="0" dirty="0"/>
+              <a:t>, but if they choose to be the one who writes good clean code, that’s a decision they have to </a:t>
+            </a:r>
+            <a:r>
+              <a:rPr lang="en-US" i="1" baseline="0" dirty="0"/>
+              <a:t>actively</a:t>
+            </a:r>
+            <a:r>
+              <a:rPr lang="en-US" i="0" baseline="0" dirty="0"/>
+              <a:t> pursue. </a:t>
             </a:r>
             <a:endParaRPr lang="en-US" dirty="0"/>
           </a:p>
@@ -1418,7 +1625,7 @@
           <a:p>
             <a:fld id="{51673806-0BCD-1F42-BAA8-2011034B3C6A}" type="datetimeFigureOut">
               <a:rPr lang="en-US" smtClean="0"/>
-              <a:t>5/14/21</a:t>
+              <a:t>5/21/21</a:t>
             </a:fld>
             <a:endParaRPr lang="en-US"/>
           </a:p>
@@ -1832,7 +2039,7 @@
           <a:p>
             <a:fld id="{51673806-0BCD-1F42-BAA8-2011034B3C6A}" type="datetimeFigureOut">
               <a:rPr lang="en-US" smtClean="0"/>
-              <a:t>5/14/21</a:t>
+              <a:t>5/21/21</a:t>
             </a:fld>
             <a:endParaRPr lang="en-US"/>
           </a:p>
@@ -2163,7 +2370,7 @@
           <a:p>
             <a:fld id="{51673806-0BCD-1F42-BAA8-2011034B3C6A}" type="datetimeFigureOut">
               <a:rPr lang="en-US" smtClean="0"/>
-              <a:t>5/14/21</a:t>
+              <a:t>5/21/21</a:t>
             </a:fld>
             <a:endParaRPr lang="en-US"/>
           </a:p>
@@ -2563,7 +2770,7 @@
           <a:p>
             <a:fld id="{51673806-0BCD-1F42-BAA8-2011034B3C6A}" type="datetimeFigureOut">
               <a:rPr lang="en-US" smtClean="0"/>
-              <a:t>5/14/21</a:t>
+              <a:t>5/21/21</a:t>
             </a:fld>
             <a:endParaRPr lang="en-US"/>
           </a:p>
@@ -3126,7 +3333,7 @@
           <a:p>
             <a:fld id="{51673806-0BCD-1F42-BAA8-2011034B3C6A}" type="datetimeFigureOut">
               <a:rPr lang="en-US" smtClean="0"/>
-              <a:t>5/14/21</a:t>
+              <a:t>5/21/21</a:t>
             </a:fld>
             <a:endParaRPr lang="en-US"/>
           </a:p>
@@ -3802,7 +4009,7 @@
           <a:p>
             <a:fld id="{51673806-0BCD-1F42-BAA8-2011034B3C6A}" type="datetimeFigureOut">
               <a:rPr lang="en-US" smtClean="0"/>
-              <a:t>5/14/21</a:t>
+              <a:t>5/21/21</a:t>
             </a:fld>
             <a:endParaRPr lang="en-US"/>
           </a:p>
@@ -4710,7 +4917,7 @@
           <a:p>
             <a:fld id="{51673806-0BCD-1F42-BAA8-2011034B3C6A}" type="datetimeFigureOut">
               <a:rPr lang="en-US" smtClean="0"/>
-              <a:t>5/14/21</a:t>
+              <a:t>5/21/21</a:t>
             </a:fld>
             <a:endParaRPr lang="en-US"/>
           </a:p>
@@ -5018,7 +5225,7 @@
           <a:p>
             <a:fld id="{51673806-0BCD-1F42-BAA8-2011034B3C6A}" type="datetimeFigureOut">
               <a:rPr lang="en-US" smtClean="0"/>
-              <a:t>5/14/21</a:t>
+              <a:t>5/21/21</a:t>
             </a:fld>
             <a:endParaRPr lang="en-US"/>
           </a:p>
@@ -5277,7 +5484,7 @@
           <a:p>
             <a:fld id="{51673806-0BCD-1F42-BAA8-2011034B3C6A}" type="datetimeFigureOut">
               <a:rPr lang="en-US" smtClean="0"/>
-              <a:t>5/14/21</a:t>
+              <a:t>5/21/21</a:t>
             </a:fld>
             <a:endParaRPr lang="en-US"/>
           </a:p>
@@ -5600,7 +5807,7 @@
           <a:p>
             <a:fld id="{51673806-0BCD-1F42-BAA8-2011034B3C6A}" type="datetimeFigureOut">
               <a:rPr lang="en-US" smtClean="0"/>
-              <a:t>5/14/21</a:t>
+              <a:t>5/21/21</a:t>
             </a:fld>
             <a:endParaRPr lang="en-US"/>
           </a:p>
@@ -5984,7 +6191,7 @@
           <a:p>
             <a:fld id="{51673806-0BCD-1F42-BAA8-2011034B3C6A}" type="datetimeFigureOut">
               <a:rPr lang="en-US" smtClean="0"/>
-              <a:t>5/14/21</a:t>
+              <a:t>5/21/21</a:t>
             </a:fld>
             <a:endParaRPr lang="en-US"/>
           </a:p>
@@ -6360,7 +6567,7 @@
           <a:p>
             <a:fld id="{51673806-0BCD-1F42-BAA8-2011034B3C6A}" type="datetimeFigureOut">
               <a:rPr lang="en-US" smtClean="0"/>
-              <a:t>5/14/21</a:t>
+              <a:t>5/21/21</a:t>
             </a:fld>
             <a:endParaRPr lang="en-US"/>
           </a:p>
@@ -6866,7 +7073,7 @@
           <a:p>
             <a:fld id="{51673806-0BCD-1F42-BAA8-2011034B3C6A}" type="datetimeFigureOut">
               <a:rPr lang="en-US" smtClean="0"/>
-              <a:t>5/14/21</a:t>
+              <a:t>5/21/21</a:t>
             </a:fld>
             <a:endParaRPr lang="en-US"/>
           </a:p>
@@ -7123,7 +7330,7 @@
           <a:p>
             <a:fld id="{51673806-0BCD-1F42-BAA8-2011034B3C6A}" type="datetimeFigureOut">
               <a:rPr lang="en-US" smtClean="0"/>
-              <a:t>5/14/21</a:t>
+              <a:t>5/21/21</a:t>
             </a:fld>
             <a:endParaRPr lang="en-US"/>
           </a:p>
@@ -7281,7 +7488,7 @@
           <a:p>
             <a:fld id="{51673806-0BCD-1F42-BAA8-2011034B3C6A}" type="datetimeFigureOut">
               <a:rPr lang="en-US" smtClean="0"/>
-              <a:t>5/14/21</a:t>
+              <a:t>5/21/21</a:t>
             </a:fld>
             <a:endParaRPr lang="en-US"/>
           </a:p>
@@ -7671,7 +7878,7 @@
           <a:p>
             <a:fld id="{51673806-0BCD-1F42-BAA8-2011034B3C6A}" type="datetimeFigureOut">
               <a:rPr lang="en-US" smtClean="0"/>
-              <a:t>5/14/21</a:t>
+              <a:t>5/21/21</a:t>
             </a:fld>
             <a:endParaRPr lang="en-US"/>
           </a:p>
@@ -8080,7 +8287,7 @@
           <a:p>
             <a:fld id="{51673806-0BCD-1F42-BAA8-2011034B3C6A}" type="datetimeFigureOut">
               <a:rPr lang="en-US" smtClean="0"/>
-              <a:t>5/14/21</a:t>
+              <a:t>5/21/21</a:t>
             </a:fld>
             <a:endParaRPr lang="en-US"/>
           </a:p>
@@ -8326,7 +8533,7 @@
             <a:fld id="{51673806-0BCD-1F42-BAA8-2011034B3C6A}" type="datetimeFigureOut">
               <a:rPr lang="en-US" smtClean="0"/>
               <a:pPr/>
-              <a:t>5/14/21</a:t>
+              <a:t>5/21/21</a:t>
             </a:fld>
             <a:endParaRPr lang="en-US" dirty="0"/>
           </a:p>
@@ -9897,7 +10104,12 @@
             <p:ph idx="1"/>
           </p:nvPr>
         </p:nvSpPr>
-        <p:spPr/>
+        <p:spPr>
+          <a:xfrm>
+            <a:off x="680321" y="2336872"/>
+            <a:ext cx="9613861" cy="4134265"/>
+          </a:xfrm>
+        </p:spPr>
         <p:txBody>
           <a:bodyPr/>
           <a:lstStyle/>
@@ -9960,12 +10172,26 @@
               <a:t>Command line: </a:t>
             </a:r>
             <a:r>
-              <a:rPr lang="en-US" i="1" dirty="0" err="1"/>
+              <a:rPr lang="en-US" i="1" dirty="0"/>
               <a:t>git</a:t>
             </a:r>
             <a:r>
               <a:rPr lang="en-US" dirty="0"/>
               <a:t> </a:t>
+            </a:r>
+          </a:p>
+          <a:p>
+            <a:pPr lvl="1">
+              <a:lnSpc>
+                <a:spcPct val="100000"/>
+              </a:lnSpc>
+              <a:spcBef>
+                <a:spcPts val="0"/>
+              </a:spcBef>
+            </a:pPr>
+            <a:r>
+              <a:rPr lang="en-US" dirty="0"/>
+              <a:t>Keeps track of all previous changes to your code base for you </a:t>
             </a:r>
           </a:p>
           <a:p>
@@ -9990,7 +10216,24 @@
               </a:spcBef>
               <a:buNone/>
             </a:pPr>
-            <a:endParaRPr lang="en-US" dirty="0"/>
+            <a:r>
+              <a:rPr lang="en-US" dirty="0"/>
+              <a:t>The standard is for public codes to use the 3-digit system (e.g. 1.2.1, 2.3.0) </a:t>
+            </a:r>
+          </a:p>
+          <a:p>
+            <a:pPr lvl="1">
+              <a:lnSpc>
+                <a:spcPct val="100000"/>
+              </a:lnSpc>
+              <a:spcBef>
+                <a:spcPts val="0"/>
+              </a:spcBef>
+            </a:pPr>
+            <a:r>
+              <a:rPr lang="en-US" dirty="0"/>
+              <a:t>First is for back-compatibility, second is for new features, third is for bug-fixes </a:t>
+            </a:r>
           </a:p>
           <a:p>
             <a:pPr marL="0" indent="0">
@@ -10016,15 +10259,7 @@
             </a:pPr>
             <a:r>
               <a:rPr lang="en-US" dirty="0"/>
-              <a:t>You don’t need to use GitHub/</a:t>
-            </a:r>
-            <a:r>
-              <a:rPr lang="en-US" dirty="0" err="1"/>
-              <a:t>Bitbucket</a:t>
-            </a:r>
-            <a:r>
-              <a:rPr lang="en-US" dirty="0"/>
-              <a:t> for version control </a:t>
+              <a:t>You don’t need to use GitHub/Bitbucket for version control </a:t>
             </a:r>
             <a:r>
               <a:rPr lang="mr-IN" dirty="0"/>

</xml_diff>

<commit_message>
slides: survey responses updated, how to get course material added, dates updated
</commit_message>
<xml_diff>
--- a/slides/basicSE.pptx
+++ b/slides/basicSE.pptx
@@ -207,7 +207,7 @@
           <a:p>
             <a:fld id="{A58EF676-DA74-5E46-A6CE-5ED3069388CC}" type="datetimeFigureOut">
               <a:rPr lang="en-US" smtClean="0"/>
-              <a:t>5/21/21</a:t>
+              <a:t>5/8/22</a:t>
             </a:fld>
             <a:endParaRPr lang="en-US"/>
           </a:p>
@@ -1625,7 +1625,7 @@
           <a:p>
             <a:fld id="{51673806-0BCD-1F42-BAA8-2011034B3C6A}" type="datetimeFigureOut">
               <a:rPr lang="en-US" smtClean="0"/>
-              <a:t>5/21/21</a:t>
+              <a:t>5/8/22</a:t>
             </a:fld>
             <a:endParaRPr lang="en-US"/>
           </a:p>
@@ -2039,7 +2039,7 @@
           <a:p>
             <a:fld id="{51673806-0BCD-1F42-BAA8-2011034B3C6A}" type="datetimeFigureOut">
               <a:rPr lang="en-US" smtClean="0"/>
-              <a:t>5/21/21</a:t>
+              <a:t>5/8/22</a:t>
             </a:fld>
             <a:endParaRPr lang="en-US"/>
           </a:p>
@@ -2370,7 +2370,7 @@
           <a:p>
             <a:fld id="{51673806-0BCD-1F42-BAA8-2011034B3C6A}" type="datetimeFigureOut">
               <a:rPr lang="en-US" smtClean="0"/>
-              <a:t>5/21/21</a:t>
+              <a:t>5/8/22</a:t>
             </a:fld>
             <a:endParaRPr lang="en-US"/>
           </a:p>
@@ -2770,7 +2770,7 @@
           <a:p>
             <a:fld id="{51673806-0BCD-1F42-BAA8-2011034B3C6A}" type="datetimeFigureOut">
               <a:rPr lang="en-US" smtClean="0"/>
-              <a:t>5/21/21</a:t>
+              <a:t>5/8/22</a:t>
             </a:fld>
             <a:endParaRPr lang="en-US"/>
           </a:p>
@@ -3333,7 +3333,7 @@
           <a:p>
             <a:fld id="{51673806-0BCD-1F42-BAA8-2011034B3C6A}" type="datetimeFigureOut">
               <a:rPr lang="en-US" smtClean="0"/>
-              <a:t>5/21/21</a:t>
+              <a:t>5/8/22</a:t>
             </a:fld>
             <a:endParaRPr lang="en-US"/>
           </a:p>
@@ -4009,7 +4009,7 @@
           <a:p>
             <a:fld id="{51673806-0BCD-1F42-BAA8-2011034B3C6A}" type="datetimeFigureOut">
               <a:rPr lang="en-US" smtClean="0"/>
-              <a:t>5/21/21</a:t>
+              <a:t>5/8/22</a:t>
             </a:fld>
             <a:endParaRPr lang="en-US"/>
           </a:p>
@@ -4917,7 +4917,7 @@
           <a:p>
             <a:fld id="{51673806-0BCD-1F42-BAA8-2011034B3C6A}" type="datetimeFigureOut">
               <a:rPr lang="en-US" smtClean="0"/>
-              <a:t>5/21/21</a:t>
+              <a:t>5/8/22</a:t>
             </a:fld>
             <a:endParaRPr lang="en-US"/>
           </a:p>
@@ -5225,7 +5225,7 @@
           <a:p>
             <a:fld id="{51673806-0BCD-1F42-BAA8-2011034B3C6A}" type="datetimeFigureOut">
               <a:rPr lang="en-US" smtClean="0"/>
-              <a:t>5/21/21</a:t>
+              <a:t>5/8/22</a:t>
             </a:fld>
             <a:endParaRPr lang="en-US"/>
           </a:p>
@@ -5484,7 +5484,7 @@
           <a:p>
             <a:fld id="{51673806-0BCD-1F42-BAA8-2011034B3C6A}" type="datetimeFigureOut">
               <a:rPr lang="en-US" smtClean="0"/>
-              <a:t>5/21/21</a:t>
+              <a:t>5/8/22</a:t>
             </a:fld>
             <a:endParaRPr lang="en-US"/>
           </a:p>
@@ -5807,7 +5807,7 @@
           <a:p>
             <a:fld id="{51673806-0BCD-1F42-BAA8-2011034B3C6A}" type="datetimeFigureOut">
               <a:rPr lang="en-US" smtClean="0"/>
-              <a:t>5/21/21</a:t>
+              <a:t>5/8/22</a:t>
             </a:fld>
             <a:endParaRPr lang="en-US"/>
           </a:p>
@@ -6191,7 +6191,7 @@
           <a:p>
             <a:fld id="{51673806-0BCD-1F42-BAA8-2011034B3C6A}" type="datetimeFigureOut">
               <a:rPr lang="en-US" smtClean="0"/>
-              <a:t>5/21/21</a:t>
+              <a:t>5/8/22</a:t>
             </a:fld>
             <a:endParaRPr lang="en-US"/>
           </a:p>
@@ -6567,7 +6567,7 @@
           <a:p>
             <a:fld id="{51673806-0BCD-1F42-BAA8-2011034B3C6A}" type="datetimeFigureOut">
               <a:rPr lang="en-US" smtClean="0"/>
-              <a:t>5/21/21</a:t>
+              <a:t>5/8/22</a:t>
             </a:fld>
             <a:endParaRPr lang="en-US"/>
           </a:p>
@@ -7073,7 +7073,7 @@
           <a:p>
             <a:fld id="{51673806-0BCD-1F42-BAA8-2011034B3C6A}" type="datetimeFigureOut">
               <a:rPr lang="en-US" smtClean="0"/>
-              <a:t>5/21/21</a:t>
+              <a:t>5/8/22</a:t>
             </a:fld>
             <a:endParaRPr lang="en-US"/>
           </a:p>
@@ -7330,7 +7330,7 @@
           <a:p>
             <a:fld id="{51673806-0BCD-1F42-BAA8-2011034B3C6A}" type="datetimeFigureOut">
               <a:rPr lang="en-US" smtClean="0"/>
-              <a:t>5/21/21</a:t>
+              <a:t>5/8/22</a:t>
             </a:fld>
             <a:endParaRPr lang="en-US"/>
           </a:p>
@@ -7488,7 +7488,7 @@
           <a:p>
             <a:fld id="{51673806-0BCD-1F42-BAA8-2011034B3C6A}" type="datetimeFigureOut">
               <a:rPr lang="en-US" smtClean="0"/>
-              <a:t>5/21/21</a:t>
+              <a:t>5/8/22</a:t>
             </a:fld>
             <a:endParaRPr lang="en-US"/>
           </a:p>
@@ -7878,7 +7878,7 @@
           <a:p>
             <a:fld id="{51673806-0BCD-1F42-BAA8-2011034B3C6A}" type="datetimeFigureOut">
               <a:rPr lang="en-US" smtClean="0"/>
-              <a:t>5/21/21</a:t>
+              <a:t>5/8/22</a:t>
             </a:fld>
             <a:endParaRPr lang="en-US"/>
           </a:p>
@@ -8287,7 +8287,7 @@
           <a:p>
             <a:fld id="{51673806-0BCD-1F42-BAA8-2011034B3C6A}" type="datetimeFigureOut">
               <a:rPr lang="en-US" smtClean="0"/>
-              <a:t>5/21/21</a:t>
+              <a:t>5/8/22</a:t>
             </a:fld>
             <a:endParaRPr lang="en-US"/>
           </a:p>
@@ -8533,7 +8533,7 @@
             <a:fld id="{51673806-0BCD-1F42-BAA8-2011034B3C6A}" type="datetimeFigureOut">
               <a:rPr lang="en-US" smtClean="0"/>
               <a:pPr/>
-              <a:t>5/21/21</a:t>
+              <a:t>5/8/22</a:t>
             </a:fld>
             <a:endParaRPr lang="en-US" dirty="0"/>
           </a:p>
@@ -8997,7 +8997,7 @@
           <a:p>
             <a:r>
               <a:rPr lang="en-US"/>
-              <a:t>SURP 2021 </a:t>
+              <a:t>SURP 2022 </a:t>
             </a:r>
             <a:r>
               <a:rPr lang="en-US" dirty="0"/>

</xml_diff>

<commit_message>
slides: minor updates to sessions 5 and 6
</commit_message>
<xml_diff>
--- a/slides/basicSE.pptx
+++ b/slides/basicSE.pptx
@@ -5,7 +5,7 @@
     <p:sldMasterId id="2147484294" r:id="rId1"/>
   </p:sldMasterIdLst>
   <p:notesMasterIdLst>
-    <p:notesMasterId r:id="rId13"/>
+    <p:notesMasterId r:id="rId14"/>
   </p:notesMasterIdLst>
   <p:sldIdLst>
     <p:sldId id="256" r:id="rId2"/>
@@ -13,12 +13,13 @@
     <p:sldId id="258" r:id="rId4"/>
     <p:sldId id="259" r:id="rId5"/>
     <p:sldId id="264" r:id="rId6"/>
-    <p:sldId id="261" r:id="rId7"/>
-    <p:sldId id="260" r:id="rId8"/>
-    <p:sldId id="262" r:id="rId9"/>
-    <p:sldId id="266" r:id="rId10"/>
-    <p:sldId id="263" r:id="rId11"/>
-    <p:sldId id="265" r:id="rId12"/>
+    <p:sldId id="267" r:id="rId7"/>
+    <p:sldId id="261" r:id="rId8"/>
+    <p:sldId id="260" r:id="rId9"/>
+    <p:sldId id="262" r:id="rId10"/>
+    <p:sldId id="266" r:id="rId11"/>
+    <p:sldId id="263" r:id="rId12"/>
+    <p:sldId id="265" r:id="rId13"/>
   </p:sldIdLst>
   <p:sldSz cx="12192000" cy="6858000"/>
   <p:notesSz cx="6858000" cy="9144000"/>
@@ -207,7 +208,7 @@
           <a:p>
             <a:fld id="{A58EF676-DA74-5E46-A6CE-5ED3069388CC}" type="datetimeFigureOut">
               <a:rPr lang="en-US" smtClean="0"/>
-              <a:t>5/8/22</a:t>
+              <a:t>5/18/22</a:t>
             </a:fld>
             <a:endParaRPr lang="en-US"/>
           </a:p>
@@ -566,6 +567,114 @@
 </p:notes>
 </file>
 
+<file path=ppt/notesSlides/notesSlide10.xml><?xml version="1.0" encoding="utf-8"?>
+<p:notes xmlns:a="http://schemas.openxmlformats.org/drawingml/2006/main" xmlns:r="http://schemas.openxmlformats.org/officeDocument/2006/relationships" xmlns:p="http://schemas.openxmlformats.org/presentationml/2006/main">
+  <p:cSld>
+    <p:spTree>
+      <p:nvGrpSpPr>
+        <p:cNvPr id="1" name=""/>
+        <p:cNvGrpSpPr/>
+        <p:nvPr/>
+      </p:nvGrpSpPr>
+      <p:grpSpPr>
+        <a:xfrm>
+          <a:off x="0" y="0"/>
+          <a:ext cx="0" cy="0"/>
+          <a:chOff x="0" y="0"/>
+          <a:chExt cx="0" cy="0"/>
+        </a:xfrm>
+      </p:grpSpPr>
+      <p:sp>
+        <p:nvSpPr>
+          <p:cNvPr id="2" name="Slide Image Placeholder 1"/>
+          <p:cNvSpPr>
+            <a:spLocks noGrp="1" noRot="1" noChangeAspect="1"/>
+          </p:cNvSpPr>
+          <p:nvPr>
+            <p:ph type="sldImg"/>
+          </p:nvPr>
+        </p:nvSpPr>
+        <p:spPr/>
+      </p:sp>
+      <p:sp>
+        <p:nvSpPr>
+          <p:cNvPr id="3" name="Notes Placeholder 2"/>
+          <p:cNvSpPr>
+            <a:spLocks noGrp="1"/>
+          </p:cNvSpPr>
+          <p:nvPr>
+            <p:ph type="body" idx="1"/>
+          </p:nvPr>
+        </p:nvSpPr>
+        <p:spPr/>
+        <p:txBody>
+          <a:bodyPr/>
+          <a:lstStyle/>
+          <a:p>
+            <a:r>
+              <a:rPr lang="en-US" dirty="0"/>
+              <a:t>If you don’t know about their</a:t>
+            </a:r>
+            <a:r>
+              <a:rPr lang="en-US" baseline="0" dirty="0"/>
+              <a:t> coding background, you should always take code advice from a research scientist with a grain of salt. Being early career researchers, most of the participants of this bootcamp are in the perfect position to make the decision about what kind of code they’re going to write </a:t>
+            </a:r>
+            <a:r>
+              <a:rPr lang="en-US" i="1" baseline="0" dirty="0"/>
+              <a:t>now</a:t>
+            </a:r>
+            <a:r>
+              <a:rPr lang="en-US" i="0" baseline="0" dirty="0"/>
+              <a:t>, but if they choose to be the one who writes good clean code, that’s a decision they have to </a:t>
+            </a:r>
+            <a:r>
+              <a:rPr lang="en-US" i="1" baseline="0" dirty="0"/>
+              <a:t>actively</a:t>
+            </a:r>
+            <a:r>
+              <a:rPr lang="en-US" i="0" baseline="0" dirty="0"/>
+              <a:t> pursue. We live and breathe through our code, so it can only help you to just be organized and clear with your workflow.</a:t>
+            </a:r>
+            <a:endParaRPr lang="en-US" dirty="0"/>
+          </a:p>
+        </p:txBody>
+      </p:sp>
+      <p:sp>
+        <p:nvSpPr>
+          <p:cNvPr id="4" name="Slide Number Placeholder 3"/>
+          <p:cNvSpPr>
+            <a:spLocks noGrp="1"/>
+          </p:cNvSpPr>
+          <p:nvPr>
+            <p:ph type="sldNum" sz="quarter" idx="10"/>
+          </p:nvPr>
+        </p:nvSpPr>
+        <p:spPr/>
+        <p:txBody>
+          <a:bodyPr/>
+          <a:lstStyle/>
+          <a:p>
+            <a:fld id="{4FBF28C1-3B45-464E-B5E4-80D7800AB463}" type="slidenum">
+              <a:rPr lang="en-US" smtClean="0"/>
+              <a:t>11</a:t>
+            </a:fld>
+            <a:endParaRPr lang="en-US"/>
+          </a:p>
+        </p:txBody>
+      </p:sp>
+    </p:spTree>
+    <p:extLst>
+      <p:ext uri="{BB962C8B-B14F-4D97-AF65-F5344CB8AC3E}">
+        <p14:creationId xmlns:p14="http://schemas.microsoft.com/office/powerpoint/2010/main" val="6894971"/>
+      </p:ext>
+    </p:extLst>
+  </p:cSld>
+  <p:clrMapOvr>
+    <a:masterClrMapping/>
+  </p:clrMapOvr>
+</p:notes>
+</file>
+
 <file path=ppt/notesSlides/notesSlide2.xml><?xml version="1.0" encoding="utf-8"?>
 <p:notes xmlns:a="http://schemas.openxmlformats.org/drawingml/2006/main" xmlns:r="http://schemas.openxmlformats.org/officeDocument/2006/relationships" xmlns:p="http://schemas.openxmlformats.org/presentationml/2006/main">
   <p:cSld>
@@ -891,11 +1000,23 @@
           <a:p>
             <a:r>
               <a:rPr lang="en-US" dirty="0"/>
-              <a:t>This applies</a:t>
-            </a:r>
-            <a:r>
-              <a:rPr lang="en-US" baseline="0" dirty="0"/>
-              <a:t> much more to people releasing code publicly, but can be a source of errors if you share code with close colleagues too. </a:t>
+              <a:t>Same principles apply for </a:t>
+            </a:r>
+            <a:r>
+              <a:rPr lang="en-US" dirty="0" err="1"/>
+              <a:t>BitBucket</a:t>
+            </a:r>
+            <a:r>
+              <a:rPr lang="en-US" dirty="0"/>
+              <a:t>. Those who cloned the source material for this bootcamp can change into the directory they have it stored at, run </a:t>
+            </a:r>
+            <a:r>
+              <a:rPr lang="en-US" i="1" dirty="0"/>
+              <a:t>git pull</a:t>
+            </a:r>
+            <a:r>
+              <a:rPr lang="en-US" i="0" dirty="0"/>
+              <a:t>, and it should automatically download all of the updates since they first cloned it.</a:t>
             </a:r>
             <a:endParaRPr lang="en-US" dirty="0"/>
           </a:p>
@@ -908,7 +1029,7 @@
             <a:spLocks noGrp="1"/>
           </p:cNvSpPr>
           <p:nvPr>
-            <p:ph type="sldNum" sz="quarter" idx="10"/>
+            <p:ph type="sldNum" sz="quarter" idx="5"/>
           </p:nvPr>
         </p:nvSpPr>
         <p:spPr/>
@@ -927,7 +1048,7 @@
     </p:spTree>
     <p:extLst>
       <p:ext uri="{BB962C8B-B14F-4D97-AF65-F5344CB8AC3E}">
-        <p14:creationId xmlns:p14="http://schemas.microsoft.com/office/powerpoint/2010/main" val="903635624"/>
+        <p14:creationId xmlns:p14="http://schemas.microsoft.com/office/powerpoint/2010/main" val="1715522035"/>
       </p:ext>
     </p:extLst>
   </p:cSld>
@@ -983,15 +1104,11 @@
           <a:p>
             <a:r>
               <a:rPr lang="en-US" dirty="0"/>
-              <a:t>If you’re going to release code publicly, unit tests should be viewed as a </a:t>
-            </a:r>
-            <a:r>
-              <a:rPr lang="en-US" i="1" dirty="0"/>
-              <a:t>requirement</a:t>
-            </a:r>
-            <a:r>
-              <a:rPr lang="en-US" i="0" dirty="0"/>
-              <a:t>, although no one enforces this. </a:t>
+              <a:t>This applies</a:t>
+            </a:r>
+            <a:r>
+              <a:rPr lang="en-US" baseline="0" dirty="0"/>
+              <a:t> much more to people releasing code publicly, but can be a source of errors if you share code with close colleagues too. </a:t>
             </a:r>
             <a:endParaRPr lang="en-US" dirty="0"/>
           </a:p>
@@ -1004,7 +1121,7 @@
             <a:spLocks noGrp="1"/>
           </p:cNvSpPr>
           <p:nvPr>
-            <p:ph type="sldNum" sz="quarter" idx="5"/>
+            <p:ph type="sldNum" sz="quarter" idx="10"/>
           </p:nvPr>
         </p:nvSpPr>
         <p:spPr/>
@@ -1023,7 +1140,7 @@
     </p:spTree>
     <p:extLst>
       <p:ext uri="{BB962C8B-B14F-4D97-AF65-F5344CB8AC3E}">
-        <p14:creationId xmlns:p14="http://schemas.microsoft.com/office/powerpoint/2010/main" val="197205030"/>
+        <p14:creationId xmlns:p14="http://schemas.microsoft.com/office/powerpoint/2010/main" val="903635624"/>
       </p:ext>
     </p:extLst>
   </p:cSld>
@@ -1079,19 +1196,15 @@
           <a:p>
             <a:r>
               <a:rPr lang="en-US" dirty="0"/>
-              <a:t>Professional</a:t>
-            </a:r>
-            <a:r>
-              <a:rPr lang="en-US" baseline="0" dirty="0"/>
-              <a:t> software engineers don’t start in the text editor/IDE </a:t>
-            </a:r>
-            <a:r>
-              <a:rPr lang="mr-IN" baseline="0" dirty="0"/>
-              <a:t>–</a:t>
-            </a:r>
-            <a:r>
-              <a:rPr lang="en-US" baseline="0" dirty="0"/>
-              <a:t> they know how they’re going to solve the problem and test their implementation before they even write a single line. </a:t>
+              <a:t>If you’re going to release code publicly, unit tests should be viewed as a </a:t>
+            </a:r>
+            <a:r>
+              <a:rPr lang="en-US" i="1" dirty="0"/>
+              <a:t>requirement</a:t>
+            </a:r>
+            <a:r>
+              <a:rPr lang="en-US" i="0" dirty="0"/>
+              <a:t>, although no one enforces this. </a:t>
             </a:r>
             <a:endParaRPr lang="en-US" dirty="0"/>
           </a:p>
@@ -1104,7 +1217,7 @@
             <a:spLocks noGrp="1"/>
           </p:cNvSpPr>
           <p:nvPr>
-            <p:ph type="sldNum" sz="quarter" idx="10"/>
+            <p:ph type="sldNum" sz="quarter" idx="5"/>
           </p:nvPr>
         </p:nvSpPr>
         <p:spPr/>
@@ -1123,7 +1236,7 @@
     </p:spTree>
     <p:extLst>
       <p:ext uri="{BB962C8B-B14F-4D97-AF65-F5344CB8AC3E}">
-        <p14:creationId xmlns:p14="http://schemas.microsoft.com/office/powerpoint/2010/main" val="348344692"/>
+        <p14:creationId xmlns:p14="http://schemas.microsoft.com/office/powerpoint/2010/main" val="197205030"/>
       </p:ext>
     </p:extLst>
   </p:cSld>
@@ -1223,7 +1336,7 @@
     </p:spTree>
     <p:extLst>
       <p:ext uri="{BB962C8B-B14F-4D97-AF65-F5344CB8AC3E}">
-        <p14:creationId xmlns:p14="http://schemas.microsoft.com/office/powerpoint/2010/main" val="2118647226"/>
+        <p14:creationId xmlns:p14="http://schemas.microsoft.com/office/powerpoint/2010/main" val="348344692"/>
       </p:ext>
     </p:extLst>
   </p:cSld>
@@ -1279,35 +1392,19 @@
           <a:p>
             <a:r>
               <a:rPr lang="en-US" dirty="0"/>
-              <a:t>If you don’t know about their</a:t>
+              <a:t>Professional</a:t>
             </a:r>
             <a:r>
               <a:rPr lang="en-US" baseline="0" dirty="0"/>
-              <a:t> coding background, you should always take code advice from a research scientist with a grain of salt. Being early career researchers, most of the participants of this </a:t>
-            </a:r>
-            <a:r>
-              <a:rPr lang="en-US" baseline="0" dirty="0" err="1"/>
-              <a:t>bootcamp</a:t>
+              <a:t> software engineers don’t start in the text editor/IDE </a:t>
+            </a:r>
+            <a:r>
+              <a:rPr lang="mr-IN" baseline="0" dirty="0"/>
+              <a:t>–</a:t>
             </a:r>
             <a:r>
               <a:rPr lang="en-US" baseline="0" dirty="0"/>
-              <a:t> are in the perfect position to make the decision about what kind of code they’re going to write </a:t>
-            </a:r>
-            <a:r>
-              <a:rPr lang="en-US" i="1" baseline="0" dirty="0"/>
-              <a:t>now</a:t>
-            </a:r>
-            <a:r>
-              <a:rPr lang="en-US" i="0" baseline="0" dirty="0"/>
-              <a:t>, but if they choose to be the one who writes good clean code, that’s a decision they have to </a:t>
-            </a:r>
-            <a:r>
-              <a:rPr lang="en-US" i="1" baseline="0" dirty="0"/>
-              <a:t>actively</a:t>
-            </a:r>
-            <a:r>
-              <a:rPr lang="en-US" i="0" baseline="0" dirty="0"/>
-              <a:t> pursue. </a:t>
+              <a:t> they know how they’re going to solve the problem and test their implementation before they even write a single line. </a:t>
             </a:r>
             <a:endParaRPr lang="en-US" dirty="0"/>
           </a:p>
@@ -1339,7 +1436,7 @@
     </p:spTree>
     <p:extLst>
       <p:ext uri="{BB962C8B-B14F-4D97-AF65-F5344CB8AC3E}">
-        <p14:creationId xmlns:p14="http://schemas.microsoft.com/office/powerpoint/2010/main" val="6894971"/>
+        <p14:creationId xmlns:p14="http://schemas.microsoft.com/office/powerpoint/2010/main" val="2118647226"/>
       </p:ext>
     </p:extLst>
   </p:cSld>
@@ -1625,7 +1722,7 @@
           <a:p>
             <a:fld id="{51673806-0BCD-1F42-BAA8-2011034B3C6A}" type="datetimeFigureOut">
               <a:rPr lang="en-US" smtClean="0"/>
-              <a:t>5/8/22</a:t>
+              <a:t>5/18/22</a:t>
             </a:fld>
             <a:endParaRPr lang="en-US"/>
           </a:p>
@@ -2039,7 +2136,7 @@
           <a:p>
             <a:fld id="{51673806-0BCD-1F42-BAA8-2011034B3C6A}" type="datetimeFigureOut">
               <a:rPr lang="en-US" smtClean="0"/>
-              <a:t>5/8/22</a:t>
+              <a:t>5/18/22</a:t>
             </a:fld>
             <a:endParaRPr lang="en-US"/>
           </a:p>
@@ -2370,7 +2467,7 @@
           <a:p>
             <a:fld id="{51673806-0BCD-1F42-BAA8-2011034B3C6A}" type="datetimeFigureOut">
               <a:rPr lang="en-US" smtClean="0"/>
-              <a:t>5/8/22</a:t>
+              <a:t>5/18/22</a:t>
             </a:fld>
             <a:endParaRPr lang="en-US"/>
           </a:p>
@@ -2770,7 +2867,7 @@
           <a:p>
             <a:fld id="{51673806-0BCD-1F42-BAA8-2011034B3C6A}" type="datetimeFigureOut">
               <a:rPr lang="en-US" smtClean="0"/>
-              <a:t>5/8/22</a:t>
+              <a:t>5/18/22</a:t>
             </a:fld>
             <a:endParaRPr lang="en-US"/>
           </a:p>
@@ -3333,7 +3430,7 @@
           <a:p>
             <a:fld id="{51673806-0BCD-1F42-BAA8-2011034B3C6A}" type="datetimeFigureOut">
               <a:rPr lang="en-US" smtClean="0"/>
-              <a:t>5/8/22</a:t>
+              <a:t>5/18/22</a:t>
             </a:fld>
             <a:endParaRPr lang="en-US"/>
           </a:p>
@@ -4009,7 +4106,7 @@
           <a:p>
             <a:fld id="{51673806-0BCD-1F42-BAA8-2011034B3C6A}" type="datetimeFigureOut">
               <a:rPr lang="en-US" smtClean="0"/>
-              <a:t>5/8/22</a:t>
+              <a:t>5/18/22</a:t>
             </a:fld>
             <a:endParaRPr lang="en-US"/>
           </a:p>
@@ -4917,7 +5014,7 @@
           <a:p>
             <a:fld id="{51673806-0BCD-1F42-BAA8-2011034B3C6A}" type="datetimeFigureOut">
               <a:rPr lang="en-US" smtClean="0"/>
-              <a:t>5/8/22</a:t>
+              <a:t>5/18/22</a:t>
             </a:fld>
             <a:endParaRPr lang="en-US"/>
           </a:p>
@@ -5225,7 +5322,7 @@
           <a:p>
             <a:fld id="{51673806-0BCD-1F42-BAA8-2011034B3C6A}" type="datetimeFigureOut">
               <a:rPr lang="en-US" smtClean="0"/>
-              <a:t>5/8/22</a:t>
+              <a:t>5/18/22</a:t>
             </a:fld>
             <a:endParaRPr lang="en-US"/>
           </a:p>
@@ -5484,7 +5581,7 @@
           <a:p>
             <a:fld id="{51673806-0BCD-1F42-BAA8-2011034B3C6A}" type="datetimeFigureOut">
               <a:rPr lang="en-US" smtClean="0"/>
-              <a:t>5/8/22</a:t>
+              <a:t>5/18/22</a:t>
             </a:fld>
             <a:endParaRPr lang="en-US"/>
           </a:p>
@@ -5807,7 +5904,7 @@
           <a:p>
             <a:fld id="{51673806-0BCD-1F42-BAA8-2011034B3C6A}" type="datetimeFigureOut">
               <a:rPr lang="en-US" smtClean="0"/>
-              <a:t>5/8/22</a:t>
+              <a:t>5/18/22</a:t>
             </a:fld>
             <a:endParaRPr lang="en-US"/>
           </a:p>
@@ -6191,7 +6288,7 @@
           <a:p>
             <a:fld id="{51673806-0BCD-1F42-BAA8-2011034B3C6A}" type="datetimeFigureOut">
               <a:rPr lang="en-US" smtClean="0"/>
-              <a:t>5/8/22</a:t>
+              <a:t>5/18/22</a:t>
             </a:fld>
             <a:endParaRPr lang="en-US"/>
           </a:p>
@@ -6567,7 +6664,7 @@
           <a:p>
             <a:fld id="{51673806-0BCD-1F42-BAA8-2011034B3C6A}" type="datetimeFigureOut">
               <a:rPr lang="en-US" smtClean="0"/>
-              <a:t>5/8/22</a:t>
+              <a:t>5/18/22</a:t>
             </a:fld>
             <a:endParaRPr lang="en-US"/>
           </a:p>
@@ -7073,7 +7170,7 @@
           <a:p>
             <a:fld id="{51673806-0BCD-1F42-BAA8-2011034B3C6A}" type="datetimeFigureOut">
               <a:rPr lang="en-US" smtClean="0"/>
-              <a:t>5/8/22</a:t>
+              <a:t>5/18/22</a:t>
             </a:fld>
             <a:endParaRPr lang="en-US"/>
           </a:p>
@@ -7330,7 +7427,7 @@
           <a:p>
             <a:fld id="{51673806-0BCD-1F42-BAA8-2011034B3C6A}" type="datetimeFigureOut">
               <a:rPr lang="en-US" smtClean="0"/>
-              <a:t>5/8/22</a:t>
+              <a:t>5/18/22</a:t>
             </a:fld>
             <a:endParaRPr lang="en-US"/>
           </a:p>
@@ -7488,7 +7585,7 @@
           <a:p>
             <a:fld id="{51673806-0BCD-1F42-BAA8-2011034B3C6A}" type="datetimeFigureOut">
               <a:rPr lang="en-US" smtClean="0"/>
-              <a:t>5/8/22</a:t>
+              <a:t>5/18/22</a:t>
             </a:fld>
             <a:endParaRPr lang="en-US"/>
           </a:p>
@@ -7878,7 +7975,7 @@
           <a:p>
             <a:fld id="{51673806-0BCD-1F42-BAA8-2011034B3C6A}" type="datetimeFigureOut">
               <a:rPr lang="en-US" smtClean="0"/>
-              <a:t>5/8/22</a:t>
+              <a:t>5/18/22</a:t>
             </a:fld>
             <a:endParaRPr lang="en-US"/>
           </a:p>
@@ -8287,7 +8384,7 @@
           <a:p>
             <a:fld id="{51673806-0BCD-1F42-BAA8-2011034B3C6A}" type="datetimeFigureOut">
               <a:rPr lang="en-US" smtClean="0"/>
-              <a:t>5/8/22</a:t>
+              <a:t>5/18/22</a:t>
             </a:fld>
             <a:endParaRPr lang="en-US"/>
           </a:p>
@@ -8533,7 +8630,7 @@
             <a:fld id="{51673806-0BCD-1F42-BAA8-2011034B3C6A}" type="datetimeFigureOut">
               <a:rPr lang="en-US" smtClean="0"/>
               <a:pPr/>
-              <a:t>5/8/22</a:t>
+              <a:t>5/18/22</a:t>
             </a:fld>
             <a:endParaRPr lang="en-US" dirty="0"/>
           </a:p>
@@ -9064,9 +9161,22 @@
           <a:lstStyle/>
           <a:p>
             <a:r>
+              <a:rPr lang="en-US" i="1" dirty="0"/>
+              <a:t>Think</a:t>
+            </a:r>
+            <a:r>
               <a:rPr lang="en-US" dirty="0"/>
-              <a:t>Rule Number One</a:t>
-            </a:r>
+              <a:t> Before You </a:t>
+            </a:r>
+            <a:r>
+              <a:rPr lang="en-US" i="1" dirty="0"/>
+              <a:t>Write</a:t>
+            </a:r>
+            <a:r>
+              <a:rPr lang="en-US" dirty="0"/>
+              <a:t> </a:t>
+            </a:r>
+            <a:endParaRPr lang="en-US" i="1" dirty="0"/>
           </a:p>
         </p:txBody>
       </p:sp>
@@ -9082,14 +9192,12 @@
         </p:nvSpPr>
         <p:spPr>
           <a:xfrm>
-            <a:off x="680321" y="2336872"/>
-            <a:ext cx="9814807" cy="4077575"/>
-          </a:xfrm>
-        </p:spPr>
-        <p:txBody>
-          <a:bodyPr>
-            <a:normAutofit/>
-          </a:bodyPr>
+            <a:off x="680321" y="2336873"/>
+            <a:ext cx="6116264" cy="4104870"/>
+          </a:xfrm>
+        </p:spPr>
+        <p:txBody>
+          <a:bodyPr/>
           <a:lstStyle/>
           <a:p>
             <a:pPr marL="0" marR="0" lvl="0" indent="0" defTabSz="914400" eaLnBrk="1" fontAlgn="auto" latinLnBrk="0" hangingPunct="1">
@@ -9109,25 +9217,7 @@
               <a:tabLst/>
               <a:defRPr/>
             </a:pPr>
-            <a:r>
-              <a:rPr lang="en-US" i="1" dirty="0"/>
-              <a:t>Code is read much more often than it is written. </a:t>
-            </a:r>
             <a:endParaRPr lang="en-US" dirty="0"/>
-          </a:p>
-          <a:p>
-            <a:pPr lvl="1">
-              <a:lnSpc>
-                <a:spcPct val="100000"/>
-              </a:lnSpc>
-              <a:spcBef>
-                <a:spcPts val="0"/>
-              </a:spcBef>
-            </a:pPr>
-            <a:r>
-              <a:rPr lang="en-US" dirty="0"/>
-              <a:t>Advice: Assume this applies to all of the code you will ever write </a:t>
-            </a:r>
           </a:p>
           <a:p>
             <a:pPr marL="0" marR="0" lvl="0" indent="0" defTabSz="914400" eaLnBrk="1" fontAlgn="auto" latinLnBrk="0" hangingPunct="1">
@@ -9167,18 +9257,7 @@
               <a:tabLst/>
               <a:defRPr/>
             </a:pPr>
-            <a:r>
-              <a:rPr lang="en-US" dirty="0"/>
-              <a:t>Emphasize </a:t>
-            </a:r>
-            <a:r>
-              <a:rPr lang="en-US" i="1" dirty="0"/>
-              <a:t>readability</a:t>
-            </a:r>
-            <a:r>
-              <a:rPr lang="en-US" dirty="0"/>
-              <a:t> above all else. It’s okay to break any of these rules if the result is a much more readable solution. </a:t>
-            </a:r>
+            <a:endParaRPr lang="en-US" dirty="0"/>
           </a:p>
           <a:p>
             <a:pPr marL="0" marR="0" lvl="0" indent="0" defTabSz="914400" eaLnBrk="1" fontAlgn="auto" latinLnBrk="0" hangingPunct="1">
@@ -9220,12 +9299,137 @@
             </a:pPr>
             <a:r>
               <a:rPr lang="en-US" dirty="0"/>
-              <a:t>Bottom line: </a:t>
-            </a:r>
+              <a:t>This is how professional developers and software engineers view scientist-written code </a:t>
+            </a:r>
+          </a:p>
+        </p:txBody>
+      </p:sp>
+      <p:pic>
+        <p:nvPicPr>
+          <p:cNvPr id="4" name="Picture 3"/>
+          <p:cNvPicPr>
+            <a:picLocks noChangeAspect="1"/>
+          </p:cNvPicPr>
+          <p:nvPr/>
+        </p:nvPicPr>
+        <p:blipFill>
+          <a:blip r:embed="rId3">
+            <a:extLst>
+              <a:ext uri="{28A0092B-C50C-407E-A947-70E740481C1C}">
+                <a14:useLocalDpi xmlns:a14="http://schemas.microsoft.com/office/drawing/2010/main" val="0"/>
+              </a:ext>
+            </a:extLst>
+          </a:blip>
+          <a:stretch>
+            <a:fillRect/>
+          </a:stretch>
+        </p:blipFill>
+        <p:spPr>
+          <a:xfrm>
+            <a:off x="7011349" y="2040359"/>
+            <a:ext cx="3770384" cy="4697898"/>
+          </a:xfrm>
+          <a:prstGeom prst="rect">
+            <a:avLst/>
+          </a:prstGeom>
+        </p:spPr>
+      </p:pic>
+    </p:spTree>
+    <p:extLst>
+      <p:ext uri="{BB962C8B-B14F-4D97-AF65-F5344CB8AC3E}">
+        <p14:creationId xmlns:p14="http://schemas.microsoft.com/office/powerpoint/2010/main" val="651769218"/>
+      </p:ext>
+    </p:extLst>
+  </p:cSld>
+  <p:clrMapOvr>
+    <a:masterClrMapping/>
+  </p:clrMapOvr>
+</p:sld>
+</file>
+
+<file path=ppt/slides/slide11.xml><?xml version="1.0" encoding="utf-8"?>
+<p:sld xmlns:a="http://schemas.openxmlformats.org/drawingml/2006/main" xmlns:r="http://schemas.openxmlformats.org/officeDocument/2006/relationships" xmlns:p="http://schemas.openxmlformats.org/presentationml/2006/main">
+  <p:cSld>
+    <p:spTree>
+      <p:nvGrpSpPr>
+        <p:cNvPr id="1" name=""/>
+        <p:cNvGrpSpPr/>
+        <p:nvPr/>
+      </p:nvGrpSpPr>
+      <p:grpSpPr>
+        <a:xfrm>
+          <a:off x="0" y="0"/>
+          <a:ext cx="0" cy="0"/>
+          <a:chOff x="0" y="0"/>
+          <a:chExt cx="0" cy="0"/>
+        </a:xfrm>
+      </p:grpSpPr>
+      <p:sp>
+        <p:nvSpPr>
+          <p:cNvPr id="2" name="Title 1"/>
+          <p:cNvSpPr>
+            <a:spLocks noGrp="1"/>
+          </p:cNvSpPr>
+          <p:nvPr>
+            <p:ph type="title"/>
+          </p:nvPr>
+        </p:nvSpPr>
+        <p:spPr/>
+        <p:txBody>
+          <a:bodyPr/>
+          <a:lstStyle/>
+          <a:p>
+            <a:r>
+              <a:rPr lang="en-US" dirty="0"/>
+              <a:t>Rule Number One</a:t>
+            </a:r>
+          </a:p>
+        </p:txBody>
+      </p:sp>
+      <p:sp>
+        <p:nvSpPr>
+          <p:cNvPr id="3" name="Content Placeholder 2"/>
+          <p:cNvSpPr>
+            <a:spLocks noGrp="1"/>
+          </p:cNvSpPr>
+          <p:nvPr>
+            <p:ph idx="1"/>
+          </p:nvPr>
+        </p:nvSpPr>
+        <p:spPr>
+          <a:xfrm>
+            <a:off x="680321" y="2336872"/>
+            <a:ext cx="9814807" cy="4077575"/>
+          </a:xfrm>
+        </p:spPr>
+        <p:txBody>
+          <a:bodyPr>
+            <a:normAutofit/>
+          </a:bodyPr>
+          <a:lstStyle/>
+          <a:p>
+            <a:pPr marL="0" marR="0" lvl="0" indent="0" defTabSz="914400" eaLnBrk="1" fontAlgn="auto" latinLnBrk="0" hangingPunct="1">
+              <a:lnSpc>
+                <a:spcPct val="100000"/>
+              </a:lnSpc>
+              <a:spcBef>
+                <a:spcPts val="0"/>
+              </a:spcBef>
+              <a:spcAft>
+                <a:spcPts val="0"/>
+              </a:spcAft>
+              <a:buClrTx/>
+              <a:buSzTx/>
+              <a:buFontTx/>
+              <a:buNone/>
+              <a:tabLst/>
+              <a:defRPr/>
+            </a:pPr>
             <a:r>
               <a:rPr lang="en-US" i="1" dirty="0"/>
-              <a:t>Well-written software is clear and does not cut corners. </a:t>
-            </a:r>
+              <a:t>Code is read much more often than it is written. </a:t>
+            </a:r>
+            <a:endParaRPr lang="en-US" dirty="0"/>
           </a:p>
           <a:p>
             <a:pPr lvl="1">
@@ -9238,7 +9442,127 @@
             </a:pPr>
             <a:r>
               <a:rPr lang="en-US" dirty="0"/>
-              <a:t>The view commonly held by research scientists that code is simply a means to an end can only cause problems if the code base gets sufficiently large; this line is usually crossed long before a public software release. The solution to this is knowing how to engineer your code. </a:t>
+              <a:t>Advice: Assume this applies to all of the code you will ever write </a:t>
+            </a:r>
+          </a:p>
+          <a:p>
+            <a:pPr marL="0" marR="0" lvl="0" indent="0" defTabSz="914400" eaLnBrk="1" fontAlgn="auto" latinLnBrk="0" hangingPunct="1">
+              <a:lnSpc>
+                <a:spcPct val="100000"/>
+              </a:lnSpc>
+              <a:spcBef>
+                <a:spcPts val="0"/>
+              </a:spcBef>
+              <a:spcAft>
+                <a:spcPts val="0"/>
+              </a:spcAft>
+              <a:buClrTx/>
+              <a:buSzTx/>
+              <a:buFontTx/>
+              <a:buNone/>
+              <a:tabLst/>
+              <a:defRPr/>
+            </a:pPr>
+            <a:endParaRPr lang="en-US" dirty="0"/>
+          </a:p>
+          <a:p>
+            <a:pPr marL="0" marR="0" lvl="0" indent="0" defTabSz="914400" eaLnBrk="1" fontAlgn="auto" latinLnBrk="0" hangingPunct="1">
+              <a:lnSpc>
+                <a:spcPct val="100000"/>
+              </a:lnSpc>
+              <a:spcBef>
+                <a:spcPts val="0"/>
+              </a:spcBef>
+              <a:spcAft>
+                <a:spcPts val="0"/>
+              </a:spcAft>
+              <a:buClrTx/>
+              <a:buSzTx/>
+              <a:buFontTx/>
+              <a:buNone/>
+              <a:tabLst/>
+              <a:defRPr/>
+            </a:pPr>
+            <a:r>
+              <a:rPr lang="en-US" dirty="0"/>
+              <a:t>Emphasize </a:t>
+            </a:r>
+            <a:r>
+              <a:rPr lang="en-US" i="1" dirty="0"/>
+              <a:t>readability</a:t>
+            </a:r>
+            <a:r>
+              <a:rPr lang="en-US" dirty="0"/>
+              <a:t> above all else. It’s okay to break any of these rules if the result is a much more readable solution. </a:t>
+            </a:r>
+          </a:p>
+          <a:p>
+            <a:pPr marL="0" marR="0" lvl="0" indent="0" defTabSz="914400" eaLnBrk="1" fontAlgn="auto" latinLnBrk="0" hangingPunct="1">
+              <a:lnSpc>
+                <a:spcPct val="100000"/>
+              </a:lnSpc>
+              <a:spcBef>
+                <a:spcPts val="0"/>
+              </a:spcBef>
+              <a:spcAft>
+                <a:spcPts val="0"/>
+              </a:spcAft>
+              <a:buClrTx/>
+              <a:buSzTx/>
+              <a:buFontTx/>
+              <a:buNone/>
+              <a:tabLst/>
+              <a:defRPr/>
+            </a:pPr>
+            <a:endParaRPr lang="en-US" dirty="0"/>
+          </a:p>
+          <a:p>
+            <a:pPr marL="0" marR="0" lvl="0" indent="0" defTabSz="914400" eaLnBrk="1" fontAlgn="auto" latinLnBrk="0" hangingPunct="1">
+              <a:lnSpc>
+                <a:spcPct val="100000"/>
+              </a:lnSpc>
+              <a:spcBef>
+                <a:spcPts val="0"/>
+              </a:spcBef>
+              <a:spcAft>
+                <a:spcPts val="0"/>
+              </a:spcAft>
+              <a:buClrTx/>
+              <a:buSzTx/>
+              <a:buFontTx/>
+              <a:buNone/>
+              <a:tabLst/>
+              <a:defRPr/>
+            </a:pPr>
+            <a:r>
+              <a:rPr lang="en-US" dirty="0"/>
+              <a:t>Bottom line: </a:t>
+            </a:r>
+            <a:r>
+              <a:rPr lang="en-US" i="1" dirty="0"/>
+              <a:t>Well-written code is clear, verbose, and does not cut corners. </a:t>
+            </a:r>
+          </a:p>
+          <a:p>
+            <a:pPr lvl="1">
+              <a:lnSpc>
+                <a:spcPct val="100000"/>
+              </a:lnSpc>
+              <a:spcBef>
+                <a:spcPts val="0"/>
+              </a:spcBef>
+            </a:pPr>
+            <a:r>
+              <a:rPr lang="en-US" dirty="0"/>
+              <a:t>Viewing code as a mere means to an end solves zero problems while causing many. That line is usually crossed </a:t>
+            </a:r>
+            <a:r>
+              <a:rPr lang="en-US" i="1" dirty="0"/>
+              <a:t>long</a:t>
+            </a:r>
+            <a:r>
+              <a:rPr lang="en-US" dirty="0"/>
+              <a:t> before a public release, and the solution is knowing how to engineer your code.</a:t>
             </a:r>
           </a:p>
         </p:txBody>
@@ -9256,7 +9580,7 @@
 </p:sld>
 </file>
 
-<file path=ppt/slides/slide11.xml><?xml version="1.0" encoding="utf-8"?>
+<file path=ppt/slides/slide12.xml><?xml version="1.0" encoding="utf-8"?>
 <p:sld xmlns:a="http://schemas.openxmlformats.org/drawingml/2006/main" xmlns:r="http://schemas.openxmlformats.org/officeDocument/2006/relationships" xmlns:p="http://schemas.openxmlformats.org/presentationml/2006/main">
   <p:cSld>
     <p:spTree>
@@ -10037,7 +10361,7 @@
             </a:pPr>
             <a:r>
               <a:rPr lang="en-US" dirty="0"/>
-              <a:t>This is a mnemonic for “everything component should do exactly one thing.” </a:t>
+              <a:t>This is a mnemonic for “every component should do exactly one thing.” </a:t>
             </a:r>
           </a:p>
         </p:txBody>
@@ -10218,7 +10542,7 @@
             </a:pPr>
             <a:r>
               <a:rPr lang="en-US" dirty="0"/>
-              <a:t>The standard is for public codes to use the 3-digit system (e.g. 1.2.1, 2.3.0) </a:t>
+              <a:t>The standard for public codes is to use the 3-digit system (e.g. 1.2.1, 2.3.0)</a:t>
             </a:r>
           </a:p>
           <a:p>
@@ -10319,7 +10643,13 @@
       </p:grpSpPr>
       <p:sp>
         <p:nvSpPr>
-          <p:cNvPr id="2" name="Title 1"/>
+          <p:cNvPr id="2" name="Title 1">
+            <a:extLst>
+              <a:ext uri="{FF2B5EF4-FFF2-40B4-BE49-F238E27FC236}">
+                <a16:creationId xmlns:a16="http://schemas.microsoft.com/office/drawing/2014/main" id="{2044C70A-0EEA-7046-A53E-5E3D67DBCCCD}"/>
+              </a:ext>
+            </a:extLst>
+          </p:cNvPr>
           <p:cNvSpPr>
             <a:spLocks noGrp="1"/>
           </p:cNvSpPr>
@@ -10334,14 +10664,20 @@
           <a:p>
             <a:r>
               <a:rPr lang="en-US" dirty="0"/>
-              <a:t>Minimization of Dependencies </a:t>
-            </a:r>
-          </a:p>
-        </p:txBody>
-      </p:sp>
-      <p:sp>
-        <p:nvSpPr>
-          <p:cNvPr id="3" name="Content Placeholder 2"/>
+              <a:t>GitHub</a:t>
+            </a:r>
+          </a:p>
+        </p:txBody>
+      </p:sp>
+      <p:sp>
+        <p:nvSpPr>
+          <p:cNvPr id="3" name="Content Placeholder 2">
+            <a:extLst>
+              <a:ext uri="{FF2B5EF4-FFF2-40B4-BE49-F238E27FC236}">
+                <a16:creationId xmlns:a16="http://schemas.microsoft.com/office/drawing/2014/main" id="{B6F063FA-7AED-F74B-BFF4-2EF8CC78A660}"/>
+              </a:ext>
+            </a:extLst>
+          </p:cNvPr>
           <p:cNvSpPr>
             <a:spLocks noGrp="1"/>
           </p:cNvSpPr>
@@ -10351,209 +10687,132 @@
         </p:nvSpPr>
         <p:spPr>
           <a:xfrm>
-            <a:off x="680321" y="2336872"/>
-            <a:ext cx="10265183" cy="4295939"/>
-          </a:xfrm>
-        </p:spPr>
-        <p:txBody>
-          <a:bodyPr>
-            <a:normAutofit/>
-          </a:bodyPr>
+            <a:off x="309945" y="2111005"/>
+            <a:ext cx="5343882" cy="4650404"/>
+          </a:xfrm>
+        </p:spPr>
+        <p:txBody>
+          <a:bodyPr/>
           <a:lstStyle/>
           <a:p>
-            <a:pPr marL="0" marR="0" lvl="0" indent="0" defTabSz="914400" eaLnBrk="1" fontAlgn="auto" latinLnBrk="0" hangingPunct="1">
-              <a:lnSpc>
-                <a:spcPct val="100000"/>
-              </a:lnSpc>
-              <a:spcBef>
-                <a:spcPts val="0"/>
-              </a:spcBef>
-              <a:spcAft>
-                <a:spcPts val="0"/>
-              </a:spcAft>
-              <a:buClrTx/>
-              <a:buSzTx/>
-              <a:buFontTx/>
-              <a:buNone/>
-              <a:tabLst/>
-              <a:defRPr/>
+            <a:pPr marL="0" indent="0">
+              <a:buNone/>
             </a:pPr>
             <a:r>
               <a:rPr lang="en-US" dirty="0"/>
-              <a:t>If the code base for your software uses another, external software (e.g. </a:t>
-            </a:r>
-            <a:r>
-              <a:rPr lang="en-US" dirty="0" err="1"/>
-              <a:t>NumPy</a:t>
-            </a:r>
+              <a:t>First and foremost: file-sharing system</a:t>
+            </a:r>
+          </a:p>
+          <a:p>
+            <a:pPr lvl="1"/>
             <a:r>
               <a:rPr lang="en-US" dirty="0"/>
-              <a:t>), that is called a </a:t>
-            </a:r>
-            <a:r>
-              <a:rPr lang="en-US" i="1" dirty="0"/>
-              <a:t>dependency</a:t>
-            </a:r>
-            <a:r>
-              <a:rPr lang="en-US" dirty="0"/>
-              <a:t> (your code </a:t>
-            </a:r>
-            <a:r>
-              <a:rPr lang="en-US" i="1" dirty="0"/>
-              <a:t>depends on </a:t>
-            </a:r>
-            <a:r>
-              <a:rPr lang="en-US" dirty="0" err="1"/>
-              <a:t>NumPy</a:t>
-            </a:r>
-            <a:r>
-              <a:rPr lang="en-US" dirty="0"/>
-              <a:t>). </a:t>
-            </a:r>
-          </a:p>
-          <a:p>
-            <a:pPr marL="0" marR="0" lvl="0" indent="0" defTabSz="914400" eaLnBrk="1" fontAlgn="auto" latinLnBrk="0" hangingPunct="1">
-              <a:lnSpc>
-                <a:spcPct val="100000"/>
-              </a:lnSpc>
-              <a:spcBef>
-                <a:spcPts val="0"/>
-              </a:spcBef>
-              <a:spcAft>
-                <a:spcPts val="0"/>
-              </a:spcAft>
-              <a:buClrTx/>
-              <a:buSzTx/>
-              <a:buFontTx/>
-              <a:buNone/>
-              <a:tabLst/>
-              <a:defRPr/>
+              <a:t>Keeps a catalog of the changes to your code over time, making it a great tool for version control for developers</a:t>
+            </a:r>
+          </a:p>
+          <a:p>
+            <a:pPr marL="0" indent="0">
+              <a:buNone/>
             </a:pPr>
             <a:endParaRPr lang="en-US" dirty="0"/>
           </a:p>
           <a:p>
-            <a:pPr marL="0" marR="0" lvl="0" indent="0" defTabSz="914400" eaLnBrk="1" fontAlgn="auto" latinLnBrk="0" hangingPunct="1">
-              <a:lnSpc>
-                <a:spcPct val="100000"/>
-              </a:lnSpc>
-              <a:spcBef>
-                <a:spcPts val="0"/>
-              </a:spcBef>
-              <a:spcAft>
-                <a:spcPts val="0"/>
-              </a:spcAft>
-              <a:buClrTx/>
-              <a:buSzTx/>
-              <a:buFontTx/>
-              <a:buNone/>
-              <a:tabLst/>
-              <a:defRPr/>
+            <a:pPr marL="0" indent="0">
+              <a:buNone/>
             </a:pPr>
             <a:r>
               <a:rPr lang="en-US" dirty="0"/>
-              <a:t>It’s quite common to have a ~few dependencies, but too many is </a:t>
-            </a:r>
-            <a:r>
-              <a:rPr lang="en-US" i="1" dirty="0"/>
-              <a:t>problematic</a:t>
-            </a:r>
+              <a:t>For astronomers:</a:t>
+            </a:r>
+          </a:p>
+          <a:p>
+            <a:pPr lvl="1"/>
             <a:r>
               <a:rPr lang="en-US" dirty="0"/>
-              <a:t>. </a:t>
-            </a:r>
-          </a:p>
-          <a:p>
-            <a:pPr marL="0" marR="0" lvl="0" indent="0" defTabSz="914400" eaLnBrk="1" fontAlgn="auto" latinLnBrk="0" hangingPunct="1">
-              <a:lnSpc>
-                <a:spcPct val="100000"/>
-              </a:lnSpc>
-              <a:spcBef>
-                <a:spcPts val="0"/>
-              </a:spcBef>
-              <a:spcAft>
-                <a:spcPts val="0"/>
-              </a:spcAft>
-              <a:buClrTx/>
-              <a:buSzTx/>
-              <a:buFontTx/>
-              <a:buNone/>
-              <a:tabLst/>
-              <a:defRPr/>
+              <a:t>Share with collaborators</a:t>
+            </a:r>
+          </a:p>
+          <a:p>
+            <a:pPr lvl="1"/>
+            <a:r>
+              <a:rPr lang="en-US" dirty="0"/>
+              <a:t>Manage files between multiple computers</a:t>
+            </a:r>
+          </a:p>
+          <a:p>
+            <a:pPr marL="0" indent="0">
+              <a:buNone/>
             </a:pPr>
             <a:endParaRPr lang="en-US" dirty="0"/>
           </a:p>
           <a:p>
-            <a:pPr marL="0" marR="0" lvl="0" indent="0" defTabSz="914400" eaLnBrk="1" fontAlgn="auto" latinLnBrk="0" hangingPunct="1">
-              <a:lnSpc>
-                <a:spcPct val="100000"/>
-              </a:lnSpc>
-              <a:spcBef>
-                <a:spcPts val="0"/>
-              </a:spcBef>
-              <a:spcAft>
-                <a:spcPts val="0"/>
-              </a:spcAft>
-              <a:buClrTx/>
-              <a:buSzTx/>
-              <a:buFontTx/>
-              <a:buNone/>
-              <a:tabLst/>
-              <a:defRPr/>
+            <a:pPr marL="0" indent="0">
+              <a:buNone/>
             </a:pPr>
             <a:r>
               <a:rPr lang="en-US" dirty="0"/>
-              <a:t>As of now my own python package (VICE) is ~76k lines of code. If one of its dependencies releases a new version with changes that affect my code, I have to go look at every file to ensure this doesn’t break anything. </a:t>
-            </a:r>
-          </a:p>
-          <a:p>
-            <a:pPr marL="0" marR="0" lvl="0" indent="0" defTabSz="914400" eaLnBrk="1" fontAlgn="auto" latinLnBrk="0" hangingPunct="1">
-              <a:lnSpc>
-                <a:spcPct val="100000"/>
-              </a:lnSpc>
-              <a:spcBef>
-                <a:spcPts val="0"/>
-              </a:spcBef>
-              <a:spcAft>
-                <a:spcPts val="0"/>
-              </a:spcAft>
-              <a:buClrTx/>
-              <a:buSzTx/>
-              <a:buFontTx/>
-              <a:buNone/>
-              <a:tabLst/>
-              <a:defRPr/>
-            </a:pPr>
-            <a:endParaRPr lang="en-US" dirty="0"/>
-          </a:p>
-          <a:p>
-            <a:pPr marL="0" marR="0" lvl="0" indent="0" defTabSz="914400" eaLnBrk="1" fontAlgn="auto" latinLnBrk="0" hangingPunct="1">
-              <a:lnSpc>
-                <a:spcPct val="100000"/>
-              </a:lnSpc>
-              <a:spcBef>
-                <a:spcPts val="0"/>
-              </a:spcBef>
-              <a:spcAft>
-                <a:spcPts val="0"/>
-              </a:spcAft>
-              <a:buClrTx/>
-              <a:buSzTx/>
-              <a:buFontTx/>
-              <a:buNone/>
-              <a:tabLst/>
-              <a:defRPr/>
-            </a:pPr>
+              <a:t>Terminal: </a:t>
+            </a:r>
+            <a:r>
+              <a:rPr lang="en-US" i="1" dirty="0"/>
+              <a:t>git</a:t>
+            </a:r>
             <a:r>
               <a:rPr lang="en-US" dirty="0"/>
-              <a:t>Advice: Don’t be afraid to write the small but challenging stuff yourself. </a:t>
-            </a:r>
-          </a:p>
-        </p:txBody>
-      </p:sp>
+              <a:t> [</a:t>
+            </a:r>
+            <a:r>
+              <a:rPr lang="en-US" i="1" dirty="0"/>
+              <a:t>add, commit, pull, push, …</a:t>
+            </a:r>
+            <a:r>
+              <a:rPr lang="en-US" dirty="0"/>
+              <a:t>]</a:t>
+            </a:r>
+          </a:p>
+          <a:p>
+            <a:pPr lvl="1"/>
+            <a:r>
+              <a:rPr lang="en-US" dirty="0"/>
+              <a:t>Their website will show you how to set up a repository</a:t>
+            </a:r>
+          </a:p>
+        </p:txBody>
+      </p:sp>
+      <p:pic>
+        <p:nvPicPr>
+          <p:cNvPr id="5" name="Picture 4" descr="A picture containing graphical user interface&#10;&#10;Description automatically generated">
+            <a:extLst>
+              <a:ext uri="{FF2B5EF4-FFF2-40B4-BE49-F238E27FC236}">
+                <a16:creationId xmlns:a16="http://schemas.microsoft.com/office/drawing/2014/main" id="{A49B0816-C986-9743-A3D6-0CB6F5E17227}"/>
+              </a:ext>
+            </a:extLst>
+          </p:cNvPr>
+          <p:cNvPicPr>
+            <a:picLocks noChangeAspect="1"/>
+          </p:cNvPicPr>
+          <p:nvPr/>
+        </p:nvPicPr>
+        <p:blipFill>
+          <a:blip r:embed="rId3"/>
+          <a:stretch>
+            <a:fillRect/>
+          </a:stretch>
+        </p:blipFill>
+        <p:spPr>
+          <a:xfrm>
+            <a:off x="5953482" y="2687933"/>
+            <a:ext cx="6095999" cy="3000225"/>
+          </a:xfrm>
+          <a:prstGeom prst="rect">
+            <a:avLst/>
+          </a:prstGeom>
+        </p:spPr>
+      </p:pic>
     </p:spTree>
     <p:extLst>
       <p:ext uri="{BB962C8B-B14F-4D97-AF65-F5344CB8AC3E}">
-        <p14:creationId xmlns:p14="http://schemas.microsoft.com/office/powerpoint/2010/main" val="831163437"/>
+        <p14:creationId xmlns:p14="http://schemas.microsoft.com/office/powerpoint/2010/main" val="445000182"/>
       </p:ext>
     </p:extLst>
   </p:cSld>
@@ -10597,7 +10856,7 @@
           <a:p>
             <a:r>
               <a:rPr lang="en-US" dirty="0"/>
-              <a:t>Testing</a:t>
+              <a:t>Minimization of Dependencies </a:t>
             </a:r>
           </a:p>
         </p:txBody>
@@ -10615,11 +10874,13 @@
         <p:spPr>
           <a:xfrm>
             <a:off x="680321" y="2336872"/>
-            <a:ext cx="9613861" cy="4159461"/>
-          </a:xfrm>
-        </p:spPr>
-        <p:txBody>
-          <a:bodyPr/>
+            <a:ext cx="10265183" cy="4295939"/>
+          </a:xfrm>
+        </p:spPr>
+        <p:txBody>
+          <a:bodyPr>
+            <a:normAutofit/>
+          </a:bodyPr>
           <a:lstStyle/>
           <a:p>
             <a:pPr marL="0" marR="0" lvl="0" indent="0" defTabSz="914400" eaLnBrk="1" fontAlgn="auto" latinLnBrk="0" hangingPunct="1">
@@ -10641,99 +10902,172 @@
             </a:pPr>
             <a:r>
               <a:rPr lang="en-US" dirty="0"/>
-              <a:t>Well-written software implements </a:t>
+              <a:t>If the code base for your software uses another, external software (e.g. </a:t>
+            </a:r>
+            <a:r>
+              <a:rPr lang="en-US" dirty="0" err="1"/>
+              <a:t>NumPy</a:t>
+            </a:r>
+            <a:r>
+              <a:rPr lang="en-US" dirty="0"/>
+              <a:t>), that is called a </a:t>
             </a:r>
             <a:r>
               <a:rPr lang="en-US" i="1" dirty="0"/>
-              <a:t>unit tests</a:t>
+              <a:t>dependency</a:t>
             </a:r>
             <a:r>
               <a:rPr lang="en-US" dirty="0"/>
-              <a:t> </a:t>
-            </a:r>
-          </a:p>
-          <a:p>
-            <a:pPr lvl="1">
+              <a:t> (your code </a:t>
+            </a:r>
+            <a:r>
+              <a:rPr lang="en-US" i="1" dirty="0"/>
+              <a:t>depends on </a:t>
+            </a:r>
+            <a:r>
+              <a:rPr lang="en-US" dirty="0" err="1"/>
+              <a:t>NumPy</a:t>
+            </a:r>
+            <a:r>
+              <a:rPr lang="en-US" dirty="0"/>
+              <a:t>). </a:t>
+            </a:r>
+          </a:p>
+          <a:p>
+            <a:pPr marL="0" marR="0" lvl="0" indent="0" defTabSz="914400" eaLnBrk="1" fontAlgn="auto" latinLnBrk="0" hangingPunct="1">
               <a:lnSpc>
                 <a:spcPct val="100000"/>
               </a:lnSpc>
               <a:spcBef>
                 <a:spcPts val="0"/>
               </a:spcBef>
+              <a:spcAft>
+                <a:spcPts val="0"/>
+              </a:spcAft>
+              <a:buClrTx/>
+              <a:buSzTx/>
+              <a:buFontTx/>
+              <a:buNone/>
+              <a:tabLst/>
+              <a:defRPr/>
             </a:pPr>
-            <a:r>
-              <a:rPr lang="en-US" dirty="0"/>
-              <a:t>A means of assigning </a:t>
-            </a:r>
-            <a:r>
-              <a:rPr lang="en-US" i="1" dirty="0"/>
-              <a:t>Success/Failure/Skipped</a:t>
-            </a:r>
-            <a:r>
-              <a:rPr lang="en-US" dirty="0"/>
-              <a:t> messages to the smallest possible components of a code base </a:t>
-            </a:r>
-          </a:p>
-          <a:p>
-            <a:pPr marL="0" indent="0">
+            <a:endParaRPr lang="en-US" dirty="0"/>
+          </a:p>
+          <a:p>
+            <a:pPr marL="0" marR="0" lvl="0" indent="0" defTabSz="914400" eaLnBrk="1" fontAlgn="auto" latinLnBrk="0" hangingPunct="1">
               <a:lnSpc>
                 <a:spcPct val="100000"/>
               </a:lnSpc>
               <a:spcBef>
                 <a:spcPts val="0"/>
               </a:spcBef>
-              <a:buNone/>
+              <a:spcAft>
+                <a:spcPts val="0"/>
+              </a:spcAft>
+              <a:buClrTx/>
+              <a:buSzTx/>
+              <a:buFontTx/>
+              <a:buNone/>
+              <a:tabLst/>
+              <a:defRPr/>
             </a:pPr>
-            <a:endParaRPr lang="en-US" dirty="0"/>
-          </a:p>
-          <a:p>
-            <a:pPr marL="0" indent="0">
+            <a:r>
+              <a:rPr lang="en-US" dirty="0"/>
+              <a:t>It’s quite common to have a ~few dependencies, but too many is </a:t>
+            </a:r>
+            <a:r>
+              <a:rPr lang="en-US" i="1" dirty="0"/>
+              <a:t>problematic</a:t>
+            </a:r>
+            <a:r>
+              <a:rPr lang="en-US" dirty="0"/>
+              <a:t>. </a:t>
+            </a:r>
+          </a:p>
+          <a:p>
+            <a:pPr marL="0" marR="0" lvl="0" indent="0" defTabSz="914400" eaLnBrk="1" fontAlgn="auto" latinLnBrk="0" hangingPunct="1">
               <a:lnSpc>
                 <a:spcPct val="100000"/>
               </a:lnSpc>
               <a:spcBef>
                 <a:spcPts val="0"/>
               </a:spcBef>
-              <a:buNone/>
+              <a:spcAft>
+                <a:spcPts val="0"/>
+              </a:spcAft>
+              <a:buClrTx/>
+              <a:buSzTx/>
+              <a:buFontTx/>
+              <a:buNone/>
+              <a:tabLst/>
+              <a:defRPr/>
             </a:pPr>
-            <a:r>
-              <a:rPr lang="en-US" dirty="0"/>
-              <a:t>When you make a future change to your code base, this gives you an automated means of finding out if your change broke anything you weren’t expecting to break. </a:t>
-            </a:r>
-          </a:p>
-          <a:p>
-            <a:pPr marL="0" indent="0">
+            <a:endParaRPr lang="en-US" dirty="0"/>
+          </a:p>
+          <a:p>
+            <a:pPr marL="0" marR="0" lvl="0" indent="0" defTabSz="914400" eaLnBrk="1" fontAlgn="auto" latinLnBrk="0" hangingPunct="1">
               <a:lnSpc>
                 <a:spcPct val="100000"/>
               </a:lnSpc>
               <a:spcBef>
                 <a:spcPts val="0"/>
               </a:spcBef>
-              <a:buNone/>
+              <a:spcAft>
+                <a:spcPts val="0"/>
+              </a:spcAft>
+              <a:buClrTx/>
+              <a:buSzTx/>
+              <a:buFontTx/>
+              <a:buNone/>
+              <a:tabLst/>
+              <a:defRPr/>
             </a:pPr>
-            <a:endParaRPr lang="en-US" dirty="0"/>
-          </a:p>
-          <a:p>
-            <a:pPr marL="0" indent="0">
+            <a:r>
+              <a:rPr lang="en-US" dirty="0"/>
+              <a:t>As of now my own python package (VICE) is ~90k lines of code. If one of its dependencies releases a new version with changes that affect my code, I have to go look at every file to ensure this doesn’t break anything. </a:t>
+            </a:r>
+          </a:p>
+          <a:p>
+            <a:pPr marL="0" marR="0" lvl="0" indent="0" defTabSz="914400" eaLnBrk="1" fontAlgn="auto" latinLnBrk="0" hangingPunct="1">
               <a:lnSpc>
                 <a:spcPct val="100000"/>
               </a:lnSpc>
               <a:spcBef>
                 <a:spcPts val="0"/>
               </a:spcBef>
-              <a:buNone/>
+              <a:spcAft>
+                <a:spcPts val="0"/>
+              </a:spcAft>
+              <a:buClrTx/>
+              <a:buSzTx/>
+              <a:buFontTx/>
+              <a:buNone/>
+              <a:tabLst/>
+              <a:defRPr/>
             </a:pPr>
+            <a:endParaRPr lang="en-US" dirty="0"/>
+          </a:p>
+          <a:p>
+            <a:pPr marL="0" marR="0" lvl="0" indent="0" defTabSz="914400" eaLnBrk="1" fontAlgn="auto" latinLnBrk="0" hangingPunct="1">
+              <a:lnSpc>
+                <a:spcPct val="100000"/>
+              </a:lnSpc>
+              <a:spcBef>
+                <a:spcPts val="0"/>
+              </a:spcBef>
+              <a:spcAft>
+                <a:spcPts val="0"/>
+              </a:spcAft>
+              <a:buClrTx/>
+              <a:buSzTx/>
+              <a:buFontTx/>
+              <a:buNone/>
+              <a:tabLst/>
+              <a:defRPr/>
+            </a:pPr>
             <a:r>
               <a:rPr lang="en-US" dirty="0"/>
-              <a:t>This is as simple as </a:t>
-            </a:r>
-            <a:r>
-              <a:rPr lang="en-US" i="1" dirty="0"/>
-              <a:t>actually saving</a:t>
-            </a:r>
-            <a:r>
-              <a:rPr lang="en-US" dirty="0"/>
-              <a:t> the code you write to test a new component of your software, and the same for when you resolve an issue. </a:t>
+              <a:t>Advice: Don’t be afraid to write the small but challenging stuff yourself. </a:t>
             </a:r>
           </a:p>
         </p:txBody>
@@ -10741,7 +11075,7 @@
     </p:spTree>
     <p:extLst>
       <p:ext uri="{BB962C8B-B14F-4D97-AF65-F5344CB8AC3E}">
-        <p14:creationId xmlns:p14="http://schemas.microsoft.com/office/powerpoint/2010/main" val="1484475418"/>
+        <p14:creationId xmlns:p14="http://schemas.microsoft.com/office/powerpoint/2010/main" val="831163437"/>
       </p:ext>
     </p:extLst>
   </p:cSld>
@@ -10784,22 +11118,9 @@
           <a:lstStyle/>
           <a:p>
             <a:r>
-              <a:rPr lang="en-US" i="1" dirty="0"/>
-              <a:t>Think</a:t>
-            </a:r>
-            <a:r>
               <a:rPr lang="en-US" dirty="0"/>
-              <a:t> Before You </a:t>
-            </a:r>
-            <a:r>
-              <a:rPr lang="en-US" i="1" dirty="0"/>
-              <a:t>Write</a:t>
-            </a:r>
-            <a:r>
-              <a:rPr lang="en-US" dirty="0"/>
-              <a:t> </a:t>
-            </a:r>
-            <a:endParaRPr lang="en-US" i="1" dirty="0"/>
+              <a:t>Testing</a:t>
+            </a:r>
           </a:p>
         </p:txBody>
       </p:sp>
@@ -10815,14 +11136,12 @@
         </p:nvSpPr>
         <p:spPr>
           <a:xfrm>
-            <a:off x="680321" y="2336873"/>
-            <a:ext cx="9613861" cy="4104870"/>
-          </a:xfrm>
-        </p:spPr>
-        <p:txBody>
-          <a:bodyPr>
-            <a:normAutofit/>
-          </a:bodyPr>
+            <a:off x="680321" y="2336872"/>
+            <a:ext cx="9613861" cy="4159461"/>
+          </a:xfrm>
+        </p:spPr>
+        <p:txBody>
+          <a:bodyPr/>
           <a:lstStyle/>
           <a:p>
             <a:pPr marL="0" marR="0" lvl="0" indent="0" defTabSz="914400" eaLnBrk="1" fontAlgn="auto" latinLnBrk="0" hangingPunct="1">
@@ -10844,7 +11163,15 @@
             </a:pPr>
             <a:r>
               <a:rPr lang="en-US" dirty="0"/>
-              <a:t>Many scientists just start writing functions when posed with a problem </a:t>
+              <a:t>Well-written software implements </a:t>
+            </a:r>
+            <a:r>
+              <a:rPr lang="en-US" i="1" dirty="0"/>
+              <a:t>unit tests</a:t>
+            </a:r>
+            <a:r>
+              <a:rPr lang="en-US" dirty="0"/>
+              <a:t> </a:t>
             </a:r>
           </a:p>
           <a:p>
@@ -10858,21 +11185,15 @@
             </a:pPr>
             <a:r>
               <a:rPr lang="en-US" dirty="0"/>
-              <a:t>This has its place and its usefulness within research </a:t>
-            </a:r>
-          </a:p>
-          <a:p>
-            <a:pPr lvl="1">
-              <a:lnSpc>
-                <a:spcPct val="100000"/>
-              </a:lnSpc>
-              <a:spcBef>
-                <a:spcPts val="0"/>
-              </a:spcBef>
-            </a:pPr>
+              <a:t>A means of assigning </a:t>
+            </a:r>
+            <a:r>
+              <a:rPr lang="en-US" i="1" dirty="0"/>
+              <a:t>Success/Failure/Skipped</a:t>
+            </a:r>
             <a:r>
               <a:rPr lang="en-US" dirty="0"/>
-              <a:t>If you’re going to use some function &gt;few times, I advise more thought </a:t>
+              <a:t> messages to the smallest possible components of a code base </a:t>
             </a:r>
           </a:p>
           <a:p>
@@ -10899,13 +11220,8 @@
             </a:pPr>
             <a:r>
               <a:rPr lang="en-US" dirty="0"/>
-              <a:t>If you’re going to be spending even as much as five minutes writing a given file, stop and ask yourself: </a:t>
-            </a:r>
-            <a:r>
-              <a:rPr lang="en-US" i="1" dirty="0"/>
-              <a:t>What objects might be useful? What functions might be useful? </a:t>
-            </a:r>
-            <a:endParaRPr lang="en-US" dirty="0"/>
+              <a:t>When you make a future change to your code base, this gives you an automated means of finding out if your change broke anything you weren’t expecting to break. </a:t>
+            </a:r>
           </a:p>
           <a:p>
             <a:pPr marL="0" indent="0">
@@ -10931,24 +11247,23 @@
             </a:pPr>
             <a:r>
               <a:rPr lang="en-US" dirty="0"/>
-              <a:t>There are many ways to write the same program, so don’t always settle for the first idea that comes into your head. </a:t>
+              <a:t>This is as simple as </a:t>
             </a:r>
             <a:r>
               <a:rPr lang="en-US" i="1" dirty="0"/>
-              <a:t>You can usually improve upon the first thing that comes to mind</a:t>
+              <a:t>actually saving</a:t>
             </a:r>
             <a:r>
               <a:rPr lang="en-US" dirty="0"/>
-              <a:t>. </a:t>
-            </a:r>
-            <a:endParaRPr lang="en-US" i="1" dirty="0"/>
+              <a:t> the code you write to test a new component of your software, and the same for when you resolve an issue. </a:t>
+            </a:r>
           </a:p>
         </p:txBody>
       </p:sp>
     </p:spTree>
     <p:extLst>
       <p:ext uri="{BB962C8B-B14F-4D97-AF65-F5344CB8AC3E}">
-        <p14:creationId xmlns:p14="http://schemas.microsoft.com/office/powerpoint/2010/main" val="932260817"/>
+        <p14:creationId xmlns:p14="http://schemas.microsoft.com/office/powerpoint/2010/main" val="1484475418"/>
       </p:ext>
     </p:extLst>
   </p:cSld>
@@ -11023,11 +11338,13 @@
         <p:spPr>
           <a:xfrm>
             <a:off x="680321" y="2336873"/>
-            <a:ext cx="6116264" cy="4104870"/>
-          </a:xfrm>
-        </p:spPr>
-        <p:txBody>
-          <a:bodyPr/>
+            <a:ext cx="9613861" cy="4104870"/>
+          </a:xfrm>
+        </p:spPr>
+        <p:txBody>
+          <a:bodyPr>
+            <a:normAutofit/>
+          </a:bodyPr>
           <a:lstStyle/>
           <a:p>
             <a:pPr marL="0" marR="0" lvl="0" indent="0" defTabSz="914400" eaLnBrk="1" fontAlgn="auto" latinLnBrk="0" hangingPunct="1">
@@ -11047,127 +11364,113 @@
               <a:tabLst/>
               <a:defRPr/>
             </a:pPr>
-            <a:endParaRPr lang="en-US" dirty="0"/>
-          </a:p>
-          <a:p>
-            <a:pPr marL="0" marR="0" lvl="0" indent="0" defTabSz="914400" eaLnBrk="1" fontAlgn="auto" latinLnBrk="0" hangingPunct="1">
+            <a:r>
+              <a:rPr lang="en-US" dirty="0"/>
+              <a:t>Many scientists just start writing functions when posed with a problem </a:t>
+            </a:r>
+          </a:p>
+          <a:p>
+            <a:pPr lvl="1">
               <a:lnSpc>
                 <a:spcPct val="100000"/>
               </a:lnSpc>
               <a:spcBef>
                 <a:spcPts val="0"/>
               </a:spcBef>
-              <a:spcAft>
-                <a:spcPts val="0"/>
-              </a:spcAft>
-              <a:buClrTx/>
-              <a:buSzTx/>
-              <a:buFontTx/>
-              <a:buNone/>
-              <a:tabLst/>
-              <a:defRPr/>
             </a:pPr>
-            <a:endParaRPr lang="en-US" dirty="0"/>
-          </a:p>
-          <a:p>
-            <a:pPr marL="0" marR="0" lvl="0" indent="0" defTabSz="914400" eaLnBrk="1" fontAlgn="auto" latinLnBrk="0" hangingPunct="1">
+            <a:r>
+              <a:rPr lang="en-US" dirty="0"/>
+              <a:t>This has its place and its usefulness within research </a:t>
+            </a:r>
+          </a:p>
+          <a:p>
+            <a:pPr lvl="1">
               <a:lnSpc>
                 <a:spcPct val="100000"/>
               </a:lnSpc>
               <a:spcBef>
                 <a:spcPts val="0"/>
               </a:spcBef>
-              <a:spcAft>
-                <a:spcPts val="0"/>
-              </a:spcAft>
-              <a:buClrTx/>
-              <a:buSzTx/>
-              <a:buFontTx/>
-              <a:buNone/>
-              <a:tabLst/>
-              <a:defRPr/>
             </a:pPr>
-            <a:endParaRPr lang="en-US" dirty="0"/>
-          </a:p>
-          <a:p>
-            <a:pPr marL="0" marR="0" lvl="0" indent="0" defTabSz="914400" eaLnBrk="1" fontAlgn="auto" latinLnBrk="0" hangingPunct="1">
+            <a:r>
+              <a:rPr lang="en-US" dirty="0"/>
+              <a:t>If you’re going to use some function &gt;few times, I advise more thought </a:t>
+            </a:r>
+          </a:p>
+          <a:p>
+            <a:pPr marL="0" indent="0">
               <a:lnSpc>
                 <a:spcPct val="100000"/>
               </a:lnSpc>
               <a:spcBef>
                 <a:spcPts val="0"/>
               </a:spcBef>
-              <a:spcAft>
-                <a:spcPts val="0"/>
-              </a:spcAft>
-              <a:buClrTx/>
-              <a:buSzTx/>
-              <a:buFontTx/>
-              <a:buNone/>
-              <a:tabLst/>
-              <a:defRPr/>
+              <a:buNone/>
             </a:pPr>
             <a:endParaRPr lang="en-US" dirty="0"/>
           </a:p>
           <a:p>
-            <a:pPr marL="0" marR="0" lvl="0" indent="0" defTabSz="914400" eaLnBrk="1" fontAlgn="auto" latinLnBrk="0" hangingPunct="1">
+            <a:pPr marL="0" indent="0">
               <a:lnSpc>
                 <a:spcPct val="100000"/>
               </a:lnSpc>
               <a:spcBef>
                 <a:spcPts val="0"/>
               </a:spcBef>
-              <a:spcAft>
+              <a:buNone/>
+            </a:pPr>
+            <a:r>
+              <a:rPr lang="en-US" dirty="0"/>
+              <a:t>If you’re going to be spending even as much as five minutes writing a given file, stop and ask yourself: </a:t>
+            </a:r>
+            <a:r>
+              <a:rPr lang="en-US" i="1" dirty="0"/>
+              <a:t>What objects might be useful? What functions might be useful? </a:t>
+            </a:r>
+            <a:endParaRPr lang="en-US" dirty="0"/>
+          </a:p>
+          <a:p>
+            <a:pPr marL="0" indent="0">
+              <a:lnSpc>
+                <a:spcPct val="100000"/>
+              </a:lnSpc>
+              <a:spcBef>
                 <a:spcPts val="0"/>
-              </a:spcAft>
-              <a:buClrTx/>
-              <a:buSzTx/>
-              <a:buFontTx/>
-              <a:buNone/>
-              <a:tabLst/>
-              <a:defRPr/>
+              </a:spcBef>
+              <a:buNone/>
             </a:pPr>
+            <a:endParaRPr lang="en-US" dirty="0"/>
+          </a:p>
+          <a:p>
+            <a:pPr marL="0" indent="0">
+              <a:lnSpc>
+                <a:spcPct val="100000"/>
+              </a:lnSpc>
+              <a:spcBef>
+                <a:spcPts val="0"/>
+              </a:spcBef>
+              <a:buNone/>
+            </a:pPr>
             <a:r>
               <a:rPr lang="en-US" dirty="0"/>
-              <a:t>This is how professional developers and software engineers view scientist-written code </a:t>
-            </a:r>
-          </a:p>
-        </p:txBody>
-      </p:sp>
-      <p:pic>
-        <p:nvPicPr>
-          <p:cNvPr id="4" name="Picture 3"/>
-          <p:cNvPicPr>
-            <a:picLocks noChangeAspect="1"/>
-          </p:cNvPicPr>
-          <p:nvPr/>
-        </p:nvPicPr>
-        <p:blipFill>
-          <a:blip r:embed="rId3">
-            <a:extLst>
-              <a:ext uri="{28A0092B-C50C-407E-A947-70E740481C1C}">
-                <a14:useLocalDpi xmlns:a14="http://schemas.microsoft.com/office/drawing/2010/main" val="0"/>
-              </a:ext>
-            </a:extLst>
-          </a:blip>
-          <a:stretch>
-            <a:fillRect/>
-          </a:stretch>
-        </p:blipFill>
-        <p:spPr>
-          <a:xfrm>
-            <a:off x="7011349" y="2040359"/>
-            <a:ext cx="3770384" cy="4697898"/>
-          </a:xfrm>
-          <a:prstGeom prst="rect">
-            <a:avLst/>
-          </a:prstGeom>
-        </p:spPr>
-      </p:pic>
+              <a:t>There are many ways to write the same program, so don’t always settle for the first idea that comes into your head. </a:t>
+            </a:r>
+            <a:r>
+              <a:rPr lang="en-US" i="1" dirty="0"/>
+              <a:t>You can usually improve upon the first thing that comes to mind</a:t>
+            </a:r>
+            <a:r>
+              <a:rPr lang="en-US" dirty="0"/>
+              <a:t>. </a:t>
+            </a:r>
+            <a:endParaRPr lang="en-US" i="1" dirty="0"/>
+          </a:p>
+        </p:txBody>
+      </p:sp>
     </p:spTree>
     <p:extLst>
       <p:ext uri="{BB962C8B-B14F-4D97-AF65-F5344CB8AC3E}">
-        <p14:creationId xmlns:p14="http://schemas.microsoft.com/office/powerpoint/2010/main" val="651769218"/>
+        <p14:creationId xmlns:p14="http://schemas.microsoft.com/office/powerpoint/2010/main" val="932260817"/>
       </p:ext>
     </p:extLst>
   </p:cSld>

</xml_diff>

<commit_message>
speaker notes from Kaz on basicSE slides
</commit_message>
<xml_diff>
--- a/slides/basicSE.pptx
+++ b/slides/basicSE.pptx
@@ -5,7 +5,7 @@
     <p:sldMasterId id="2147484294" r:id="rId1"/>
   </p:sldMasterIdLst>
   <p:notesMasterIdLst>
-    <p:notesMasterId r:id="rId14"/>
+    <p:notesMasterId r:id="rId13"/>
   </p:notesMasterIdLst>
   <p:sldIdLst>
     <p:sldId id="256" r:id="rId2"/>
@@ -19,7 +19,6 @@
     <p:sldId id="262" r:id="rId10"/>
     <p:sldId id="266" r:id="rId11"/>
     <p:sldId id="263" r:id="rId12"/>
-    <p:sldId id="265" r:id="rId13"/>
   </p:sldIdLst>
   <p:sldSz cx="12192000" cy="6858000"/>
   <p:notesSz cx="6858000" cy="9144000"/>
@@ -208,7 +207,7 @@
           <a:p>
             <a:fld id="{A58EF676-DA74-5E46-A6CE-5ED3069388CC}" type="datetimeFigureOut">
               <a:rPr lang="en-US" smtClean="0"/>
-              <a:t>5/18/22</a:t>
+              <a:t>5/17/23</a:t>
             </a:fld>
             <a:endParaRPr lang="en-US"/>
           </a:p>
@@ -519,6 +518,43 @@
           <a:bodyPr/>
           <a:lstStyle/>
           <a:p>
+            <a:pPr marL="0" marR="0" lvl="0" indent="0" algn="l" defTabSz="914400" rtl="0" eaLnBrk="1" fontAlgn="auto" latinLnBrk="0" hangingPunct="1">
+              <a:lnSpc>
+                <a:spcPct val="100000"/>
+              </a:lnSpc>
+              <a:spcBef>
+                <a:spcPts val="0"/>
+              </a:spcBef>
+              <a:spcAft>
+                <a:spcPts val="0"/>
+              </a:spcAft>
+              <a:buClrTx/>
+              <a:buSzTx/>
+              <a:buFontTx/>
+              <a:buNone/>
+              <a:tabLst/>
+              <a:defRPr/>
+            </a:pPr>
+            <a:r>
+              <a:rPr lang="en-US" dirty="0"/>
+              <a:t>Software engineering is defined as: The application of the principles of engineering to software development. These principles include: making efficient use of resources, extensions of existing features, testing the individual components and maintenance of the code you write. So, why care if you’re an astronomer? Well, what we do is complicated so the code we write is complicated. Applying these principles to the code you write will save you headaches and migraines later on. Engineering code based upon these principles will create good habits in the long run. Also, as a side note when we say engineering code, we also mean organizing it, they mean essentially the same thing. Additionally, when we talk about ‘substantially large’ codes, we don’t just mean production-level ones like who Python packages. Any code that you look at and think ‘huh maybe I should organize this a little’ is </a:t>
+            </a:r>
+            <a:r>
+              <a:rPr lang="en-US" baseline="0" dirty="0"/>
+              <a:t>substantially</a:t>
+            </a:r>
+            <a:r>
+              <a:rPr lang="en-US" dirty="0"/>
+              <a:t> large code, whether it’s for a research project or class or an entire Python package.</a:t>
+            </a:r>
+          </a:p>
+          <a:p>
+            <a:endParaRPr lang="en-US" dirty="0"/>
+          </a:p>
+          <a:p>
+            <a:endParaRPr lang="en-US" dirty="0"/>
+          </a:p>
+          <a:p>
             <a:r>
               <a:rPr lang="en-US" dirty="0"/>
               <a:t>Note here that engineering code</a:t>
@@ -719,6 +755,32 @@
           <a:bodyPr/>
           <a:lstStyle/>
           <a:p>
+            <a:pPr marL="0" marR="0" lvl="0" indent="0" algn="l" defTabSz="914400" rtl="0" eaLnBrk="1" fontAlgn="auto" latinLnBrk="0" hangingPunct="1">
+              <a:lnSpc>
+                <a:spcPct val="100000"/>
+              </a:lnSpc>
+              <a:spcBef>
+                <a:spcPts val="0"/>
+              </a:spcBef>
+              <a:spcAft>
+                <a:spcPts val="0"/>
+              </a:spcAft>
+              <a:buClrTx/>
+              <a:buSzTx/>
+              <a:buFontTx/>
+              <a:buNone/>
+              <a:tabLst/>
+              <a:defRPr/>
+            </a:pPr>
+            <a:r>
+              <a:rPr lang="en-US" dirty="0"/>
+              <a:t>The first principle that you should familiarize yourself with in terms of organizing or engineering code is DRY: Don’t Repeat Yourself. The basic idea in this is that you should never write the same code twice within the independent software. And in any piece of code you write, whether it’s a function, file, or an entire application, you should always assume that it is bugged in some subtle, nuanced way that’s not necessarily apparent to you at that moment. We don’t know the bugs we’re going to find in the future within our code. Therefore, the idea behind don’t repeat yourself is that you want to make the correction in one piece of code and then have that correction propagate throughout your entire code. That way, you’re not spending time correcting the same mistake several different times within one piece of code. The caveat to this is that some python packages are written in a modular manner, meaning that every component is implemented independently of the other components. Some people will break this rule across modules, meaning they won’t use the same line of code within one module but might repeat it in other modules. A lot of research scientists, including astronomers, will just tell you to copy and paste code often times and make small changes to it. Don’t do that!!! It breaks the DRY rule.</a:t>
+            </a:r>
+          </a:p>
+          <a:p>
+            <a:endParaRPr lang="en-US" dirty="0"/>
+          </a:p>
+          <a:p>
             <a:r>
               <a:rPr lang="en-US" dirty="0"/>
               <a:t>Specifically address the “oh just copy and paste</a:t>
@@ -813,11 +875,11 @@
           <a:p>
             <a:r>
               <a:rPr lang="en-US" dirty="0"/>
-              <a:t>This is a rule of thumb, and can</a:t>
+              <a:t>Another good rule of thumb is the pneumonic: No Ifs, Ands or Buts. This basically means that each line of code that you write should do exactly one thing, no ifs, ands or buts. If you can’t describe what a file, function, class or just piece of code in general in one simple, declarative statement without an if and or but, you should split it into more than one component. You should be able to say “this file does BLANK”, “this class does BLANK”, etc. It helps to know simply what each piece of code’s purpose is and greatly helps with organization. If everything you write has one simple purpose, it becomes easier to move things around to where they need to go. This rule of thumb can be </a:t>
             </a:r>
             <a:r>
               <a:rPr lang="en-US" baseline="0" dirty="0"/>
-              <a:t> be broken if the phrase can be re-stated without an if, and, or but. For example “fitting a line” and “determining the slope and intercept” are really the same thing and ideally wouldn’t be separated even though the second version has an “and.” </a:t>
+              <a:t>broken if the phrase can be re-stated without an if, and, or but. For example “fitting a line” and “determining the slope and intercept” are really the same thing and ideally wouldn’t be separated even though the second version has an “and.” </a:t>
             </a:r>
             <a:endParaRPr lang="en-US" dirty="0"/>
           </a:p>
@@ -905,7 +967,23 @@
           <a:p>
             <a:r>
               <a:rPr lang="en-US" dirty="0"/>
-              <a:t>Address files and codes with the names “v2”/”v3”/”v4” </a:t>
+              <a:t>If you need it, version control is great for managing large code bases. Version control is basically cataloging previous versions of a software’s source code. Tools like </a:t>
+            </a:r>
+            <a:r>
+              <a:rPr lang="en-US" dirty="0" err="1"/>
+              <a:t>Github</a:t>
+            </a:r>
+            <a:r>
+              <a:rPr lang="en-US" dirty="0"/>
+              <a:t> and Bitbucket were made for this kind of thing. You can access these repositories of code, from platforms like </a:t>
+            </a:r>
+            <a:r>
+              <a:rPr lang="en-US" dirty="0" err="1"/>
+              <a:t>Github</a:t>
+            </a:r>
+            <a:r>
+              <a:rPr lang="en-US" dirty="0"/>
+              <a:t>, with the command line git. And these tools allow you to keep track of all the previous changes in your code in one easily-accessible place. The standard for identifying versions of code is by using the 3-digit system, for example the latest version of Python is: 3.10.4. The first number is for back-compatibility, basically meaning any version with the same first number can be used together while if one version has a different first number (like Python 2), then it will be incompatible with any code running on Python 3. The second number just indicates new features were added to this version of the code and the third number is for bug-fixes between versions. Sometimes, you may run into files and codes with the names “v2”/”v3”/”v4” </a:t>
             </a:r>
             <a:r>
               <a:rPr lang="en-US" dirty="0" err="1"/>
@@ -913,7 +991,15 @@
             </a:r>
             <a:r>
               <a:rPr lang="en-US" dirty="0"/>
-              <a:t> appended on the end of their names. When you see codes with names like that, it’s like a giant banner broadcasting that whoever wrote it has no knowledge of version control. </a:t>
+              <a:t> appended on the end of their names. When you see codes with names like that, it’s like a giant banner broadcasting that whoever wrote it has no knowledge of version control. Version control is not the only thing you can do with </a:t>
+            </a:r>
+            <a:r>
+              <a:rPr lang="en-US" dirty="0" err="1"/>
+              <a:t>Github</a:t>
+            </a:r>
+            <a:r>
+              <a:rPr lang="en-US" dirty="0"/>
+              <a:t> and you certainly don’t have to use it for just that. It’s also a great collaborative tool to share your research code and plots with other scientists or team members.</a:t>
             </a:r>
           </a:p>
         </p:txBody>
@@ -997,6 +1083,75 @@
         <p:txBody>
           <a:bodyPr/>
           <a:lstStyle/>
+          <a:p>
+            <a:pPr marL="0" marR="0" lvl="0" indent="0" algn="l" defTabSz="914400" rtl="0" eaLnBrk="1" fontAlgn="auto" latinLnBrk="0" hangingPunct="1">
+              <a:lnSpc>
+                <a:spcPct val="100000"/>
+              </a:lnSpc>
+              <a:spcBef>
+                <a:spcPts val="0"/>
+              </a:spcBef>
+              <a:spcAft>
+                <a:spcPts val="0"/>
+              </a:spcAft>
+              <a:buClrTx/>
+              <a:buSzTx/>
+              <a:buFontTx/>
+              <a:buNone/>
+              <a:tabLst/>
+              <a:defRPr/>
+            </a:pPr>
+            <a:r>
+              <a:rPr lang="en-US" dirty="0"/>
+              <a:t>It is first and foremost a file-sharing system, but as mentioned previously a great version control tool for developers. For astronomers: </a:t>
+            </a:r>
+            <a:r>
+              <a:rPr lang="en-US" dirty="0" err="1"/>
+              <a:t>Github</a:t>
+            </a:r>
+            <a:r>
+              <a:rPr lang="en-US" dirty="0"/>
+              <a:t> is not only a good way to share code and plots between collaborators but also to manage files from multiple different computers. As graduate students, we have AT MINIMUM a desktop computer in our office and then our own laptops as well. Using </a:t>
+            </a:r>
+            <a:r>
+              <a:rPr lang="en-US" dirty="0" err="1"/>
+              <a:t>Github</a:t>
+            </a:r>
+            <a:r>
+              <a:rPr lang="en-US" dirty="0"/>
+              <a:t>, you can access your code from either of those computers whether you’re at home or school. Using the git command lines, you can upload changes that you’ve made to code from one computer onto </a:t>
+            </a:r>
+            <a:r>
+              <a:rPr lang="en-US" dirty="0" err="1"/>
+              <a:t>Github</a:t>
+            </a:r>
+            <a:r>
+              <a:rPr lang="en-US" dirty="0"/>
+              <a:t> and then pull these changes directly onto another computer to work from there as well. It acts almost like a Google drive, except for your codes and provides a much needed back-up when your computer crashes and you lose all of the code you worked so hard on. Their website will also show you how to set up a repository where you can upload and change your code using the git command lines. </a:t>
+            </a:r>
+            <a:r>
+              <a:rPr lang="en-US" dirty="0" err="1"/>
+              <a:t>BitBucket</a:t>
+            </a:r>
+            <a:r>
+              <a:rPr lang="en-US" dirty="0"/>
+              <a:t> works on the same principle and for those of you who cloned the source material for this bootcamp, you can run git pull and it will automatically download all of the updates we’ve made since you first cloned it. Overall, </a:t>
+            </a:r>
+            <a:r>
+              <a:rPr lang="en-US" dirty="0" err="1"/>
+              <a:t>Github</a:t>
+            </a:r>
+            <a:r>
+              <a:rPr lang="en-US" dirty="0"/>
+              <a:t> is a really useful and life-saving tool and astronomers use it on a daily basis for almost all of their code.</a:t>
+            </a:r>
+          </a:p>
+          <a:p>
+            <a:endParaRPr lang="en-US" dirty="0"/>
+          </a:p>
+          <a:p>
+            <a:endParaRPr lang="en-US" dirty="0"/>
+          </a:p>
           <a:p>
             <a:r>
               <a:rPr lang="en-US" dirty="0"/>
@@ -1722,7 +1877,7 @@
           <a:p>
             <a:fld id="{51673806-0BCD-1F42-BAA8-2011034B3C6A}" type="datetimeFigureOut">
               <a:rPr lang="en-US" smtClean="0"/>
-              <a:t>5/18/22</a:t>
+              <a:t>5/17/23</a:t>
             </a:fld>
             <a:endParaRPr lang="en-US"/>
           </a:p>
@@ -2136,7 +2291,7 @@
           <a:p>
             <a:fld id="{51673806-0BCD-1F42-BAA8-2011034B3C6A}" type="datetimeFigureOut">
               <a:rPr lang="en-US" smtClean="0"/>
-              <a:t>5/18/22</a:t>
+              <a:t>5/17/23</a:t>
             </a:fld>
             <a:endParaRPr lang="en-US"/>
           </a:p>
@@ -2467,7 +2622,7 @@
           <a:p>
             <a:fld id="{51673806-0BCD-1F42-BAA8-2011034B3C6A}" type="datetimeFigureOut">
               <a:rPr lang="en-US" smtClean="0"/>
-              <a:t>5/18/22</a:t>
+              <a:t>5/17/23</a:t>
             </a:fld>
             <a:endParaRPr lang="en-US"/>
           </a:p>
@@ -2867,7 +3022,7 @@
           <a:p>
             <a:fld id="{51673806-0BCD-1F42-BAA8-2011034B3C6A}" type="datetimeFigureOut">
               <a:rPr lang="en-US" smtClean="0"/>
-              <a:t>5/18/22</a:t>
+              <a:t>5/17/23</a:t>
             </a:fld>
             <a:endParaRPr lang="en-US"/>
           </a:p>
@@ -3430,7 +3585,7 @@
           <a:p>
             <a:fld id="{51673806-0BCD-1F42-BAA8-2011034B3C6A}" type="datetimeFigureOut">
               <a:rPr lang="en-US" smtClean="0"/>
-              <a:t>5/18/22</a:t>
+              <a:t>5/17/23</a:t>
             </a:fld>
             <a:endParaRPr lang="en-US"/>
           </a:p>
@@ -4106,7 +4261,7 @@
           <a:p>
             <a:fld id="{51673806-0BCD-1F42-BAA8-2011034B3C6A}" type="datetimeFigureOut">
               <a:rPr lang="en-US" smtClean="0"/>
-              <a:t>5/18/22</a:t>
+              <a:t>5/17/23</a:t>
             </a:fld>
             <a:endParaRPr lang="en-US"/>
           </a:p>
@@ -5014,7 +5169,7 @@
           <a:p>
             <a:fld id="{51673806-0BCD-1F42-BAA8-2011034B3C6A}" type="datetimeFigureOut">
               <a:rPr lang="en-US" smtClean="0"/>
-              <a:t>5/18/22</a:t>
+              <a:t>5/17/23</a:t>
             </a:fld>
             <a:endParaRPr lang="en-US"/>
           </a:p>
@@ -5322,7 +5477,7 @@
           <a:p>
             <a:fld id="{51673806-0BCD-1F42-BAA8-2011034B3C6A}" type="datetimeFigureOut">
               <a:rPr lang="en-US" smtClean="0"/>
-              <a:t>5/18/22</a:t>
+              <a:t>5/17/23</a:t>
             </a:fld>
             <a:endParaRPr lang="en-US"/>
           </a:p>
@@ -5581,7 +5736,7 @@
           <a:p>
             <a:fld id="{51673806-0BCD-1F42-BAA8-2011034B3C6A}" type="datetimeFigureOut">
               <a:rPr lang="en-US" smtClean="0"/>
-              <a:t>5/18/22</a:t>
+              <a:t>5/17/23</a:t>
             </a:fld>
             <a:endParaRPr lang="en-US"/>
           </a:p>
@@ -5904,7 +6059,7 @@
           <a:p>
             <a:fld id="{51673806-0BCD-1F42-BAA8-2011034B3C6A}" type="datetimeFigureOut">
               <a:rPr lang="en-US" smtClean="0"/>
-              <a:t>5/18/22</a:t>
+              <a:t>5/17/23</a:t>
             </a:fld>
             <a:endParaRPr lang="en-US"/>
           </a:p>
@@ -6288,7 +6443,7 @@
           <a:p>
             <a:fld id="{51673806-0BCD-1F42-BAA8-2011034B3C6A}" type="datetimeFigureOut">
               <a:rPr lang="en-US" smtClean="0"/>
-              <a:t>5/18/22</a:t>
+              <a:t>5/17/23</a:t>
             </a:fld>
             <a:endParaRPr lang="en-US"/>
           </a:p>
@@ -6664,7 +6819,7 @@
           <a:p>
             <a:fld id="{51673806-0BCD-1F42-BAA8-2011034B3C6A}" type="datetimeFigureOut">
               <a:rPr lang="en-US" smtClean="0"/>
-              <a:t>5/18/22</a:t>
+              <a:t>5/17/23</a:t>
             </a:fld>
             <a:endParaRPr lang="en-US"/>
           </a:p>
@@ -7170,7 +7325,7 @@
           <a:p>
             <a:fld id="{51673806-0BCD-1F42-BAA8-2011034B3C6A}" type="datetimeFigureOut">
               <a:rPr lang="en-US" smtClean="0"/>
-              <a:t>5/18/22</a:t>
+              <a:t>5/17/23</a:t>
             </a:fld>
             <a:endParaRPr lang="en-US"/>
           </a:p>
@@ -7427,7 +7582,7 @@
           <a:p>
             <a:fld id="{51673806-0BCD-1F42-BAA8-2011034B3C6A}" type="datetimeFigureOut">
               <a:rPr lang="en-US" smtClean="0"/>
-              <a:t>5/18/22</a:t>
+              <a:t>5/17/23</a:t>
             </a:fld>
             <a:endParaRPr lang="en-US"/>
           </a:p>
@@ -7585,7 +7740,7 @@
           <a:p>
             <a:fld id="{51673806-0BCD-1F42-BAA8-2011034B3C6A}" type="datetimeFigureOut">
               <a:rPr lang="en-US" smtClean="0"/>
-              <a:t>5/18/22</a:t>
+              <a:t>5/17/23</a:t>
             </a:fld>
             <a:endParaRPr lang="en-US"/>
           </a:p>
@@ -7975,7 +8130,7 @@
           <a:p>
             <a:fld id="{51673806-0BCD-1F42-BAA8-2011034B3C6A}" type="datetimeFigureOut">
               <a:rPr lang="en-US" smtClean="0"/>
-              <a:t>5/18/22</a:t>
+              <a:t>5/17/23</a:t>
             </a:fld>
             <a:endParaRPr lang="en-US"/>
           </a:p>
@@ -8384,7 +8539,7 @@
           <a:p>
             <a:fld id="{51673806-0BCD-1F42-BAA8-2011034B3C6A}" type="datetimeFigureOut">
               <a:rPr lang="en-US" smtClean="0"/>
-              <a:t>5/18/22</a:t>
+              <a:t>5/17/23</a:t>
             </a:fld>
             <a:endParaRPr lang="en-US"/>
           </a:p>
@@ -8630,7 +8785,7 @@
             <a:fld id="{51673806-0BCD-1F42-BAA8-2011034B3C6A}" type="datetimeFigureOut">
               <a:rPr lang="en-US" smtClean="0"/>
               <a:pPr/>
-              <a:t>5/18/22</a:t>
+              <a:t>5/17/23</a:t>
             </a:fld>
             <a:endParaRPr lang="en-US" dirty="0"/>
           </a:p>
@@ -9571,154 +9726,6 @@
     <p:extLst>
       <p:ext uri="{BB962C8B-B14F-4D97-AF65-F5344CB8AC3E}">
         <p14:creationId xmlns:p14="http://schemas.microsoft.com/office/powerpoint/2010/main" val="2027507245"/>
-      </p:ext>
-    </p:extLst>
-  </p:cSld>
-  <p:clrMapOvr>
-    <a:masterClrMapping/>
-  </p:clrMapOvr>
-</p:sld>
-</file>
-
-<file path=ppt/slides/slide12.xml><?xml version="1.0" encoding="utf-8"?>
-<p:sld xmlns:a="http://schemas.openxmlformats.org/drawingml/2006/main" xmlns:r="http://schemas.openxmlformats.org/officeDocument/2006/relationships" xmlns:p="http://schemas.openxmlformats.org/presentationml/2006/main">
-  <p:cSld>
-    <p:spTree>
-      <p:nvGrpSpPr>
-        <p:cNvPr id="1" name=""/>
-        <p:cNvGrpSpPr/>
-        <p:nvPr/>
-      </p:nvGrpSpPr>
-      <p:grpSpPr>
-        <a:xfrm>
-          <a:off x="0" y="0"/>
-          <a:ext cx="0" cy="0"/>
-          <a:chOff x="0" y="0"/>
-          <a:chExt cx="0" cy="0"/>
-        </a:xfrm>
-      </p:grpSpPr>
-      <p:sp>
-        <p:nvSpPr>
-          <p:cNvPr id="2" name="Title 1"/>
-          <p:cNvSpPr>
-            <a:spLocks noGrp="1"/>
-          </p:cNvSpPr>
-          <p:nvPr>
-            <p:ph type="title"/>
-          </p:nvPr>
-        </p:nvSpPr>
-        <p:spPr/>
-        <p:txBody>
-          <a:bodyPr/>
-          <a:lstStyle/>
-          <a:p>
-            <a:endParaRPr lang="en-US"/>
-          </a:p>
-        </p:txBody>
-      </p:sp>
-      <p:sp>
-        <p:nvSpPr>
-          <p:cNvPr id="3" name="Content Placeholder 2"/>
-          <p:cNvSpPr>
-            <a:spLocks noGrp="1"/>
-          </p:cNvSpPr>
-          <p:nvPr>
-            <p:ph idx="1"/>
-          </p:nvPr>
-        </p:nvSpPr>
-        <p:spPr/>
-        <p:txBody>
-          <a:bodyPr/>
-          <a:lstStyle/>
-          <a:p>
-            <a:pPr marL="0" marR="0" lvl="0" indent="0" algn="ctr" defTabSz="914400" eaLnBrk="1" fontAlgn="auto" latinLnBrk="0" hangingPunct="1">
-              <a:lnSpc>
-                <a:spcPct val="100000"/>
-              </a:lnSpc>
-              <a:spcBef>
-                <a:spcPts val="0"/>
-              </a:spcBef>
-              <a:spcAft>
-                <a:spcPts val="0"/>
-              </a:spcAft>
-              <a:buClrTx/>
-              <a:buSzTx/>
-              <a:buFontTx/>
-              <a:buNone/>
-              <a:tabLst/>
-              <a:defRPr/>
-            </a:pPr>
-            <a:endParaRPr lang="en-US" dirty="0"/>
-          </a:p>
-          <a:p>
-            <a:pPr marL="0" marR="0" lvl="0" indent="0" algn="ctr" defTabSz="914400" eaLnBrk="1" fontAlgn="auto" latinLnBrk="0" hangingPunct="1">
-              <a:lnSpc>
-                <a:spcPct val="100000"/>
-              </a:lnSpc>
-              <a:spcBef>
-                <a:spcPts val="0"/>
-              </a:spcBef>
-              <a:spcAft>
-                <a:spcPts val="0"/>
-              </a:spcAft>
-              <a:buClrTx/>
-              <a:buSzTx/>
-              <a:buFontTx/>
-              <a:buNone/>
-              <a:tabLst/>
-              <a:defRPr/>
-            </a:pPr>
-            <a:endParaRPr lang="en-US" dirty="0"/>
-          </a:p>
-          <a:p>
-            <a:pPr marL="0" marR="0" lvl="0" indent="0" algn="ctr" defTabSz="914400" eaLnBrk="1" fontAlgn="auto" latinLnBrk="0" hangingPunct="1">
-              <a:lnSpc>
-                <a:spcPct val="100000"/>
-              </a:lnSpc>
-              <a:spcBef>
-                <a:spcPts val="0"/>
-              </a:spcBef>
-              <a:spcAft>
-                <a:spcPts val="0"/>
-              </a:spcAft>
-              <a:buClrTx/>
-              <a:buSzTx/>
-              <a:buFontTx/>
-              <a:buNone/>
-              <a:tabLst/>
-              <a:defRPr/>
-            </a:pPr>
-            <a:endParaRPr lang="en-US" dirty="0"/>
-          </a:p>
-          <a:p>
-            <a:pPr marL="0" marR="0" lvl="0" indent="0" algn="ctr" defTabSz="914400" eaLnBrk="1" fontAlgn="auto" latinLnBrk="0" hangingPunct="1">
-              <a:lnSpc>
-                <a:spcPct val="100000"/>
-              </a:lnSpc>
-              <a:spcBef>
-                <a:spcPts val="0"/>
-              </a:spcBef>
-              <a:spcAft>
-                <a:spcPts val="0"/>
-              </a:spcAft>
-              <a:buClrTx/>
-              <a:buSzTx/>
-              <a:buFontTx/>
-              <a:buNone/>
-              <a:tabLst/>
-              <a:defRPr/>
-            </a:pPr>
-            <a:r>
-              <a:rPr lang="en-US" sz="6000" dirty="0"/>
-              <a:t>Thank you!</a:t>
-            </a:r>
-          </a:p>
-        </p:txBody>
-      </p:sp>
-    </p:spTree>
-    <p:extLst>
-      <p:ext uri="{BB962C8B-B14F-4D97-AF65-F5344CB8AC3E}">
-        <p14:creationId xmlns:p14="http://schemas.microsoft.com/office/powerpoint/2010/main" val="2037745443"/>
       </p:ext>
     </p:extLst>
   </p:cSld>

</xml_diff>